<commit_message>
test case and documentation
</commit_message>
<xml_diff>
--- a/doc/images/ImageSources.pptx
+++ b/doc/images/ImageSources.pptx
@@ -5,7 +5,7 @@
     <p:sldMasterId id="2147483648" r:id="rId1"/>
   </p:sldMasterIdLst>
   <p:sldIdLst>
-    <p:sldId id="257" r:id="rId2"/>
+    <p:sldId id="259" r:id="rId2"/>
     <p:sldId id="258" r:id="rId3"/>
   </p:sldIdLst>
   <p:sldSz cx="12192000" cy="6858000"/>
@@ -110,7 +110,7 @@
       <p14:sectionLst xmlns:p14="http://schemas.microsoft.com/office/powerpoint/2010/main">
         <p14:section name="Default Section" id="{A7BD87C3-F855-4348-B876-2AADA34CFF03}">
           <p14:sldIdLst>
-            <p14:sldId id="257"/>
+            <p14:sldId id="259"/>
             <p14:sldId id="258"/>
           </p14:sldIdLst>
         </p14:section>
@@ -252,7 +252,7 @@
           <a:p>
             <a:fld id="{03ABD037-9D82-4436-AC70-ED75D2FE9417}" type="datetimeFigureOut">
               <a:rPr lang="en-US" smtClean="0"/>
-              <a:t>7/16/2019</a:t>
+              <a:t>7/17/2019</a:t>
             </a:fld>
             <a:endParaRPr lang="en-US"/>
           </a:p>
@@ -420,7 +420,7 @@
           <a:p>
             <a:fld id="{03ABD037-9D82-4436-AC70-ED75D2FE9417}" type="datetimeFigureOut">
               <a:rPr lang="en-US" smtClean="0"/>
-              <a:t>7/16/2019</a:t>
+              <a:t>7/17/2019</a:t>
             </a:fld>
             <a:endParaRPr lang="en-US"/>
           </a:p>
@@ -598,7 +598,7 @@
           <a:p>
             <a:fld id="{03ABD037-9D82-4436-AC70-ED75D2FE9417}" type="datetimeFigureOut">
               <a:rPr lang="en-US" smtClean="0"/>
-              <a:t>7/16/2019</a:t>
+              <a:t>7/17/2019</a:t>
             </a:fld>
             <a:endParaRPr lang="en-US"/>
           </a:p>
@@ -766,7 +766,7 @@
           <a:p>
             <a:fld id="{03ABD037-9D82-4436-AC70-ED75D2FE9417}" type="datetimeFigureOut">
               <a:rPr lang="en-US" smtClean="0"/>
-              <a:t>7/16/2019</a:t>
+              <a:t>7/17/2019</a:t>
             </a:fld>
             <a:endParaRPr lang="en-US"/>
           </a:p>
@@ -1011,7 +1011,7 @@
           <a:p>
             <a:fld id="{03ABD037-9D82-4436-AC70-ED75D2FE9417}" type="datetimeFigureOut">
               <a:rPr lang="en-US" smtClean="0"/>
-              <a:t>7/16/2019</a:t>
+              <a:t>7/17/2019</a:t>
             </a:fld>
             <a:endParaRPr lang="en-US"/>
           </a:p>
@@ -1240,7 +1240,7 @@
           <a:p>
             <a:fld id="{03ABD037-9D82-4436-AC70-ED75D2FE9417}" type="datetimeFigureOut">
               <a:rPr lang="en-US" smtClean="0"/>
-              <a:t>7/16/2019</a:t>
+              <a:t>7/17/2019</a:t>
             </a:fld>
             <a:endParaRPr lang="en-US"/>
           </a:p>
@@ -1604,7 +1604,7 @@
           <a:p>
             <a:fld id="{03ABD037-9D82-4436-AC70-ED75D2FE9417}" type="datetimeFigureOut">
               <a:rPr lang="en-US" smtClean="0"/>
-              <a:t>7/16/2019</a:t>
+              <a:t>7/17/2019</a:t>
             </a:fld>
             <a:endParaRPr lang="en-US"/>
           </a:p>
@@ -1721,7 +1721,7 @@
           <a:p>
             <a:fld id="{03ABD037-9D82-4436-AC70-ED75D2FE9417}" type="datetimeFigureOut">
               <a:rPr lang="en-US" smtClean="0"/>
-              <a:t>7/16/2019</a:t>
+              <a:t>7/17/2019</a:t>
             </a:fld>
             <a:endParaRPr lang="en-US"/>
           </a:p>
@@ -1816,7 +1816,7 @@
           <a:p>
             <a:fld id="{03ABD037-9D82-4436-AC70-ED75D2FE9417}" type="datetimeFigureOut">
               <a:rPr lang="en-US" smtClean="0"/>
-              <a:t>7/16/2019</a:t>
+              <a:t>7/17/2019</a:t>
             </a:fld>
             <a:endParaRPr lang="en-US"/>
           </a:p>
@@ -2091,7 +2091,7 @@
           <a:p>
             <a:fld id="{03ABD037-9D82-4436-AC70-ED75D2FE9417}" type="datetimeFigureOut">
               <a:rPr lang="en-US" smtClean="0"/>
-              <a:t>7/16/2019</a:t>
+              <a:t>7/17/2019</a:t>
             </a:fld>
             <a:endParaRPr lang="en-US"/>
           </a:p>
@@ -2343,7 +2343,7 @@
           <a:p>
             <a:fld id="{03ABD037-9D82-4436-AC70-ED75D2FE9417}" type="datetimeFigureOut">
               <a:rPr lang="en-US" smtClean="0"/>
-              <a:t>7/16/2019</a:t>
+              <a:t>7/17/2019</a:t>
             </a:fld>
             <a:endParaRPr lang="en-US"/>
           </a:p>
@@ -2554,7 +2554,7 @@
           <a:p>
             <a:fld id="{03ABD037-9D82-4436-AC70-ED75D2FE9417}" type="datetimeFigureOut">
               <a:rPr lang="en-US" smtClean="0"/>
-              <a:t>7/16/2019</a:t>
+              <a:t>7/17/2019</a:t>
             </a:fld>
             <a:endParaRPr lang="en-US"/>
           </a:p>
@@ -3251,42 +3251,6 @@
       </p:sp>
       <p:sp>
         <p:nvSpPr>
-          <p:cNvPr id="8" name="TextBox 7">
-            <a:extLst>
-              <a:ext uri="{FF2B5EF4-FFF2-40B4-BE49-F238E27FC236}">
-                <a16:creationId xmlns:a16="http://schemas.microsoft.com/office/drawing/2014/main" id="{65065511-4BA5-4904-8562-3036DAFC8EE7}"/>
-              </a:ext>
-            </a:extLst>
-          </p:cNvPr>
-          <p:cNvSpPr txBox="1"/>
-          <p:nvPr/>
-        </p:nvSpPr>
-        <p:spPr>
-          <a:xfrm>
-            <a:off x="6698972" y="218662"/>
-            <a:ext cx="1914307" cy="461665"/>
-          </a:xfrm>
-          <a:prstGeom prst="rect">
-            <a:avLst/>
-          </a:prstGeom>
-          <a:noFill/>
-        </p:spPr>
-        <p:txBody>
-          <a:bodyPr wrap="none" rtlCol="0">
-            <a:spAutoFit/>
-          </a:bodyPr>
-          <a:lstStyle/>
-          <a:p>
-            <a:r>
-              <a:rPr lang="en-US" sz="2400" b="1" dirty="0" err="1"/>
-              <a:t>SubjectShape</a:t>
-            </a:r>
-            <a:endParaRPr lang="en-US" sz="2400" b="1" dirty="0"/>
-          </a:p>
-        </p:txBody>
-      </p:sp>
-      <p:sp>
-        <p:nvSpPr>
           <p:cNvPr id="19" name="TextBox 18">
             <a:extLst>
               <a:ext uri="{FF2B5EF4-FFF2-40B4-BE49-F238E27FC236}">
@@ -3341,7 +3305,7 @@
         <p:spPr>
           <a:xfrm>
             <a:off x="7235686" y="4181061"/>
-            <a:ext cx="2037737" cy="461665"/>
+            <a:ext cx="2004075" cy="461665"/>
           </a:xfrm>
           <a:prstGeom prst="rect">
             <a:avLst/>
@@ -3355,8 +3319,14 @@
           <a:lstStyle/>
           <a:p>
             <a:r>
-              <a:rPr lang="en-US" sz="2400" i="1" dirty="0"/>
-              <a:t>...other shapes</a:t>
+              <a:rPr lang="en-US" sz="2400" i="1" dirty="0">
+                <a:solidFill>
+                  <a:schemeClr val="bg1">
+                    <a:lumMod val="65000"/>
+                  </a:schemeClr>
+                </a:solidFill>
+              </a:rPr>
+              <a:t>...more shapes</a:t>
             </a:r>
           </a:p>
         </p:txBody>
@@ -3619,10 +3589,52 @@
           </a:p>
         </p:txBody>
       </p:sp>
+      <p:sp>
+        <p:nvSpPr>
+          <p:cNvPr id="13" name="TextBox 12">
+            <a:extLst>
+              <a:ext uri="{FF2B5EF4-FFF2-40B4-BE49-F238E27FC236}">
+                <a16:creationId xmlns:a16="http://schemas.microsoft.com/office/drawing/2014/main" id="{47A2AA95-FF59-4D21-BCDB-A931A9C8AB84}"/>
+              </a:ext>
+            </a:extLst>
+          </p:cNvPr>
+          <p:cNvSpPr txBox="1"/>
+          <p:nvPr/>
+        </p:nvSpPr>
+        <p:spPr>
+          <a:xfrm>
+            <a:off x="877558" y="4174965"/>
+            <a:ext cx="1714508" cy="461665"/>
+          </a:xfrm>
+          <a:prstGeom prst="rect">
+            <a:avLst/>
+          </a:prstGeom>
+          <a:noFill/>
+        </p:spPr>
+        <p:txBody>
+          <a:bodyPr wrap="none" rtlCol="0">
+            <a:spAutoFit/>
+          </a:bodyPr>
+          <a:lstStyle/>
+          <a:p>
+            <a:r>
+              <a:rPr lang="en-US" sz="2400" i="1" dirty="0">
+                <a:solidFill>
+                  <a:schemeClr val="tx1">
+                    <a:lumMod val="50000"/>
+                    <a:lumOff val="50000"/>
+                  </a:schemeClr>
+                </a:solidFill>
+              </a:rPr>
+              <a:t>...more data</a:t>
+            </a:r>
+          </a:p>
+        </p:txBody>
+      </p:sp>
     </p:spTree>
     <p:extLst>
       <p:ext uri="{BB962C8B-B14F-4D97-AF65-F5344CB8AC3E}">
-        <p14:creationId xmlns:p14="http://schemas.microsoft.com/office/powerpoint/2010/main" val="3319063907"/>
+        <p14:creationId xmlns:p14="http://schemas.microsoft.com/office/powerpoint/2010/main" val="3442749000"/>
       </p:ext>
     </p:extLst>
   </p:cSld>

</xml_diff>

<commit_message>
new approach. Full example
</commit_message>
<xml_diff>
--- a/doc/images/ImageSources.pptx
+++ b/doc/images/ImageSources.pptx
@@ -6,7 +6,8 @@
   </p:sldMasterIdLst>
   <p:sldIdLst>
     <p:sldId id="259" r:id="rId2"/>
-    <p:sldId id="258" r:id="rId3"/>
+    <p:sldId id="260" r:id="rId3"/>
+    <p:sldId id="258" r:id="rId4"/>
   </p:sldIdLst>
   <p:sldSz cx="12192000" cy="6858000"/>
   <p:notesSz cx="6858000" cy="9144000"/>
@@ -111,6 +112,7 @@
         <p14:section name="Default Section" id="{A7BD87C3-F855-4348-B876-2AADA34CFF03}">
           <p14:sldIdLst>
             <p14:sldId id="259"/>
+            <p14:sldId id="260"/>
             <p14:sldId id="258"/>
           </p14:sldIdLst>
         </p14:section>
@@ -252,7 +254,7 @@
           <a:p>
             <a:fld id="{03ABD037-9D82-4436-AC70-ED75D2FE9417}" type="datetimeFigureOut">
               <a:rPr lang="en-US" smtClean="0"/>
-              <a:t>7/17/2019</a:t>
+              <a:t>7/18/2019</a:t>
             </a:fld>
             <a:endParaRPr lang="en-US"/>
           </a:p>
@@ -420,7 +422,7 @@
           <a:p>
             <a:fld id="{03ABD037-9D82-4436-AC70-ED75D2FE9417}" type="datetimeFigureOut">
               <a:rPr lang="en-US" smtClean="0"/>
-              <a:t>7/17/2019</a:t>
+              <a:t>7/18/2019</a:t>
             </a:fld>
             <a:endParaRPr lang="en-US"/>
           </a:p>
@@ -598,7 +600,7 @@
           <a:p>
             <a:fld id="{03ABD037-9D82-4436-AC70-ED75D2FE9417}" type="datetimeFigureOut">
               <a:rPr lang="en-US" smtClean="0"/>
-              <a:t>7/17/2019</a:t>
+              <a:t>7/18/2019</a:t>
             </a:fld>
             <a:endParaRPr lang="en-US"/>
           </a:p>
@@ -766,7 +768,7 @@
           <a:p>
             <a:fld id="{03ABD037-9D82-4436-AC70-ED75D2FE9417}" type="datetimeFigureOut">
               <a:rPr lang="en-US" smtClean="0"/>
-              <a:t>7/17/2019</a:t>
+              <a:t>7/18/2019</a:t>
             </a:fld>
             <a:endParaRPr lang="en-US"/>
           </a:p>
@@ -1011,7 +1013,7 @@
           <a:p>
             <a:fld id="{03ABD037-9D82-4436-AC70-ED75D2FE9417}" type="datetimeFigureOut">
               <a:rPr lang="en-US" smtClean="0"/>
-              <a:t>7/17/2019</a:t>
+              <a:t>7/18/2019</a:t>
             </a:fld>
             <a:endParaRPr lang="en-US"/>
           </a:p>
@@ -1240,7 +1242,7 @@
           <a:p>
             <a:fld id="{03ABD037-9D82-4436-AC70-ED75D2FE9417}" type="datetimeFigureOut">
               <a:rPr lang="en-US" smtClean="0"/>
-              <a:t>7/17/2019</a:t>
+              <a:t>7/18/2019</a:t>
             </a:fld>
             <a:endParaRPr lang="en-US"/>
           </a:p>
@@ -1604,7 +1606,7 @@
           <a:p>
             <a:fld id="{03ABD037-9D82-4436-AC70-ED75D2FE9417}" type="datetimeFigureOut">
               <a:rPr lang="en-US" smtClean="0"/>
-              <a:t>7/17/2019</a:t>
+              <a:t>7/18/2019</a:t>
             </a:fld>
             <a:endParaRPr lang="en-US"/>
           </a:p>
@@ -1721,7 +1723,7 @@
           <a:p>
             <a:fld id="{03ABD037-9D82-4436-AC70-ED75D2FE9417}" type="datetimeFigureOut">
               <a:rPr lang="en-US" smtClean="0"/>
-              <a:t>7/17/2019</a:t>
+              <a:t>7/18/2019</a:t>
             </a:fld>
             <a:endParaRPr lang="en-US"/>
           </a:p>
@@ -1816,7 +1818,7 @@
           <a:p>
             <a:fld id="{03ABD037-9D82-4436-AC70-ED75D2FE9417}" type="datetimeFigureOut">
               <a:rPr lang="en-US" smtClean="0"/>
-              <a:t>7/17/2019</a:t>
+              <a:t>7/18/2019</a:t>
             </a:fld>
             <a:endParaRPr lang="en-US"/>
           </a:p>
@@ -2091,7 +2093,7 @@
           <a:p>
             <a:fld id="{03ABD037-9D82-4436-AC70-ED75D2FE9417}" type="datetimeFigureOut">
               <a:rPr lang="en-US" smtClean="0"/>
-              <a:t>7/17/2019</a:t>
+              <a:t>7/18/2019</a:t>
             </a:fld>
             <a:endParaRPr lang="en-US"/>
           </a:p>
@@ -2343,7 +2345,7 @@
           <a:p>
             <a:fld id="{03ABD037-9D82-4436-AC70-ED75D2FE9417}" type="datetimeFigureOut">
               <a:rPr lang="en-US" smtClean="0"/>
-              <a:t>7/17/2019</a:t>
+              <a:t>7/18/2019</a:t>
             </a:fld>
             <a:endParaRPr lang="en-US"/>
           </a:p>
@@ -2554,7 +2556,7 @@
           <a:p>
             <a:fld id="{03ABD037-9D82-4436-AC70-ED75D2FE9417}" type="datetimeFigureOut">
               <a:rPr lang="en-US" smtClean="0"/>
-              <a:t>7/17/2019</a:t>
+              <a:t>7/18/2019</a:t>
             </a:fld>
             <a:endParaRPr lang="en-US"/>
           </a:p>
@@ -3663,6 +3665,602 @@
       </p:grpSpPr>
       <p:sp>
         <p:nvSpPr>
+          <p:cNvPr id="15" name="Rectangle: Rounded Corners 14">
+            <a:extLst>
+              <a:ext uri="{FF2B5EF4-FFF2-40B4-BE49-F238E27FC236}">
+                <a16:creationId xmlns:a16="http://schemas.microsoft.com/office/drawing/2014/main" id="{FA40E339-40A8-448E-A741-015329DCA7D1}"/>
+              </a:ext>
+            </a:extLst>
+          </p:cNvPr>
+          <p:cNvSpPr/>
+          <p:nvPr/>
+        </p:nvSpPr>
+        <p:spPr>
+          <a:xfrm>
+            <a:off x="318052" y="1264951"/>
+            <a:ext cx="8746435" cy="2750458"/>
+          </a:xfrm>
+          <a:prstGeom prst="roundRect">
+            <a:avLst/>
+          </a:prstGeom>
+          <a:solidFill>
+            <a:schemeClr val="bg1">
+              <a:lumMod val="95000"/>
+            </a:schemeClr>
+          </a:solidFill>
+          <a:ln>
+            <a:solidFill>
+              <a:schemeClr val="tx1"/>
+            </a:solidFill>
+          </a:ln>
+        </p:spPr>
+        <p:style>
+          <a:lnRef idx="2">
+            <a:schemeClr val="accent1">
+              <a:shade val="50000"/>
+            </a:schemeClr>
+          </a:lnRef>
+          <a:fillRef idx="1">
+            <a:schemeClr val="accent1"/>
+          </a:fillRef>
+          <a:effectRef idx="0">
+            <a:schemeClr val="accent1"/>
+          </a:effectRef>
+          <a:fontRef idx="minor">
+            <a:schemeClr val="lt1"/>
+          </a:fontRef>
+        </p:style>
+        <p:txBody>
+          <a:bodyPr rtlCol="0" anchor="ctr"/>
+          <a:lstStyle/>
+          <a:p>
+            <a:pPr algn="ctr"/>
+            <a:endParaRPr lang="en-US" b="1" dirty="0">
+              <a:solidFill>
+                <a:schemeClr val="tx1"/>
+              </a:solidFill>
+            </a:endParaRPr>
+          </a:p>
+        </p:txBody>
+      </p:sp>
+      <p:sp>
+        <p:nvSpPr>
+          <p:cNvPr id="19" name="TextBox 18">
+            <a:extLst>
+              <a:ext uri="{FF2B5EF4-FFF2-40B4-BE49-F238E27FC236}">
+                <a16:creationId xmlns:a16="http://schemas.microsoft.com/office/drawing/2014/main" id="{4F329E82-4FE1-4EE2-909E-1739258B41D6}"/>
+              </a:ext>
+            </a:extLst>
+          </p:cNvPr>
+          <p:cNvSpPr txBox="1"/>
+          <p:nvPr/>
+        </p:nvSpPr>
+        <p:spPr>
+          <a:xfrm>
+            <a:off x="5690268" y="3215821"/>
+            <a:ext cx="1930337" cy="461665"/>
+          </a:xfrm>
+          <a:prstGeom prst="rect">
+            <a:avLst/>
+          </a:prstGeom>
+          <a:noFill/>
+        </p:spPr>
+        <p:txBody>
+          <a:bodyPr wrap="none" rtlCol="0">
+            <a:spAutoFit/>
+          </a:bodyPr>
+          <a:lstStyle/>
+          <a:p>
+            <a:r>
+              <a:rPr lang="en-US" sz="2400" b="1" dirty="0">
+                <a:solidFill>
+                  <a:srgbClr val="996699"/>
+                </a:solidFill>
+              </a:rPr>
+              <a:t>SD1002Shape</a:t>
+            </a:r>
+          </a:p>
+        </p:txBody>
+      </p:sp>
+      <p:sp>
+        <p:nvSpPr>
+          <p:cNvPr id="22" name="TextBox 21">
+            <a:extLst>
+              <a:ext uri="{FF2B5EF4-FFF2-40B4-BE49-F238E27FC236}">
+                <a16:creationId xmlns:a16="http://schemas.microsoft.com/office/drawing/2014/main" id="{5604566B-9473-44E6-A9F0-16B413C2F315}"/>
+              </a:ext>
+            </a:extLst>
+          </p:cNvPr>
+          <p:cNvSpPr txBox="1"/>
+          <p:nvPr/>
+        </p:nvSpPr>
+        <p:spPr>
+          <a:xfrm>
+            <a:off x="6950450" y="1971165"/>
+            <a:ext cx="1792927" cy="461665"/>
+          </a:xfrm>
+          <a:prstGeom prst="rect">
+            <a:avLst/>
+          </a:prstGeom>
+          <a:noFill/>
+        </p:spPr>
+        <p:txBody>
+          <a:bodyPr wrap="none" rtlCol="0">
+            <a:spAutoFit/>
+          </a:bodyPr>
+          <a:lstStyle/>
+          <a:p>
+            <a:r>
+              <a:rPr lang="en-US" sz="2400" b="1" dirty="0" err="1">
+                <a:solidFill>
+                  <a:schemeClr val="accent1">
+                    <a:lumMod val="75000"/>
+                  </a:schemeClr>
+                </a:solidFill>
+              </a:rPr>
+              <a:t>rfstdtcShape</a:t>
+            </a:r>
+            <a:endParaRPr lang="en-US" sz="2400" b="1" dirty="0">
+              <a:solidFill>
+                <a:schemeClr val="accent1">
+                  <a:lumMod val="75000"/>
+                </a:schemeClr>
+              </a:solidFill>
+            </a:endParaRPr>
+          </a:p>
+        </p:txBody>
+      </p:sp>
+      <p:sp>
+        <p:nvSpPr>
+          <p:cNvPr id="23" name="TextBox 22">
+            <a:extLst>
+              <a:ext uri="{FF2B5EF4-FFF2-40B4-BE49-F238E27FC236}">
+                <a16:creationId xmlns:a16="http://schemas.microsoft.com/office/drawing/2014/main" id="{CD7F6E51-1BA6-4815-8455-7C3C94C69EA6}"/>
+              </a:ext>
+            </a:extLst>
+          </p:cNvPr>
+          <p:cNvSpPr txBox="1"/>
+          <p:nvPr/>
+        </p:nvSpPr>
+        <p:spPr>
+          <a:xfrm>
+            <a:off x="5900372" y="854765"/>
+            <a:ext cx="2818400" cy="461665"/>
+          </a:xfrm>
+          <a:prstGeom prst="rect">
+            <a:avLst/>
+          </a:prstGeom>
+          <a:noFill/>
+        </p:spPr>
+        <p:txBody>
+          <a:bodyPr wrap="none" rtlCol="0">
+            <a:spAutoFit/>
+          </a:bodyPr>
+          <a:lstStyle/>
+          <a:p>
+            <a:r>
+              <a:rPr lang="en-US" sz="2400" b="1" dirty="0" err="1">
+                <a:solidFill>
+                  <a:schemeClr val="bg1">
+                    <a:lumMod val="50000"/>
+                  </a:schemeClr>
+                </a:solidFill>
+              </a:rPr>
+              <a:t>AnimalSubjectShape</a:t>
+            </a:r>
+            <a:endParaRPr lang="en-US" sz="2400" b="1" dirty="0">
+              <a:solidFill>
+                <a:schemeClr val="bg1">
+                  <a:lumMod val="50000"/>
+                </a:schemeClr>
+              </a:solidFill>
+            </a:endParaRPr>
+          </a:p>
+        </p:txBody>
+      </p:sp>
+      <p:sp>
+        <p:nvSpPr>
+          <p:cNvPr id="16" name="TextBox 15">
+            <a:extLst>
+              <a:ext uri="{FF2B5EF4-FFF2-40B4-BE49-F238E27FC236}">
+                <a16:creationId xmlns:a16="http://schemas.microsoft.com/office/drawing/2014/main" id="{7B8C2949-0D96-4A00-AB8F-339207DADC4C}"/>
+              </a:ext>
+            </a:extLst>
+          </p:cNvPr>
+          <p:cNvSpPr txBox="1"/>
+          <p:nvPr/>
+        </p:nvSpPr>
+        <p:spPr>
+          <a:xfrm>
+            <a:off x="6950450" y="2513620"/>
+            <a:ext cx="1887248" cy="461665"/>
+          </a:xfrm>
+          <a:prstGeom prst="rect">
+            <a:avLst/>
+          </a:prstGeom>
+          <a:noFill/>
+        </p:spPr>
+        <p:txBody>
+          <a:bodyPr wrap="none" rtlCol="0">
+            <a:spAutoFit/>
+          </a:bodyPr>
+          <a:lstStyle/>
+          <a:p>
+            <a:r>
+              <a:rPr lang="en-US" sz="2400" b="1" dirty="0" err="1">
+                <a:solidFill>
+                  <a:schemeClr val="accent1">
+                    <a:lumMod val="50000"/>
+                  </a:schemeClr>
+                </a:solidFill>
+              </a:rPr>
+              <a:t>rfendtcShape</a:t>
+            </a:r>
+            <a:endParaRPr lang="en-US" sz="2400" b="1" dirty="0">
+              <a:solidFill>
+                <a:schemeClr val="accent1">
+                  <a:lumMod val="50000"/>
+                </a:schemeClr>
+              </a:solidFill>
+            </a:endParaRPr>
+          </a:p>
+        </p:txBody>
+      </p:sp>
+      <p:sp>
+        <p:nvSpPr>
+          <p:cNvPr id="20" name="Rectangle: Rounded Corners 19">
+            <a:extLst>
+              <a:ext uri="{FF2B5EF4-FFF2-40B4-BE49-F238E27FC236}">
+                <a16:creationId xmlns:a16="http://schemas.microsoft.com/office/drawing/2014/main" id="{CC5B69B4-0616-4076-B15C-CB2DDC286FF3}"/>
+              </a:ext>
+            </a:extLst>
+          </p:cNvPr>
+          <p:cNvSpPr/>
+          <p:nvPr/>
+        </p:nvSpPr>
+        <p:spPr>
+          <a:xfrm>
+            <a:off x="876754" y="1965425"/>
+            <a:ext cx="6035040" cy="475488"/>
+          </a:xfrm>
+          <a:prstGeom prst="roundRect">
+            <a:avLst/>
+          </a:prstGeom>
+          <a:solidFill>
+            <a:schemeClr val="accent1">
+              <a:lumMod val="20000"/>
+              <a:lumOff val="80000"/>
+            </a:schemeClr>
+          </a:solidFill>
+          <a:ln>
+            <a:solidFill>
+              <a:schemeClr val="tx1"/>
+            </a:solidFill>
+          </a:ln>
+        </p:spPr>
+        <p:style>
+          <a:lnRef idx="2">
+            <a:schemeClr val="accent1">
+              <a:shade val="50000"/>
+            </a:schemeClr>
+          </a:lnRef>
+          <a:fillRef idx="1">
+            <a:schemeClr val="accent1"/>
+          </a:fillRef>
+          <a:effectRef idx="0">
+            <a:schemeClr val="accent1"/>
+          </a:effectRef>
+          <a:fontRef idx="minor">
+            <a:schemeClr val="lt1"/>
+          </a:fontRef>
+        </p:style>
+        <p:txBody>
+          <a:bodyPr rtlCol="0" anchor="ctr"/>
+          <a:lstStyle/>
+          <a:p>
+            <a:pPr algn="ctr"/>
+            <a:endParaRPr lang="en-US" b="1" dirty="0">
+              <a:solidFill>
+                <a:schemeClr val="accent1">
+                  <a:lumMod val="75000"/>
+                </a:schemeClr>
+              </a:solidFill>
+            </a:endParaRPr>
+          </a:p>
+        </p:txBody>
+      </p:sp>
+      <p:sp>
+        <p:nvSpPr>
+          <p:cNvPr id="24" name="Rectangle: Rounded Corners 23">
+            <a:extLst>
+              <a:ext uri="{FF2B5EF4-FFF2-40B4-BE49-F238E27FC236}">
+                <a16:creationId xmlns:a16="http://schemas.microsoft.com/office/drawing/2014/main" id="{7E3CBDAE-A66B-4331-9011-2CEB90F3E6B3}"/>
+              </a:ext>
+            </a:extLst>
+          </p:cNvPr>
+          <p:cNvSpPr/>
+          <p:nvPr/>
+        </p:nvSpPr>
+        <p:spPr>
+          <a:xfrm>
+            <a:off x="876754" y="2515390"/>
+            <a:ext cx="6035040" cy="475488"/>
+          </a:xfrm>
+          <a:prstGeom prst="roundRect">
+            <a:avLst/>
+          </a:prstGeom>
+          <a:solidFill>
+            <a:schemeClr val="accent5">
+              <a:lumMod val="40000"/>
+              <a:lumOff val="60000"/>
+            </a:schemeClr>
+          </a:solidFill>
+          <a:ln>
+            <a:solidFill>
+              <a:schemeClr val="tx1"/>
+            </a:solidFill>
+          </a:ln>
+        </p:spPr>
+        <p:style>
+          <a:lnRef idx="2">
+            <a:schemeClr val="accent1">
+              <a:shade val="50000"/>
+            </a:schemeClr>
+          </a:lnRef>
+          <a:fillRef idx="1">
+            <a:schemeClr val="accent1"/>
+          </a:fillRef>
+          <a:effectRef idx="0">
+            <a:schemeClr val="accent1"/>
+          </a:effectRef>
+          <a:fontRef idx="minor">
+            <a:schemeClr val="lt1"/>
+          </a:fontRef>
+        </p:style>
+        <p:txBody>
+          <a:bodyPr rtlCol="0" anchor="ctr"/>
+          <a:lstStyle/>
+          <a:p>
+            <a:pPr algn="ctr"/>
+            <a:endParaRPr lang="en-US" b="1" dirty="0">
+              <a:solidFill>
+                <a:schemeClr val="accent1">
+                  <a:lumMod val="75000"/>
+                </a:schemeClr>
+              </a:solidFill>
+            </a:endParaRPr>
+          </a:p>
+        </p:txBody>
+      </p:sp>
+      <p:sp>
+        <p:nvSpPr>
+          <p:cNvPr id="25" name="Rectangle: Rounded Corners 24">
+            <a:extLst>
+              <a:ext uri="{FF2B5EF4-FFF2-40B4-BE49-F238E27FC236}">
+                <a16:creationId xmlns:a16="http://schemas.microsoft.com/office/drawing/2014/main" id="{E43946E1-CE9B-4688-8035-380A1B4A0174}"/>
+              </a:ext>
+            </a:extLst>
+          </p:cNvPr>
+          <p:cNvSpPr/>
+          <p:nvPr/>
+        </p:nvSpPr>
+        <p:spPr>
+          <a:xfrm>
+            <a:off x="834887" y="1888435"/>
+            <a:ext cx="5764695" cy="1350066"/>
+          </a:xfrm>
+          <a:prstGeom prst="roundRect">
+            <a:avLst/>
+          </a:prstGeom>
+          <a:noFill/>
+          <a:ln w="57150">
+            <a:solidFill>
+              <a:srgbClr val="996699"/>
+            </a:solidFill>
+            <a:prstDash val="sysDash"/>
+          </a:ln>
+        </p:spPr>
+        <p:style>
+          <a:lnRef idx="2">
+            <a:schemeClr val="accent1">
+              <a:shade val="50000"/>
+            </a:schemeClr>
+          </a:lnRef>
+          <a:fillRef idx="1">
+            <a:schemeClr val="accent1"/>
+          </a:fillRef>
+          <a:effectRef idx="0">
+            <a:schemeClr val="accent1"/>
+          </a:effectRef>
+          <a:fontRef idx="minor">
+            <a:schemeClr val="lt1"/>
+          </a:fontRef>
+        </p:style>
+        <p:txBody>
+          <a:bodyPr rtlCol="0" anchor="ctr"/>
+          <a:lstStyle/>
+          <a:p>
+            <a:pPr algn="ctr"/>
+            <a:endParaRPr lang="en-US" b="1" dirty="0">
+              <a:solidFill>
+                <a:schemeClr val="accent1">
+                  <a:lumMod val="75000"/>
+                </a:schemeClr>
+              </a:solidFill>
+            </a:endParaRPr>
+          </a:p>
+        </p:txBody>
+      </p:sp>
+      <p:sp>
+        <p:nvSpPr>
+          <p:cNvPr id="45" name="TextBox 44">
+            <a:extLst>
+              <a:ext uri="{FF2B5EF4-FFF2-40B4-BE49-F238E27FC236}">
+                <a16:creationId xmlns:a16="http://schemas.microsoft.com/office/drawing/2014/main" id="{DCEB2144-B3F4-48FC-863E-2B0381C57201}"/>
+              </a:ext>
+            </a:extLst>
+          </p:cNvPr>
+          <p:cNvSpPr txBox="1"/>
+          <p:nvPr/>
+        </p:nvSpPr>
+        <p:spPr>
+          <a:xfrm>
+            <a:off x="690259" y="817724"/>
+            <a:ext cx="6233055" cy="3123932"/>
+          </a:xfrm>
+          <a:prstGeom prst="rect">
+            <a:avLst/>
+          </a:prstGeom>
+          <a:noFill/>
+        </p:spPr>
+        <p:txBody>
+          <a:bodyPr wrap="square" rtlCol="0">
+            <a:spAutoFit/>
+          </a:bodyPr>
+          <a:lstStyle/>
+          <a:p>
+            <a:pPr>
+              <a:spcBef>
+                <a:spcPts val="600"/>
+              </a:spcBef>
+              <a:spcAft>
+                <a:spcPts val="600"/>
+              </a:spcAft>
+            </a:pPr>
+            <a:r>
+              <a:rPr lang="en-US" sz="2400" dirty="0"/>
+              <a:t>study:Subject_CJ16050_00M01</a:t>
+            </a:r>
+          </a:p>
+          <a:p>
+            <a:pPr>
+              <a:lnSpc>
+                <a:spcPct val="150000"/>
+              </a:lnSpc>
+            </a:pPr>
+            <a:r>
+              <a:rPr lang="en-US" sz="2400" dirty="0"/>
+              <a:t>    a                           </a:t>
+            </a:r>
+            <a:r>
+              <a:rPr lang="en-US" sz="2400" dirty="0" err="1"/>
+              <a:t>study:</a:t>
+            </a:r>
+            <a:r>
+              <a:rPr lang="en-US" sz="2400" dirty="0" err="1">
+                <a:solidFill>
+                  <a:srgbClr val="0033CC"/>
+                </a:solidFill>
+              </a:rPr>
+              <a:t>AnimalSubject</a:t>
+            </a:r>
+            <a:r>
+              <a:rPr lang="en-US" sz="2400" dirty="0"/>
+              <a:t> ;</a:t>
+            </a:r>
+          </a:p>
+          <a:p>
+            <a:pPr>
+              <a:lnSpc>
+                <a:spcPct val="150000"/>
+              </a:lnSpc>
+            </a:pPr>
+            <a:r>
+              <a:rPr lang="en-US" sz="2400" dirty="0"/>
+              <a:t>    </a:t>
+            </a:r>
+            <a:r>
+              <a:rPr lang="en-US" sz="2400" dirty="0" err="1"/>
+              <a:t>study:rfendtc</a:t>
+            </a:r>
+            <a:r>
+              <a:rPr lang="en-US" sz="2400" dirty="0"/>
+              <a:t>      "2016-12-07"^^</a:t>
+            </a:r>
+            <a:r>
+              <a:rPr lang="en-US" sz="2400" dirty="0" err="1"/>
+              <a:t>xsd:date</a:t>
+            </a:r>
+            <a:r>
+              <a:rPr lang="en-US" sz="2400" dirty="0"/>
+              <a:t> ;</a:t>
+            </a:r>
+          </a:p>
+          <a:p>
+            <a:pPr>
+              <a:lnSpc>
+                <a:spcPct val="150000"/>
+              </a:lnSpc>
+            </a:pPr>
+            <a:r>
+              <a:rPr lang="en-US" sz="2400" dirty="0"/>
+              <a:t>    </a:t>
+            </a:r>
+            <a:r>
+              <a:rPr lang="en-US" sz="2400" dirty="0" err="1"/>
+              <a:t>study:rfstdtc</a:t>
+            </a:r>
+            <a:r>
+              <a:rPr lang="en-US" sz="2400" dirty="0"/>
+              <a:t>       "2016-12-07"^^</a:t>
+            </a:r>
+            <a:r>
+              <a:rPr lang="en-US" sz="2400" dirty="0" err="1"/>
+              <a:t>xsd:date</a:t>
+            </a:r>
+            <a:r>
+              <a:rPr lang="en-US" sz="2400" dirty="0"/>
+              <a:t> ;</a:t>
+            </a:r>
+          </a:p>
+          <a:p>
+            <a:pPr>
+              <a:lnSpc>
+                <a:spcPct val="150000"/>
+              </a:lnSpc>
+            </a:pPr>
+            <a:r>
+              <a:rPr lang="en-US" sz="2400" dirty="0"/>
+              <a:t>    </a:t>
+            </a:r>
+          </a:p>
+          <a:p>
+            <a:endParaRPr lang="en-US" sz="2400" dirty="0"/>
+          </a:p>
+        </p:txBody>
+      </p:sp>
+    </p:spTree>
+    <p:extLst>
+      <p:ext uri="{BB962C8B-B14F-4D97-AF65-F5344CB8AC3E}">
+        <p14:creationId xmlns:p14="http://schemas.microsoft.com/office/powerpoint/2010/main" val="2881235337"/>
+      </p:ext>
+    </p:extLst>
+  </p:cSld>
+  <p:clrMapOvr>
+    <a:masterClrMapping/>
+  </p:clrMapOvr>
+</p:sld>
+</file>
+
+<file path=ppt/slides/slide3.xml><?xml version="1.0" encoding="utf-8"?>
+<p:sld xmlns:a="http://schemas.openxmlformats.org/drawingml/2006/main" xmlns:r="http://schemas.openxmlformats.org/officeDocument/2006/relationships" xmlns:p="http://schemas.openxmlformats.org/presentationml/2006/main">
+  <p:cSld>
+    <p:spTree>
+      <p:nvGrpSpPr>
+        <p:cNvPr id="1" name=""/>
+        <p:cNvGrpSpPr/>
+        <p:nvPr/>
+      </p:nvGrpSpPr>
+      <p:grpSpPr>
+        <a:xfrm>
+          <a:off x="0" y="0"/>
+          <a:ext cx="0" cy="0"/>
+          <a:chOff x="0" y="0"/>
+          <a:chExt cx="0" cy="0"/>
+        </a:xfrm>
+      </p:grpSpPr>
+      <p:sp>
+        <p:nvSpPr>
           <p:cNvPr id="4" name="Rectangle: Rounded Corners 3"/>
           <p:cNvSpPr/>
           <p:nvPr/>

</xml_diff>

<commit_message>
working on SD102 (real data)
</commit_message>
<xml_diff>
--- a/doc/images/ImageSources.pptx
+++ b/doc/images/ImageSources.pptx
@@ -8,6 +8,8 @@
     <p:sldId id="259" r:id="rId2"/>
     <p:sldId id="260" r:id="rId3"/>
     <p:sldId id="258" r:id="rId4"/>
+    <p:sldId id="262" r:id="rId5"/>
+    <p:sldId id="261" r:id="rId6"/>
   </p:sldIdLst>
   <p:sldSz cx="12192000" cy="6858000"/>
   <p:notesSz cx="6858000" cy="9144000"/>
@@ -114,6 +116,8 @@
             <p14:sldId id="259"/>
             <p14:sldId id="260"/>
             <p14:sldId id="258"/>
+            <p14:sldId id="262"/>
+            <p14:sldId id="261"/>
           </p14:sldIdLst>
         </p14:section>
       </p14:sectionLst>
@@ -254,7 +258,7 @@
           <a:p>
             <a:fld id="{03ABD037-9D82-4436-AC70-ED75D2FE9417}" type="datetimeFigureOut">
               <a:rPr lang="en-US" smtClean="0"/>
-              <a:t>7/18/2019</a:t>
+              <a:t>7/25/2019</a:t>
             </a:fld>
             <a:endParaRPr lang="en-US"/>
           </a:p>
@@ -422,7 +426,7 @@
           <a:p>
             <a:fld id="{03ABD037-9D82-4436-AC70-ED75D2FE9417}" type="datetimeFigureOut">
               <a:rPr lang="en-US" smtClean="0"/>
-              <a:t>7/18/2019</a:t>
+              <a:t>7/25/2019</a:t>
             </a:fld>
             <a:endParaRPr lang="en-US"/>
           </a:p>
@@ -600,7 +604,7 @@
           <a:p>
             <a:fld id="{03ABD037-9D82-4436-AC70-ED75D2FE9417}" type="datetimeFigureOut">
               <a:rPr lang="en-US" smtClean="0"/>
-              <a:t>7/18/2019</a:t>
+              <a:t>7/25/2019</a:t>
             </a:fld>
             <a:endParaRPr lang="en-US"/>
           </a:p>
@@ -768,7 +772,7 @@
           <a:p>
             <a:fld id="{03ABD037-9D82-4436-AC70-ED75D2FE9417}" type="datetimeFigureOut">
               <a:rPr lang="en-US" smtClean="0"/>
-              <a:t>7/18/2019</a:t>
+              <a:t>7/25/2019</a:t>
             </a:fld>
             <a:endParaRPr lang="en-US"/>
           </a:p>
@@ -1013,7 +1017,7 @@
           <a:p>
             <a:fld id="{03ABD037-9D82-4436-AC70-ED75D2FE9417}" type="datetimeFigureOut">
               <a:rPr lang="en-US" smtClean="0"/>
-              <a:t>7/18/2019</a:t>
+              <a:t>7/25/2019</a:t>
             </a:fld>
             <a:endParaRPr lang="en-US"/>
           </a:p>
@@ -1242,7 +1246,7 @@
           <a:p>
             <a:fld id="{03ABD037-9D82-4436-AC70-ED75D2FE9417}" type="datetimeFigureOut">
               <a:rPr lang="en-US" smtClean="0"/>
-              <a:t>7/18/2019</a:t>
+              <a:t>7/25/2019</a:t>
             </a:fld>
             <a:endParaRPr lang="en-US"/>
           </a:p>
@@ -1606,7 +1610,7 @@
           <a:p>
             <a:fld id="{03ABD037-9D82-4436-AC70-ED75D2FE9417}" type="datetimeFigureOut">
               <a:rPr lang="en-US" smtClean="0"/>
-              <a:t>7/18/2019</a:t>
+              <a:t>7/25/2019</a:t>
             </a:fld>
             <a:endParaRPr lang="en-US"/>
           </a:p>
@@ -1723,7 +1727,7 @@
           <a:p>
             <a:fld id="{03ABD037-9D82-4436-AC70-ED75D2FE9417}" type="datetimeFigureOut">
               <a:rPr lang="en-US" smtClean="0"/>
-              <a:t>7/18/2019</a:t>
+              <a:t>7/25/2019</a:t>
             </a:fld>
             <a:endParaRPr lang="en-US"/>
           </a:p>
@@ -1818,7 +1822,7 @@
           <a:p>
             <a:fld id="{03ABD037-9D82-4436-AC70-ED75D2FE9417}" type="datetimeFigureOut">
               <a:rPr lang="en-US" smtClean="0"/>
-              <a:t>7/18/2019</a:t>
+              <a:t>7/25/2019</a:t>
             </a:fld>
             <a:endParaRPr lang="en-US"/>
           </a:p>
@@ -2093,7 +2097,7 @@
           <a:p>
             <a:fld id="{03ABD037-9D82-4436-AC70-ED75D2FE9417}" type="datetimeFigureOut">
               <a:rPr lang="en-US" smtClean="0"/>
-              <a:t>7/18/2019</a:t>
+              <a:t>7/25/2019</a:t>
             </a:fld>
             <a:endParaRPr lang="en-US"/>
           </a:p>
@@ -2345,7 +2349,7 @@
           <a:p>
             <a:fld id="{03ABD037-9D82-4436-AC70-ED75D2FE9417}" type="datetimeFigureOut">
               <a:rPr lang="en-US" smtClean="0"/>
-              <a:t>7/18/2019</a:t>
+              <a:t>7/25/2019</a:t>
             </a:fld>
             <a:endParaRPr lang="en-US"/>
           </a:p>
@@ -2556,7 +2560,7 @@
           <a:p>
             <a:fld id="{03ABD037-9D82-4436-AC70-ED75D2FE9417}" type="datetimeFigureOut">
               <a:rPr lang="en-US" smtClean="0"/>
-              <a:t>7/18/2019</a:t>
+              <a:t>7/25/2019</a:t>
             </a:fld>
             <a:endParaRPr lang="en-US"/>
           </a:p>
@@ -4267,7 +4271,7 @@
         </p:nvSpPr>
         <p:spPr>
           <a:xfrm>
-            <a:off x="6359054" y="800152"/>
+            <a:off x="702287" y="592888"/>
             <a:ext cx="2468880" cy="449588"/>
           </a:xfrm>
           <a:prstGeom prst="roundRect">
@@ -4312,30 +4316,26 @@
                   <a:schemeClr val="tx1"/>
                 </a:solidFill>
               </a:rPr>
-              <a:t>Person_</a:t>
-            </a:r>
-            <a:r>
-              <a:rPr lang="en-US" b="1" dirty="0">
-                <a:solidFill>
-                  <a:schemeClr val="accent1">
-                    <a:lumMod val="75000"/>
-                  </a:schemeClr>
-                </a:solidFill>
-              </a:rPr>
-              <a:t>01-701-1015</a:t>
-            </a:r>
-          </a:p>
-        </p:txBody>
-      </p:sp>
-      <p:sp>
-        <p:nvSpPr>
-          <p:cNvPr id="5" name="Rectangle: Rounded Corners 4"/>
+              <a:t>:Animal_00M01</a:t>
+            </a:r>
+          </a:p>
+        </p:txBody>
+      </p:sp>
+      <p:sp>
+        <p:nvSpPr>
+          <p:cNvPr id="10" name="Rectangle: Rounded Corners 9">
+            <a:extLst>
+              <a:ext uri="{FF2B5EF4-FFF2-40B4-BE49-F238E27FC236}">
+                <a16:creationId xmlns:a16="http://schemas.microsoft.com/office/drawing/2014/main" id="{6B507A6C-DA4D-4A07-AC87-C4CECFA5297B}"/>
+              </a:ext>
+            </a:extLst>
+          </p:cNvPr>
           <p:cNvSpPr/>
           <p:nvPr/>
         </p:nvSpPr>
         <p:spPr>
           <a:xfrm>
-            <a:off x="7348177" y="2628952"/>
+            <a:off x="4791455" y="598984"/>
             <a:ext cx="2468880" cy="457001"/>
           </a:xfrm>
           <a:prstGeom prst="roundRect">
@@ -4347,9 +4347,11 @@
               <a:lumOff val="60000"/>
             </a:schemeClr>
           </a:solidFill>
-          <a:ln>
+          <a:ln w="38100">
             <a:solidFill>
-              <a:schemeClr val="tx1"/>
+              <a:schemeClr val="accent1">
+                <a:lumMod val="75000"/>
+              </a:schemeClr>
             </a:solidFill>
           </a:ln>
         </p:spPr>
@@ -4380,62 +4382,15 @@
                   <a:schemeClr val="tx1"/>
                 </a:solidFill>
               </a:rPr>
-              <a:t>Medical Condition</a:t>
-            </a:r>
-          </a:p>
-        </p:txBody>
-      </p:sp>
-      <p:sp>
-        <p:nvSpPr>
-          <p:cNvPr id="13" name="Rectangle: Rounded Corners 12"/>
-          <p:cNvSpPr/>
-          <p:nvPr/>
-        </p:nvSpPr>
-        <p:spPr>
-          <a:xfrm>
-            <a:off x="7158066" y="4705104"/>
-            <a:ext cx="2468880" cy="457001"/>
-          </a:xfrm>
-          <a:prstGeom prst="roundRect">
-            <a:avLst/>
-          </a:prstGeom>
-          <a:solidFill>
-            <a:srgbClr val="FFC000"/>
-          </a:solidFill>
-          <a:ln>
-            <a:solidFill>
-              <a:schemeClr val="tx1"/>
-            </a:solidFill>
-          </a:ln>
-        </p:spPr>
-        <p:style>
-          <a:lnRef idx="2">
-            <a:schemeClr val="accent1">
-              <a:shade val="50000"/>
-            </a:schemeClr>
-          </a:lnRef>
-          <a:fillRef idx="1">
-            <a:schemeClr val="accent1"/>
-          </a:fillRef>
-          <a:effectRef idx="0">
-            <a:schemeClr val="accent1"/>
-          </a:effectRef>
-          <a:fontRef idx="minor">
-            <a:schemeClr val="lt1"/>
-          </a:fontRef>
-        </p:style>
-        <p:txBody>
-          <a:bodyPr rtlCol="0" anchor="ctr"/>
-          <a:lstStyle/>
-          <a:p>
-            <a:pPr algn="ctr"/>
+              <a:t>:</a:t>
+            </a:r>
             <a:r>
               <a:rPr lang="en-US" b="1" dirty="0" err="1">
                 <a:solidFill>
                   <a:schemeClr val="tx1"/>
                 </a:solidFill>
               </a:rPr>
-              <a:t>AdverseEvent</a:t>
+              <a:t>AnimalSubject</a:t>
             </a:r>
             <a:endParaRPr lang="en-US" b="1" dirty="0">
               <a:solidFill>
@@ -4447,18 +4402,24 @@
       </p:sp>
       <p:cxnSp>
         <p:nvCxnSpPr>
-          <p:cNvPr id="14" name="Straight Arrow Connector 13"/>
+          <p:cNvPr id="16" name="Straight Arrow Connector 15">
+            <a:extLst>
+              <a:ext uri="{FF2B5EF4-FFF2-40B4-BE49-F238E27FC236}">
+                <a16:creationId xmlns:a16="http://schemas.microsoft.com/office/drawing/2014/main" id="{2BD3BC57-ACA0-4E8B-A760-B1A2EC9E7B20}"/>
+              </a:ext>
+            </a:extLst>
+          </p:cNvPr>
           <p:cNvCxnSpPr>
             <a:cxnSpLocks/>
-            <a:stCxn id="5" idx="2"/>
-            <a:endCxn id="13" idx="0"/>
+            <a:stCxn id="4" idx="3"/>
+            <a:endCxn id="10" idx="1"/>
           </p:cNvCxnSpPr>
           <p:nvPr/>
         </p:nvCxnSpPr>
         <p:spPr>
-          <a:xfrm flipH="1">
-            <a:off x="8392506" y="3085953"/>
-            <a:ext cx="190111" cy="1619151"/>
+          <a:xfrm>
+            <a:off x="3171167" y="817682"/>
+            <a:ext cx="1620288" cy="9803"/>
           </a:xfrm>
           <a:prstGeom prst="straightConnector1">
             <a:avLst/>
@@ -4489,14 +4450,311 @@
       </p:cxnSp>
       <p:sp>
         <p:nvSpPr>
-          <p:cNvPr id="20" name="TextBox 19"/>
+          <p:cNvPr id="22" name="Rectangle: Rounded Corners 21">
+            <a:extLst>
+              <a:ext uri="{FF2B5EF4-FFF2-40B4-BE49-F238E27FC236}">
+                <a16:creationId xmlns:a16="http://schemas.microsoft.com/office/drawing/2014/main" id="{A80CEA84-AC4C-4D17-B914-0EB2393DC44E}"/>
+              </a:ext>
+            </a:extLst>
+          </p:cNvPr>
+          <p:cNvSpPr/>
+          <p:nvPr/>
+        </p:nvSpPr>
+        <p:spPr>
+          <a:xfrm>
+            <a:off x="4791455" y="1972158"/>
+            <a:ext cx="2468880" cy="457001"/>
+          </a:xfrm>
+          <a:prstGeom prst="roundRect">
+            <a:avLst/>
+          </a:prstGeom>
+          <a:solidFill>
+            <a:schemeClr val="accent1">
+              <a:lumMod val="40000"/>
+              <a:lumOff val="60000"/>
+            </a:schemeClr>
+          </a:solidFill>
+          <a:ln w="38100">
+            <a:solidFill>
+              <a:schemeClr val="accent1">
+                <a:lumMod val="75000"/>
+              </a:schemeClr>
+            </a:solidFill>
+          </a:ln>
+        </p:spPr>
+        <p:style>
+          <a:lnRef idx="2">
+            <a:schemeClr val="accent1">
+              <a:shade val="50000"/>
+            </a:schemeClr>
+          </a:lnRef>
+          <a:fillRef idx="1">
+            <a:schemeClr val="accent1"/>
+          </a:fillRef>
+          <a:effectRef idx="0">
+            <a:schemeClr val="accent1"/>
+          </a:effectRef>
+          <a:fontRef idx="minor">
+            <a:schemeClr val="lt1"/>
+          </a:fontRef>
+        </p:style>
+        <p:txBody>
+          <a:bodyPr rtlCol="0" anchor="ctr"/>
+          <a:lstStyle/>
+          <a:p>
+            <a:pPr algn="ctr"/>
+            <a:r>
+              <a:rPr lang="en-US" b="1" dirty="0">
+                <a:solidFill>
+                  <a:schemeClr val="tx1"/>
+                </a:solidFill>
+              </a:rPr>
+              <a:t>:</a:t>
+            </a:r>
+            <a:r>
+              <a:rPr lang="en-US" b="1" dirty="0" err="1">
+                <a:solidFill>
+                  <a:schemeClr val="tx1"/>
+                </a:solidFill>
+              </a:rPr>
+              <a:t>ReferenceInterval</a:t>
+            </a:r>
+            <a:endParaRPr lang="en-US" b="1" dirty="0">
+              <a:solidFill>
+                <a:schemeClr val="tx1"/>
+              </a:solidFill>
+            </a:endParaRPr>
+          </a:p>
+        </p:txBody>
+      </p:sp>
+      <p:cxnSp>
+        <p:nvCxnSpPr>
+          <p:cNvPr id="23" name="Straight Arrow Connector 22">
+            <a:extLst>
+              <a:ext uri="{FF2B5EF4-FFF2-40B4-BE49-F238E27FC236}">
+                <a16:creationId xmlns:a16="http://schemas.microsoft.com/office/drawing/2014/main" id="{1DA770EC-9121-483A-9ECC-050B87E2EE9E}"/>
+              </a:ext>
+            </a:extLst>
+          </p:cNvPr>
+          <p:cNvCxnSpPr>
+            <a:cxnSpLocks/>
+            <a:stCxn id="15" idx="3"/>
+            <a:endCxn id="22" idx="1"/>
+          </p:cNvCxnSpPr>
+          <p:nvPr/>
+        </p:nvCxnSpPr>
+        <p:spPr>
+          <a:xfrm>
+            <a:off x="3681983" y="2200659"/>
+            <a:ext cx="1109472" cy="0"/>
+          </a:xfrm>
+          <a:prstGeom prst="straightConnector1">
+            <a:avLst/>
+          </a:prstGeom>
+          <a:ln w="50800">
+            <a:solidFill>
+              <a:schemeClr val="bg1">
+                <a:lumMod val="50000"/>
+              </a:schemeClr>
+            </a:solidFill>
+            <a:tailEnd type="triangle"/>
+          </a:ln>
+        </p:spPr>
+        <p:style>
+          <a:lnRef idx="1">
+            <a:schemeClr val="accent1"/>
+          </a:lnRef>
+          <a:fillRef idx="0">
+            <a:schemeClr val="accent1"/>
+          </a:fillRef>
+          <a:effectRef idx="0">
+            <a:schemeClr val="accent1"/>
+          </a:effectRef>
+          <a:fontRef idx="minor">
+            <a:schemeClr val="tx1"/>
+          </a:fontRef>
+        </p:style>
+      </p:cxnSp>
+      <p:cxnSp>
+        <p:nvCxnSpPr>
+          <p:cNvPr id="30" name="Straight Arrow Connector 29">
+            <a:extLst>
+              <a:ext uri="{FF2B5EF4-FFF2-40B4-BE49-F238E27FC236}">
+                <a16:creationId xmlns:a16="http://schemas.microsoft.com/office/drawing/2014/main" id="{769D4B6A-7F30-4FB5-B811-ACFD7653AAE5}"/>
+              </a:ext>
+            </a:extLst>
+          </p:cNvPr>
+          <p:cNvCxnSpPr>
+            <a:cxnSpLocks/>
+            <a:stCxn id="15" idx="2"/>
+            <a:endCxn id="47" idx="0"/>
+          </p:cNvCxnSpPr>
+          <p:nvPr/>
+        </p:nvCxnSpPr>
+        <p:spPr>
+          <a:xfrm>
+            <a:off x="1936728" y="2429159"/>
+            <a:ext cx="2517648" cy="742337"/>
+          </a:xfrm>
+          <a:prstGeom prst="straightConnector1">
+            <a:avLst/>
+          </a:prstGeom>
+          <a:ln w="50800">
+            <a:solidFill>
+              <a:schemeClr val="bg1">
+                <a:lumMod val="50000"/>
+              </a:schemeClr>
+            </a:solidFill>
+            <a:tailEnd type="triangle"/>
+          </a:ln>
+        </p:spPr>
+        <p:style>
+          <a:lnRef idx="1">
+            <a:schemeClr val="accent1"/>
+          </a:lnRef>
+          <a:fillRef idx="0">
+            <a:schemeClr val="accent1"/>
+          </a:fillRef>
+          <a:effectRef idx="0">
+            <a:schemeClr val="accent1"/>
+          </a:effectRef>
+          <a:fontRef idx="minor">
+            <a:schemeClr val="tx1"/>
+          </a:fontRef>
+        </p:style>
+      </p:cxnSp>
+      <p:grpSp>
+        <p:nvGrpSpPr>
+          <p:cNvPr id="38" name="Group 37">
+            <a:extLst>
+              <a:ext uri="{FF2B5EF4-FFF2-40B4-BE49-F238E27FC236}">
+                <a16:creationId xmlns:a16="http://schemas.microsoft.com/office/drawing/2014/main" id="{FD57785F-5ED7-49A8-86E0-7E9316E39A31}"/>
+              </a:ext>
+            </a:extLst>
+          </p:cNvPr>
+          <p:cNvGrpSpPr/>
+          <p:nvPr/>
+        </p:nvGrpSpPr>
+        <p:grpSpPr>
+          <a:xfrm>
+            <a:off x="362878" y="1042476"/>
+            <a:ext cx="3124033" cy="929682"/>
+            <a:chOff x="362878" y="1042476"/>
+            <a:chExt cx="3124033" cy="929682"/>
+          </a:xfrm>
+        </p:grpSpPr>
+        <p:cxnSp>
+          <p:nvCxnSpPr>
+            <p:cNvPr id="17" name="Straight Arrow Connector 16">
+              <a:extLst>
+                <a:ext uri="{FF2B5EF4-FFF2-40B4-BE49-F238E27FC236}">
+                  <a16:creationId xmlns:a16="http://schemas.microsoft.com/office/drawing/2014/main" id="{29F0277E-AD84-48E5-9890-328F2C49D080}"/>
+                </a:ext>
+              </a:extLst>
+            </p:cNvPr>
+            <p:cNvCxnSpPr>
+              <a:cxnSpLocks/>
+              <a:stCxn id="4" idx="2"/>
+              <a:endCxn id="15" idx="0"/>
+            </p:cNvCxnSpPr>
+            <p:nvPr/>
+          </p:nvCxnSpPr>
+          <p:spPr>
+            <a:xfrm>
+              <a:off x="1936727" y="1042476"/>
+              <a:ext cx="1" cy="929682"/>
+            </a:xfrm>
+            <a:prstGeom prst="straightConnector1">
+              <a:avLst/>
+            </a:prstGeom>
+            <a:ln w="50800">
+              <a:solidFill>
+                <a:schemeClr val="bg1">
+                  <a:lumMod val="50000"/>
+                </a:schemeClr>
+              </a:solidFill>
+              <a:tailEnd type="triangle"/>
+            </a:ln>
+          </p:spPr>
+          <p:style>
+            <a:lnRef idx="1">
+              <a:schemeClr val="accent1"/>
+            </a:lnRef>
+            <a:fillRef idx="0">
+              <a:schemeClr val="accent1"/>
+            </a:fillRef>
+            <a:effectRef idx="0">
+              <a:schemeClr val="accent1"/>
+            </a:effectRef>
+            <a:fontRef idx="minor">
+              <a:schemeClr val="tx1"/>
+            </a:fontRef>
+          </p:style>
+        </p:cxnSp>
+        <p:sp>
+          <p:nvSpPr>
+            <p:cNvPr id="7" name="TextBox 6"/>
+            <p:cNvSpPr txBox="1"/>
+            <p:nvPr/>
+          </p:nvSpPr>
+          <p:spPr>
+            <a:xfrm>
+              <a:off x="362878" y="1314039"/>
+              <a:ext cx="3124033" cy="369332"/>
+            </a:xfrm>
+            <a:prstGeom prst="rect">
+              <a:avLst/>
+            </a:prstGeom>
+            <a:solidFill>
+              <a:schemeClr val="bg1"/>
+            </a:solidFill>
+          </p:spPr>
+          <p:txBody>
+            <a:bodyPr wrap="square" rtlCol="0">
+              <a:spAutoFit/>
+            </a:bodyPr>
+            <a:lstStyle>
+              <a:defPPr>
+                <a:defRPr lang="en-US"/>
+              </a:defPPr>
+              <a:lvl1pPr>
+                <a:defRPr b="1">
+                  <a:solidFill>
+                    <a:schemeClr val="accent2">
+                      <a:lumMod val="75000"/>
+                    </a:schemeClr>
+                  </a:solidFill>
+                  <a:latin typeface="Courier New" panose="02070309020205020404" pitchFamily="49" charset="0"/>
+                  <a:cs typeface="Courier New" panose="02070309020205020404" pitchFamily="49" charset="0"/>
+                </a:defRPr>
+              </a:lvl1pPr>
+            </a:lstStyle>
+            <a:p>
+              <a:r>
+                <a:rPr lang="en-US" dirty="0" err="1"/>
+                <a:t>hasReferenceInterval</a:t>
+              </a:r>
+              <a:endParaRPr lang="en-US" dirty="0"/>
+            </a:p>
+          </p:txBody>
+        </p:sp>
+      </p:grpSp>
+      <p:sp>
+        <p:nvSpPr>
+          <p:cNvPr id="42" name="TextBox 41">
+            <a:extLst>
+              <a:ext uri="{FF2B5EF4-FFF2-40B4-BE49-F238E27FC236}">
+                <a16:creationId xmlns:a16="http://schemas.microsoft.com/office/drawing/2014/main" id="{E44AC35C-D56A-4BA4-9884-CFA2D845B4FA}"/>
+              </a:ext>
+            </a:extLst>
+          </p:cNvPr>
           <p:cNvSpPr txBox="1"/>
           <p:nvPr/>
         </p:nvSpPr>
         <p:spPr>
           <a:xfrm>
-            <a:off x="9644498" y="739025"/>
-            <a:ext cx="1967829" cy="369332"/>
+            <a:off x="2587918" y="2661255"/>
+            <a:ext cx="2276689" cy="369332"/>
           </a:xfrm>
           <a:prstGeom prst="rect">
             <a:avLst/>
@@ -4527,19 +4785,71 @@
           </a:lstStyle>
           <a:p>
             <a:r>
+              <a:rPr lang="en-US" dirty="0"/>
+              <a:t>:</a:t>
+            </a:r>
+            <a:r>
               <a:rPr lang="en-US" dirty="0" err="1"/>
-              <a:t>afflictedBy</a:t>
+              <a:t>ReferenceBegin</a:t>
             </a:r>
             <a:endParaRPr lang="en-US" dirty="0"/>
           </a:p>
         </p:txBody>
       </p:sp>
-      <p:sp>
-        <p:nvSpPr>
-          <p:cNvPr id="41" name="TextBox 40">
+      <p:cxnSp>
+        <p:nvCxnSpPr>
+          <p:cNvPr id="43" name="Straight Arrow Connector 42">
             <a:extLst>
               <a:ext uri="{FF2B5EF4-FFF2-40B4-BE49-F238E27FC236}">
-                <a16:creationId xmlns:a16="http://schemas.microsoft.com/office/drawing/2014/main" id="{CCC2A432-EE41-4F21-9AAE-EB569CE224D5}"/>
+                <a16:creationId xmlns:a16="http://schemas.microsoft.com/office/drawing/2014/main" id="{DBA4C3E1-A7BC-4049-9A3C-CAAB8D4552F6}"/>
+              </a:ext>
+            </a:extLst>
+          </p:cNvPr>
+          <p:cNvCxnSpPr>
+            <a:cxnSpLocks/>
+            <a:stCxn id="15" idx="2"/>
+            <a:endCxn id="48" idx="0"/>
+          </p:cNvCxnSpPr>
+          <p:nvPr/>
+        </p:nvCxnSpPr>
+        <p:spPr>
+          <a:xfrm>
+            <a:off x="1936728" y="2429159"/>
+            <a:ext cx="1267968" cy="2495037"/>
+          </a:xfrm>
+          <a:prstGeom prst="straightConnector1">
+            <a:avLst/>
+          </a:prstGeom>
+          <a:ln w="50800">
+            <a:solidFill>
+              <a:schemeClr val="bg1">
+                <a:lumMod val="50000"/>
+              </a:schemeClr>
+            </a:solidFill>
+            <a:tailEnd type="triangle"/>
+          </a:ln>
+        </p:spPr>
+        <p:style>
+          <a:lnRef idx="1">
+            <a:schemeClr val="accent1"/>
+          </a:lnRef>
+          <a:fillRef idx="0">
+            <a:schemeClr val="accent1"/>
+          </a:fillRef>
+          <a:effectRef idx="0">
+            <a:schemeClr val="accent1"/>
+          </a:effectRef>
+          <a:fontRef idx="minor">
+            <a:schemeClr val="tx1"/>
+          </a:fontRef>
+        </p:style>
+      </p:cxnSp>
+      <p:sp>
+        <p:nvSpPr>
+          <p:cNvPr id="46" name="TextBox 45">
+            <a:extLst>
+              <a:ext uri="{FF2B5EF4-FFF2-40B4-BE49-F238E27FC236}">
+                <a16:creationId xmlns:a16="http://schemas.microsoft.com/office/drawing/2014/main" id="{418C348C-A1DB-4629-B90E-D3E0A4F40A88}"/>
               </a:ext>
             </a:extLst>
           </p:cNvPr>
@@ -4548,48 +4858,8 @@
         </p:nvSpPr>
         <p:spPr>
           <a:xfrm>
-            <a:off x="8696860" y="1917222"/>
-            <a:ext cx="1740300" cy="369332"/>
-          </a:xfrm>
-          <a:prstGeom prst="rect">
-            <a:avLst/>
-          </a:prstGeom>
-          <a:solidFill>
-            <a:schemeClr val="bg1"/>
-          </a:solidFill>
-        </p:spPr>
-        <p:txBody>
-          <a:bodyPr wrap="square" rtlCol="0">
-            <a:spAutoFit/>
-          </a:bodyPr>
-          <a:lstStyle/>
-          <a:p>
-            <a:r>
-              <a:rPr lang="en-US" b="1" dirty="0">
-                <a:solidFill>
-                  <a:schemeClr val="accent2">
-                    <a:lumMod val="40000"/>
-                    <a:lumOff val="60000"/>
-                  </a:schemeClr>
-                </a:solidFill>
-                <a:latin typeface="Courier New" panose="02070309020205020404" pitchFamily="49" charset="0"/>
-                <a:cs typeface="Courier New" panose="02070309020205020404" pitchFamily="49" charset="0"/>
-              </a:rPr>
-              <a:t>severity</a:t>
-            </a:r>
-          </a:p>
-        </p:txBody>
-      </p:sp>
-      <p:sp>
-        <p:nvSpPr>
-          <p:cNvPr id="7" name="TextBox 6"/>
-          <p:cNvSpPr txBox="1"/>
-          <p:nvPr/>
-        </p:nvSpPr>
-        <p:spPr>
-          <a:xfrm>
-            <a:off x="7665887" y="3569559"/>
-            <a:ext cx="1643348" cy="369332"/>
+            <a:off x="2020991" y="4008471"/>
+            <a:ext cx="2014561" cy="369332"/>
           </a:xfrm>
           <a:prstGeom prst="rect">
             <a:avLst/>
@@ -4620,6 +4890,3180 @@
           </a:lstStyle>
           <a:p>
             <a:r>
+              <a:rPr lang="en-US" dirty="0"/>
+              <a:t>:</a:t>
+            </a:r>
+            <a:r>
+              <a:rPr lang="en-US" dirty="0" err="1"/>
+              <a:t>ReferenceEnd</a:t>
+            </a:r>
+            <a:endParaRPr lang="en-US" dirty="0"/>
+          </a:p>
+        </p:txBody>
+      </p:sp>
+      <p:sp>
+        <p:nvSpPr>
+          <p:cNvPr id="47" name="Rectangle: Rounded Corners 46">
+            <a:extLst>
+              <a:ext uri="{FF2B5EF4-FFF2-40B4-BE49-F238E27FC236}">
+                <a16:creationId xmlns:a16="http://schemas.microsoft.com/office/drawing/2014/main" id="{23F8A56F-9569-488F-9C72-B2665C87B7BA}"/>
+              </a:ext>
+            </a:extLst>
+          </p:cNvPr>
+          <p:cNvSpPr/>
+          <p:nvPr/>
+        </p:nvSpPr>
+        <p:spPr>
+          <a:xfrm>
+            <a:off x="2709120" y="3171496"/>
+            <a:ext cx="3490511" cy="457001"/>
+          </a:xfrm>
+          <a:prstGeom prst="roundRect">
+            <a:avLst/>
+          </a:prstGeom>
+          <a:solidFill>
+            <a:schemeClr val="accent6">
+              <a:lumMod val="40000"/>
+              <a:lumOff val="60000"/>
+            </a:schemeClr>
+          </a:solidFill>
+          <a:ln>
+            <a:solidFill>
+              <a:schemeClr val="tx1"/>
+            </a:solidFill>
+          </a:ln>
+        </p:spPr>
+        <p:style>
+          <a:lnRef idx="2">
+            <a:schemeClr val="accent1">
+              <a:shade val="50000"/>
+            </a:schemeClr>
+          </a:lnRef>
+          <a:fillRef idx="1">
+            <a:schemeClr val="accent1"/>
+          </a:fillRef>
+          <a:effectRef idx="0">
+            <a:schemeClr val="accent1"/>
+          </a:effectRef>
+          <a:fontRef idx="minor">
+            <a:schemeClr val="lt1"/>
+          </a:fontRef>
+        </p:style>
+        <p:txBody>
+          <a:bodyPr rtlCol="0" anchor="ctr"/>
+          <a:lstStyle/>
+          <a:p>
+            <a:pPr algn="ctr"/>
+            <a:r>
+              <a:rPr lang="en-US" b="1" dirty="0">
+                <a:solidFill>
+                  <a:schemeClr val="tx1"/>
+                </a:solidFill>
+              </a:rPr>
+              <a:t>:Date_2016-12-07</a:t>
+            </a:r>
+          </a:p>
+        </p:txBody>
+      </p:sp>
+      <p:sp>
+        <p:nvSpPr>
+          <p:cNvPr id="48" name="Rectangle: Rounded Corners 47">
+            <a:extLst>
+              <a:ext uri="{FF2B5EF4-FFF2-40B4-BE49-F238E27FC236}">
+                <a16:creationId xmlns:a16="http://schemas.microsoft.com/office/drawing/2014/main" id="{CEBC1294-CAA3-49E1-A52E-68753199F3A5}"/>
+              </a:ext>
+            </a:extLst>
+          </p:cNvPr>
+          <p:cNvSpPr/>
+          <p:nvPr/>
+        </p:nvSpPr>
+        <p:spPr>
+          <a:xfrm>
+            <a:off x="1459440" y="4924196"/>
+            <a:ext cx="3490511" cy="457001"/>
+          </a:xfrm>
+          <a:prstGeom prst="roundRect">
+            <a:avLst/>
+          </a:prstGeom>
+          <a:solidFill>
+            <a:schemeClr val="accent6">
+              <a:lumMod val="40000"/>
+              <a:lumOff val="60000"/>
+            </a:schemeClr>
+          </a:solidFill>
+          <a:ln>
+            <a:solidFill>
+              <a:schemeClr val="tx1"/>
+            </a:solidFill>
+          </a:ln>
+        </p:spPr>
+        <p:style>
+          <a:lnRef idx="2">
+            <a:schemeClr val="accent1">
+              <a:shade val="50000"/>
+            </a:schemeClr>
+          </a:lnRef>
+          <a:fillRef idx="1">
+            <a:schemeClr val="accent1"/>
+          </a:fillRef>
+          <a:effectRef idx="0">
+            <a:schemeClr val="accent1"/>
+          </a:effectRef>
+          <a:fontRef idx="minor">
+            <a:schemeClr val="lt1"/>
+          </a:fontRef>
+        </p:style>
+        <p:txBody>
+          <a:bodyPr rtlCol="0" anchor="ctr"/>
+          <a:lstStyle/>
+          <a:p>
+            <a:pPr algn="ctr"/>
+            <a:r>
+              <a:rPr lang="en-US" b="1" dirty="0">
+                <a:solidFill>
+                  <a:schemeClr val="tx1"/>
+                </a:solidFill>
+              </a:rPr>
+              <a:t>:Date_2016-12-07</a:t>
+            </a:r>
+          </a:p>
+        </p:txBody>
+      </p:sp>
+      <p:sp>
+        <p:nvSpPr>
+          <p:cNvPr id="50" name="Rectangle: Rounded Corners 49">
+            <a:extLst>
+              <a:ext uri="{FF2B5EF4-FFF2-40B4-BE49-F238E27FC236}">
+                <a16:creationId xmlns:a16="http://schemas.microsoft.com/office/drawing/2014/main" id="{F3B80F0D-6FEC-490C-B729-BA78FF1A38CA}"/>
+              </a:ext>
+            </a:extLst>
+          </p:cNvPr>
+          <p:cNvSpPr/>
+          <p:nvPr/>
+        </p:nvSpPr>
+        <p:spPr>
+          <a:xfrm>
+            <a:off x="7214064" y="2817928"/>
+            <a:ext cx="2468880" cy="457001"/>
+          </a:xfrm>
+          <a:prstGeom prst="roundRect">
+            <a:avLst/>
+          </a:prstGeom>
+          <a:solidFill>
+            <a:schemeClr val="accent1">
+              <a:lumMod val="40000"/>
+              <a:lumOff val="60000"/>
+            </a:schemeClr>
+          </a:solidFill>
+          <a:ln w="38100">
+            <a:solidFill>
+              <a:schemeClr val="accent1">
+                <a:lumMod val="75000"/>
+              </a:schemeClr>
+            </a:solidFill>
+          </a:ln>
+        </p:spPr>
+        <p:style>
+          <a:lnRef idx="2">
+            <a:schemeClr val="accent1">
+              <a:shade val="50000"/>
+            </a:schemeClr>
+          </a:lnRef>
+          <a:fillRef idx="1">
+            <a:schemeClr val="accent1"/>
+          </a:fillRef>
+          <a:effectRef idx="0">
+            <a:schemeClr val="accent1"/>
+          </a:effectRef>
+          <a:fontRef idx="minor">
+            <a:schemeClr val="lt1"/>
+          </a:fontRef>
+        </p:style>
+        <p:txBody>
+          <a:bodyPr rtlCol="0" anchor="ctr"/>
+          <a:lstStyle/>
+          <a:p>
+            <a:pPr algn="ctr"/>
+            <a:r>
+              <a:rPr lang="en-US" b="1" dirty="0">
+                <a:solidFill>
+                  <a:schemeClr val="tx1"/>
+                </a:solidFill>
+              </a:rPr>
+              <a:t>:</a:t>
+            </a:r>
+            <a:r>
+              <a:rPr lang="en-US" b="1" dirty="0" err="1">
+                <a:solidFill>
+                  <a:schemeClr val="tx1"/>
+                </a:solidFill>
+              </a:rPr>
+              <a:t>ReferenceBegin</a:t>
+            </a:r>
+            <a:endParaRPr lang="en-US" b="1" dirty="0">
+              <a:solidFill>
+                <a:schemeClr val="tx1"/>
+              </a:solidFill>
+            </a:endParaRPr>
+          </a:p>
+        </p:txBody>
+      </p:sp>
+      <p:sp>
+        <p:nvSpPr>
+          <p:cNvPr id="51" name="Rectangle: Rounded Corners 50">
+            <a:extLst>
+              <a:ext uri="{FF2B5EF4-FFF2-40B4-BE49-F238E27FC236}">
+                <a16:creationId xmlns:a16="http://schemas.microsoft.com/office/drawing/2014/main" id="{D2ACF014-9FBD-4451-B9FF-FA3B75B0E42D}"/>
+              </a:ext>
+            </a:extLst>
+          </p:cNvPr>
+          <p:cNvSpPr/>
+          <p:nvPr/>
+        </p:nvSpPr>
+        <p:spPr>
+          <a:xfrm>
+            <a:off x="5903424" y="4469944"/>
+            <a:ext cx="2468880" cy="457001"/>
+          </a:xfrm>
+          <a:prstGeom prst="roundRect">
+            <a:avLst/>
+          </a:prstGeom>
+          <a:solidFill>
+            <a:schemeClr val="accent1">
+              <a:lumMod val="40000"/>
+              <a:lumOff val="60000"/>
+            </a:schemeClr>
+          </a:solidFill>
+          <a:ln w="38100">
+            <a:solidFill>
+              <a:schemeClr val="accent1">
+                <a:lumMod val="75000"/>
+              </a:schemeClr>
+            </a:solidFill>
+          </a:ln>
+        </p:spPr>
+        <p:style>
+          <a:lnRef idx="2">
+            <a:schemeClr val="accent1">
+              <a:shade val="50000"/>
+            </a:schemeClr>
+          </a:lnRef>
+          <a:fillRef idx="1">
+            <a:schemeClr val="accent1"/>
+          </a:fillRef>
+          <a:effectRef idx="0">
+            <a:schemeClr val="accent1"/>
+          </a:effectRef>
+          <a:fontRef idx="minor">
+            <a:schemeClr val="lt1"/>
+          </a:fontRef>
+        </p:style>
+        <p:txBody>
+          <a:bodyPr rtlCol="0" anchor="ctr"/>
+          <a:lstStyle/>
+          <a:p>
+            <a:pPr algn="ctr"/>
+            <a:r>
+              <a:rPr lang="en-US" b="1" dirty="0">
+                <a:solidFill>
+                  <a:schemeClr val="tx1"/>
+                </a:solidFill>
+              </a:rPr>
+              <a:t>:</a:t>
+            </a:r>
+            <a:r>
+              <a:rPr lang="en-US" b="1" dirty="0" err="1">
+                <a:solidFill>
+                  <a:schemeClr val="tx1"/>
+                </a:solidFill>
+              </a:rPr>
+              <a:t>ReferenceEnd</a:t>
+            </a:r>
+            <a:endParaRPr lang="en-US" b="1" dirty="0">
+              <a:solidFill>
+                <a:schemeClr val="tx1"/>
+              </a:solidFill>
+            </a:endParaRPr>
+          </a:p>
+        </p:txBody>
+      </p:sp>
+      <p:cxnSp>
+        <p:nvCxnSpPr>
+          <p:cNvPr id="52" name="Straight Arrow Connector 51">
+            <a:extLst>
+              <a:ext uri="{FF2B5EF4-FFF2-40B4-BE49-F238E27FC236}">
+                <a16:creationId xmlns:a16="http://schemas.microsoft.com/office/drawing/2014/main" id="{A1004DBD-4B82-4578-94CB-FCC9FAAE6D9A}"/>
+              </a:ext>
+            </a:extLst>
+          </p:cNvPr>
+          <p:cNvCxnSpPr>
+            <a:cxnSpLocks/>
+            <a:stCxn id="47" idx="3"/>
+            <a:endCxn id="50" idx="1"/>
+          </p:cNvCxnSpPr>
+          <p:nvPr/>
+        </p:nvCxnSpPr>
+        <p:spPr>
+          <a:xfrm flipV="1">
+            <a:off x="6199631" y="3046429"/>
+            <a:ext cx="1014433" cy="353568"/>
+          </a:xfrm>
+          <a:prstGeom prst="straightConnector1">
+            <a:avLst/>
+          </a:prstGeom>
+          <a:ln w="50800">
+            <a:solidFill>
+              <a:schemeClr val="bg1">
+                <a:lumMod val="50000"/>
+              </a:schemeClr>
+            </a:solidFill>
+            <a:tailEnd type="triangle"/>
+          </a:ln>
+        </p:spPr>
+        <p:style>
+          <a:lnRef idx="1">
+            <a:schemeClr val="accent1"/>
+          </a:lnRef>
+          <a:fillRef idx="0">
+            <a:schemeClr val="accent1"/>
+          </a:fillRef>
+          <a:effectRef idx="0">
+            <a:schemeClr val="accent1"/>
+          </a:effectRef>
+          <a:fontRef idx="minor">
+            <a:schemeClr val="tx1"/>
+          </a:fontRef>
+        </p:style>
+      </p:cxnSp>
+      <p:cxnSp>
+        <p:nvCxnSpPr>
+          <p:cNvPr id="55" name="Straight Arrow Connector 54">
+            <a:extLst>
+              <a:ext uri="{FF2B5EF4-FFF2-40B4-BE49-F238E27FC236}">
+                <a16:creationId xmlns:a16="http://schemas.microsoft.com/office/drawing/2014/main" id="{72612BB5-E67E-41BB-A2EF-D5CEF9CED4EF}"/>
+              </a:ext>
+            </a:extLst>
+          </p:cNvPr>
+          <p:cNvCxnSpPr>
+            <a:cxnSpLocks/>
+            <a:stCxn id="48" idx="3"/>
+            <a:endCxn id="51" idx="1"/>
+          </p:cNvCxnSpPr>
+          <p:nvPr/>
+        </p:nvCxnSpPr>
+        <p:spPr>
+          <a:xfrm flipV="1">
+            <a:off x="4949951" y="4698445"/>
+            <a:ext cx="953473" cy="454252"/>
+          </a:xfrm>
+          <a:prstGeom prst="straightConnector1">
+            <a:avLst/>
+          </a:prstGeom>
+          <a:ln w="50800">
+            <a:solidFill>
+              <a:schemeClr val="bg1">
+                <a:lumMod val="50000"/>
+              </a:schemeClr>
+            </a:solidFill>
+            <a:tailEnd type="triangle"/>
+          </a:ln>
+        </p:spPr>
+        <p:style>
+          <a:lnRef idx="1">
+            <a:schemeClr val="accent1"/>
+          </a:lnRef>
+          <a:fillRef idx="0">
+            <a:schemeClr val="accent1"/>
+          </a:fillRef>
+          <a:effectRef idx="0">
+            <a:schemeClr val="accent1"/>
+          </a:effectRef>
+          <a:fontRef idx="minor">
+            <a:schemeClr val="tx1"/>
+          </a:fontRef>
+        </p:style>
+      </p:cxnSp>
+      <p:cxnSp>
+        <p:nvCxnSpPr>
+          <p:cNvPr id="59" name="Straight Arrow Connector 58">
+            <a:extLst>
+              <a:ext uri="{FF2B5EF4-FFF2-40B4-BE49-F238E27FC236}">
+                <a16:creationId xmlns:a16="http://schemas.microsoft.com/office/drawing/2014/main" id="{CC9BF0AA-2E99-4EF2-9F6E-111BE8ACD9AA}"/>
+              </a:ext>
+            </a:extLst>
+          </p:cNvPr>
+          <p:cNvCxnSpPr>
+            <a:cxnSpLocks/>
+            <a:stCxn id="47" idx="3"/>
+            <a:endCxn id="63" idx="1"/>
+          </p:cNvCxnSpPr>
+          <p:nvPr/>
+        </p:nvCxnSpPr>
+        <p:spPr>
+          <a:xfrm>
+            <a:off x="6199631" y="3399997"/>
+            <a:ext cx="2453089" cy="792282"/>
+          </a:xfrm>
+          <a:prstGeom prst="straightConnector1">
+            <a:avLst/>
+          </a:prstGeom>
+          <a:ln w="50800">
+            <a:solidFill>
+              <a:schemeClr val="bg1">
+                <a:lumMod val="50000"/>
+              </a:schemeClr>
+            </a:solidFill>
+            <a:tailEnd type="triangle"/>
+          </a:ln>
+        </p:spPr>
+        <p:style>
+          <a:lnRef idx="1">
+            <a:schemeClr val="accent1"/>
+          </a:lnRef>
+          <a:fillRef idx="0">
+            <a:schemeClr val="accent1"/>
+          </a:fillRef>
+          <a:effectRef idx="0">
+            <a:schemeClr val="accent1"/>
+          </a:effectRef>
+          <a:fontRef idx="minor">
+            <a:schemeClr val="tx1"/>
+          </a:fontRef>
+        </p:style>
+      </p:cxnSp>
+      <p:sp>
+        <p:nvSpPr>
+          <p:cNvPr id="63" name="Rectangle: Rounded Corners 62">
+            <a:extLst>
+              <a:ext uri="{FF2B5EF4-FFF2-40B4-BE49-F238E27FC236}">
+                <a16:creationId xmlns:a16="http://schemas.microsoft.com/office/drawing/2014/main" id="{B1630B21-91BA-4E9C-B731-9E61ED2AFA72}"/>
+              </a:ext>
+            </a:extLst>
+          </p:cNvPr>
+          <p:cNvSpPr/>
+          <p:nvPr/>
+        </p:nvSpPr>
+        <p:spPr>
+          <a:xfrm>
+            <a:off x="8652720" y="3963778"/>
+            <a:ext cx="2783375" cy="457001"/>
+          </a:xfrm>
+          <a:prstGeom prst="roundRect">
+            <a:avLst/>
+          </a:prstGeom>
+          <a:solidFill>
+            <a:schemeClr val="bg1"/>
+          </a:solidFill>
+          <a:ln>
+            <a:solidFill>
+              <a:schemeClr val="tx1"/>
+            </a:solidFill>
+          </a:ln>
+        </p:spPr>
+        <p:style>
+          <a:lnRef idx="2">
+            <a:schemeClr val="accent1">
+              <a:shade val="50000"/>
+            </a:schemeClr>
+          </a:lnRef>
+          <a:fillRef idx="1">
+            <a:schemeClr val="accent1"/>
+          </a:fillRef>
+          <a:effectRef idx="0">
+            <a:schemeClr val="accent1"/>
+          </a:effectRef>
+          <a:fontRef idx="minor">
+            <a:schemeClr val="lt1"/>
+          </a:fontRef>
+        </p:style>
+        <p:txBody>
+          <a:bodyPr rtlCol="0" anchor="ctr"/>
+          <a:lstStyle/>
+          <a:p>
+            <a:pPr algn="ctr"/>
+            <a:r>
+              <a:rPr lang="en-US" b="1" dirty="0">
+                <a:solidFill>
+                  <a:schemeClr val="tx1"/>
+                </a:solidFill>
+              </a:rPr>
+              <a:t>“2016-12-07”</a:t>
+            </a:r>
+            <a:r>
+              <a:rPr lang="en-US" b="1" dirty="0">
+                <a:solidFill>
+                  <a:schemeClr val="accent2">
+                    <a:lumMod val="75000"/>
+                  </a:schemeClr>
+                </a:solidFill>
+              </a:rPr>
+              <a:t>^^</a:t>
+            </a:r>
+            <a:r>
+              <a:rPr lang="en-US" b="1" dirty="0" err="1">
+                <a:solidFill>
+                  <a:schemeClr val="accent2">
+                    <a:lumMod val="75000"/>
+                  </a:schemeClr>
+                </a:solidFill>
+              </a:rPr>
+              <a:t>xsd:date</a:t>
+            </a:r>
+            <a:endParaRPr lang="en-US" b="1" dirty="0">
+              <a:solidFill>
+                <a:schemeClr val="accent2">
+                  <a:lumMod val="75000"/>
+                </a:schemeClr>
+              </a:solidFill>
+            </a:endParaRPr>
+          </a:p>
+        </p:txBody>
+      </p:sp>
+      <p:sp>
+        <p:nvSpPr>
+          <p:cNvPr id="64" name="Rectangle: Rounded Corners 63">
+            <a:extLst>
+              <a:ext uri="{FF2B5EF4-FFF2-40B4-BE49-F238E27FC236}">
+                <a16:creationId xmlns:a16="http://schemas.microsoft.com/office/drawing/2014/main" id="{FF35D29D-668C-4B62-879F-808B1E68966A}"/>
+              </a:ext>
+            </a:extLst>
+          </p:cNvPr>
+          <p:cNvSpPr/>
+          <p:nvPr/>
+        </p:nvSpPr>
+        <p:spPr>
+          <a:xfrm>
+            <a:off x="7281120" y="5640178"/>
+            <a:ext cx="2783375" cy="457001"/>
+          </a:xfrm>
+          <a:prstGeom prst="roundRect">
+            <a:avLst/>
+          </a:prstGeom>
+          <a:solidFill>
+            <a:schemeClr val="bg1"/>
+          </a:solidFill>
+          <a:ln>
+            <a:solidFill>
+              <a:schemeClr val="tx1"/>
+            </a:solidFill>
+          </a:ln>
+        </p:spPr>
+        <p:style>
+          <a:lnRef idx="2">
+            <a:schemeClr val="accent1">
+              <a:shade val="50000"/>
+            </a:schemeClr>
+          </a:lnRef>
+          <a:fillRef idx="1">
+            <a:schemeClr val="accent1"/>
+          </a:fillRef>
+          <a:effectRef idx="0">
+            <a:schemeClr val="accent1"/>
+          </a:effectRef>
+          <a:fontRef idx="minor">
+            <a:schemeClr val="lt1"/>
+          </a:fontRef>
+        </p:style>
+        <p:txBody>
+          <a:bodyPr rtlCol="0" anchor="ctr"/>
+          <a:lstStyle/>
+          <a:p>
+            <a:pPr algn="ctr"/>
+            <a:r>
+              <a:rPr lang="en-US" b="1" dirty="0">
+                <a:solidFill>
+                  <a:schemeClr val="tx1"/>
+                </a:solidFill>
+              </a:rPr>
+              <a:t>“2016-12-07”</a:t>
+            </a:r>
+            <a:r>
+              <a:rPr lang="en-US" b="1" dirty="0">
+                <a:solidFill>
+                  <a:schemeClr val="accent2">
+                    <a:lumMod val="75000"/>
+                  </a:schemeClr>
+                </a:solidFill>
+              </a:rPr>
+              <a:t>^^</a:t>
+            </a:r>
+            <a:r>
+              <a:rPr lang="en-US" b="1" dirty="0" err="1">
+                <a:solidFill>
+                  <a:schemeClr val="accent2">
+                    <a:lumMod val="75000"/>
+                  </a:schemeClr>
+                </a:solidFill>
+              </a:rPr>
+              <a:t>xsd:date</a:t>
+            </a:r>
+            <a:endParaRPr lang="en-US" b="1" dirty="0">
+              <a:solidFill>
+                <a:schemeClr val="accent2">
+                  <a:lumMod val="75000"/>
+                </a:schemeClr>
+              </a:solidFill>
+            </a:endParaRPr>
+          </a:p>
+        </p:txBody>
+      </p:sp>
+      <p:cxnSp>
+        <p:nvCxnSpPr>
+          <p:cNvPr id="87" name="Straight Arrow Connector 86">
+            <a:extLst>
+              <a:ext uri="{FF2B5EF4-FFF2-40B4-BE49-F238E27FC236}">
+                <a16:creationId xmlns:a16="http://schemas.microsoft.com/office/drawing/2014/main" id="{747653AA-D7FE-4197-9659-330578AD3397}"/>
+              </a:ext>
+            </a:extLst>
+          </p:cNvPr>
+          <p:cNvCxnSpPr>
+            <a:cxnSpLocks/>
+            <a:stCxn id="48" idx="3"/>
+            <a:endCxn id="64" idx="1"/>
+          </p:cNvCxnSpPr>
+          <p:nvPr/>
+        </p:nvCxnSpPr>
+        <p:spPr>
+          <a:xfrm>
+            <a:off x="4949951" y="5152697"/>
+            <a:ext cx="2331169" cy="715982"/>
+          </a:xfrm>
+          <a:prstGeom prst="straightConnector1">
+            <a:avLst/>
+          </a:prstGeom>
+          <a:ln w="50800">
+            <a:solidFill>
+              <a:schemeClr val="bg1">
+                <a:lumMod val="50000"/>
+              </a:schemeClr>
+            </a:solidFill>
+            <a:tailEnd type="triangle"/>
+          </a:ln>
+        </p:spPr>
+        <p:style>
+          <a:lnRef idx="1">
+            <a:schemeClr val="accent1"/>
+          </a:lnRef>
+          <a:fillRef idx="0">
+            <a:schemeClr val="accent1"/>
+          </a:fillRef>
+          <a:effectRef idx="0">
+            <a:schemeClr val="accent1"/>
+          </a:effectRef>
+          <a:fontRef idx="minor">
+            <a:schemeClr val="tx1"/>
+          </a:fontRef>
+        </p:style>
+      </p:cxnSp>
+      <p:sp>
+        <p:nvSpPr>
+          <p:cNvPr id="15" name="Rectangle: Rounded Corners 14">
+            <a:extLst>
+              <a:ext uri="{FF2B5EF4-FFF2-40B4-BE49-F238E27FC236}">
+                <a16:creationId xmlns:a16="http://schemas.microsoft.com/office/drawing/2014/main" id="{F2D1CDB2-6DA6-45BF-B57E-8A1B3116DAB8}"/>
+              </a:ext>
+            </a:extLst>
+          </p:cNvPr>
+          <p:cNvSpPr/>
+          <p:nvPr/>
+        </p:nvSpPr>
+        <p:spPr>
+          <a:xfrm>
+            <a:off x="191472" y="1972158"/>
+            <a:ext cx="3490511" cy="457001"/>
+          </a:xfrm>
+          <a:prstGeom prst="roundRect">
+            <a:avLst/>
+          </a:prstGeom>
+          <a:solidFill>
+            <a:schemeClr val="accent6">
+              <a:lumMod val="40000"/>
+              <a:lumOff val="60000"/>
+            </a:schemeClr>
+          </a:solidFill>
+          <a:ln>
+            <a:solidFill>
+              <a:schemeClr val="tx1"/>
+            </a:solidFill>
+          </a:ln>
+        </p:spPr>
+        <p:style>
+          <a:lnRef idx="2">
+            <a:schemeClr val="accent1">
+              <a:shade val="50000"/>
+            </a:schemeClr>
+          </a:lnRef>
+          <a:fillRef idx="1">
+            <a:schemeClr val="accent1"/>
+          </a:fillRef>
+          <a:effectRef idx="0">
+            <a:schemeClr val="accent1"/>
+          </a:effectRef>
+          <a:fontRef idx="minor">
+            <a:schemeClr val="lt1"/>
+          </a:fontRef>
+        </p:style>
+        <p:txBody>
+          <a:bodyPr rtlCol="0" anchor="ctr"/>
+          <a:lstStyle/>
+          <a:p>
+            <a:pPr algn="ctr"/>
+            <a:r>
+              <a:rPr lang="en-US" b="1" dirty="0">
+                <a:solidFill>
+                  <a:schemeClr val="tx1"/>
+                </a:solidFill>
+              </a:rPr>
+              <a:t>:Interval_2016-12-07_2016_12-07</a:t>
+            </a:r>
+          </a:p>
+        </p:txBody>
+      </p:sp>
+      <p:sp>
+        <p:nvSpPr>
+          <p:cNvPr id="101" name="TextBox 100">
+            <a:extLst>
+              <a:ext uri="{FF2B5EF4-FFF2-40B4-BE49-F238E27FC236}">
+                <a16:creationId xmlns:a16="http://schemas.microsoft.com/office/drawing/2014/main" id="{C09F5CFC-6F12-41B9-B15E-3BD12189F043}"/>
+              </a:ext>
+            </a:extLst>
+          </p:cNvPr>
+          <p:cNvSpPr txBox="1"/>
+          <p:nvPr/>
+        </p:nvSpPr>
+        <p:spPr>
+          <a:xfrm flipH="1">
+            <a:off x="3669792" y="609600"/>
+            <a:ext cx="329184" cy="369332"/>
+          </a:xfrm>
+          <a:prstGeom prst="rect">
+            <a:avLst/>
+          </a:prstGeom>
+          <a:solidFill>
+            <a:schemeClr val="bg1"/>
+          </a:solidFill>
+        </p:spPr>
+        <p:txBody>
+          <a:bodyPr wrap="square" rtlCol="0">
+            <a:spAutoFit/>
+          </a:bodyPr>
+          <a:lstStyle>
+            <a:defPPr>
+              <a:defRPr lang="en-US"/>
+            </a:defPPr>
+            <a:lvl1pPr>
+              <a:defRPr b="1">
+                <a:solidFill>
+                  <a:schemeClr val="accent2">
+                    <a:lumMod val="75000"/>
+                  </a:schemeClr>
+                </a:solidFill>
+                <a:latin typeface="Courier New" panose="02070309020205020404" pitchFamily="49" charset="0"/>
+                <a:cs typeface="Courier New" panose="02070309020205020404" pitchFamily="49" charset="0"/>
+              </a:defRPr>
+            </a:lvl1pPr>
+          </a:lstStyle>
+          <a:p>
+            <a:r>
+              <a:rPr lang="en-US" dirty="0"/>
+              <a:t>a</a:t>
+            </a:r>
+          </a:p>
+        </p:txBody>
+      </p:sp>
+      <p:sp>
+        <p:nvSpPr>
+          <p:cNvPr id="102" name="TextBox 101">
+            <a:extLst>
+              <a:ext uri="{FF2B5EF4-FFF2-40B4-BE49-F238E27FC236}">
+                <a16:creationId xmlns:a16="http://schemas.microsoft.com/office/drawing/2014/main" id="{C131BC81-344F-4327-B4A7-CB6A075FB769}"/>
+              </a:ext>
+            </a:extLst>
+          </p:cNvPr>
+          <p:cNvSpPr txBox="1"/>
+          <p:nvPr/>
+        </p:nvSpPr>
+        <p:spPr>
+          <a:xfrm flipH="1">
+            <a:off x="3980688" y="2017776"/>
+            <a:ext cx="420624" cy="369332"/>
+          </a:xfrm>
+          <a:prstGeom prst="rect">
+            <a:avLst/>
+          </a:prstGeom>
+          <a:solidFill>
+            <a:schemeClr val="bg1"/>
+          </a:solidFill>
+        </p:spPr>
+        <p:txBody>
+          <a:bodyPr wrap="square" rtlCol="0">
+            <a:spAutoFit/>
+          </a:bodyPr>
+          <a:lstStyle>
+            <a:defPPr>
+              <a:defRPr lang="en-US"/>
+            </a:defPPr>
+            <a:lvl1pPr>
+              <a:defRPr b="1">
+                <a:solidFill>
+                  <a:schemeClr val="accent2">
+                    <a:lumMod val="75000"/>
+                  </a:schemeClr>
+                </a:solidFill>
+                <a:latin typeface="Courier New" panose="02070309020205020404" pitchFamily="49" charset="0"/>
+                <a:cs typeface="Courier New" panose="02070309020205020404" pitchFamily="49" charset="0"/>
+              </a:defRPr>
+            </a:lvl1pPr>
+          </a:lstStyle>
+          <a:p>
+            <a:r>
+              <a:rPr lang="en-US" dirty="0"/>
+              <a:t>a</a:t>
+            </a:r>
+          </a:p>
+        </p:txBody>
+      </p:sp>
+      <p:sp>
+        <p:nvSpPr>
+          <p:cNvPr id="103" name="TextBox 102">
+            <a:extLst>
+              <a:ext uri="{FF2B5EF4-FFF2-40B4-BE49-F238E27FC236}">
+                <a16:creationId xmlns:a16="http://schemas.microsoft.com/office/drawing/2014/main" id="{1575B748-BC68-4CFD-8CCA-7EB9518B465B}"/>
+              </a:ext>
+            </a:extLst>
+          </p:cNvPr>
+          <p:cNvSpPr txBox="1"/>
+          <p:nvPr/>
+        </p:nvSpPr>
+        <p:spPr>
+          <a:xfrm flipH="1">
+            <a:off x="6534912" y="2962656"/>
+            <a:ext cx="420624" cy="369332"/>
+          </a:xfrm>
+          <a:prstGeom prst="rect">
+            <a:avLst/>
+          </a:prstGeom>
+          <a:solidFill>
+            <a:schemeClr val="bg1"/>
+          </a:solidFill>
+        </p:spPr>
+        <p:txBody>
+          <a:bodyPr wrap="square" rtlCol="0">
+            <a:spAutoFit/>
+          </a:bodyPr>
+          <a:lstStyle>
+            <a:defPPr>
+              <a:defRPr lang="en-US"/>
+            </a:defPPr>
+            <a:lvl1pPr>
+              <a:defRPr b="1">
+                <a:solidFill>
+                  <a:schemeClr val="accent2">
+                    <a:lumMod val="75000"/>
+                  </a:schemeClr>
+                </a:solidFill>
+                <a:latin typeface="Courier New" panose="02070309020205020404" pitchFamily="49" charset="0"/>
+                <a:cs typeface="Courier New" panose="02070309020205020404" pitchFamily="49" charset="0"/>
+              </a:defRPr>
+            </a:lvl1pPr>
+          </a:lstStyle>
+          <a:p>
+            <a:r>
+              <a:rPr lang="en-US" dirty="0"/>
+              <a:t>a</a:t>
+            </a:r>
+          </a:p>
+        </p:txBody>
+      </p:sp>
+      <p:sp>
+        <p:nvSpPr>
+          <p:cNvPr id="104" name="TextBox 103">
+            <a:extLst>
+              <a:ext uri="{FF2B5EF4-FFF2-40B4-BE49-F238E27FC236}">
+                <a16:creationId xmlns:a16="http://schemas.microsoft.com/office/drawing/2014/main" id="{03B9BB02-0A20-4035-A314-6500C1A3EFEA}"/>
+              </a:ext>
+            </a:extLst>
+          </p:cNvPr>
+          <p:cNvSpPr txBox="1"/>
+          <p:nvPr/>
+        </p:nvSpPr>
+        <p:spPr>
+          <a:xfrm flipH="1">
+            <a:off x="5248656" y="4712208"/>
+            <a:ext cx="420624" cy="369332"/>
+          </a:xfrm>
+          <a:prstGeom prst="rect">
+            <a:avLst/>
+          </a:prstGeom>
+          <a:solidFill>
+            <a:schemeClr val="bg1"/>
+          </a:solidFill>
+        </p:spPr>
+        <p:txBody>
+          <a:bodyPr wrap="square" rtlCol="0">
+            <a:spAutoFit/>
+          </a:bodyPr>
+          <a:lstStyle>
+            <a:defPPr>
+              <a:defRPr lang="en-US"/>
+            </a:defPPr>
+            <a:lvl1pPr>
+              <a:defRPr b="1">
+                <a:solidFill>
+                  <a:schemeClr val="accent2">
+                    <a:lumMod val="75000"/>
+                  </a:schemeClr>
+                </a:solidFill>
+                <a:latin typeface="Courier New" panose="02070309020205020404" pitchFamily="49" charset="0"/>
+                <a:cs typeface="Courier New" panose="02070309020205020404" pitchFamily="49" charset="0"/>
+              </a:defRPr>
+            </a:lvl1pPr>
+          </a:lstStyle>
+          <a:p>
+            <a:r>
+              <a:rPr lang="en-US" dirty="0"/>
+              <a:t>a</a:t>
+            </a:r>
+          </a:p>
+        </p:txBody>
+      </p:sp>
+      <p:sp>
+        <p:nvSpPr>
+          <p:cNvPr id="107" name="Rectangle 106">
+            <a:extLst>
+              <a:ext uri="{FF2B5EF4-FFF2-40B4-BE49-F238E27FC236}">
+                <a16:creationId xmlns:a16="http://schemas.microsoft.com/office/drawing/2014/main" id="{CBA756AA-71BD-413D-93C8-BAE6C900E028}"/>
+              </a:ext>
+            </a:extLst>
+          </p:cNvPr>
+          <p:cNvSpPr/>
+          <p:nvPr/>
+        </p:nvSpPr>
+        <p:spPr>
+          <a:xfrm>
+            <a:off x="5242126" y="5292590"/>
+            <a:ext cx="2114681" cy="369332"/>
+          </a:xfrm>
+          <a:prstGeom prst="rect">
+            <a:avLst/>
+          </a:prstGeom>
+          <a:solidFill>
+            <a:schemeClr val="bg1"/>
+          </a:solidFill>
+        </p:spPr>
+        <p:txBody>
+          <a:bodyPr wrap="square" rtlCol="0">
+            <a:spAutoFit/>
+          </a:bodyPr>
+          <a:lstStyle/>
+          <a:p>
+            <a:r>
+              <a:rPr lang="en-US" b="1" dirty="0" err="1">
+                <a:solidFill>
+                  <a:schemeClr val="accent2">
+                    <a:lumMod val="75000"/>
+                  </a:schemeClr>
+                </a:solidFill>
+                <a:latin typeface="Courier New" panose="02070309020205020404" pitchFamily="49" charset="0"/>
+                <a:cs typeface="Courier New" panose="02070309020205020404" pitchFamily="49" charset="0"/>
+              </a:rPr>
+              <a:t>time:inXSDDate</a:t>
+            </a:r>
+            <a:endParaRPr lang="en-US" b="1" dirty="0">
+              <a:solidFill>
+                <a:schemeClr val="accent2">
+                  <a:lumMod val="75000"/>
+                </a:schemeClr>
+              </a:solidFill>
+              <a:latin typeface="Courier New" panose="02070309020205020404" pitchFamily="49" charset="0"/>
+              <a:cs typeface="Courier New" panose="02070309020205020404" pitchFamily="49" charset="0"/>
+            </a:endParaRPr>
+          </a:p>
+        </p:txBody>
+      </p:sp>
+      <p:sp>
+        <p:nvSpPr>
+          <p:cNvPr id="109" name="Rectangle 108">
+            <a:extLst>
+              <a:ext uri="{FF2B5EF4-FFF2-40B4-BE49-F238E27FC236}">
+                <a16:creationId xmlns:a16="http://schemas.microsoft.com/office/drawing/2014/main" id="{7753650D-E3D5-4A84-9104-0960BCEF32EC}"/>
+              </a:ext>
+            </a:extLst>
+          </p:cNvPr>
+          <p:cNvSpPr/>
+          <p:nvPr/>
+        </p:nvSpPr>
+        <p:spPr>
+          <a:xfrm>
+            <a:off x="6467422" y="3640574"/>
+            <a:ext cx="2114681" cy="369332"/>
+          </a:xfrm>
+          <a:prstGeom prst="rect">
+            <a:avLst/>
+          </a:prstGeom>
+          <a:solidFill>
+            <a:schemeClr val="bg1"/>
+          </a:solidFill>
+        </p:spPr>
+        <p:txBody>
+          <a:bodyPr wrap="square" rtlCol="0">
+            <a:spAutoFit/>
+          </a:bodyPr>
+          <a:lstStyle/>
+          <a:p>
+            <a:r>
+              <a:rPr lang="en-US" b="1" dirty="0" err="1">
+                <a:solidFill>
+                  <a:schemeClr val="accent2">
+                    <a:lumMod val="75000"/>
+                  </a:schemeClr>
+                </a:solidFill>
+                <a:latin typeface="Courier New" panose="02070309020205020404" pitchFamily="49" charset="0"/>
+                <a:cs typeface="Courier New" panose="02070309020205020404" pitchFamily="49" charset="0"/>
+              </a:rPr>
+              <a:t>time:inXSDDate</a:t>
+            </a:r>
+            <a:endParaRPr lang="en-US" b="1" dirty="0">
+              <a:solidFill>
+                <a:schemeClr val="accent2">
+                  <a:lumMod val="75000"/>
+                </a:schemeClr>
+              </a:solidFill>
+              <a:latin typeface="Courier New" panose="02070309020205020404" pitchFamily="49" charset="0"/>
+              <a:cs typeface="Courier New" panose="02070309020205020404" pitchFamily="49" charset="0"/>
+            </a:endParaRPr>
+          </a:p>
+        </p:txBody>
+      </p:sp>
+    </p:spTree>
+    <p:extLst>
+      <p:ext uri="{BB962C8B-B14F-4D97-AF65-F5344CB8AC3E}">
+        <p14:creationId xmlns:p14="http://schemas.microsoft.com/office/powerpoint/2010/main" val="758022510"/>
+      </p:ext>
+    </p:extLst>
+  </p:cSld>
+  <p:clrMapOvr>
+    <a:masterClrMapping/>
+  </p:clrMapOvr>
+</p:sld>
+</file>
+
+<file path=ppt/slides/slide4.xml><?xml version="1.0" encoding="utf-8"?>
+<p:sld xmlns:a="http://schemas.openxmlformats.org/drawingml/2006/main" xmlns:r="http://schemas.openxmlformats.org/officeDocument/2006/relationships" xmlns:p="http://schemas.openxmlformats.org/presentationml/2006/main">
+  <p:cSld>
+    <p:spTree>
+      <p:nvGrpSpPr>
+        <p:cNvPr id="1" name=""/>
+        <p:cNvGrpSpPr/>
+        <p:nvPr/>
+      </p:nvGrpSpPr>
+      <p:grpSpPr>
+        <a:xfrm>
+          <a:off x="0" y="0"/>
+          <a:ext cx="0" cy="0"/>
+          <a:chOff x="0" y="0"/>
+          <a:chExt cx="0" cy="0"/>
+        </a:xfrm>
+      </p:grpSpPr>
+      <p:sp>
+        <p:nvSpPr>
+          <p:cNvPr id="4" name="Rectangle: Rounded Corners 3"/>
+          <p:cNvSpPr/>
+          <p:nvPr/>
+        </p:nvSpPr>
+        <p:spPr>
+          <a:xfrm>
+            <a:off x="992472" y="602691"/>
+            <a:ext cx="2613937" cy="449588"/>
+          </a:xfrm>
+          <a:prstGeom prst="roundRect">
+            <a:avLst/>
+          </a:prstGeom>
+          <a:solidFill>
+            <a:schemeClr val="accent6">
+              <a:lumMod val="40000"/>
+              <a:lumOff val="60000"/>
+            </a:schemeClr>
+          </a:solidFill>
+          <a:ln>
+            <a:solidFill>
+              <a:schemeClr val="tx1"/>
+            </a:solidFill>
+          </a:ln>
+        </p:spPr>
+        <p:style>
+          <a:lnRef idx="2">
+            <a:schemeClr val="accent1">
+              <a:shade val="50000"/>
+            </a:schemeClr>
+          </a:lnRef>
+          <a:fillRef idx="1">
+            <a:schemeClr val="accent1"/>
+          </a:fillRef>
+          <a:effectRef idx="0">
+            <a:schemeClr val="accent1"/>
+          </a:effectRef>
+          <a:fontRef idx="minor">
+            <a:schemeClr val="lt1"/>
+          </a:fontRef>
+        </p:style>
+        <p:txBody>
+          <a:bodyPr rtlCol="0" anchor="ctr"/>
+          <a:lstStyle/>
+          <a:p>
+            <a:pPr algn="ctr"/>
+            <a:r>
+              <a:rPr lang="en-US" sz="1600" dirty="0">
+                <a:solidFill>
+                  <a:schemeClr val="tx1"/>
+                </a:solidFill>
+              </a:rPr>
+              <a:t>cj16050:</a:t>
+            </a:r>
+            <a:r>
+              <a:rPr lang="en-US" b="1" dirty="0">
+                <a:solidFill>
+                  <a:schemeClr val="tx1"/>
+                </a:solidFill>
+              </a:rPr>
+              <a:t>Animal_99M91</a:t>
+            </a:r>
+          </a:p>
+        </p:txBody>
+      </p:sp>
+      <p:sp>
+        <p:nvSpPr>
+          <p:cNvPr id="10" name="Rectangle: Rounded Corners 9">
+            <a:extLst>
+              <a:ext uri="{FF2B5EF4-FFF2-40B4-BE49-F238E27FC236}">
+                <a16:creationId xmlns:a16="http://schemas.microsoft.com/office/drawing/2014/main" id="{6B507A6C-DA4D-4A07-AC87-C4CECFA5297B}"/>
+              </a:ext>
+            </a:extLst>
+          </p:cNvPr>
+          <p:cNvSpPr/>
+          <p:nvPr/>
+        </p:nvSpPr>
+        <p:spPr>
+          <a:xfrm>
+            <a:off x="5872963" y="598984"/>
+            <a:ext cx="2468880" cy="457001"/>
+          </a:xfrm>
+          <a:prstGeom prst="roundRect">
+            <a:avLst/>
+          </a:prstGeom>
+          <a:solidFill>
+            <a:schemeClr val="accent1">
+              <a:lumMod val="40000"/>
+              <a:lumOff val="60000"/>
+            </a:schemeClr>
+          </a:solidFill>
+          <a:ln w="38100">
+            <a:solidFill>
+              <a:schemeClr val="accent1">
+                <a:lumMod val="75000"/>
+              </a:schemeClr>
+            </a:solidFill>
+          </a:ln>
+        </p:spPr>
+        <p:style>
+          <a:lnRef idx="2">
+            <a:schemeClr val="accent1">
+              <a:shade val="50000"/>
+            </a:schemeClr>
+          </a:lnRef>
+          <a:fillRef idx="1">
+            <a:schemeClr val="accent1"/>
+          </a:fillRef>
+          <a:effectRef idx="0">
+            <a:schemeClr val="accent1"/>
+          </a:effectRef>
+          <a:fontRef idx="minor">
+            <a:schemeClr val="lt1"/>
+          </a:fontRef>
+        </p:style>
+        <p:txBody>
+          <a:bodyPr rtlCol="0" anchor="ctr"/>
+          <a:lstStyle/>
+          <a:p>
+            <a:pPr algn="ctr"/>
+            <a:r>
+              <a:rPr lang="en-US" sz="1600" dirty="0" err="1">
+                <a:solidFill>
+                  <a:schemeClr val="tx1"/>
+                </a:solidFill>
+              </a:rPr>
+              <a:t>study:</a:t>
+            </a:r>
+            <a:r>
+              <a:rPr lang="en-US" b="1" dirty="0" err="1">
+                <a:solidFill>
+                  <a:schemeClr val="tx1"/>
+                </a:solidFill>
+              </a:rPr>
+              <a:t>AnimalSubject</a:t>
+            </a:r>
+            <a:endParaRPr lang="en-US" b="1" dirty="0">
+              <a:solidFill>
+                <a:schemeClr val="tx1"/>
+              </a:solidFill>
+            </a:endParaRPr>
+          </a:p>
+        </p:txBody>
+      </p:sp>
+      <p:cxnSp>
+        <p:nvCxnSpPr>
+          <p:cNvPr id="16" name="Straight Arrow Connector 15">
+            <a:extLst>
+              <a:ext uri="{FF2B5EF4-FFF2-40B4-BE49-F238E27FC236}">
+                <a16:creationId xmlns:a16="http://schemas.microsoft.com/office/drawing/2014/main" id="{2BD3BC57-ACA0-4E8B-A760-B1A2EC9E7B20}"/>
+              </a:ext>
+            </a:extLst>
+          </p:cNvPr>
+          <p:cNvCxnSpPr>
+            <a:cxnSpLocks/>
+            <a:stCxn id="4" idx="3"/>
+            <a:endCxn id="10" idx="1"/>
+          </p:cNvCxnSpPr>
+          <p:nvPr/>
+        </p:nvCxnSpPr>
+        <p:spPr>
+          <a:xfrm>
+            <a:off x="3606409" y="827485"/>
+            <a:ext cx="2266554" cy="0"/>
+          </a:xfrm>
+          <a:prstGeom prst="straightConnector1">
+            <a:avLst/>
+          </a:prstGeom>
+          <a:ln w="50800">
+            <a:solidFill>
+              <a:schemeClr val="bg1">
+                <a:lumMod val="50000"/>
+              </a:schemeClr>
+            </a:solidFill>
+            <a:tailEnd type="triangle"/>
+          </a:ln>
+        </p:spPr>
+        <p:style>
+          <a:lnRef idx="1">
+            <a:schemeClr val="accent1"/>
+          </a:lnRef>
+          <a:fillRef idx="0">
+            <a:schemeClr val="accent1"/>
+          </a:fillRef>
+          <a:effectRef idx="0">
+            <a:schemeClr val="accent1"/>
+          </a:effectRef>
+          <a:fontRef idx="minor">
+            <a:schemeClr val="tx1"/>
+          </a:fontRef>
+        </p:style>
+      </p:cxnSp>
+      <p:sp>
+        <p:nvSpPr>
+          <p:cNvPr id="22" name="Rectangle: Rounded Corners 21">
+            <a:extLst>
+              <a:ext uri="{FF2B5EF4-FFF2-40B4-BE49-F238E27FC236}">
+                <a16:creationId xmlns:a16="http://schemas.microsoft.com/office/drawing/2014/main" id="{A80CEA84-AC4C-4D17-B914-0EB2393DC44E}"/>
+              </a:ext>
+            </a:extLst>
+          </p:cNvPr>
+          <p:cNvSpPr/>
+          <p:nvPr/>
+        </p:nvSpPr>
+        <p:spPr>
+          <a:xfrm>
+            <a:off x="5872963" y="1972158"/>
+            <a:ext cx="2468880" cy="457001"/>
+          </a:xfrm>
+          <a:prstGeom prst="roundRect">
+            <a:avLst/>
+          </a:prstGeom>
+          <a:solidFill>
+            <a:schemeClr val="accent1">
+              <a:lumMod val="40000"/>
+              <a:lumOff val="60000"/>
+            </a:schemeClr>
+          </a:solidFill>
+          <a:ln w="38100">
+            <a:solidFill>
+              <a:schemeClr val="accent1">
+                <a:lumMod val="75000"/>
+              </a:schemeClr>
+            </a:solidFill>
+          </a:ln>
+        </p:spPr>
+        <p:style>
+          <a:lnRef idx="2">
+            <a:schemeClr val="accent1">
+              <a:shade val="50000"/>
+            </a:schemeClr>
+          </a:lnRef>
+          <a:fillRef idx="1">
+            <a:schemeClr val="accent1"/>
+          </a:fillRef>
+          <a:effectRef idx="0">
+            <a:schemeClr val="accent1"/>
+          </a:effectRef>
+          <a:fontRef idx="minor">
+            <a:schemeClr val="lt1"/>
+          </a:fontRef>
+        </p:style>
+        <p:txBody>
+          <a:bodyPr rtlCol="0" anchor="ctr"/>
+          <a:lstStyle/>
+          <a:p>
+            <a:pPr algn="ctr"/>
+            <a:r>
+              <a:rPr lang="en-US" sz="1600" dirty="0" err="1">
+                <a:solidFill>
+                  <a:schemeClr val="tx1"/>
+                </a:solidFill>
+              </a:rPr>
+              <a:t>study:</a:t>
+            </a:r>
+            <a:r>
+              <a:rPr lang="en-US" b="1" dirty="0" err="1">
+                <a:solidFill>
+                  <a:schemeClr val="tx1"/>
+                </a:solidFill>
+              </a:rPr>
+              <a:t>ReferenceInterval</a:t>
+            </a:r>
+            <a:endParaRPr lang="en-US" b="1" dirty="0">
+              <a:solidFill>
+                <a:schemeClr val="tx1"/>
+              </a:solidFill>
+            </a:endParaRPr>
+          </a:p>
+        </p:txBody>
+      </p:sp>
+      <p:cxnSp>
+        <p:nvCxnSpPr>
+          <p:cNvPr id="23" name="Straight Arrow Connector 22">
+            <a:extLst>
+              <a:ext uri="{FF2B5EF4-FFF2-40B4-BE49-F238E27FC236}">
+                <a16:creationId xmlns:a16="http://schemas.microsoft.com/office/drawing/2014/main" id="{1DA770EC-9121-483A-9ECC-050B87E2EE9E}"/>
+              </a:ext>
+            </a:extLst>
+          </p:cNvPr>
+          <p:cNvCxnSpPr>
+            <a:cxnSpLocks/>
+            <a:stCxn id="15" idx="3"/>
+            <a:endCxn id="22" idx="1"/>
+          </p:cNvCxnSpPr>
+          <p:nvPr/>
+        </p:nvCxnSpPr>
+        <p:spPr>
+          <a:xfrm>
+            <a:off x="4343400" y="2200659"/>
+            <a:ext cx="1529563" cy="0"/>
+          </a:xfrm>
+          <a:prstGeom prst="straightConnector1">
+            <a:avLst/>
+          </a:prstGeom>
+          <a:ln w="50800">
+            <a:solidFill>
+              <a:schemeClr val="bg1">
+                <a:lumMod val="50000"/>
+              </a:schemeClr>
+            </a:solidFill>
+            <a:tailEnd type="triangle"/>
+          </a:ln>
+        </p:spPr>
+        <p:style>
+          <a:lnRef idx="1">
+            <a:schemeClr val="accent1"/>
+          </a:lnRef>
+          <a:fillRef idx="0">
+            <a:schemeClr val="accent1"/>
+          </a:fillRef>
+          <a:effectRef idx="0">
+            <a:schemeClr val="accent1"/>
+          </a:effectRef>
+          <a:fontRef idx="minor">
+            <a:schemeClr val="tx1"/>
+          </a:fontRef>
+        </p:style>
+      </p:cxnSp>
+      <p:cxnSp>
+        <p:nvCxnSpPr>
+          <p:cNvPr id="30" name="Straight Arrow Connector 29">
+            <a:extLst>
+              <a:ext uri="{FF2B5EF4-FFF2-40B4-BE49-F238E27FC236}">
+                <a16:creationId xmlns:a16="http://schemas.microsoft.com/office/drawing/2014/main" id="{769D4B6A-7F30-4FB5-B811-ACFD7653AAE5}"/>
+              </a:ext>
+            </a:extLst>
+          </p:cNvPr>
+          <p:cNvCxnSpPr>
+            <a:cxnSpLocks/>
+            <a:stCxn id="15" idx="2"/>
+            <a:endCxn id="47" idx="0"/>
+          </p:cNvCxnSpPr>
+          <p:nvPr/>
+        </p:nvCxnSpPr>
+        <p:spPr>
+          <a:xfrm>
+            <a:off x="2299440" y="2429159"/>
+            <a:ext cx="2569464" cy="852065"/>
+          </a:xfrm>
+          <a:prstGeom prst="straightConnector1">
+            <a:avLst/>
+          </a:prstGeom>
+          <a:ln w="50800">
+            <a:solidFill>
+              <a:schemeClr val="bg1">
+                <a:lumMod val="50000"/>
+              </a:schemeClr>
+            </a:solidFill>
+            <a:tailEnd type="triangle"/>
+          </a:ln>
+        </p:spPr>
+        <p:style>
+          <a:lnRef idx="1">
+            <a:schemeClr val="accent1"/>
+          </a:lnRef>
+          <a:fillRef idx="0">
+            <a:schemeClr val="accent1"/>
+          </a:fillRef>
+          <a:effectRef idx="0">
+            <a:schemeClr val="accent1"/>
+          </a:effectRef>
+          <a:fontRef idx="minor">
+            <a:schemeClr val="tx1"/>
+          </a:fontRef>
+        </p:style>
+      </p:cxnSp>
+      <p:grpSp>
+        <p:nvGrpSpPr>
+          <p:cNvPr id="38" name="Group 37">
+            <a:extLst>
+              <a:ext uri="{FF2B5EF4-FFF2-40B4-BE49-F238E27FC236}">
+                <a16:creationId xmlns:a16="http://schemas.microsoft.com/office/drawing/2014/main" id="{FD57785F-5ED7-49A8-86E0-7E9316E39A31}"/>
+              </a:ext>
+            </a:extLst>
+          </p:cNvPr>
+          <p:cNvGrpSpPr/>
+          <p:nvPr/>
+        </p:nvGrpSpPr>
+        <p:grpSpPr>
+          <a:xfrm>
+            <a:off x="377759" y="1052279"/>
+            <a:ext cx="3843362" cy="919879"/>
+            <a:chOff x="240958" y="1052279"/>
+            <a:chExt cx="3843362" cy="919879"/>
+          </a:xfrm>
+        </p:grpSpPr>
+        <p:cxnSp>
+          <p:nvCxnSpPr>
+            <p:cNvPr id="17" name="Straight Arrow Connector 16">
+              <a:extLst>
+                <a:ext uri="{FF2B5EF4-FFF2-40B4-BE49-F238E27FC236}">
+                  <a16:creationId xmlns:a16="http://schemas.microsoft.com/office/drawing/2014/main" id="{29F0277E-AD84-48E5-9890-328F2C49D080}"/>
+                </a:ext>
+              </a:extLst>
+            </p:cNvPr>
+            <p:cNvCxnSpPr>
+              <a:cxnSpLocks/>
+              <a:stCxn id="4" idx="2"/>
+              <a:endCxn id="15" idx="0"/>
+            </p:cNvCxnSpPr>
+            <p:nvPr/>
+          </p:nvCxnSpPr>
+          <p:spPr>
+            <a:xfrm flipH="1">
+              <a:off x="2299440" y="1052279"/>
+              <a:ext cx="1" cy="919879"/>
+            </a:xfrm>
+            <a:prstGeom prst="straightConnector1">
+              <a:avLst/>
+            </a:prstGeom>
+            <a:ln w="50800">
+              <a:solidFill>
+                <a:schemeClr val="bg1">
+                  <a:lumMod val="50000"/>
+                </a:schemeClr>
+              </a:solidFill>
+              <a:tailEnd type="triangle"/>
+            </a:ln>
+          </p:spPr>
+          <p:style>
+            <a:lnRef idx="1">
+              <a:schemeClr val="accent1"/>
+            </a:lnRef>
+            <a:fillRef idx="0">
+              <a:schemeClr val="accent1"/>
+            </a:fillRef>
+            <a:effectRef idx="0">
+              <a:schemeClr val="accent1"/>
+            </a:effectRef>
+            <a:fontRef idx="minor">
+              <a:schemeClr val="tx1"/>
+            </a:fontRef>
+          </p:style>
+        </p:cxnSp>
+        <p:sp>
+          <p:nvSpPr>
+            <p:cNvPr id="7" name="TextBox 6"/>
+            <p:cNvSpPr txBox="1"/>
+            <p:nvPr/>
+          </p:nvSpPr>
+          <p:spPr>
+            <a:xfrm>
+              <a:off x="240958" y="1301847"/>
+              <a:ext cx="3843362" cy="369332"/>
+            </a:xfrm>
+            <a:prstGeom prst="rect">
+              <a:avLst/>
+            </a:prstGeom>
+            <a:solidFill>
+              <a:schemeClr val="bg1"/>
+            </a:solidFill>
+          </p:spPr>
+          <p:txBody>
+            <a:bodyPr wrap="square" rtlCol="0">
+              <a:spAutoFit/>
+            </a:bodyPr>
+            <a:lstStyle>
+              <a:defPPr>
+                <a:defRPr lang="en-US"/>
+              </a:defPPr>
+              <a:lvl1pPr>
+                <a:defRPr b="1">
+                  <a:solidFill>
+                    <a:schemeClr val="accent2">
+                      <a:lumMod val="75000"/>
+                    </a:schemeClr>
+                  </a:solidFill>
+                  <a:latin typeface="Courier New" panose="02070309020205020404" pitchFamily="49" charset="0"/>
+                  <a:cs typeface="Courier New" panose="02070309020205020404" pitchFamily="49" charset="0"/>
+                </a:defRPr>
+              </a:lvl1pPr>
+            </a:lstStyle>
+            <a:p>
+              <a:r>
+                <a:rPr lang="en-US" sz="1600" b="0" dirty="0" err="1"/>
+                <a:t>study:</a:t>
+              </a:r>
+              <a:r>
+                <a:rPr lang="en-US" dirty="0" err="1"/>
+                <a:t>hasReferenceInterval</a:t>
+              </a:r>
+              <a:endParaRPr lang="en-US" dirty="0"/>
+            </a:p>
+          </p:txBody>
+        </p:sp>
+      </p:grpSp>
+      <p:sp>
+        <p:nvSpPr>
+          <p:cNvPr id="42" name="TextBox 41">
+            <a:extLst>
+              <a:ext uri="{FF2B5EF4-FFF2-40B4-BE49-F238E27FC236}">
+                <a16:creationId xmlns:a16="http://schemas.microsoft.com/office/drawing/2014/main" id="{E44AC35C-D56A-4BA4-9884-CFA2D845B4FA}"/>
+              </a:ext>
+            </a:extLst>
+          </p:cNvPr>
+          <p:cNvSpPr txBox="1"/>
+          <p:nvPr/>
+        </p:nvSpPr>
+        <p:spPr>
+          <a:xfrm>
+            <a:off x="2587918" y="2661255"/>
+            <a:ext cx="2605874" cy="369332"/>
+          </a:xfrm>
+          <a:prstGeom prst="rect">
+            <a:avLst/>
+          </a:prstGeom>
+          <a:solidFill>
+            <a:schemeClr val="bg1"/>
+          </a:solidFill>
+        </p:spPr>
+        <p:txBody>
+          <a:bodyPr wrap="square" rtlCol="0">
+            <a:spAutoFit/>
+          </a:bodyPr>
+          <a:lstStyle>
+            <a:defPPr>
+              <a:defRPr lang="en-US"/>
+            </a:defPPr>
+            <a:lvl1pPr>
+              <a:defRPr b="1">
+                <a:solidFill>
+                  <a:schemeClr val="accent2">
+                    <a:lumMod val="75000"/>
+                  </a:schemeClr>
+                </a:solidFill>
+                <a:latin typeface="Courier New" panose="02070309020205020404" pitchFamily="49" charset="0"/>
+                <a:cs typeface="Courier New" panose="02070309020205020404" pitchFamily="49" charset="0"/>
+              </a:defRPr>
+            </a:lvl1pPr>
+          </a:lstStyle>
+          <a:p>
+            <a:r>
+              <a:rPr lang="en-US" sz="1600" b="0" dirty="0" err="1"/>
+              <a:t>time:</a:t>
+            </a:r>
+            <a:r>
+              <a:rPr lang="en-US" dirty="0" err="1"/>
+              <a:t>hasBeginng</a:t>
+            </a:r>
+            <a:endParaRPr lang="en-US" dirty="0"/>
+          </a:p>
+        </p:txBody>
+      </p:sp>
+      <p:cxnSp>
+        <p:nvCxnSpPr>
+          <p:cNvPr id="43" name="Straight Arrow Connector 42">
+            <a:extLst>
+              <a:ext uri="{FF2B5EF4-FFF2-40B4-BE49-F238E27FC236}">
+                <a16:creationId xmlns:a16="http://schemas.microsoft.com/office/drawing/2014/main" id="{DBA4C3E1-A7BC-4049-9A3C-CAAB8D4552F6}"/>
+              </a:ext>
+            </a:extLst>
+          </p:cNvPr>
+          <p:cNvCxnSpPr>
+            <a:cxnSpLocks/>
+            <a:stCxn id="15" idx="2"/>
+            <a:endCxn id="48" idx="0"/>
+          </p:cNvCxnSpPr>
+          <p:nvPr/>
+        </p:nvCxnSpPr>
+        <p:spPr>
+          <a:xfrm>
+            <a:off x="2299440" y="2429159"/>
+            <a:ext cx="1" cy="2495037"/>
+          </a:xfrm>
+          <a:prstGeom prst="straightConnector1">
+            <a:avLst/>
+          </a:prstGeom>
+          <a:ln w="50800">
+            <a:solidFill>
+              <a:schemeClr val="bg1">
+                <a:lumMod val="50000"/>
+              </a:schemeClr>
+            </a:solidFill>
+            <a:tailEnd type="triangle"/>
+          </a:ln>
+        </p:spPr>
+        <p:style>
+          <a:lnRef idx="1">
+            <a:schemeClr val="accent1"/>
+          </a:lnRef>
+          <a:fillRef idx="0">
+            <a:schemeClr val="accent1"/>
+          </a:fillRef>
+          <a:effectRef idx="0">
+            <a:schemeClr val="accent1"/>
+          </a:effectRef>
+          <a:fontRef idx="minor">
+            <a:schemeClr val="tx1"/>
+          </a:fontRef>
+        </p:style>
+      </p:cxnSp>
+      <p:sp>
+        <p:nvSpPr>
+          <p:cNvPr id="47" name="Rectangle: Rounded Corners 46">
+            <a:extLst>
+              <a:ext uri="{FF2B5EF4-FFF2-40B4-BE49-F238E27FC236}">
+                <a16:creationId xmlns:a16="http://schemas.microsoft.com/office/drawing/2014/main" id="{23F8A56F-9569-488F-9C72-B2665C87B7BA}"/>
+              </a:ext>
+            </a:extLst>
+          </p:cNvPr>
+          <p:cNvSpPr/>
+          <p:nvPr/>
+        </p:nvSpPr>
+        <p:spPr>
+          <a:xfrm>
+            <a:off x="3123648" y="3281224"/>
+            <a:ext cx="3490511" cy="457001"/>
+          </a:xfrm>
+          <a:prstGeom prst="roundRect">
+            <a:avLst/>
+          </a:prstGeom>
+          <a:solidFill>
+            <a:schemeClr val="accent6">
+              <a:lumMod val="40000"/>
+              <a:lumOff val="60000"/>
+            </a:schemeClr>
+          </a:solidFill>
+          <a:ln>
+            <a:solidFill>
+              <a:schemeClr val="tx1"/>
+            </a:solidFill>
+          </a:ln>
+        </p:spPr>
+        <p:style>
+          <a:lnRef idx="2">
+            <a:schemeClr val="accent1">
+              <a:shade val="50000"/>
+            </a:schemeClr>
+          </a:lnRef>
+          <a:fillRef idx="1">
+            <a:schemeClr val="accent1"/>
+          </a:fillRef>
+          <a:effectRef idx="0">
+            <a:schemeClr val="accent1"/>
+          </a:effectRef>
+          <a:fontRef idx="minor">
+            <a:schemeClr val="lt1"/>
+          </a:fontRef>
+        </p:style>
+        <p:txBody>
+          <a:bodyPr rtlCol="0" anchor="ctr"/>
+          <a:lstStyle/>
+          <a:p>
+            <a:pPr algn="ctr"/>
+            <a:r>
+              <a:rPr lang="en-US" sz="1600" dirty="0">
+                <a:solidFill>
+                  <a:schemeClr val="tx1"/>
+                </a:solidFill>
+              </a:rPr>
+              <a:t>cj16050</a:t>
+            </a:r>
+            <a:r>
+              <a:rPr lang="en-US" b="1" dirty="0">
+                <a:solidFill>
+                  <a:schemeClr val="tx1"/>
+                </a:solidFill>
+              </a:rPr>
+              <a:t>:Date_2016-12-07</a:t>
+            </a:r>
+          </a:p>
+        </p:txBody>
+      </p:sp>
+      <p:sp>
+        <p:nvSpPr>
+          <p:cNvPr id="48" name="Rectangle: Rounded Corners 47">
+            <a:extLst>
+              <a:ext uri="{FF2B5EF4-FFF2-40B4-BE49-F238E27FC236}">
+                <a16:creationId xmlns:a16="http://schemas.microsoft.com/office/drawing/2014/main" id="{CEBC1294-CAA3-49E1-A52E-68753199F3A5}"/>
+              </a:ext>
+            </a:extLst>
+          </p:cNvPr>
+          <p:cNvSpPr/>
+          <p:nvPr/>
+        </p:nvSpPr>
+        <p:spPr>
+          <a:xfrm>
+            <a:off x="554185" y="4924196"/>
+            <a:ext cx="3490511" cy="457001"/>
+          </a:xfrm>
+          <a:prstGeom prst="roundRect">
+            <a:avLst/>
+          </a:prstGeom>
+          <a:solidFill>
+            <a:schemeClr val="accent6">
+              <a:lumMod val="40000"/>
+              <a:lumOff val="60000"/>
+            </a:schemeClr>
+          </a:solidFill>
+          <a:ln>
+            <a:solidFill>
+              <a:schemeClr val="tx1"/>
+            </a:solidFill>
+          </a:ln>
+        </p:spPr>
+        <p:style>
+          <a:lnRef idx="2">
+            <a:schemeClr val="accent1">
+              <a:shade val="50000"/>
+            </a:schemeClr>
+          </a:lnRef>
+          <a:fillRef idx="1">
+            <a:schemeClr val="accent1"/>
+          </a:fillRef>
+          <a:effectRef idx="0">
+            <a:schemeClr val="accent1"/>
+          </a:effectRef>
+          <a:fontRef idx="minor">
+            <a:schemeClr val="lt1"/>
+          </a:fontRef>
+        </p:style>
+        <p:txBody>
+          <a:bodyPr rtlCol="0" anchor="ctr"/>
+          <a:lstStyle/>
+          <a:p>
+            <a:pPr algn="ctr"/>
+            <a:r>
+              <a:rPr lang="en-US" sz="1600" dirty="0">
+                <a:solidFill>
+                  <a:schemeClr val="tx1"/>
+                </a:solidFill>
+              </a:rPr>
+              <a:t>cj16050</a:t>
+            </a:r>
+            <a:r>
+              <a:rPr lang="en-US" b="1" dirty="0">
+                <a:solidFill>
+                  <a:schemeClr val="tx1"/>
+                </a:solidFill>
+              </a:rPr>
+              <a:t>:Date_2016-12-06</a:t>
+            </a:r>
+          </a:p>
+        </p:txBody>
+      </p:sp>
+      <p:sp>
+        <p:nvSpPr>
+          <p:cNvPr id="50" name="Rectangle: Rounded Corners 49">
+            <a:extLst>
+              <a:ext uri="{FF2B5EF4-FFF2-40B4-BE49-F238E27FC236}">
+                <a16:creationId xmlns:a16="http://schemas.microsoft.com/office/drawing/2014/main" id="{F3B80F0D-6FEC-490C-B729-BA78FF1A38CA}"/>
+              </a:ext>
+            </a:extLst>
+          </p:cNvPr>
+          <p:cNvSpPr/>
+          <p:nvPr/>
+        </p:nvSpPr>
+        <p:spPr>
+          <a:xfrm>
+            <a:off x="7811472" y="2830120"/>
+            <a:ext cx="2468880" cy="457001"/>
+          </a:xfrm>
+          <a:prstGeom prst="roundRect">
+            <a:avLst/>
+          </a:prstGeom>
+          <a:solidFill>
+            <a:schemeClr val="accent1">
+              <a:lumMod val="40000"/>
+              <a:lumOff val="60000"/>
+            </a:schemeClr>
+          </a:solidFill>
+          <a:ln w="38100">
+            <a:solidFill>
+              <a:schemeClr val="accent1">
+                <a:lumMod val="75000"/>
+              </a:schemeClr>
+            </a:solidFill>
+          </a:ln>
+        </p:spPr>
+        <p:style>
+          <a:lnRef idx="2">
+            <a:schemeClr val="accent1">
+              <a:shade val="50000"/>
+            </a:schemeClr>
+          </a:lnRef>
+          <a:fillRef idx="1">
+            <a:schemeClr val="accent1"/>
+          </a:fillRef>
+          <a:effectRef idx="0">
+            <a:schemeClr val="accent1"/>
+          </a:effectRef>
+          <a:fontRef idx="minor">
+            <a:schemeClr val="lt1"/>
+          </a:fontRef>
+        </p:style>
+        <p:txBody>
+          <a:bodyPr rtlCol="0" anchor="ctr"/>
+          <a:lstStyle/>
+          <a:p>
+            <a:pPr algn="ctr"/>
+            <a:r>
+              <a:rPr lang="en-US" sz="1600" dirty="0" err="1">
+                <a:solidFill>
+                  <a:schemeClr val="tx1"/>
+                </a:solidFill>
+              </a:rPr>
+              <a:t>study:</a:t>
+            </a:r>
+            <a:r>
+              <a:rPr lang="en-US" b="1" dirty="0" err="1">
+                <a:solidFill>
+                  <a:schemeClr val="tx1"/>
+                </a:solidFill>
+              </a:rPr>
+              <a:t>ReferenceBegin</a:t>
+            </a:r>
+            <a:endParaRPr lang="en-US" b="1" dirty="0">
+              <a:solidFill>
+                <a:schemeClr val="tx1"/>
+              </a:solidFill>
+            </a:endParaRPr>
+          </a:p>
+        </p:txBody>
+      </p:sp>
+      <p:sp>
+        <p:nvSpPr>
+          <p:cNvPr id="51" name="Rectangle: Rounded Corners 50">
+            <a:extLst>
+              <a:ext uri="{FF2B5EF4-FFF2-40B4-BE49-F238E27FC236}">
+                <a16:creationId xmlns:a16="http://schemas.microsoft.com/office/drawing/2014/main" id="{D2ACF014-9FBD-4451-B9FF-FA3B75B0E42D}"/>
+              </a:ext>
+            </a:extLst>
+          </p:cNvPr>
+          <p:cNvSpPr/>
+          <p:nvPr/>
+        </p:nvSpPr>
+        <p:spPr>
+          <a:xfrm>
+            <a:off x="5872963" y="4469944"/>
+            <a:ext cx="2468880" cy="457001"/>
+          </a:xfrm>
+          <a:prstGeom prst="roundRect">
+            <a:avLst/>
+          </a:prstGeom>
+          <a:solidFill>
+            <a:schemeClr val="accent1">
+              <a:lumMod val="40000"/>
+              <a:lumOff val="60000"/>
+            </a:schemeClr>
+          </a:solidFill>
+          <a:ln w="38100">
+            <a:solidFill>
+              <a:schemeClr val="accent1">
+                <a:lumMod val="75000"/>
+              </a:schemeClr>
+            </a:solidFill>
+          </a:ln>
+        </p:spPr>
+        <p:style>
+          <a:lnRef idx="2">
+            <a:schemeClr val="accent1">
+              <a:shade val="50000"/>
+            </a:schemeClr>
+          </a:lnRef>
+          <a:fillRef idx="1">
+            <a:schemeClr val="accent1"/>
+          </a:fillRef>
+          <a:effectRef idx="0">
+            <a:schemeClr val="accent1"/>
+          </a:effectRef>
+          <a:fontRef idx="minor">
+            <a:schemeClr val="lt1"/>
+          </a:fontRef>
+        </p:style>
+        <p:txBody>
+          <a:bodyPr rtlCol="0" anchor="ctr"/>
+          <a:lstStyle/>
+          <a:p>
+            <a:pPr algn="ctr"/>
+            <a:r>
+              <a:rPr lang="en-US" sz="1600" dirty="0" err="1">
+                <a:solidFill>
+                  <a:schemeClr val="tx1"/>
+                </a:solidFill>
+              </a:rPr>
+              <a:t>study:</a:t>
+            </a:r>
+            <a:r>
+              <a:rPr lang="en-US" b="1" dirty="0" err="1">
+                <a:solidFill>
+                  <a:schemeClr val="tx1"/>
+                </a:solidFill>
+              </a:rPr>
+              <a:t>ReferenceEnd</a:t>
+            </a:r>
+            <a:endParaRPr lang="en-US" b="1" dirty="0">
+              <a:solidFill>
+                <a:schemeClr val="tx1"/>
+              </a:solidFill>
+            </a:endParaRPr>
+          </a:p>
+        </p:txBody>
+      </p:sp>
+      <p:cxnSp>
+        <p:nvCxnSpPr>
+          <p:cNvPr id="52" name="Straight Arrow Connector 51">
+            <a:extLst>
+              <a:ext uri="{FF2B5EF4-FFF2-40B4-BE49-F238E27FC236}">
+                <a16:creationId xmlns:a16="http://schemas.microsoft.com/office/drawing/2014/main" id="{A1004DBD-4B82-4578-94CB-FCC9FAAE6D9A}"/>
+              </a:ext>
+            </a:extLst>
+          </p:cNvPr>
+          <p:cNvCxnSpPr>
+            <a:cxnSpLocks/>
+            <a:stCxn id="47" idx="3"/>
+            <a:endCxn id="50" idx="1"/>
+          </p:cNvCxnSpPr>
+          <p:nvPr/>
+        </p:nvCxnSpPr>
+        <p:spPr>
+          <a:xfrm flipV="1">
+            <a:off x="6614159" y="3058621"/>
+            <a:ext cx="1197313" cy="451104"/>
+          </a:xfrm>
+          <a:prstGeom prst="straightConnector1">
+            <a:avLst/>
+          </a:prstGeom>
+          <a:ln w="50800">
+            <a:solidFill>
+              <a:schemeClr val="bg1">
+                <a:lumMod val="50000"/>
+              </a:schemeClr>
+            </a:solidFill>
+            <a:tailEnd type="triangle"/>
+          </a:ln>
+        </p:spPr>
+        <p:style>
+          <a:lnRef idx="1">
+            <a:schemeClr val="accent1"/>
+          </a:lnRef>
+          <a:fillRef idx="0">
+            <a:schemeClr val="accent1"/>
+          </a:fillRef>
+          <a:effectRef idx="0">
+            <a:schemeClr val="accent1"/>
+          </a:effectRef>
+          <a:fontRef idx="minor">
+            <a:schemeClr val="tx1"/>
+          </a:fontRef>
+        </p:style>
+      </p:cxnSp>
+      <p:cxnSp>
+        <p:nvCxnSpPr>
+          <p:cNvPr id="55" name="Straight Arrow Connector 54">
+            <a:extLst>
+              <a:ext uri="{FF2B5EF4-FFF2-40B4-BE49-F238E27FC236}">
+                <a16:creationId xmlns:a16="http://schemas.microsoft.com/office/drawing/2014/main" id="{72612BB5-E67E-41BB-A2EF-D5CEF9CED4EF}"/>
+              </a:ext>
+            </a:extLst>
+          </p:cNvPr>
+          <p:cNvCxnSpPr>
+            <a:cxnSpLocks/>
+            <a:stCxn id="48" idx="3"/>
+            <a:endCxn id="51" idx="1"/>
+          </p:cNvCxnSpPr>
+          <p:nvPr/>
+        </p:nvCxnSpPr>
+        <p:spPr>
+          <a:xfrm flipV="1">
+            <a:off x="4044696" y="4698445"/>
+            <a:ext cx="1828267" cy="454252"/>
+          </a:xfrm>
+          <a:prstGeom prst="straightConnector1">
+            <a:avLst/>
+          </a:prstGeom>
+          <a:ln w="50800">
+            <a:solidFill>
+              <a:schemeClr val="bg1">
+                <a:lumMod val="50000"/>
+              </a:schemeClr>
+            </a:solidFill>
+            <a:tailEnd type="triangle"/>
+          </a:ln>
+        </p:spPr>
+        <p:style>
+          <a:lnRef idx="1">
+            <a:schemeClr val="accent1"/>
+          </a:lnRef>
+          <a:fillRef idx="0">
+            <a:schemeClr val="accent1"/>
+          </a:fillRef>
+          <a:effectRef idx="0">
+            <a:schemeClr val="accent1"/>
+          </a:effectRef>
+          <a:fontRef idx="minor">
+            <a:schemeClr val="tx1"/>
+          </a:fontRef>
+        </p:style>
+      </p:cxnSp>
+      <p:cxnSp>
+        <p:nvCxnSpPr>
+          <p:cNvPr id="59" name="Straight Arrow Connector 58">
+            <a:extLst>
+              <a:ext uri="{FF2B5EF4-FFF2-40B4-BE49-F238E27FC236}">
+                <a16:creationId xmlns:a16="http://schemas.microsoft.com/office/drawing/2014/main" id="{CC9BF0AA-2E99-4EF2-9F6E-111BE8ACD9AA}"/>
+              </a:ext>
+            </a:extLst>
+          </p:cNvPr>
+          <p:cNvCxnSpPr>
+            <a:cxnSpLocks/>
+            <a:stCxn id="47" idx="3"/>
+            <a:endCxn id="63" idx="1"/>
+          </p:cNvCxnSpPr>
+          <p:nvPr/>
+        </p:nvCxnSpPr>
+        <p:spPr>
+          <a:xfrm>
+            <a:off x="6614159" y="3509725"/>
+            <a:ext cx="2136097" cy="911055"/>
+          </a:xfrm>
+          <a:prstGeom prst="straightConnector1">
+            <a:avLst/>
+          </a:prstGeom>
+          <a:ln w="50800">
+            <a:solidFill>
+              <a:schemeClr val="bg1">
+                <a:lumMod val="50000"/>
+              </a:schemeClr>
+            </a:solidFill>
+            <a:tailEnd type="triangle"/>
+          </a:ln>
+        </p:spPr>
+        <p:style>
+          <a:lnRef idx="1">
+            <a:schemeClr val="accent1"/>
+          </a:lnRef>
+          <a:fillRef idx="0">
+            <a:schemeClr val="accent1"/>
+          </a:fillRef>
+          <a:effectRef idx="0">
+            <a:schemeClr val="accent1"/>
+          </a:effectRef>
+          <a:fontRef idx="minor">
+            <a:schemeClr val="tx1"/>
+          </a:fontRef>
+        </p:style>
+      </p:cxnSp>
+      <p:sp>
+        <p:nvSpPr>
+          <p:cNvPr id="63" name="Rectangle: Rounded Corners 62">
+            <a:extLst>
+              <a:ext uri="{FF2B5EF4-FFF2-40B4-BE49-F238E27FC236}">
+                <a16:creationId xmlns:a16="http://schemas.microsoft.com/office/drawing/2014/main" id="{B1630B21-91BA-4E9C-B731-9E61ED2AFA72}"/>
+              </a:ext>
+            </a:extLst>
+          </p:cNvPr>
+          <p:cNvSpPr/>
+          <p:nvPr/>
+        </p:nvSpPr>
+        <p:spPr>
+          <a:xfrm>
+            <a:off x="8750256" y="4192279"/>
+            <a:ext cx="2783375" cy="457001"/>
+          </a:xfrm>
+          <a:prstGeom prst="roundRect">
+            <a:avLst/>
+          </a:prstGeom>
+          <a:solidFill>
+            <a:schemeClr val="bg1"/>
+          </a:solidFill>
+          <a:ln>
+            <a:solidFill>
+              <a:schemeClr val="tx1"/>
+            </a:solidFill>
+          </a:ln>
+        </p:spPr>
+        <p:style>
+          <a:lnRef idx="2">
+            <a:schemeClr val="accent1">
+              <a:shade val="50000"/>
+            </a:schemeClr>
+          </a:lnRef>
+          <a:fillRef idx="1">
+            <a:schemeClr val="accent1"/>
+          </a:fillRef>
+          <a:effectRef idx="0">
+            <a:schemeClr val="accent1"/>
+          </a:effectRef>
+          <a:fontRef idx="minor">
+            <a:schemeClr val="lt1"/>
+          </a:fontRef>
+        </p:style>
+        <p:txBody>
+          <a:bodyPr rtlCol="0" anchor="ctr"/>
+          <a:lstStyle/>
+          <a:p>
+            <a:pPr algn="ctr"/>
+            <a:r>
+              <a:rPr lang="en-US" b="1" dirty="0">
+                <a:solidFill>
+                  <a:schemeClr val="tx1"/>
+                </a:solidFill>
+              </a:rPr>
+              <a:t>“2016-12-07”</a:t>
+            </a:r>
+            <a:r>
+              <a:rPr lang="en-US" b="1" dirty="0">
+                <a:solidFill>
+                  <a:schemeClr val="accent2">
+                    <a:lumMod val="75000"/>
+                  </a:schemeClr>
+                </a:solidFill>
+              </a:rPr>
+              <a:t>^^</a:t>
+            </a:r>
+            <a:r>
+              <a:rPr lang="en-US" b="1" dirty="0" err="1">
+                <a:solidFill>
+                  <a:schemeClr val="accent2">
+                    <a:lumMod val="75000"/>
+                  </a:schemeClr>
+                </a:solidFill>
+              </a:rPr>
+              <a:t>xsd:date</a:t>
+            </a:r>
+            <a:endParaRPr lang="en-US" b="1" dirty="0">
+              <a:solidFill>
+                <a:schemeClr val="accent2">
+                  <a:lumMod val="75000"/>
+                </a:schemeClr>
+              </a:solidFill>
+            </a:endParaRPr>
+          </a:p>
+        </p:txBody>
+      </p:sp>
+      <p:sp>
+        <p:nvSpPr>
+          <p:cNvPr id="64" name="Rectangle: Rounded Corners 63">
+            <a:extLst>
+              <a:ext uri="{FF2B5EF4-FFF2-40B4-BE49-F238E27FC236}">
+                <a16:creationId xmlns:a16="http://schemas.microsoft.com/office/drawing/2014/main" id="{FF35D29D-668C-4B62-879F-808B1E68966A}"/>
+              </a:ext>
+            </a:extLst>
+          </p:cNvPr>
+          <p:cNvSpPr/>
+          <p:nvPr/>
+        </p:nvSpPr>
+        <p:spPr>
+          <a:xfrm>
+            <a:off x="7281120" y="5640178"/>
+            <a:ext cx="2783375" cy="457001"/>
+          </a:xfrm>
+          <a:prstGeom prst="roundRect">
+            <a:avLst/>
+          </a:prstGeom>
+          <a:solidFill>
+            <a:schemeClr val="bg1"/>
+          </a:solidFill>
+          <a:ln>
+            <a:solidFill>
+              <a:schemeClr val="tx1"/>
+            </a:solidFill>
+          </a:ln>
+        </p:spPr>
+        <p:style>
+          <a:lnRef idx="2">
+            <a:schemeClr val="accent1">
+              <a:shade val="50000"/>
+            </a:schemeClr>
+          </a:lnRef>
+          <a:fillRef idx="1">
+            <a:schemeClr val="accent1"/>
+          </a:fillRef>
+          <a:effectRef idx="0">
+            <a:schemeClr val="accent1"/>
+          </a:effectRef>
+          <a:fontRef idx="minor">
+            <a:schemeClr val="lt1"/>
+          </a:fontRef>
+        </p:style>
+        <p:txBody>
+          <a:bodyPr rtlCol="0" anchor="ctr"/>
+          <a:lstStyle/>
+          <a:p>
+            <a:pPr algn="ctr"/>
+            <a:r>
+              <a:rPr lang="en-US" b="1" dirty="0">
+                <a:solidFill>
+                  <a:schemeClr val="tx1"/>
+                </a:solidFill>
+              </a:rPr>
+              <a:t>“2016-12-06”</a:t>
+            </a:r>
+            <a:r>
+              <a:rPr lang="en-US" b="1" dirty="0">
+                <a:solidFill>
+                  <a:schemeClr val="accent2">
+                    <a:lumMod val="75000"/>
+                  </a:schemeClr>
+                </a:solidFill>
+              </a:rPr>
+              <a:t>^^</a:t>
+            </a:r>
+            <a:r>
+              <a:rPr lang="en-US" b="1" dirty="0" err="1">
+                <a:solidFill>
+                  <a:schemeClr val="accent2">
+                    <a:lumMod val="75000"/>
+                  </a:schemeClr>
+                </a:solidFill>
+              </a:rPr>
+              <a:t>xsd:date</a:t>
+            </a:r>
+            <a:endParaRPr lang="en-US" b="1" dirty="0">
+              <a:solidFill>
+                <a:schemeClr val="accent2">
+                  <a:lumMod val="75000"/>
+                </a:schemeClr>
+              </a:solidFill>
+            </a:endParaRPr>
+          </a:p>
+        </p:txBody>
+      </p:sp>
+      <p:cxnSp>
+        <p:nvCxnSpPr>
+          <p:cNvPr id="87" name="Straight Arrow Connector 86">
+            <a:extLst>
+              <a:ext uri="{FF2B5EF4-FFF2-40B4-BE49-F238E27FC236}">
+                <a16:creationId xmlns:a16="http://schemas.microsoft.com/office/drawing/2014/main" id="{747653AA-D7FE-4197-9659-330578AD3397}"/>
+              </a:ext>
+            </a:extLst>
+          </p:cNvPr>
+          <p:cNvCxnSpPr>
+            <a:cxnSpLocks/>
+            <a:stCxn id="48" idx="3"/>
+            <a:endCxn id="64" idx="1"/>
+          </p:cNvCxnSpPr>
+          <p:nvPr/>
+        </p:nvCxnSpPr>
+        <p:spPr>
+          <a:xfrm>
+            <a:off x="4044696" y="5152697"/>
+            <a:ext cx="3236424" cy="715982"/>
+          </a:xfrm>
+          <a:prstGeom prst="straightConnector1">
+            <a:avLst/>
+          </a:prstGeom>
+          <a:ln w="50800">
+            <a:solidFill>
+              <a:schemeClr val="bg1">
+                <a:lumMod val="50000"/>
+              </a:schemeClr>
+            </a:solidFill>
+            <a:tailEnd type="triangle"/>
+          </a:ln>
+        </p:spPr>
+        <p:style>
+          <a:lnRef idx="1">
+            <a:schemeClr val="accent1"/>
+          </a:lnRef>
+          <a:fillRef idx="0">
+            <a:schemeClr val="accent1"/>
+          </a:fillRef>
+          <a:effectRef idx="0">
+            <a:schemeClr val="accent1"/>
+          </a:effectRef>
+          <a:fontRef idx="minor">
+            <a:schemeClr val="tx1"/>
+          </a:fontRef>
+        </p:style>
+      </p:cxnSp>
+      <p:sp>
+        <p:nvSpPr>
+          <p:cNvPr id="15" name="Rectangle: Rounded Corners 14">
+            <a:extLst>
+              <a:ext uri="{FF2B5EF4-FFF2-40B4-BE49-F238E27FC236}">
+                <a16:creationId xmlns:a16="http://schemas.microsoft.com/office/drawing/2014/main" id="{F2D1CDB2-6DA6-45BF-B57E-8A1B3116DAB8}"/>
+              </a:ext>
+            </a:extLst>
+          </p:cNvPr>
+          <p:cNvSpPr/>
+          <p:nvPr/>
+        </p:nvSpPr>
+        <p:spPr>
+          <a:xfrm>
+            <a:off x="255480" y="1972158"/>
+            <a:ext cx="4087920" cy="457001"/>
+          </a:xfrm>
+          <a:prstGeom prst="roundRect">
+            <a:avLst/>
+          </a:prstGeom>
+          <a:solidFill>
+            <a:schemeClr val="accent6">
+              <a:lumMod val="40000"/>
+              <a:lumOff val="60000"/>
+            </a:schemeClr>
+          </a:solidFill>
+          <a:ln>
+            <a:solidFill>
+              <a:schemeClr val="tx1"/>
+            </a:solidFill>
+          </a:ln>
+        </p:spPr>
+        <p:style>
+          <a:lnRef idx="2">
+            <a:schemeClr val="accent1">
+              <a:shade val="50000"/>
+            </a:schemeClr>
+          </a:lnRef>
+          <a:fillRef idx="1">
+            <a:schemeClr val="accent1"/>
+          </a:fillRef>
+          <a:effectRef idx="0">
+            <a:schemeClr val="accent1"/>
+          </a:effectRef>
+          <a:fontRef idx="minor">
+            <a:schemeClr val="lt1"/>
+          </a:fontRef>
+        </p:style>
+        <p:txBody>
+          <a:bodyPr rtlCol="0" anchor="ctr"/>
+          <a:lstStyle/>
+          <a:p>
+            <a:pPr algn="ctr"/>
+            <a:r>
+              <a:rPr lang="en-US" sz="1600" dirty="0">
+                <a:solidFill>
+                  <a:schemeClr val="tx1"/>
+                </a:solidFill>
+              </a:rPr>
+              <a:t>cj16050</a:t>
+            </a:r>
+            <a:r>
+              <a:rPr lang="en-US" b="1" dirty="0">
+                <a:solidFill>
+                  <a:schemeClr val="tx1"/>
+                </a:solidFill>
+              </a:rPr>
+              <a:t>:Interval_2016-12-07_2016_12-06</a:t>
+            </a:r>
+          </a:p>
+        </p:txBody>
+      </p:sp>
+      <p:sp>
+        <p:nvSpPr>
+          <p:cNvPr id="101" name="TextBox 100">
+            <a:extLst>
+              <a:ext uri="{FF2B5EF4-FFF2-40B4-BE49-F238E27FC236}">
+                <a16:creationId xmlns:a16="http://schemas.microsoft.com/office/drawing/2014/main" id="{C09F5CFC-6F12-41B9-B15E-3BD12189F043}"/>
+              </a:ext>
+            </a:extLst>
+          </p:cNvPr>
+          <p:cNvSpPr txBox="1"/>
+          <p:nvPr/>
+        </p:nvSpPr>
+        <p:spPr>
+          <a:xfrm flipH="1">
+            <a:off x="4704311" y="621792"/>
+            <a:ext cx="329184" cy="369332"/>
+          </a:xfrm>
+          <a:prstGeom prst="rect">
+            <a:avLst/>
+          </a:prstGeom>
+          <a:solidFill>
+            <a:schemeClr val="bg1"/>
+          </a:solidFill>
+        </p:spPr>
+        <p:txBody>
+          <a:bodyPr wrap="square" rtlCol="0">
+            <a:spAutoFit/>
+          </a:bodyPr>
+          <a:lstStyle>
+            <a:defPPr>
+              <a:defRPr lang="en-US"/>
+            </a:defPPr>
+            <a:lvl1pPr>
+              <a:defRPr b="1">
+                <a:solidFill>
+                  <a:schemeClr val="accent2">
+                    <a:lumMod val="75000"/>
+                  </a:schemeClr>
+                </a:solidFill>
+                <a:latin typeface="Courier New" panose="02070309020205020404" pitchFamily="49" charset="0"/>
+                <a:cs typeface="Courier New" panose="02070309020205020404" pitchFamily="49" charset="0"/>
+              </a:defRPr>
+            </a:lvl1pPr>
+          </a:lstStyle>
+          <a:p>
+            <a:r>
+              <a:rPr lang="en-US" dirty="0"/>
+              <a:t>a</a:t>
+            </a:r>
+          </a:p>
+        </p:txBody>
+      </p:sp>
+      <p:sp>
+        <p:nvSpPr>
+          <p:cNvPr id="102" name="TextBox 101">
+            <a:extLst>
+              <a:ext uri="{FF2B5EF4-FFF2-40B4-BE49-F238E27FC236}">
+                <a16:creationId xmlns:a16="http://schemas.microsoft.com/office/drawing/2014/main" id="{C131BC81-344F-4327-B4A7-CB6A075FB769}"/>
+              </a:ext>
+            </a:extLst>
+          </p:cNvPr>
+          <p:cNvSpPr txBox="1"/>
+          <p:nvPr/>
+        </p:nvSpPr>
+        <p:spPr>
+          <a:xfrm flipH="1">
+            <a:off x="4658591" y="2017776"/>
+            <a:ext cx="352321" cy="369332"/>
+          </a:xfrm>
+          <a:prstGeom prst="rect">
+            <a:avLst/>
+          </a:prstGeom>
+          <a:solidFill>
+            <a:schemeClr val="bg1"/>
+          </a:solidFill>
+        </p:spPr>
+        <p:txBody>
+          <a:bodyPr wrap="square" rtlCol="0">
+            <a:spAutoFit/>
+          </a:bodyPr>
+          <a:lstStyle>
+            <a:defPPr>
+              <a:defRPr lang="en-US"/>
+            </a:defPPr>
+            <a:lvl1pPr>
+              <a:defRPr b="1">
+                <a:solidFill>
+                  <a:schemeClr val="accent2">
+                    <a:lumMod val="75000"/>
+                  </a:schemeClr>
+                </a:solidFill>
+                <a:latin typeface="Courier New" panose="02070309020205020404" pitchFamily="49" charset="0"/>
+                <a:cs typeface="Courier New" panose="02070309020205020404" pitchFamily="49" charset="0"/>
+              </a:defRPr>
+            </a:lvl1pPr>
+          </a:lstStyle>
+          <a:p>
+            <a:r>
+              <a:rPr lang="en-US" dirty="0"/>
+              <a:t>a</a:t>
+            </a:r>
+          </a:p>
+        </p:txBody>
+      </p:sp>
+      <p:sp>
+        <p:nvSpPr>
+          <p:cNvPr id="103" name="TextBox 102">
+            <a:extLst>
+              <a:ext uri="{FF2B5EF4-FFF2-40B4-BE49-F238E27FC236}">
+                <a16:creationId xmlns:a16="http://schemas.microsoft.com/office/drawing/2014/main" id="{1575B748-BC68-4CFD-8CCA-7EB9518B465B}"/>
+              </a:ext>
+            </a:extLst>
+          </p:cNvPr>
+          <p:cNvSpPr txBox="1"/>
+          <p:nvPr/>
+        </p:nvSpPr>
+        <p:spPr>
+          <a:xfrm flipH="1">
+            <a:off x="6897091" y="3108960"/>
+            <a:ext cx="320573" cy="369332"/>
+          </a:xfrm>
+          <a:prstGeom prst="rect">
+            <a:avLst/>
+          </a:prstGeom>
+          <a:solidFill>
+            <a:schemeClr val="bg1"/>
+          </a:solidFill>
+        </p:spPr>
+        <p:txBody>
+          <a:bodyPr wrap="square" rtlCol="0">
+            <a:spAutoFit/>
+          </a:bodyPr>
+          <a:lstStyle>
+            <a:defPPr>
+              <a:defRPr lang="en-US"/>
+            </a:defPPr>
+            <a:lvl1pPr>
+              <a:defRPr b="1">
+                <a:solidFill>
+                  <a:schemeClr val="accent2">
+                    <a:lumMod val="75000"/>
+                  </a:schemeClr>
+                </a:solidFill>
+                <a:latin typeface="Courier New" panose="02070309020205020404" pitchFamily="49" charset="0"/>
+                <a:cs typeface="Courier New" panose="02070309020205020404" pitchFamily="49" charset="0"/>
+              </a:defRPr>
+            </a:lvl1pPr>
+          </a:lstStyle>
+          <a:p>
+            <a:r>
+              <a:rPr lang="en-US" dirty="0"/>
+              <a:t>a</a:t>
+            </a:r>
+          </a:p>
+        </p:txBody>
+      </p:sp>
+      <p:sp>
+        <p:nvSpPr>
+          <p:cNvPr id="104" name="TextBox 103">
+            <a:extLst>
+              <a:ext uri="{FF2B5EF4-FFF2-40B4-BE49-F238E27FC236}">
+                <a16:creationId xmlns:a16="http://schemas.microsoft.com/office/drawing/2014/main" id="{03B9BB02-0A20-4035-A314-6500C1A3EFEA}"/>
+              </a:ext>
+            </a:extLst>
+          </p:cNvPr>
+          <p:cNvSpPr txBox="1"/>
+          <p:nvPr/>
+        </p:nvSpPr>
+        <p:spPr>
+          <a:xfrm flipH="1">
+            <a:off x="4658591" y="4736592"/>
+            <a:ext cx="327937" cy="369332"/>
+          </a:xfrm>
+          <a:prstGeom prst="rect">
+            <a:avLst/>
+          </a:prstGeom>
+          <a:solidFill>
+            <a:schemeClr val="bg1"/>
+          </a:solidFill>
+        </p:spPr>
+        <p:txBody>
+          <a:bodyPr wrap="square" rtlCol="0">
+            <a:spAutoFit/>
+          </a:bodyPr>
+          <a:lstStyle>
+            <a:defPPr>
+              <a:defRPr lang="en-US"/>
+            </a:defPPr>
+            <a:lvl1pPr>
+              <a:defRPr b="1">
+                <a:solidFill>
+                  <a:schemeClr val="accent2">
+                    <a:lumMod val="75000"/>
+                  </a:schemeClr>
+                </a:solidFill>
+                <a:latin typeface="Courier New" panose="02070309020205020404" pitchFamily="49" charset="0"/>
+                <a:cs typeface="Courier New" panose="02070309020205020404" pitchFamily="49" charset="0"/>
+              </a:defRPr>
+            </a:lvl1pPr>
+          </a:lstStyle>
+          <a:p>
+            <a:r>
+              <a:rPr lang="en-US" dirty="0"/>
+              <a:t>a</a:t>
+            </a:r>
+          </a:p>
+        </p:txBody>
+      </p:sp>
+      <p:sp>
+        <p:nvSpPr>
+          <p:cNvPr id="107" name="Rectangle 106">
+            <a:extLst>
+              <a:ext uri="{FF2B5EF4-FFF2-40B4-BE49-F238E27FC236}">
+                <a16:creationId xmlns:a16="http://schemas.microsoft.com/office/drawing/2014/main" id="{CBA756AA-71BD-413D-93C8-BAE6C900E028}"/>
+              </a:ext>
+            </a:extLst>
+          </p:cNvPr>
+          <p:cNvSpPr/>
+          <p:nvPr/>
+        </p:nvSpPr>
+        <p:spPr>
+          <a:xfrm>
+            <a:off x="4766638" y="5390126"/>
+            <a:ext cx="2114681" cy="369332"/>
+          </a:xfrm>
+          <a:prstGeom prst="rect">
+            <a:avLst/>
+          </a:prstGeom>
+          <a:solidFill>
+            <a:schemeClr val="bg1"/>
+          </a:solidFill>
+        </p:spPr>
+        <p:txBody>
+          <a:bodyPr wrap="square" rtlCol="0">
+            <a:spAutoFit/>
+          </a:bodyPr>
+          <a:lstStyle/>
+          <a:p>
+            <a:r>
+              <a:rPr lang="en-US" b="1" dirty="0" err="1">
+                <a:solidFill>
+                  <a:schemeClr val="accent2">
+                    <a:lumMod val="75000"/>
+                  </a:schemeClr>
+                </a:solidFill>
+                <a:latin typeface="Courier New" panose="02070309020205020404" pitchFamily="49" charset="0"/>
+                <a:cs typeface="Courier New" panose="02070309020205020404" pitchFamily="49" charset="0"/>
+              </a:rPr>
+              <a:t>time:inXSDDate</a:t>
+            </a:r>
+            <a:endParaRPr lang="en-US" b="1" dirty="0">
+              <a:solidFill>
+                <a:schemeClr val="accent2">
+                  <a:lumMod val="75000"/>
+                </a:schemeClr>
+              </a:solidFill>
+              <a:latin typeface="Courier New" panose="02070309020205020404" pitchFamily="49" charset="0"/>
+              <a:cs typeface="Courier New" panose="02070309020205020404" pitchFamily="49" charset="0"/>
+            </a:endParaRPr>
+          </a:p>
+        </p:txBody>
+      </p:sp>
+      <p:sp>
+        <p:nvSpPr>
+          <p:cNvPr id="109" name="Rectangle 108">
+            <a:extLst>
+              <a:ext uri="{FF2B5EF4-FFF2-40B4-BE49-F238E27FC236}">
+                <a16:creationId xmlns:a16="http://schemas.microsoft.com/office/drawing/2014/main" id="{7753650D-E3D5-4A84-9104-0960BCEF32EC}"/>
+              </a:ext>
+            </a:extLst>
+          </p:cNvPr>
+          <p:cNvSpPr/>
+          <p:nvPr/>
+        </p:nvSpPr>
+        <p:spPr>
+          <a:xfrm>
+            <a:off x="6842543" y="3762494"/>
+            <a:ext cx="2114681" cy="369332"/>
+          </a:xfrm>
+          <a:prstGeom prst="rect">
+            <a:avLst/>
+          </a:prstGeom>
+          <a:solidFill>
+            <a:schemeClr val="bg1"/>
+          </a:solidFill>
+        </p:spPr>
+        <p:txBody>
+          <a:bodyPr wrap="square" rtlCol="0">
+            <a:spAutoFit/>
+          </a:bodyPr>
+          <a:lstStyle/>
+          <a:p>
+            <a:r>
+              <a:rPr lang="en-US" b="1" dirty="0" err="1">
+                <a:solidFill>
+                  <a:schemeClr val="accent2">
+                    <a:lumMod val="75000"/>
+                  </a:schemeClr>
+                </a:solidFill>
+                <a:latin typeface="Courier New" panose="02070309020205020404" pitchFamily="49" charset="0"/>
+                <a:cs typeface="Courier New" panose="02070309020205020404" pitchFamily="49" charset="0"/>
+              </a:rPr>
+              <a:t>time:inXSDDate</a:t>
+            </a:r>
+            <a:endParaRPr lang="en-US" b="1" dirty="0">
+              <a:solidFill>
+                <a:schemeClr val="accent2">
+                  <a:lumMod val="75000"/>
+                </a:schemeClr>
+              </a:solidFill>
+              <a:latin typeface="Courier New" panose="02070309020205020404" pitchFamily="49" charset="0"/>
+              <a:cs typeface="Courier New" panose="02070309020205020404" pitchFamily="49" charset="0"/>
+            </a:endParaRPr>
+          </a:p>
+        </p:txBody>
+      </p:sp>
+      <p:sp>
+        <p:nvSpPr>
+          <p:cNvPr id="44" name="TextBox 43">
+            <a:extLst>
+              <a:ext uri="{FF2B5EF4-FFF2-40B4-BE49-F238E27FC236}">
+                <a16:creationId xmlns:a16="http://schemas.microsoft.com/office/drawing/2014/main" id="{7012A0B4-25D6-4236-9791-8A8C47DACE25}"/>
+              </a:ext>
+            </a:extLst>
+          </p:cNvPr>
+          <p:cNvSpPr txBox="1"/>
+          <p:nvPr/>
+        </p:nvSpPr>
+        <p:spPr>
+          <a:xfrm>
+            <a:off x="996503" y="3898743"/>
+            <a:ext cx="2605874" cy="369332"/>
+          </a:xfrm>
+          <a:prstGeom prst="rect">
+            <a:avLst/>
+          </a:prstGeom>
+          <a:solidFill>
+            <a:schemeClr val="bg1"/>
+          </a:solidFill>
+        </p:spPr>
+        <p:txBody>
+          <a:bodyPr wrap="square" rtlCol="0">
+            <a:spAutoFit/>
+          </a:bodyPr>
+          <a:lstStyle>
+            <a:defPPr>
+              <a:defRPr lang="en-US"/>
+            </a:defPPr>
+            <a:lvl1pPr>
+              <a:defRPr b="1">
+                <a:solidFill>
+                  <a:schemeClr val="accent2">
+                    <a:lumMod val="75000"/>
+                  </a:schemeClr>
+                </a:solidFill>
+                <a:latin typeface="Courier New" panose="02070309020205020404" pitchFamily="49" charset="0"/>
+                <a:cs typeface="Courier New" panose="02070309020205020404" pitchFamily="49" charset="0"/>
+              </a:defRPr>
+            </a:lvl1pPr>
+          </a:lstStyle>
+          <a:p>
+            <a:r>
+              <a:rPr lang="en-US" sz="1600" b="0" dirty="0" err="1"/>
+              <a:t>time:</a:t>
+            </a:r>
+            <a:r>
+              <a:rPr lang="en-US" dirty="0" err="1"/>
+              <a:t>hasEnd</a:t>
+            </a:r>
+            <a:endParaRPr lang="en-US" dirty="0"/>
+          </a:p>
+        </p:txBody>
+      </p:sp>
+    </p:spTree>
+    <p:extLst>
+      <p:ext uri="{BB962C8B-B14F-4D97-AF65-F5344CB8AC3E}">
+        <p14:creationId xmlns:p14="http://schemas.microsoft.com/office/powerpoint/2010/main" val="1343021710"/>
+      </p:ext>
+    </p:extLst>
+  </p:cSld>
+  <p:clrMapOvr>
+    <a:masterClrMapping/>
+  </p:clrMapOvr>
+</p:sld>
+</file>
+
+<file path=ppt/slides/slide5.xml><?xml version="1.0" encoding="utf-8"?>
+<p:sld xmlns:a="http://schemas.openxmlformats.org/drawingml/2006/main" xmlns:r="http://schemas.openxmlformats.org/officeDocument/2006/relationships" xmlns:p="http://schemas.openxmlformats.org/presentationml/2006/main">
+  <p:cSld>
+    <p:spTree>
+      <p:nvGrpSpPr>
+        <p:cNvPr id="1" name=""/>
+        <p:cNvGrpSpPr/>
+        <p:nvPr/>
+      </p:nvGrpSpPr>
+      <p:grpSpPr>
+        <a:xfrm>
+          <a:off x="0" y="0"/>
+          <a:ext cx="0" cy="0"/>
+          <a:chOff x="0" y="0"/>
+          <a:chExt cx="0" cy="0"/>
+        </a:xfrm>
+      </p:grpSpPr>
+      <p:sp>
+        <p:nvSpPr>
+          <p:cNvPr id="4" name="Rectangle: Rounded Corners 3"/>
+          <p:cNvSpPr/>
+          <p:nvPr/>
+        </p:nvSpPr>
+        <p:spPr>
+          <a:xfrm>
+            <a:off x="6359054" y="800152"/>
+            <a:ext cx="2468880" cy="449588"/>
+          </a:xfrm>
+          <a:prstGeom prst="roundRect">
+            <a:avLst/>
+          </a:prstGeom>
+          <a:solidFill>
+            <a:schemeClr val="accent6">
+              <a:lumMod val="40000"/>
+              <a:lumOff val="60000"/>
+            </a:schemeClr>
+          </a:solidFill>
+          <a:ln>
+            <a:solidFill>
+              <a:schemeClr val="tx1"/>
+            </a:solidFill>
+          </a:ln>
+        </p:spPr>
+        <p:style>
+          <a:lnRef idx="2">
+            <a:schemeClr val="accent1">
+              <a:shade val="50000"/>
+            </a:schemeClr>
+          </a:lnRef>
+          <a:fillRef idx="1">
+            <a:schemeClr val="accent1"/>
+          </a:fillRef>
+          <a:effectRef idx="0">
+            <a:schemeClr val="accent1"/>
+          </a:effectRef>
+          <a:fontRef idx="minor">
+            <a:schemeClr val="lt1"/>
+          </a:fontRef>
+        </p:style>
+        <p:txBody>
+          <a:bodyPr rtlCol="0" anchor="ctr"/>
+          <a:lstStyle/>
+          <a:p>
+            <a:pPr algn="ctr"/>
+            <a:r>
+              <a:rPr lang="en-US" b="1" dirty="0">
+                <a:solidFill>
+                  <a:schemeClr val="tx1"/>
+                </a:solidFill>
+              </a:rPr>
+              <a:t>Person_</a:t>
+            </a:r>
+            <a:r>
+              <a:rPr lang="en-US" b="1" dirty="0">
+                <a:solidFill>
+                  <a:schemeClr val="accent1">
+                    <a:lumMod val="75000"/>
+                  </a:schemeClr>
+                </a:solidFill>
+              </a:rPr>
+              <a:t>01-701-1015</a:t>
+            </a:r>
+          </a:p>
+        </p:txBody>
+      </p:sp>
+      <p:sp>
+        <p:nvSpPr>
+          <p:cNvPr id="5" name="Rectangle: Rounded Corners 4"/>
+          <p:cNvSpPr/>
+          <p:nvPr/>
+        </p:nvSpPr>
+        <p:spPr>
+          <a:xfrm>
+            <a:off x="7348177" y="2628952"/>
+            <a:ext cx="2468880" cy="457001"/>
+          </a:xfrm>
+          <a:prstGeom prst="roundRect">
+            <a:avLst/>
+          </a:prstGeom>
+          <a:solidFill>
+            <a:schemeClr val="accent1">
+              <a:lumMod val="40000"/>
+              <a:lumOff val="60000"/>
+            </a:schemeClr>
+          </a:solidFill>
+          <a:ln>
+            <a:solidFill>
+              <a:schemeClr val="tx1"/>
+            </a:solidFill>
+          </a:ln>
+        </p:spPr>
+        <p:style>
+          <a:lnRef idx="2">
+            <a:schemeClr val="accent1">
+              <a:shade val="50000"/>
+            </a:schemeClr>
+          </a:lnRef>
+          <a:fillRef idx="1">
+            <a:schemeClr val="accent1"/>
+          </a:fillRef>
+          <a:effectRef idx="0">
+            <a:schemeClr val="accent1"/>
+          </a:effectRef>
+          <a:fontRef idx="minor">
+            <a:schemeClr val="lt1"/>
+          </a:fontRef>
+        </p:style>
+        <p:txBody>
+          <a:bodyPr rtlCol="0" anchor="ctr"/>
+          <a:lstStyle/>
+          <a:p>
+            <a:pPr algn="ctr"/>
+            <a:r>
+              <a:rPr lang="en-US" b="1" dirty="0">
+                <a:solidFill>
+                  <a:schemeClr val="tx1"/>
+                </a:solidFill>
+              </a:rPr>
+              <a:t>Medical Condition</a:t>
+            </a:r>
+          </a:p>
+        </p:txBody>
+      </p:sp>
+      <p:sp>
+        <p:nvSpPr>
+          <p:cNvPr id="13" name="Rectangle: Rounded Corners 12"/>
+          <p:cNvSpPr/>
+          <p:nvPr/>
+        </p:nvSpPr>
+        <p:spPr>
+          <a:xfrm>
+            <a:off x="7158066" y="4705104"/>
+            <a:ext cx="2468880" cy="457001"/>
+          </a:xfrm>
+          <a:prstGeom prst="roundRect">
+            <a:avLst/>
+          </a:prstGeom>
+          <a:solidFill>
+            <a:srgbClr val="FFC000"/>
+          </a:solidFill>
+          <a:ln>
+            <a:solidFill>
+              <a:schemeClr val="tx1"/>
+            </a:solidFill>
+          </a:ln>
+        </p:spPr>
+        <p:style>
+          <a:lnRef idx="2">
+            <a:schemeClr val="accent1">
+              <a:shade val="50000"/>
+            </a:schemeClr>
+          </a:lnRef>
+          <a:fillRef idx="1">
+            <a:schemeClr val="accent1"/>
+          </a:fillRef>
+          <a:effectRef idx="0">
+            <a:schemeClr val="accent1"/>
+          </a:effectRef>
+          <a:fontRef idx="minor">
+            <a:schemeClr val="lt1"/>
+          </a:fontRef>
+        </p:style>
+        <p:txBody>
+          <a:bodyPr rtlCol="0" anchor="ctr"/>
+          <a:lstStyle/>
+          <a:p>
+            <a:pPr algn="ctr"/>
+            <a:r>
+              <a:rPr lang="en-US" b="1" dirty="0" err="1">
+                <a:solidFill>
+                  <a:schemeClr val="tx1"/>
+                </a:solidFill>
+              </a:rPr>
+              <a:t>AdverseEvent</a:t>
+            </a:r>
+            <a:endParaRPr lang="en-US" b="1" dirty="0">
+              <a:solidFill>
+                <a:schemeClr val="tx1"/>
+              </a:solidFill>
+            </a:endParaRPr>
+          </a:p>
+        </p:txBody>
+      </p:sp>
+      <p:cxnSp>
+        <p:nvCxnSpPr>
+          <p:cNvPr id="14" name="Straight Arrow Connector 13"/>
+          <p:cNvCxnSpPr>
+            <a:cxnSpLocks/>
+            <a:stCxn id="5" idx="2"/>
+            <a:endCxn id="13" idx="0"/>
+          </p:cNvCxnSpPr>
+          <p:nvPr/>
+        </p:nvCxnSpPr>
+        <p:spPr>
+          <a:xfrm flipH="1">
+            <a:off x="8392506" y="3085953"/>
+            <a:ext cx="190111" cy="1619151"/>
+          </a:xfrm>
+          <a:prstGeom prst="straightConnector1">
+            <a:avLst/>
+          </a:prstGeom>
+          <a:ln w="50800">
+            <a:solidFill>
+              <a:schemeClr val="bg1">
+                <a:lumMod val="50000"/>
+              </a:schemeClr>
+            </a:solidFill>
+            <a:tailEnd type="triangle"/>
+          </a:ln>
+        </p:spPr>
+        <p:style>
+          <a:lnRef idx="1">
+            <a:schemeClr val="accent1"/>
+          </a:lnRef>
+          <a:fillRef idx="0">
+            <a:schemeClr val="accent1"/>
+          </a:fillRef>
+          <a:effectRef idx="0">
+            <a:schemeClr val="accent1"/>
+          </a:effectRef>
+          <a:fontRef idx="minor">
+            <a:schemeClr val="tx1"/>
+          </a:fontRef>
+        </p:style>
+      </p:cxnSp>
+      <p:sp>
+        <p:nvSpPr>
+          <p:cNvPr id="20" name="TextBox 19"/>
+          <p:cNvSpPr txBox="1"/>
+          <p:nvPr/>
+        </p:nvSpPr>
+        <p:spPr>
+          <a:xfrm>
+            <a:off x="9644498" y="739025"/>
+            <a:ext cx="1967829" cy="369332"/>
+          </a:xfrm>
+          <a:prstGeom prst="rect">
+            <a:avLst/>
+          </a:prstGeom>
+          <a:solidFill>
+            <a:schemeClr val="bg1"/>
+          </a:solidFill>
+        </p:spPr>
+        <p:txBody>
+          <a:bodyPr wrap="square" rtlCol="0">
+            <a:spAutoFit/>
+          </a:bodyPr>
+          <a:lstStyle>
+            <a:defPPr>
+              <a:defRPr lang="en-US"/>
+            </a:defPPr>
+            <a:lvl1pPr>
+              <a:defRPr b="1">
+                <a:solidFill>
+                  <a:schemeClr val="accent2">
+                    <a:lumMod val="75000"/>
+                  </a:schemeClr>
+                </a:solidFill>
+                <a:latin typeface="Courier New" panose="02070309020205020404" pitchFamily="49" charset="0"/>
+                <a:cs typeface="Courier New" panose="02070309020205020404" pitchFamily="49" charset="0"/>
+              </a:defRPr>
+            </a:lvl1pPr>
+          </a:lstStyle>
+          <a:p>
+            <a:r>
+              <a:rPr lang="en-US" dirty="0" err="1"/>
+              <a:t>afflictedBy</a:t>
+            </a:r>
+            <a:endParaRPr lang="en-US" dirty="0"/>
+          </a:p>
+        </p:txBody>
+      </p:sp>
+      <p:sp>
+        <p:nvSpPr>
+          <p:cNvPr id="41" name="TextBox 40">
+            <a:extLst>
+              <a:ext uri="{FF2B5EF4-FFF2-40B4-BE49-F238E27FC236}">
+                <a16:creationId xmlns:a16="http://schemas.microsoft.com/office/drawing/2014/main" id="{CCC2A432-EE41-4F21-9AAE-EB569CE224D5}"/>
+              </a:ext>
+            </a:extLst>
+          </p:cNvPr>
+          <p:cNvSpPr txBox="1"/>
+          <p:nvPr/>
+        </p:nvSpPr>
+        <p:spPr>
+          <a:xfrm>
+            <a:off x="8696860" y="1917222"/>
+            <a:ext cx="1740300" cy="369332"/>
+          </a:xfrm>
+          <a:prstGeom prst="rect">
+            <a:avLst/>
+          </a:prstGeom>
+          <a:solidFill>
+            <a:schemeClr val="bg1"/>
+          </a:solidFill>
+        </p:spPr>
+        <p:txBody>
+          <a:bodyPr wrap="square" rtlCol="0">
+            <a:spAutoFit/>
+          </a:bodyPr>
+          <a:lstStyle/>
+          <a:p>
+            <a:r>
+              <a:rPr lang="en-US" b="1" dirty="0">
+                <a:solidFill>
+                  <a:schemeClr val="accent2">
+                    <a:lumMod val="40000"/>
+                    <a:lumOff val="60000"/>
+                  </a:schemeClr>
+                </a:solidFill>
+                <a:latin typeface="Courier New" panose="02070309020205020404" pitchFamily="49" charset="0"/>
+                <a:cs typeface="Courier New" panose="02070309020205020404" pitchFamily="49" charset="0"/>
+              </a:rPr>
+              <a:t>severity</a:t>
+            </a:r>
+          </a:p>
+        </p:txBody>
+      </p:sp>
+      <p:sp>
+        <p:nvSpPr>
+          <p:cNvPr id="7" name="TextBox 6"/>
+          <p:cNvSpPr txBox="1"/>
+          <p:nvPr/>
+        </p:nvSpPr>
+        <p:spPr>
+          <a:xfrm>
+            <a:off x="7665887" y="3569559"/>
+            <a:ext cx="1643348" cy="369332"/>
+          </a:xfrm>
+          <a:prstGeom prst="rect">
+            <a:avLst/>
+          </a:prstGeom>
+          <a:solidFill>
+            <a:schemeClr val="bg1"/>
+          </a:solidFill>
+        </p:spPr>
+        <p:txBody>
+          <a:bodyPr wrap="square" rtlCol="0">
+            <a:spAutoFit/>
+          </a:bodyPr>
+          <a:lstStyle>
+            <a:defPPr>
+              <a:defRPr lang="en-US"/>
+            </a:defPPr>
+            <a:lvl1pPr>
+              <a:defRPr b="1">
+                <a:solidFill>
+                  <a:schemeClr val="accent2">
+                    <a:lumMod val="75000"/>
+                  </a:schemeClr>
+                </a:solidFill>
+                <a:latin typeface="Courier New" panose="02070309020205020404" pitchFamily="49" charset="0"/>
+                <a:cs typeface="Courier New" panose="02070309020205020404" pitchFamily="49" charset="0"/>
+              </a:defRPr>
+            </a:lvl1pPr>
+          </a:lstStyle>
+          <a:p>
+            <a:r>
               <a:rPr lang="en-US" dirty="0" err="1"/>
               <a:t>subClassOf</a:t>
             </a:r>
@@ -4785,7 +8229,7 @@
     </p:spTree>
     <p:extLst>
       <p:ext uri="{BB962C8B-B14F-4D97-AF65-F5344CB8AC3E}">
-        <p14:creationId xmlns:p14="http://schemas.microsoft.com/office/powerpoint/2010/main" val="758022510"/>
+        <p14:creationId xmlns:p14="http://schemas.microsoft.com/office/powerpoint/2010/main" val="2932786974"/>
       </p:ext>
     </p:extLst>
   </p:cSld>

</xml_diff>

<commit_message>
updates to Animal model forthcoming
</commit_message>
<xml_diff>
--- a/doc/images/ImageSources.pptx
+++ b/doc/images/ImageSources.pptx
@@ -7,9 +7,8 @@
   <p:sldIdLst>
     <p:sldId id="259" r:id="rId2"/>
     <p:sldId id="260" r:id="rId3"/>
-    <p:sldId id="258" r:id="rId4"/>
-    <p:sldId id="262" r:id="rId5"/>
-    <p:sldId id="261" r:id="rId6"/>
+    <p:sldId id="262" r:id="rId4"/>
+    <p:sldId id="261" r:id="rId5"/>
   </p:sldIdLst>
   <p:sldSz cx="12192000" cy="6858000"/>
   <p:notesSz cx="6858000" cy="9144000"/>
@@ -115,7 +114,6 @@
           <p14:sldIdLst>
             <p14:sldId id="259"/>
             <p14:sldId id="260"/>
-            <p14:sldId id="258"/>
             <p14:sldId id="262"/>
             <p14:sldId id="261"/>
           </p14:sldIdLst>
@@ -258,7 +256,7 @@
           <a:p>
             <a:fld id="{03ABD037-9D82-4436-AC70-ED75D2FE9417}" type="datetimeFigureOut">
               <a:rPr lang="en-US" smtClean="0"/>
-              <a:t>7/25/2019</a:t>
+              <a:t>7/30/2019</a:t>
             </a:fld>
             <a:endParaRPr lang="en-US"/>
           </a:p>
@@ -426,7 +424,7 @@
           <a:p>
             <a:fld id="{03ABD037-9D82-4436-AC70-ED75D2FE9417}" type="datetimeFigureOut">
               <a:rPr lang="en-US" smtClean="0"/>
-              <a:t>7/25/2019</a:t>
+              <a:t>7/30/2019</a:t>
             </a:fld>
             <a:endParaRPr lang="en-US"/>
           </a:p>
@@ -604,7 +602,7 @@
           <a:p>
             <a:fld id="{03ABD037-9D82-4436-AC70-ED75D2FE9417}" type="datetimeFigureOut">
               <a:rPr lang="en-US" smtClean="0"/>
-              <a:t>7/25/2019</a:t>
+              <a:t>7/30/2019</a:t>
             </a:fld>
             <a:endParaRPr lang="en-US"/>
           </a:p>
@@ -772,7 +770,7 @@
           <a:p>
             <a:fld id="{03ABD037-9D82-4436-AC70-ED75D2FE9417}" type="datetimeFigureOut">
               <a:rPr lang="en-US" smtClean="0"/>
-              <a:t>7/25/2019</a:t>
+              <a:t>7/30/2019</a:t>
             </a:fld>
             <a:endParaRPr lang="en-US"/>
           </a:p>
@@ -1017,7 +1015,7 @@
           <a:p>
             <a:fld id="{03ABD037-9D82-4436-AC70-ED75D2FE9417}" type="datetimeFigureOut">
               <a:rPr lang="en-US" smtClean="0"/>
-              <a:t>7/25/2019</a:t>
+              <a:t>7/30/2019</a:t>
             </a:fld>
             <a:endParaRPr lang="en-US"/>
           </a:p>
@@ -1246,7 +1244,7 @@
           <a:p>
             <a:fld id="{03ABD037-9D82-4436-AC70-ED75D2FE9417}" type="datetimeFigureOut">
               <a:rPr lang="en-US" smtClean="0"/>
-              <a:t>7/25/2019</a:t>
+              <a:t>7/30/2019</a:t>
             </a:fld>
             <a:endParaRPr lang="en-US"/>
           </a:p>
@@ -1610,7 +1608,7 @@
           <a:p>
             <a:fld id="{03ABD037-9D82-4436-AC70-ED75D2FE9417}" type="datetimeFigureOut">
               <a:rPr lang="en-US" smtClean="0"/>
-              <a:t>7/25/2019</a:t>
+              <a:t>7/30/2019</a:t>
             </a:fld>
             <a:endParaRPr lang="en-US"/>
           </a:p>
@@ -1727,7 +1725,7 @@
           <a:p>
             <a:fld id="{03ABD037-9D82-4436-AC70-ED75D2FE9417}" type="datetimeFigureOut">
               <a:rPr lang="en-US" smtClean="0"/>
-              <a:t>7/25/2019</a:t>
+              <a:t>7/30/2019</a:t>
             </a:fld>
             <a:endParaRPr lang="en-US"/>
           </a:p>
@@ -1822,7 +1820,7 @@
           <a:p>
             <a:fld id="{03ABD037-9D82-4436-AC70-ED75D2FE9417}" type="datetimeFigureOut">
               <a:rPr lang="en-US" smtClean="0"/>
-              <a:t>7/25/2019</a:t>
+              <a:t>7/30/2019</a:t>
             </a:fld>
             <a:endParaRPr lang="en-US"/>
           </a:p>
@@ -2097,7 +2095,7 @@
           <a:p>
             <a:fld id="{03ABD037-9D82-4436-AC70-ED75D2FE9417}" type="datetimeFigureOut">
               <a:rPr lang="en-US" smtClean="0"/>
-              <a:t>7/25/2019</a:t>
+              <a:t>7/30/2019</a:t>
             </a:fld>
             <a:endParaRPr lang="en-US"/>
           </a:p>
@@ -2349,7 +2347,7 @@
           <a:p>
             <a:fld id="{03ABD037-9D82-4436-AC70-ED75D2FE9417}" type="datetimeFigureOut">
               <a:rPr lang="en-US" smtClean="0"/>
-              <a:t>7/25/2019</a:t>
+              <a:t>7/30/2019</a:t>
             </a:fld>
             <a:endParaRPr lang="en-US"/>
           </a:p>
@@ -2560,7 +2558,7 @@
           <a:p>
             <a:fld id="{03ABD037-9D82-4436-AC70-ED75D2FE9417}" type="datetimeFigureOut">
               <a:rPr lang="en-US" smtClean="0"/>
-              <a:t>7/25/2019</a:t>
+              <a:t>7/30/2019</a:t>
             </a:fld>
             <a:endParaRPr lang="en-US"/>
           </a:p>
@@ -4271,8 +4269,8 @@
         </p:nvSpPr>
         <p:spPr>
           <a:xfrm>
-            <a:off x="702287" y="592888"/>
-            <a:ext cx="2468880" cy="449588"/>
+            <a:off x="811546" y="602691"/>
+            <a:ext cx="2975788" cy="449588"/>
           </a:xfrm>
           <a:prstGeom prst="roundRect">
             <a:avLst/>
@@ -4311,12 +4309,20 @@
           <a:p>
             <a:pPr algn="ctr"/>
             <a:r>
+              <a:rPr lang="en-US" sz="1600" dirty="0">
+                <a:solidFill>
+                  <a:schemeClr val="tx1"/>
+                </a:solidFill>
+              </a:rPr>
+              <a:t>cj16050:</a:t>
+            </a:r>
+            <a:r>
               <a:rPr lang="en-US" b="1" dirty="0">
                 <a:solidFill>
                   <a:schemeClr val="tx1"/>
                 </a:solidFill>
               </a:rPr>
-              <a:t>:Animal_00M01</a:t>
+              <a:t>Animal_a6d09184</a:t>
             </a:r>
           </a:p>
         </p:txBody>
@@ -4335,7 +4341,7 @@
         </p:nvSpPr>
         <p:spPr>
           <a:xfrm>
-            <a:off x="4791455" y="598984"/>
+            <a:off x="5872963" y="598984"/>
             <a:ext cx="2468880" cy="457001"/>
           </a:xfrm>
           <a:prstGeom prst="roundRect">
@@ -4377,12 +4383,12 @@
           <a:p>
             <a:pPr algn="ctr"/>
             <a:r>
-              <a:rPr lang="en-US" b="1" dirty="0">
+              <a:rPr lang="en-US" sz="1600" dirty="0" err="1">
                 <a:solidFill>
                   <a:schemeClr val="tx1"/>
                 </a:solidFill>
               </a:rPr>
-              <a:t>:</a:t>
+              <a:t>study:</a:t>
             </a:r>
             <a:r>
               <a:rPr lang="en-US" b="1" dirty="0" err="1">
@@ -4418,8 +4424,8 @@
         </p:nvCxnSpPr>
         <p:spPr>
           <a:xfrm>
-            <a:off x="3171167" y="817682"/>
-            <a:ext cx="1620288" cy="9803"/>
+            <a:off x="3787334" y="827485"/>
+            <a:ext cx="2085629" cy="0"/>
           </a:xfrm>
           <a:prstGeom prst="straightConnector1">
             <a:avLst/>
@@ -4462,7 +4468,7 @@
         </p:nvSpPr>
         <p:spPr>
           <a:xfrm>
-            <a:off x="4791455" y="1972158"/>
+            <a:off x="5872963" y="1972158"/>
             <a:ext cx="2468880" cy="457001"/>
           </a:xfrm>
           <a:prstGeom prst="roundRect">
@@ -4504,12 +4510,12 @@
           <a:p>
             <a:pPr algn="ctr"/>
             <a:r>
-              <a:rPr lang="en-US" b="1" dirty="0">
+              <a:rPr lang="en-US" sz="1600" dirty="0" err="1">
                 <a:solidFill>
                   <a:schemeClr val="tx1"/>
                 </a:solidFill>
               </a:rPr>
-              <a:t>:</a:t>
+              <a:t>study:</a:t>
             </a:r>
             <a:r>
               <a:rPr lang="en-US" b="1" dirty="0" err="1">
@@ -4545,8 +4551,8 @@
         </p:nvCxnSpPr>
         <p:spPr>
           <a:xfrm>
-            <a:off x="3681983" y="2200659"/>
-            <a:ext cx="1109472" cy="0"/>
+            <a:off x="4343400" y="2200659"/>
+            <a:ext cx="1529563" cy="0"/>
           </a:xfrm>
           <a:prstGeom prst="straightConnector1">
             <a:avLst/>
@@ -4593,8 +4599,8 @@
         </p:nvCxnSpPr>
         <p:spPr>
           <a:xfrm>
-            <a:off x="1936728" y="2429159"/>
-            <a:ext cx="2517648" cy="742337"/>
+            <a:off x="2299440" y="2429159"/>
+            <a:ext cx="2569464" cy="852065"/>
           </a:xfrm>
           <a:prstGeom prst="straightConnector1">
             <a:avLst/>
@@ -4637,10 +4643,10 @@
         </p:nvGrpSpPr>
         <p:grpSpPr>
           <a:xfrm>
-            <a:off x="362878" y="1042476"/>
-            <a:ext cx="3124033" cy="929682"/>
-            <a:chOff x="362878" y="1042476"/>
-            <a:chExt cx="3124033" cy="929682"/>
+            <a:off x="377759" y="1052279"/>
+            <a:ext cx="3843362" cy="919879"/>
+            <a:chOff x="240958" y="1052279"/>
+            <a:chExt cx="3843362" cy="919879"/>
           </a:xfrm>
         </p:grpSpPr>
         <p:cxnSp>
@@ -4661,1718 +4667,8 @@
           </p:nvCxnSpPr>
           <p:spPr>
             <a:xfrm>
-              <a:off x="1936727" y="1042476"/>
-              <a:ext cx="1" cy="929682"/>
-            </a:xfrm>
-            <a:prstGeom prst="straightConnector1">
-              <a:avLst/>
-            </a:prstGeom>
-            <a:ln w="50800">
-              <a:solidFill>
-                <a:schemeClr val="bg1">
-                  <a:lumMod val="50000"/>
-                </a:schemeClr>
-              </a:solidFill>
-              <a:tailEnd type="triangle"/>
-            </a:ln>
-          </p:spPr>
-          <p:style>
-            <a:lnRef idx="1">
-              <a:schemeClr val="accent1"/>
-            </a:lnRef>
-            <a:fillRef idx="0">
-              <a:schemeClr val="accent1"/>
-            </a:fillRef>
-            <a:effectRef idx="0">
-              <a:schemeClr val="accent1"/>
-            </a:effectRef>
-            <a:fontRef idx="minor">
-              <a:schemeClr val="tx1"/>
-            </a:fontRef>
-          </p:style>
-        </p:cxnSp>
-        <p:sp>
-          <p:nvSpPr>
-            <p:cNvPr id="7" name="TextBox 6"/>
-            <p:cNvSpPr txBox="1"/>
-            <p:nvPr/>
-          </p:nvSpPr>
-          <p:spPr>
-            <a:xfrm>
-              <a:off x="362878" y="1314039"/>
-              <a:ext cx="3124033" cy="369332"/>
-            </a:xfrm>
-            <a:prstGeom prst="rect">
-              <a:avLst/>
-            </a:prstGeom>
-            <a:solidFill>
-              <a:schemeClr val="bg1"/>
-            </a:solidFill>
-          </p:spPr>
-          <p:txBody>
-            <a:bodyPr wrap="square" rtlCol="0">
-              <a:spAutoFit/>
-            </a:bodyPr>
-            <a:lstStyle>
-              <a:defPPr>
-                <a:defRPr lang="en-US"/>
-              </a:defPPr>
-              <a:lvl1pPr>
-                <a:defRPr b="1">
-                  <a:solidFill>
-                    <a:schemeClr val="accent2">
-                      <a:lumMod val="75000"/>
-                    </a:schemeClr>
-                  </a:solidFill>
-                  <a:latin typeface="Courier New" panose="02070309020205020404" pitchFamily="49" charset="0"/>
-                  <a:cs typeface="Courier New" panose="02070309020205020404" pitchFamily="49" charset="0"/>
-                </a:defRPr>
-              </a:lvl1pPr>
-            </a:lstStyle>
-            <a:p>
-              <a:r>
-                <a:rPr lang="en-US" dirty="0" err="1"/>
-                <a:t>hasReferenceInterval</a:t>
-              </a:r>
-              <a:endParaRPr lang="en-US" dirty="0"/>
-            </a:p>
-          </p:txBody>
-        </p:sp>
-      </p:grpSp>
-      <p:sp>
-        <p:nvSpPr>
-          <p:cNvPr id="42" name="TextBox 41">
-            <a:extLst>
-              <a:ext uri="{FF2B5EF4-FFF2-40B4-BE49-F238E27FC236}">
-                <a16:creationId xmlns:a16="http://schemas.microsoft.com/office/drawing/2014/main" id="{E44AC35C-D56A-4BA4-9884-CFA2D845B4FA}"/>
-              </a:ext>
-            </a:extLst>
-          </p:cNvPr>
-          <p:cNvSpPr txBox="1"/>
-          <p:nvPr/>
-        </p:nvSpPr>
-        <p:spPr>
-          <a:xfrm>
-            <a:off x="2587918" y="2661255"/>
-            <a:ext cx="2276689" cy="369332"/>
-          </a:xfrm>
-          <a:prstGeom prst="rect">
-            <a:avLst/>
-          </a:prstGeom>
-          <a:solidFill>
-            <a:schemeClr val="bg1"/>
-          </a:solidFill>
-        </p:spPr>
-        <p:txBody>
-          <a:bodyPr wrap="square" rtlCol="0">
-            <a:spAutoFit/>
-          </a:bodyPr>
-          <a:lstStyle>
-            <a:defPPr>
-              <a:defRPr lang="en-US"/>
-            </a:defPPr>
-            <a:lvl1pPr>
-              <a:defRPr b="1">
-                <a:solidFill>
-                  <a:schemeClr val="accent2">
-                    <a:lumMod val="75000"/>
-                  </a:schemeClr>
-                </a:solidFill>
-                <a:latin typeface="Courier New" panose="02070309020205020404" pitchFamily="49" charset="0"/>
-                <a:cs typeface="Courier New" panose="02070309020205020404" pitchFamily="49" charset="0"/>
-              </a:defRPr>
-            </a:lvl1pPr>
-          </a:lstStyle>
-          <a:p>
-            <a:r>
-              <a:rPr lang="en-US" dirty="0"/>
-              <a:t>:</a:t>
-            </a:r>
-            <a:r>
-              <a:rPr lang="en-US" dirty="0" err="1"/>
-              <a:t>ReferenceBegin</a:t>
-            </a:r>
-            <a:endParaRPr lang="en-US" dirty="0"/>
-          </a:p>
-        </p:txBody>
-      </p:sp>
-      <p:cxnSp>
-        <p:nvCxnSpPr>
-          <p:cNvPr id="43" name="Straight Arrow Connector 42">
-            <a:extLst>
-              <a:ext uri="{FF2B5EF4-FFF2-40B4-BE49-F238E27FC236}">
-                <a16:creationId xmlns:a16="http://schemas.microsoft.com/office/drawing/2014/main" id="{DBA4C3E1-A7BC-4049-9A3C-CAAB8D4552F6}"/>
-              </a:ext>
-            </a:extLst>
-          </p:cNvPr>
-          <p:cNvCxnSpPr>
-            <a:cxnSpLocks/>
-            <a:stCxn id="15" idx="2"/>
-            <a:endCxn id="48" idx="0"/>
-          </p:cNvCxnSpPr>
-          <p:nvPr/>
-        </p:nvCxnSpPr>
-        <p:spPr>
-          <a:xfrm>
-            <a:off x="1936728" y="2429159"/>
-            <a:ext cx="1267968" cy="2495037"/>
-          </a:xfrm>
-          <a:prstGeom prst="straightConnector1">
-            <a:avLst/>
-          </a:prstGeom>
-          <a:ln w="50800">
-            <a:solidFill>
-              <a:schemeClr val="bg1">
-                <a:lumMod val="50000"/>
-              </a:schemeClr>
-            </a:solidFill>
-            <a:tailEnd type="triangle"/>
-          </a:ln>
-        </p:spPr>
-        <p:style>
-          <a:lnRef idx="1">
-            <a:schemeClr val="accent1"/>
-          </a:lnRef>
-          <a:fillRef idx="0">
-            <a:schemeClr val="accent1"/>
-          </a:fillRef>
-          <a:effectRef idx="0">
-            <a:schemeClr val="accent1"/>
-          </a:effectRef>
-          <a:fontRef idx="minor">
-            <a:schemeClr val="tx1"/>
-          </a:fontRef>
-        </p:style>
-      </p:cxnSp>
-      <p:sp>
-        <p:nvSpPr>
-          <p:cNvPr id="46" name="TextBox 45">
-            <a:extLst>
-              <a:ext uri="{FF2B5EF4-FFF2-40B4-BE49-F238E27FC236}">
-                <a16:creationId xmlns:a16="http://schemas.microsoft.com/office/drawing/2014/main" id="{418C348C-A1DB-4629-B90E-D3E0A4F40A88}"/>
-              </a:ext>
-            </a:extLst>
-          </p:cNvPr>
-          <p:cNvSpPr txBox="1"/>
-          <p:nvPr/>
-        </p:nvSpPr>
-        <p:spPr>
-          <a:xfrm>
-            <a:off x="2020991" y="4008471"/>
-            <a:ext cx="2014561" cy="369332"/>
-          </a:xfrm>
-          <a:prstGeom prst="rect">
-            <a:avLst/>
-          </a:prstGeom>
-          <a:solidFill>
-            <a:schemeClr val="bg1"/>
-          </a:solidFill>
-        </p:spPr>
-        <p:txBody>
-          <a:bodyPr wrap="square" rtlCol="0">
-            <a:spAutoFit/>
-          </a:bodyPr>
-          <a:lstStyle>
-            <a:defPPr>
-              <a:defRPr lang="en-US"/>
-            </a:defPPr>
-            <a:lvl1pPr>
-              <a:defRPr b="1">
-                <a:solidFill>
-                  <a:schemeClr val="accent2">
-                    <a:lumMod val="75000"/>
-                  </a:schemeClr>
-                </a:solidFill>
-                <a:latin typeface="Courier New" panose="02070309020205020404" pitchFamily="49" charset="0"/>
-                <a:cs typeface="Courier New" panose="02070309020205020404" pitchFamily="49" charset="0"/>
-              </a:defRPr>
-            </a:lvl1pPr>
-          </a:lstStyle>
-          <a:p>
-            <a:r>
-              <a:rPr lang="en-US" dirty="0"/>
-              <a:t>:</a:t>
-            </a:r>
-            <a:r>
-              <a:rPr lang="en-US" dirty="0" err="1"/>
-              <a:t>ReferenceEnd</a:t>
-            </a:r>
-            <a:endParaRPr lang="en-US" dirty="0"/>
-          </a:p>
-        </p:txBody>
-      </p:sp>
-      <p:sp>
-        <p:nvSpPr>
-          <p:cNvPr id="47" name="Rectangle: Rounded Corners 46">
-            <a:extLst>
-              <a:ext uri="{FF2B5EF4-FFF2-40B4-BE49-F238E27FC236}">
-                <a16:creationId xmlns:a16="http://schemas.microsoft.com/office/drawing/2014/main" id="{23F8A56F-9569-488F-9C72-B2665C87B7BA}"/>
-              </a:ext>
-            </a:extLst>
-          </p:cNvPr>
-          <p:cNvSpPr/>
-          <p:nvPr/>
-        </p:nvSpPr>
-        <p:spPr>
-          <a:xfrm>
-            <a:off x="2709120" y="3171496"/>
-            <a:ext cx="3490511" cy="457001"/>
-          </a:xfrm>
-          <a:prstGeom prst="roundRect">
-            <a:avLst/>
-          </a:prstGeom>
-          <a:solidFill>
-            <a:schemeClr val="accent6">
-              <a:lumMod val="40000"/>
-              <a:lumOff val="60000"/>
-            </a:schemeClr>
-          </a:solidFill>
-          <a:ln>
-            <a:solidFill>
-              <a:schemeClr val="tx1"/>
-            </a:solidFill>
-          </a:ln>
-        </p:spPr>
-        <p:style>
-          <a:lnRef idx="2">
-            <a:schemeClr val="accent1">
-              <a:shade val="50000"/>
-            </a:schemeClr>
-          </a:lnRef>
-          <a:fillRef idx="1">
-            <a:schemeClr val="accent1"/>
-          </a:fillRef>
-          <a:effectRef idx="0">
-            <a:schemeClr val="accent1"/>
-          </a:effectRef>
-          <a:fontRef idx="minor">
-            <a:schemeClr val="lt1"/>
-          </a:fontRef>
-        </p:style>
-        <p:txBody>
-          <a:bodyPr rtlCol="0" anchor="ctr"/>
-          <a:lstStyle/>
-          <a:p>
-            <a:pPr algn="ctr"/>
-            <a:r>
-              <a:rPr lang="en-US" b="1" dirty="0">
-                <a:solidFill>
-                  <a:schemeClr val="tx1"/>
-                </a:solidFill>
-              </a:rPr>
-              <a:t>:Date_2016-12-07</a:t>
-            </a:r>
-          </a:p>
-        </p:txBody>
-      </p:sp>
-      <p:sp>
-        <p:nvSpPr>
-          <p:cNvPr id="48" name="Rectangle: Rounded Corners 47">
-            <a:extLst>
-              <a:ext uri="{FF2B5EF4-FFF2-40B4-BE49-F238E27FC236}">
-                <a16:creationId xmlns:a16="http://schemas.microsoft.com/office/drawing/2014/main" id="{CEBC1294-CAA3-49E1-A52E-68753199F3A5}"/>
-              </a:ext>
-            </a:extLst>
-          </p:cNvPr>
-          <p:cNvSpPr/>
-          <p:nvPr/>
-        </p:nvSpPr>
-        <p:spPr>
-          <a:xfrm>
-            <a:off x="1459440" y="4924196"/>
-            <a:ext cx="3490511" cy="457001"/>
-          </a:xfrm>
-          <a:prstGeom prst="roundRect">
-            <a:avLst/>
-          </a:prstGeom>
-          <a:solidFill>
-            <a:schemeClr val="accent6">
-              <a:lumMod val="40000"/>
-              <a:lumOff val="60000"/>
-            </a:schemeClr>
-          </a:solidFill>
-          <a:ln>
-            <a:solidFill>
-              <a:schemeClr val="tx1"/>
-            </a:solidFill>
-          </a:ln>
-        </p:spPr>
-        <p:style>
-          <a:lnRef idx="2">
-            <a:schemeClr val="accent1">
-              <a:shade val="50000"/>
-            </a:schemeClr>
-          </a:lnRef>
-          <a:fillRef idx="1">
-            <a:schemeClr val="accent1"/>
-          </a:fillRef>
-          <a:effectRef idx="0">
-            <a:schemeClr val="accent1"/>
-          </a:effectRef>
-          <a:fontRef idx="minor">
-            <a:schemeClr val="lt1"/>
-          </a:fontRef>
-        </p:style>
-        <p:txBody>
-          <a:bodyPr rtlCol="0" anchor="ctr"/>
-          <a:lstStyle/>
-          <a:p>
-            <a:pPr algn="ctr"/>
-            <a:r>
-              <a:rPr lang="en-US" b="1" dirty="0">
-                <a:solidFill>
-                  <a:schemeClr val="tx1"/>
-                </a:solidFill>
-              </a:rPr>
-              <a:t>:Date_2016-12-07</a:t>
-            </a:r>
-          </a:p>
-        </p:txBody>
-      </p:sp>
-      <p:sp>
-        <p:nvSpPr>
-          <p:cNvPr id="50" name="Rectangle: Rounded Corners 49">
-            <a:extLst>
-              <a:ext uri="{FF2B5EF4-FFF2-40B4-BE49-F238E27FC236}">
-                <a16:creationId xmlns:a16="http://schemas.microsoft.com/office/drawing/2014/main" id="{F3B80F0D-6FEC-490C-B729-BA78FF1A38CA}"/>
-              </a:ext>
-            </a:extLst>
-          </p:cNvPr>
-          <p:cNvSpPr/>
-          <p:nvPr/>
-        </p:nvSpPr>
-        <p:spPr>
-          <a:xfrm>
-            <a:off x="7214064" y="2817928"/>
-            <a:ext cx="2468880" cy="457001"/>
-          </a:xfrm>
-          <a:prstGeom prst="roundRect">
-            <a:avLst/>
-          </a:prstGeom>
-          <a:solidFill>
-            <a:schemeClr val="accent1">
-              <a:lumMod val="40000"/>
-              <a:lumOff val="60000"/>
-            </a:schemeClr>
-          </a:solidFill>
-          <a:ln w="38100">
-            <a:solidFill>
-              <a:schemeClr val="accent1">
-                <a:lumMod val="75000"/>
-              </a:schemeClr>
-            </a:solidFill>
-          </a:ln>
-        </p:spPr>
-        <p:style>
-          <a:lnRef idx="2">
-            <a:schemeClr val="accent1">
-              <a:shade val="50000"/>
-            </a:schemeClr>
-          </a:lnRef>
-          <a:fillRef idx="1">
-            <a:schemeClr val="accent1"/>
-          </a:fillRef>
-          <a:effectRef idx="0">
-            <a:schemeClr val="accent1"/>
-          </a:effectRef>
-          <a:fontRef idx="minor">
-            <a:schemeClr val="lt1"/>
-          </a:fontRef>
-        </p:style>
-        <p:txBody>
-          <a:bodyPr rtlCol="0" anchor="ctr"/>
-          <a:lstStyle/>
-          <a:p>
-            <a:pPr algn="ctr"/>
-            <a:r>
-              <a:rPr lang="en-US" b="1" dirty="0">
-                <a:solidFill>
-                  <a:schemeClr val="tx1"/>
-                </a:solidFill>
-              </a:rPr>
-              <a:t>:</a:t>
-            </a:r>
-            <a:r>
-              <a:rPr lang="en-US" b="1" dirty="0" err="1">
-                <a:solidFill>
-                  <a:schemeClr val="tx1"/>
-                </a:solidFill>
-              </a:rPr>
-              <a:t>ReferenceBegin</a:t>
-            </a:r>
-            <a:endParaRPr lang="en-US" b="1" dirty="0">
-              <a:solidFill>
-                <a:schemeClr val="tx1"/>
-              </a:solidFill>
-            </a:endParaRPr>
-          </a:p>
-        </p:txBody>
-      </p:sp>
-      <p:sp>
-        <p:nvSpPr>
-          <p:cNvPr id="51" name="Rectangle: Rounded Corners 50">
-            <a:extLst>
-              <a:ext uri="{FF2B5EF4-FFF2-40B4-BE49-F238E27FC236}">
-                <a16:creationId xmlns:a16="http://schemas.microsoft.com/office/drawing/2014/main" id="{D2ACF014-9FBD-4451-B9FF-FA3B75B0E42D}"/>
-              </a:ext>
-            </a:extLst>
-          </p:cNvPr>
-          <p:cNvSpPr/>
-          <p:nvPr/>
-        </p:nvSpPr>
-        <p:spPr>
-          <a:xfrm>
-            <a:off x="5903424" y="4469944"/>
-            <a:ext cx="2468880" cy="457001"/>
-          </a:xfrm>
-          <a:prstGeom prst="roundRect">
-            <a:avLst/>
-          </a:prstGeom>
-          <a:solidFill>
-            <a:schemeClr val="accent1">
-              <a:lumMod val="40000"/>
-              <a:lumOff val="60000"/>
-            </a:schemeClr>
-          </a:solidFill>
-          <a:ln w="38100">
-            <a:solidFill>
-              <a:schemeClr val="accent1">
-                <a:lumMod val="75000"/>
-              </a:schemeClr>
-            </a:solidFill>
-          </a:ln>
-        </p:spPr>
-        <p:style>
-          <a:lnRef idx="2">
-            <a:schemeClr val="accent1">
-              <a:shade val="50000"/>
-            </a:schemeClr>
-          </a:lnRef>
-          <a:fillRef idx="1">
-            <a:schemeClr val="accent1"/>
-          </a:fillRef>
-          <a:effectRef idx="0">
-            <a:schemeClr val="accent1"/>
-          </a:effectRef>
-          <a:fontRef idx="minor">
-            <a:schemeClr val="lt1"/>
-          </a:fontRef>
-        </p:style>
-        <p:txBody>
-          <a:bodyPr rtlCol="0" anchor="ctr"/>
-          <a:lstStyle/>
-          <a:p>
-            <a:pPr algn="ctr"/>
-            <a:r>
-              <a:rPr lang="en-US" b="1" dirty="0">
-                <a:solidFill>
-                  <a:schemeClr val="tx1"/>
-                </a:solidFill>
-              </a:rPr>
-              <a:t>:</a:t>
-            </a:r>
-            <a:r>
-              <a:rPr lang="en-US" b="1" dirty="0" err="1">
-                <a:solidFill>
-                  <a:schemeClr val="tx1"/>
-                </a:solidFill>
-              </a:rPr>
-              <a:t>ReferenceEnd</a:t>
-            </a:r>
-            <a:endParaRPr lang="en-US" b="1" dirty="0">
-              <a:solidFill>
-                <a:schemeClr val="tx1"/>
-              </a:solidFill>
-            </a:endParaRPr>
-          </a:p>
-        </p:txBody>
-      </p:sp>
-      <p:cxnSp>
-        <p:nvCxnSpPr>
-          <p:cNvPr id="52" name="Straight Arrow Connector 51">
-            <a:extLst>
-              <a:ext uri="{FF2B5EF4-FFF2-40B4-BE49-F238E27FC236}">
-                <a16:creationId xmlns:a16="http://schemas.microsoft.com/office/drawing/2014/main" id="{A1004DBD-4B82-4578-94CB-FCC9FAAE6D9A}"/>
-              </a:ext>
-            </a:extLst>
-          </p:cNvPr>
-          <p:cNvCxnSpPr>
-            <a:cxnSpLocks/>
-            <a:stCxn id="47" idx="3"/>
-            <a:endCxn id="50" idx="1"/>
-          </p:cNvCxnSpPr>
-          <p:nvPr/>
-        </p:nvCxnSpPr>
-        <p:spPr>
-          <a:xfrm flipV="1">
-            <a:off x="6199631" y="3046429"/>
-            <a:ext cx="1014433" cy="353568"/>
-          </a:xfrm>
-          <a:prstGeom prst="straightConnector1">
-            <a:avLst/>
-          </a:prstGeom>
-          <a:ln w="50800">
-            <a:solidFill>
-              <a:schemeClr val="bg1">
-                <a:lumMod val="50000"/>
-              </a:schemeClr>
-            </a:solidFill>
-            <a:tailEnd type="triangle"/>
-          </a:ln>
-        </p:spPr>
-        <p:style>
-          <a:lnRef idx="1">
-            <a:schemeClr val="accent1"/>
-          </a:lnRef>
-          <a:fillRef idx="0">
-            <a:schemeClr val="accent1"/>
-          </a:fillRef>
-          <a:effectRef idx="0">
-            <a:schemeClr val="accent1"/>
-          </a:effectRef>
-          <a:fontRef idx="minor">
-            <a:schemeClr val="tx1"/>
-          </a:fontRef>
-        </p:style>
-      </p:cxnSp>
-      <p:cxnSp>
-        <p:nvCxnSpPr>
-          <p:cNvPr id="55" name="Straight Arrow Connector 54">
-            <a:extLst>
-              <a:ext uri="{FF2B5EF4-FFF2-40B4-BE49-F238E27FC236}">
-                <a16:creationId xmlns:a16="http://schemas.microsoft.com/office/drawing/2014/main" id="{72612BB5-E67E-41BB-A2EF-D5CEF9CED4EF}"/>
-              </a:ext>
-            </a:extLst>
-          </p:cNvPr>
-          <p:cNvCxnSpPr>
-            <a:cxnSpLocks/>
-            <a:stCxn id="48" idx="3"/>
-            <a:endCxn id="51" idx="1"/>
-          </p:cNvCxnSpPr>
-          <p:nvPr/>
-        </p:nvCxnSpPr>
-        <p:spPr>
-          <a:xfrm flipV="1">
-            <a:off x="4949951" y="4698445"/>
-            <a:ext cx="953473" cy="454252"/>
-          </a:xfrm>
-          <a:prstGeom prst="straightConnector1">
-            <a:avLst/>
-          </a:prstGeom>
-          <a:ln w="50800">
-            <a:solidFill>
-              <a:schemeClr val="bg1">
-                <a:lumMod val="50000"/>
-              </a:schemeClr>
-            </a:solidFill>
-            <a:tailEnd type="triangle"/>
-          </a:ln>
-        </p:spPr>
-        <p:style>
-          <a:lnRef idx="1">
-            <a:schemeClr val="accent1"/>
-          </a:lnRef>
-          <a:fillRef idx="0">
-            <a:schemeClr val="accent1"/>
-          </a:fillRef>
-          <a:effectRef idx="0">
-            <a:schemeClr val="accent1"/>
-          </a:effectRef>
-          <a:fontRef idx="minor">
-            <a:schemeClr val="tx1"/>
-          </a:fontRef>
-        </p:style>
-      </p:cxnSp>
-      <p:cxnSp>
-        <p:nvCxnSpPr>
-          <p:cNvPr id="59" name="Straight Arrow Connector 58">
-            <a:extLst>
-              <a:ext uri="{FF2B5EF4-FFF2-40B4-BE49-F238E27FC236}">
-                <a16:creationId xmlns:a16="http://schemas.microsoft.com/office/drawing/2014/main" id="{CC9BF0AA-2E99-4EF2-9F6E-111BE8ACD9AA}"/>
-              </a:ext>
-            </a:extLst>
-          </p:cNvPr>
-          <p:cNvCxnSpPr>
-            <a:cxnSpLocks/>
-            <a:stCxn id="47" idx="3"/>
-            <a:endCxn id="63" idx="1"/>
-          </p:cNvCxnSpPr>
-          <p:nvPr/>
-        </p:nvCxnSpPr>
-        <p:spPr>
-          <a:xfrm>
-            <a:off x="6199631" y="3399997"/>
-            <a:ext cx="2453089" cy="792282"/>
-          </a:xfrm>
-          <a:prstGeom prst="straightConnector1">
-            <a:avLst/>
-          </a:prstGeom>
-          <a:ln w="50800">
-            <a:solidFill>
-              <a:schemeClr val="bg1">
-                <a:lumMod val="50000"/>
-              </a:schemeClr>
-            </a:solidFill>
-            <a:tailEnd type="triangle"/>
-          </a:ln>
-        </p:spPr>
-        <p:style>
-          <a:lnRef idx="1">
-            <a:schemeClr val="accent1"/>
-          </a:lnRef>
-          <a:fillRef idx="0">
-            <a:schemeClr val="accent1"/>
-          </a:fillRef>
-          <a:effectRef idx="0">
-            <a:schemeClr val="accent1"/>
-          </a:effectRef>
-          <a:fontRef idx="minor">
-            <a:schemeClr val="tx1"/>
-          </a:fontRef>
-        </p:style>
-      </p:cxnSp>
-      <p:sp>
-        <p:nvSpPr>
-          <p:cNvPr id="63" name="Rectangle: Rounded Corners 62">
-            <a:extLst>
-              <a:ext uri="{FF2B5EF4-FFF2-40B4-BE49-F238E27FC236}">
-                <a16:creationId xmlns:a16="http://schemas.microsoft.com/office/drawing/2014/main" id="{B1630B21-91BA-4E9C-B731-9E61ED2AFA72}"/>
-              </a:ext>
-            </a:extLst>
-          </p:cNvPr>
-          <p:cNvSpPr/>
-          <p:nvPr/>
-        </p:nvSpPr>
-        <p:spPr>
-          <a:xfrm>
-            <a:off x="8652720" y="3963778"/>
-            <a:ext cx="2783375" cy="457001"/>
-          </a:xfrm>
-          <a:prstGeom prst="roundRect">
-            <a:avLst/>
-          </a:prstGeom>
-          <a:solidFill>
-            <a:schemeClr val="bg1"/>
-          </a:solidFill>
-          <a:ln>
-            <a:solidFill>
-              <a:schemeClr val="tx1"/>
-            </a:solidFill>
-          </a:ln>
-        </p:spPr>
-        <p:style>
-          <a:lnRef idx="2">
-            <a:schemeClr val="accent1">
-              <a:shade val="50000"/>
-            </a:schemeClr>
-          </a:lnRef>
-          <a:fillRef idx="1">
-            <a:schemeClr val="accent1"/>
-          </a:fillRef>
-          <a:effectRef idx="0">
-            <a:schemeClr val="accent1"/>
-          </a:effectRef>
-          <a:fontRef idx="minor">
-            <a:schemeClr val="lt1"/>
-          </a:fontRef>
-        </p:style>
-        <p:txBody>
-          <a:bodyPr rtlCol="0" anchor="ctr"/>
-          <a:lstStyle/>
-          <a:p>
-            <a:pPr algn="ctr"/>
-            <a:r>
-              <a:rPr lang="en-US" b="1" dirty="0">
-                <a:solidFill>
-                  <a:schemeClr val="tx1"/>
-                </a:solidFill>
-              </a:rPr>
-              <a:t>“2016-12-07”</a:t>
-            </a:r>
-            <a:r>
-              <a:rPr lang="en-US" b="1" dirty="0">
-                <a:solidFill>
-                  <a:schemeClr val="accent2">
-                    <a:lumMod val="75000"/>
-                  </a:schemeClr>
-                </a:solidFill>
-              </a:rPr>
-              <a:t>^^</a:t>
-            </a:r>
-            <a:r>
-              <a:rPr lang="en-US" b="1" dirty="0" err="1">
-                <a:solidFill>
-                  <a:schemeClr val="accent2">
-                    <a:lumMod val="75000"/>
-                  </a:schemeClr>
-                </a:solidFill>
-              </a:rPr>
-              <a:t>xsd:date</a:t>
-            </a:r>
-            <a:endParaRPr lang="en-US" b="1" dirty="0">
-              <a:solidFill>
-                <a:schemeClr val="accent2">
-                  <a:lumMod val="75000"/>
-                </a:schemeClr>
-              </a:solidFill>
-            </a:endParaRPr>
-          </a:p>
-        </p:txBody>
-      </p:sp>
-      <p:sp>
-        <p:nvSpPr>
-          <p:cNvPr id="64" name="Rectangle: Rounded Corners 63">
-            <a:extLst>
-              <a:ext uri="{FF2B5EF4-FFF2-40B4-BE49-F238E27FC236}">
-                <a16:creationId xmlns:a16="http://schemas.microsoft.com/office/drawing/2014/main" id="{FF35D29D-668C-4B62-879F-808B1E68966A}"/>
-              </a:ext>
-            </a:extLst>
-          </p:cNvPr>
-          <p:cNvSpPr/>
-          <p:nvPr/>
-        </p:nvSpPr>
-        <p:spPr>
-          <a:xfrm>
-            <a:off x="7281120" y="5640178"/>
-            <a:ext cx="2783375" cy="457001"/>
-          </a:xfrm>
-          <a:prstGeom prst="roundRect">
-            <a:avLst/>
-          </a:prstGeom>
-          <a:solidFill>
-            <a:schemeClr val="bg1"/>
-          </a:solidFill>
-          <a:ln>
-            <a:solidFill>
-              <a:schemeClr val="tx1"/>
-            </a:solidFill>
-          </a:ln>
-        </p:spPr>
-        <p:style>
-          <a:lnRef idx="2">
-            <a:schemeClr val="accent1">
-              <a:shade val="50000"/>
-            </a:schemeClr>
-          </a:lnRef>
-          <a:fillRef idx="1">
-            <a:schemeClr val="accent1"/>
-          </a:fillRef>
-          <a:effectRef idx="0">
-            <a:schemeClr val="accent1"/>
-          </a:effectRef>
-          <a:fontRef idx="minor">
-            <a:schemeClr val="lt1"/>
-          </a:fontRef>
-        </p:style>
-        <p:txBody>
-          <a:bodyPr rtlCol="0" anchor="ctr"/>
-          <a:lstStyle/>
-          <a:p>
-            <a:pPr algn="ctr"/>
-            <a:r>
-              <a:rPr lang="en-US" b="1" dirty="0">
-                <a:solidFill>
-                  <a:schemeClr val="tx1"/>
-                </a:solidFill>
-              </a:rPr>
-              <a:t>“2016-12-07”</a:t>
-            </a:r>
-            <a:r>
-              <a:rPr lang="en-US" b="1" dirty="0">
-                <a:solidFill>
-                  <a:schemeClr val="accent2">
-                    <a:lumMod val="75000"/>
-                  </a:schemeClr>
-                </a:solidFill>
-              </a:rPr>
-              <a:t>^^</a:t>
-            </a:r>
-            <a:r>
-              <a:rPr lang="en-US" b="1" dirty="0" err="1">
-                <a:solidFill>
-                  <a:schemeClr val="accent2">
-                    <a:lumMod val="75000"/>
-                  </a:schemeClr>
-                </a:solidFill>
-              </a:rPr>
-              <a:t>xsd:date</a:t>
-            </a:r>
-            <a:endParaRPr lang="en-US" b="1" dirty="0">
-              <a:solidFill>
-                <a:schemeClr val="accent2">
-                  <a:lumMod val="75000"/>
-                </a:schemeClr>
-              </a:solidFill>
-            </a:endParaRPr>
-          </a:p>
-        </p:txBody>
-      </p:sp>
-      <p:cxnSp>
-        <p:nvCxnSpPr>
-          <p:cNvPr id="87" name="Straight Arrow Connector 86">
-            <a:extLst>
-              <a:ext uri="{FF2B5EF4-FFF2-40B4-BE49-F238E27FC236}">
-                <a16:creationId xmlns:a16="http://schemas.microsoft.com/office/drawing/2014/main" id="{747653AA-D7FE-4197-9659-330578AD3397}"/>
-              </a:ext>
-            </a:extLst>
-          </p:cNvPr>
-          <p:cNvCxnSpPr>
-            <a:cxnSpLocks/>
-            <a:stCxn id="48" idx="3"/>
-            <a:endCxn id="64" idx="1"/>
-          </p:cNvCxnSpPr>
-          <p:nvPr/>
-        </p:nvCxnSpPr>
-        <p:spPr>
-          <a:xfrm>
-            <a:off x="4949951" y="5152697"/>
-            <a:ext cx="2331169" cy="715982"/>
-          </a:xfrm>
-          <a:prstGeom prst="straightConnector1">
-            <a:avLst/>
-          </a:prstGeom>
-          <a:ln w="50800">
-            <a:solidFill>
-              <a:schemeClr val="bg1">
-                <a:lumMod val="50000"/>
-              </a:schemeClr>
-            </a:solidFill>
-            <a:tailEnd type="triangle"/>
-          </a:ln>
-        </p:spPr>
-        <p:style>
-          <a:lnRef idx="1">
-            <a:schemeClr val="accent1"/>
-          </a:lnRef>
-          <a:fillRef idx="0">
-            <a:schemeClr val="accent1"/>
-          </a:fillRef>
-          <a:effectRef idx="0">
-            <a:schemeClr val="accent1"/>
-          </a:effectRef>
-          <a:fontRef idx="minor">
-            <a:schemeClr val="tx1"/>
-          </a:fontRef>
-        </p:style>
-      </p:cxnSp>
-      <p:sp>
-        <p:nvSpPr>
-          <p:cNvPr id="15" name="Rectangle: Rounded Corners 14">
-            <a:extLst>
-              <a:ext uri="{FF2B5EF4-FFF2-40B4-BE49-F238E27FC236}">
-                <a16:creationId xmlns:a16="http://schemas.microsoft.com/office/drawing/2014/main" id="{F2D1CDB2-6DA6-45BF-B57E-8A1B3116DAB8}"/>
-              </a:ext>
-            </a:extLst>
-          </p:cNvPr>
-          <p:cNvSpPr/>
-          <p:nvPr/>
-        </p:nvSpPr>
-        <p:spPr>
-          <a:xfrm>
-            <a:off x="191472" y="1972158"/>
-            <a:ext cx="3490511" cy="457001"/>
-          </a:xfrm>
-          <a:prstGeom prst="roundRect">
-            <a:avLst/>
-          </a:prstGeom>
-          <a:solidFill>
-            <a:schemeClr val="accent6">
-              <a:lumMod val="40000"/>
-              <a:lumOff val="60000"/>
-            </a:schemeClr>
-          </a:solidFill>
-          <a:ln>
-            <a:solidFill>
-              <a:schemeClr val="tx1"/>
-            </a:solidFill>
-          </a:ln>
-        </p:spPr>
-        <p:style>
-          <a:lnRef idx="2">
-            <a:schemeClr val="accent1">
-              <a:shade val="50000"/>
-            </a:schemeClr>
-          </a:lnRef>
-          <a:fillRef idx="1">
-            <a:schemeClr val="accent1"/>
-          </a:fillRef>
-          <a:effectRef idx="0">
-            <a:schemeClr val="accent1"/>
-          </a:effectRef>
-          <a:fontRef idx="minor">
-            <a:schemeClr val="lt1"/>
-          </a:fontRef>
-        </p:style>
-        <p:txBody>
-          <a:bodyPr rtlCol="0" anchor="ctr"/>
-          <a:lstStyle/>
-          <a:p>
-            <a:pPr algn="ctr"/>
-            <a:r>
-              <a:rPr lang="en-US" b="1" dirty="0">
-                <a:solidFill>
-                  <a:schemeClr val="tx1"/>
-                </a:solidFill>
-              </a:rPr>
-              <a:t>:Interval_2016-12-07_2016_12-07</a:t>
-            </a:r>
-          </a:p>
-        </p:txBody>
-      </p:sp>
-      <p:sp>
-        <p:nvSpPr>
-          <p:cNvPr id="101" name="TextBox 100">
-            <a:extLst>
-              <a:ext uri="{FF2B5EF4-FFF2-40B4-BE49-F238E27FC236}">
-                <a16:creationId xmlns:a16="http://schemas.microsoft.com/office/drawing/2014/main" id="{C09F5CFC-6F12-41B9-B15E-3BD12189F043}"/>
-              </a:ext>
-            </a:extLst>
-          </p:cNvPr>
-          <p:cNvSpPr txBox="1"/>
-          <p:nvPr/>
-        </p:nvSpPr>
-        <p:spPr>
-          <a:xfrm flipH="1">
-            <a:off x="3669792" y="609600"/>
-            <a:ext cx="329184" cy="369332"/>
-          </a:xfrm>
-          <a:prstGeom prst="rect">
-            <a:avLst/>
-          </a:prstGeom>
-          <a:solidFill>
-            <a:schemeClr val="bg1"/>
-          </a:solidFill>
-        </p:spPr>
-        <p:txBody>
-          <a:bodyPr wrap="square" rtlCol="0">
-            <a:spAutoFit/>
-          </a:bodyPr>
-          <a:lstStyle>
-            <a:defPPr>
-              <a:defRPr lang="en-US"/>
-            </a:defPPr>
-            <a:lvl1pPr>
-              <a:defRPr b="1">
-                <a:solidFill>
-                  <a:schemeClr val="accent2">
-                    <a:lumMod val="75000"/>
-                  </a:schemeClr>
-                </a:solidFill>
-                <a:latin typeface="Courier New" panose="02070309020205020404" pitchFamily="49" charset="0"/>
-                <a:cs typeface="Courier New" panose="02070309020205020404" pitchFamily="49" charset="0"/>
-              </a:defRPr>
-            </a:lvl1pPr>
-          </a:lstStyle>
-          <a:p>
-            <a:r>
-              <a:rPr lang="en-US" dirty="0"/>
-              <a:t>a</a:t>
-            </a:r>
-          </a:p>
-        </p:txBody>
-      </p:sp>
-      <p:sp>
-        <p:nvSpPr>
-          <p:cNvPr id="102" name="TextBox 101">
-            <a:extLst>
-              <a:ext uri="{FF2B5EF4-FFF2-40B4-BE49-F238E27FC236}">
-                <a16:creationId xmlns:a16="http://schemas.microsoft.com/office/drawing/2014/main" id="{C131BC81-344F-4327-B4A7-CB6A075FB769}"/>
-              </a:ext>
-            </a:extLst>
-          </p:cNvPr>
-          <p:cNvSpPr txBox="1"/>
-          <p:nvPr/>
-        </p:nvSpPr>
-        <p:spPr>
-          <a:xfrm flipH="1">
-            <a:off x="3980688" y="2017776"/>
-            <a:ext cx="420624" cy="369332"/>
-          </a:xfrm>
-          <a:prstGeom prst="rect">
-            <a:avLst/>
-          </a:prstGeom>
-          <a:solidFill>
-            <a:schemeClr val="bg1"/>
-          </a:solidFill>
-        </p:spPr>
-        <p:txBody>
-          <a:bodyPr wrap="square" rtlCol="0">
-            <a:spAutoFit/>
-          </a:bodyPr>
-          <a:lstStyle>
-            <a:defPPr>
-              <a:defRPr lang="en-US"/>
-            </a:defPPr>
-            <a:lvl1pPr>
-              <a:defRPr b="1">
-                <a:solidFill>
-                  <a:schemeClr val="accent2">
-                    <a:lumMod val="75000"/>
-                  </a:schemeClr>
-                </a:solidFill>
-                <a:latin typeface="Courier New" panose="02070309020205020404" pitchFamily="49" charset="0"/>
-                <a:cs typeface="Courier New" panose="02070309020205020404" pitchFamily="49" charset="0"/>
-              </a:defRPr>
-            </a:lvl1pPr>
-          </a:lstStyle>
-          <a:p>
-            <a:r>
-              <a:rPr lang="en-US" dirty="0"/>
-              <a:t>a</a:t>
-            </a:r>
-          </a:p>
-        </p:txBody>
-      </p:sp>
-      <p:sp>
-        <p:nvSpPr>
-          <p:cNvPr id="103" name="TextBox 102">
-            <a:extLst>
-              <a:ext uri="{FF2B5EF4-FFF2-40B4-BE49-F238E27FC236}">
-                <a16:creationId xmlns:a16="http://schemas.microsoft.com/office/drawing/2014/main" id="{1575B748-BC68-4CFD-8CCA-7EB9518B465B}"/>
-              </a:ext>
-            </a:extLst>
-          </p:cNvPr>
-          <p:cNvSpPr txBox="1"/>
-          <p:nvPr/>
-        </p:nvSpPr>
-        <p:spPr>
-          <a:xfrm flipH="1">
-            <a:off x="6534912" y="2962656"/>
-            <a:ext cx="420624" cy="369332"/>
-          </a:xfrm>
-          <a:prstGeom prst="rect">
-            <a:avLst/>
-          </a:prstGeom>
-          <a:solidFill>
-            <a:schemeClr val="bg1"/>
-          </a:solidFill>
-        </p:spPr>
-        <p:txBody>
-          <a:bodyPr wrap="square" rtlCol="0">
-            <a:spAutoFit/>
-          </a:bodyPr>
-          <a:lstStyle>
-            <a:defPPr>
-              <a:defRPr lang="en-US"/>
-            </a:defPPr>
-            <a:lvl1pPr>
-              <a:defRPr b="1">
-                <a:solidFill>
-                  <a:schemeClr val="accent2">
-                    <a:lumMod val="75000"/>
-                  </a:schemeClr>
-                </a:solidFill>
-                <a:latin typeface="Courier New" panose="02070309020205020404" pitchFamily="49" charset="0"/>
-                <a:cs typeface="Courier New" panose="02070309020205020404" pitchFamily="49" charset="0"/>
-              </a:defRPr>
-            </a:lvl1pPr>
-          </a:lstStyle>
-          <a:p>
-            <a:r>
-              <a:rPr lang="en-US" dirty="0"/>
-              <a:t>a</a:t>
-            </a:r>
-          </a:p>
-        </p:txBody>
-      </p:sp>
-      <p:sp>
-        <p:nvSpPr>
-          <p:cNvPr id="104" name="TextBox 103">
-            <a:extLst>
-              <a:ext uri="{FF2B5EF4-FFF2-40B4-BE49-F238E27FC236}">
-                <a16:creationId xmlns:a16="http://schemas.microsoft.com/office/drawing/2014/main" id="{03B9BB02-0A20-4035-A314-6500C1A3EFEA}"/>
-              </a:ext>
-            </a:extLst>
-          </p:cNvPr>
-          <p:cNvSpPr txBox="1"/>
-          <p:nvPr/>
-        </p:nvSpPr>
-        <p:spPr>
-          <a:xfrm flipH="1">
-            <a:off x="5248656" y="4712208"/>
-            <a:ext cx="420624" cy="369332"/>
-          </a:xfrm>
-          <a:prstGeom prst="rect">
-            <a:avLst/>
-          </a:prstGeom>
-          <a:solidFill>
-            <a:schemeClr val="bg1"/>
-          </a:solidFill>
-        </p:spPr>
-        <p:txBody>
-          <a:bodyPr wrap="square" rtlCol="0">
-            <a:spAutoFit/>
-          </a:bodyPr>
-          <a:lstStyle>
-            <a:defPPr>
-              <a:defRPr lang="en-US"/>
-            </a:defPPr>
-            <a:lvl1pPr>
-              <a:defRPr b="1">
-                <a:solidFill>
-                  <a:schemeClr val="accent2">
-                    <a:lumMod val="75000"/>
-                  </a:schemeClr>
-                </a:solidFill>
-                <a:latin typeface="Courier New" panose="02070309020205020404" pitchFamily="49" charset="0"/>
-                <a:cs typeface="Courier New" panose="02070309020205020404" pitchFamily="49" charset="0"/>
-              </a:defRPr>
-            </a:lvl1pPr>
-          </a:lstStyle>
-          <a:p>
-            <a:r>
-              <a:rPr lang="en-US" dirty="0"/>
-              <a:t>a</a:t>
-            </a:r>
-          </a:p>
-        </p:txBody>
-      </p:sp>
-      <p:sp>
-        <p:nvSpPr>
-          <p:cNvPr id="107" name="Rectangle 106">
-            <a:extLst>
-              <a:ext uri="{FF2B5EF4-FFF2-40B4-BE49-F238E27FC236}">
-                <a16:creationId xmlns:a16="http://schemas.microsoft.com/office/drawing/2014/main" id="{CBA756AA-71BD-413D-93C8-BAE6C900E028}"/>
-              </a:ext>
-            </a:extLst>
-          </p:cNvPr>
-          <p:cNvSpPr/>
-          <p:nvPr/>
-        </p:nvSpPr>
-        <p:spPr>
-          <a:xfrm>
-            <a:off x="5242126" y="5292590"/>
-            <a:ext cx="2114681" cy="369332"/>
-          </a:xfrm>
-          <a:prstGeom prst="rect">
-            <a:avLst/>
-          </a:prstGeom>
-          <a:solidFill>
-            <a:schemeClr val="bg1"/>
-          </a:solidFill>
-        </p:spPr>
-        <p:txBody>
-          <a:bodyPr wrap="square" rtlCol="0">
-            <a:spAutoFit/>
-          </a:bodyPr>
-          <a:lstStyle/>
-          <a:p>
-            <a:r>
-              <a:rPr lang="en-US" b="1" dirty="0" err="1">
-                <a:solidFill>
-                  <a:schemeClr val="accent2">
-                    <a:lumMod val="75000"/>
-                  </a:schemeClr>
-                </a:solidFill>
-                <a:latin typeface="Courier New" panose="02070309020205020404" pitchFamily="49" charset="0"/>
-                <a:cs typeface="Courier New" panose="02070309020205020404" pitchFamily="49" charset="0"/>
-              </a:rPr>
-              <a:t>time:inXSDDate</a:t>
-            </a:r>
-            <a:endParaRPr lang="en-US" b="1" dirty="0">
-              <a:solidFill>
-                <a:schemeClr val="accent2">
-                  <a:lumMod val="75000"/>
-                </a:schemeClr>
-              </a:solidFill>
-              <a:latin typeface="Courier New" panose="02070309020205020404" pitchFamily="49" charset="0"/>
-              <a:cs typeface="Courier New" panose="02070309020205020404" pitchFamily="49" charset="0"/>
-            </a:endParaRPr>
-          </a:p>
-        </p:txBody>
-      </p:sp>
-      <p:sp>
-        <p:nvSpPr>
-          <p:cNvPr id="109" name="Rectangle 108">
-            <a:extLst>
-              <a:ext uri="{FF2B5EF4-FFF2-40B4-BE49-F238E27FC236}">
-                <a16:creationId xmlns:a16="http://schemas.microsoft.com/office/drawing/2014/main" id="{7753650D-E3D5-4A84-9104-0960BCEF32EC}"/>
-              </a:ext>
-            </a:extLst>
-          </p:cNvPr>
-          <p:cNvSpPr/>
-          <p:nvPr/>
-        </p:nvSpPr>
-        <p:spPr>
-          <a:xfrm>
-            <a:off x="6467422" y="3640574"/>
-            <a:ext cx="2114681" cy="369332"/>
-          </a:xfrm>
-          <a:prstGeom prst="rect">
-            <a:avLst/>
-          </a:prstGeom>
-          <a:solidFill>
-            <a:schemeClr val="bg1"/>
-          </a:solidFill>
-        </p:spPr>
-        <p:txBody>
-          <a:bodyPr wrap="square" rtlCol="0">
-            <a:spAutoFit/>
-          </a:bodyPr>
-          <a:lstStyle/>
-          <a:p>
-            <a:r>
-              <a:rPr lang="en-US" b="1" dirty="0" err="1">
-                <a:solidFill>
-                  <a:schemeClr val="accent2">
-                    <a:lumMod val="75000"/>
-                  </a:schemeClr>
-                </a:solidFill>
-                <a:latin typeface="Courier New" panose="02070309020205020404" pitchFamily="49" charset="0"/>
-                <a:cs typeface="Courier New" panose="02070309020205020404" pitchFamily="49" charset="0"/>
-              </a:rPr>
-              <a:t>time:inXSDDate</a:t>
-            </a:r>
-            <a:endParaRPr lang="en-US" b="1" dirty="0">
-              <a:solidFill>
-                <a:schemeClr val="accent2">
-                  <a:lumMod val="75000"/>
-                </a:schemeClr>
-              </a:solidFill>
-              <a:latin typeface="Courier New" panose="02070309020205020404" pitchFamily="49" charset="0"/>
-              <a:cs typeface="Courier New" panose="02070309020205020404" pitchFamily="49" charset="0"/>
-            </a:endParaRPr>
-          </a:p>
-        </p:txBody>
-      </p:sp>
-    </p:spTree>
-    <p:extLst>
-      <p:ext uri="{BB962C8B-B14F-4D97-AF65-F5344CB8AC3E}">
-        <p14:creationId xmlns:p14="http://schemas.microsoft.com/office/powerpoint/2010/main" val="758022510"/>
-      </p:ext>
-    </p:extLst>
-  </p:cSld>
-  <p:clrMapOvr>
-    <a:masterClrMapping/>
-  </p:clrMapOvr>
-</p:sld>
-</file>
-
-<file path=ppt/slides/slide4.xml><?xml version="1.0" encoding="utf-8"?>
-<p:sld xmlns:a="http://schemas.openxmlformats.org/drawingml/2006/main" xmlns:r="http://schemas.openxmlformats.org/officeDocument/2006/relationships" xmlns:p="http://schemas.openxmlformats.org/presentationml/2006/main">
-  <p:cSld>
-    <p:spTree>
-      <p:nvGrpSpPr>
-        <p:cNvPr id="1" name=""/>
-        <p:cNvGrpSpPr/>
-        <p:nvPr/>
-      </p:nvGrpSpPr>
-      <p:grpSpPr>
-        <a:xfrm>
-          <a:off x="0" y="0"/>
-          <a:ext cx="0" cy="0"/>
-          <a:chOff x="0" y="0"/>
-          <a:chExt cx="0" cy="0"/>
-        </a:xfrm>
-      </p:grpSpPr>
-      <p:sp>
-        <p:nvSpPr>
-          <p:cNvPr id="4" name="Rectangle: Rounded Corners 3"/>
-          <p:cNvSpPr/>
-          <p:nvPr/>
-        </p:nvSpPr>
-        <p:spPr>
-          <a:xfrm>
-            <a:off x="992472" y="602691"/>
-            <a:ext cx="2613937" cy="449588"/>
-          </a:xfrm>
-          <a:prstGeom prst="roundRect">
-            <a:avLst/>
-          </a:prstGeom>
-          <a:solidFill>
-            <a:schemeClr val="accent6">
-              <a:lumMod val="40000"/>
-              <a:lumOff val="60000"/>
-            </a:schemeClr>
-          </a:solidFill>
-          <a:ln>
-            <a:solidFill>
-              <a:schemeClr val="tx1"/>
-            </a:solidFill>
-          </a:ln>
-        </p:spPr>
-        <p:style>
-          <a:lnRef idx="2">
-            <a:schemeClr val="accent1">
-              <a:shade val="50000"/>
-            </a:schemeClr>
-          </a:lnRef>
-          <a:fillRef idx="1">
-            <a:schemeClr val="accent1"/>
-          </a:fillRef>
-          <a:effectRef idx="0">
-            <a:schemeClr val="accent1"/>
-          </a:effectRef>
-          <a:fontRef idx="minor">
-            <a:schemeClr val="lt1"/>
-          </a:fontRef>
-        </p:style>
-        <p:txBody>
-          <a:bodyPr rtlCol="0" anchor="ctr"/>
-          <a:lstStyle/>
-          <a:p>
-            <a:pPr algn="ctr"/>
-            <a:r>
-              <a:rPr lang="en-US" sz="1600" dirty="0">
-                <a:solidFill>
-                  <a:schemeClr val="tx1"/>
-                </a:solidFill>
-              </a:rPr>
-              <a:t>cj16050:</a:t>
-            </a:r>
-            <a:r>
-              <a:rPr lang="en-US" b="1" dirty="0">
-                <a:solidFill>
-                  <a:schemeClr val="tx1"/>
-                </a:solidFill>
-              </a:rPr>
-              <a:t>Animal_99M91</a:t>
-            </a:r>
-          </a:p>
-        </p:txBody>
-      </p:sp>
-      <p:sp>
-        <p:nvSpPr>
-          <p:cNvPr id="10" name="Rectangle: Rounded Corners 9">
-            <a:extLst>
-              <a:ext uri="{FF2B5EF4-FFF2-40B4-BE49-F238E27FC236}">
-                <a16:creationId xmlns:a16="http://schemas.microsoft.com/office/drawing/2014/main" id="{6B507A6C-DA4D-4A07-AC87-C4CECFA5297B}"/>
-              </a:ext>
-            </a:extLst>
-          </p:cNvPr>
-          <p:cNvSpPr/>
-          <p:nvPr/>
-        </p:nvSpPr>
-        <p:spPr>
-          <a:xfrm>
-            <a:off x="5872963" y="598984"/>
-            <a:ext cx="2468880" cy="457001"/>
-          </a:xfrm>
-          <a:prstGeom prst="roundRect">
-            <a:avLst/>
-          </a:prstGeom>
-          <a:solidFill>
-            <a:schemeClr val="accent1">
-              <a:lumMod val="40000"/>
-              <a:lumOff val="60000"/>
-            </a:schemeClr>
-          </a:solidFill>
-          <a:ln w="38100">
-            <a:solidFill>
-              <a:schemeClr val="accent1">
-                <a:lumMod val="75000"/>
-              </a:schemeClr>
-            </a:solidFill>
-          </a:ln>
-        </p:spPr>
-        <p:style>
-          <a:lnRef idx="2">
-            <a:schemeClr val="accent1">
-              <a:shade val="50000"/>
-            </a:schemeClr>
-          </a:lnRef>
-          <a:fillRef idx="1">
-            <a:schemeClr val="accent1"/>
-          </a:fillRef>
-          <a:effectRef idx="0">
-            <a:schemeClr val="accent1"/>
-          </a:effectRef>
-          <a:fontRef idx="minor">
-            <a:schemeClr val="lt1"/>
-          </a:fontRef>
-        </p:style>
-        <p:txBody>
-          <a:bodyPr rtlCol="0" anchor="ctr"/>
-          <a:lstStyle/>
-          <a:p>
-            <a:pPr algn="ctr"/>
-            <a:r>
-              <a:rPr lang="en-US" sz="1600" dirty="0" err="1">
-                <a:solidFill>
-                  <a:schemeClr val="tx1"/>
-                </a:solidFill>
-              </a:rPr>
-              <a:t>study:</a:t>
-            </a:r>
-            <a:r>
-              <a:rPr lang="en-US" b="1" dirty="0" err="1">
-                <a:solidFill>
-                  <a:schemeClr val="tx1"/>
-                </a:solidFill>
-              </a:rPr>
-              <a:t>AnimalSubject</a:t>
-            </a:r>
-            <a:endParaRPr lang="en-US" b="1" dirty="0">
-              <a:solidFill>
-                <a:schemeClr val="tx1"/>
-              </a:solidFill>
-            </a:endParaRPr>
-          </a:p>
-        </p:txBody>
-      </p:sp>
-      <p:cxnSp>
-        <p:nvCxnSpPr>
-          <p:cNvPr id="16" name="Straight Arrow Connector 15">
-            <a:extLst>
-              <a:ext uri="{FF2B5EF4-FFF2-40B4-BE49-F238E27FC236}">
-                <a16:creationId xmlns:a16="http://schemas.microsoft.com/office/drawing/2014/main" id="{2BD3BC57-ACA0-4E8B-A760-B1A2EC9E7B20}"/>
-              </a:ext>
-            </a:extLst>
-          </p:cNvPr>
-          <p:cNvCxnSpPr>
-            <a:cxnSpLocks/>
-            <a:stCxn id="4" idx="3"/>
-            <a:endCxn id="10" idx="1"/>
-          </p:cNvCxnSpPr>
-          <p:nvPr/>
-        </p:nvCxnSpPr>
-        <p:spPr>
-          <a:xfrm>
-            <a:off x="3606409" y="827485"/>
-            <a:ext cx="2266554" cy="0"/>
-          </a:xfrm>
-          <a:prstGeom prst="straightConnector1">
-            <a:avLst/>
-          </a:prstGeom>
-          <a:ln w="50800">
-            <a:solidFill>
-              <a:schemeClr val="bg1">
-                <a:lumMod val="50000"/>
-              </a:schemeClr>
-            </a:solidFill>
-            <a:tailEnd type="triangle"/>
-          </a:ln>
-        </p:spPr>
-        <p:style>
-          <a:lnRef idx="1">
-            <a:schemeClr val="accent1"/>
-          </a:lnRef>
-          <a:fillRef idx="0">
-            <a:schemeClr val="accent1"/>
-          </a:fillRef>
-          <a:effectRef idx="0">
-            <a:schemeClr val="accent1"/>
-          </a:effectRef>
-          <a:fontRef idx="minor">
-            <a:schemeClr val="tx1"/>
-          </a:fontRef>
-        </p:style>
-      </p:cxnSp>
-      <p:sp>
-        <p:nvSpPr>
-          <p:cNvPr id="22" name="Rectangle: Rounded Corners 21">
-            <a:extLst>
-              <a:ext uri="{FF2B5EF4-FFF2-40B4-BE49-F238E27FC236}">
-                <a16:creationId xmlns:a16="http://schemas.microsoft.com/office/drawing/2014/main" id="{A80CEA84-AC4C-4D17-B914-0EB2393DC44E}"/>
-              </a:ext>
-            </a:extLst>
-          </p:cNvPr>
-          <p:cNvSpPr/>
-          <p:nvPr/>
-        </p:nvSpPr>
-        <p:spPr>
-          <a:xfrm>
-            <a:off x="5872963" y="1972158"/>
-            <a:ext cx="2468880" cy="457001"/>
-          </a:xfrm>
-          <a:prstGeom prst="roundRect">
-            <a:avLst/>
-          </a:prstGeom>
-          <a:solidFill>
-            <a:schemeClr val="accent1">
-              <a:lumMod val="40000"/>
-              <a:lumOff val="60000"/>
-            </a:schemeClr>
-          </a:solidFill>
-          <a:ln w="38100">
-            <a:solidFill>
-              <a:schemeClr val="accent1">
-                <a:lumMod val="75000"/>
-              </a:schemeClr>
-            </a:solidFill>
-          </a:ln>
-        </p:spPr>
-        <p:style>
-          <a:lnRef idx="2">
-            <a:schemeClr val="accent1">
-              <a:shade val="50000"/>
-            </a:schemeClr>
-          </a:lnRef>
-          <a:fillRef idx="1">
-            <a:schemeClr val="accent1"/>
-          </a:fillRef>
-          <a:effectRef idx="0">
-            <a:schemeClr val="accent1"/>
-          </a:effectRef>
-          <a:fontRef idx="minor">
-            <a:schemeClr val="lt1"/>
-          </a:fontRef>
-        </p:style>
-        <p:txBody>
-          <a:bodyPr rtlCol="0" anchor="ctr"/>
-          <a:lstStyle/>
-          <a:p>
-            <a:pPr algn="ctr"/>
-            <a:r>
-              <a:rPr lang="en-US" sz="1600" dirty="0" err="1">
-                <a:solidFill>
-                  <a:schemeClr val="tx1"/>
-                </a:solidFill>
-              </a:rPr>
-              <a:t>study:</a:t>
-            </a:r>
-            <a:r>
-              <a:rPr lang="en-US" b="1" dirty="0" err="1">
-                <a:solidFill>
-                  <a:schemeClr val="tx1"/>
-                </a:solidFill>
-              </a:rPr>
-              <a:t>ReferenceInterval</a:t>
-            </a:r>
-            <a:endParaRPr lang="en-US" b="1" dirty="0">
-              <a:solidFill>
-                <a:schemeClr val="tx1"/>
-              </a:solidFill>
-            </a:endParaRPr>
-          </a:p>
-        </p:txBody>
-      </p:sp>
-      <p:cxnSp>
-        <p:nvCxnSpPr>
-          <p:cNvPr id="23" name="Straight Arrow Connector 22">
-            <a:extLst>
-              <a:ext uri="{FF2B5EF4-FFF2-40B4-BE49-F238E27FC236}">
-                <a16:creationId xmlns:a16="http://schemas.microsoft.com/office/drawing/2014/main" id="{1DA770EC-9121-483A-9ECC-050B87E2EE9E}"/>
-              </a:ext>
-            </a:extLst>
-          </p:cNvPr>
-          <p:cNvCxnSpPr>
-            <a:cxnSpLocks/>
-            <a:stCxn id="15" idx="3"/>
-            <a:endCxn id="22" idx="1"/>
-          </p:cNvCxnSpPr>
-          <p:nvPr/>
-        </p:nvCxnSpPr>
-        <p:spPr>
-          <a:xfrm>
-            <a:off x="4343400" y="2200659"/>
-            <a:ext cx="1529563" cy="0"/>
-          </a:xfrm>
-          <a:prstGeom prst="straightConnector1">
-            <a:avLst/>
-          </a:prstGeom>
-          <a:ln w="50800">
-            <a:solidFill>
-              <a:schemeClr val="bg1">
-                <a:lumMod val="50000"/>
-              </a:schemeClr>
-            </a:solidFill>
-            <a:tailEnd type="triangle"/>
-          </a:ln>
-        </p:spPr>
-        <p:style>
-          <a:lnRef idx="1">
-            <a:schemeClr val="accent1"/>
-          </a:lnRef>
-          <a:fillRef idx="0">
-            <a:schemeClr val="accent1"/>
-          </a:fillRef>
-          <a:effectRef idx="0">
-            <a:schemeClr val="accent1"/>
-          </a:effectRef>
-          <a:fontRef idx="minor">
-            <a:schemeClr val="tx1"/>
-          </a:fontRef>
-        </p:style>
-      </p:cxnSp>
-      <p:cxnSp>
-        <p:nvCxnSpPr>
-          <p:cNvPr id="30" name="Straight Arrow Connector 29">
-            <a:extLst>
-              <a:ext uri="{FF2B5EF4-FFF2-40B4-BE49-F238E27FC236}">
-                <a16:creationId xmlns:a16="http://schemas.microsoft.com/office/drawing/2014/main" id="{769D4B6A-7F30-4FB5-B811-ACFD7653AAE5}"/>
-              </a:ext>
-            </a:extLst>
-          </p:cNvPr>
-          <p:cNvCxnSpPr>
-            <a:cxnSpLocks/>
-            <a:stCxn id="15" idx="2"/>
-            <a:endCxn id="47" idx="0"/>
-          </p:cNvCxnSpPr>
-          <p:nvPr/>
-        </p:nvCxnSpPr>
-        <p:spPr>
-          <a:xfrm>
-            <a:off x="2299440" y="2429159"/>
-            <a:ext cx="2569464" cy="852065"/>
-          </a:xfrm>
-          <a:prstGeom prst="straightConnector1">
-            <a:avLst/>
-          </a:prstGeom>
-          <a:ln w="50800">
-            <a:solidFill>
-              <a:schemeClr val="bg1">
-                <a:lumMod val="50000"/>
-              </a:schemeClr>
-            </a:solidFill>
-            <a:tailEnd type="triangle"/>
-          </a:ln>
-        </p:spPr>
-        <p:style>
-          <a:lnRef idx="1">
-            <a:schemeClr val="accent1"/>
-          </a:lnRef>
-          <a:fillRef idx="0">
-            <a:schemeClr val="accent1"/>
-          </a:fillRef>
-          <a:effectRef idx="0">
-            <a:schemeClr val="accent1"/>
-          </a:effectRef>
-          <a:fontRef idx="minor">
-            <a:schemeClr val="tx1"/>
-          </a:fontRef>
-        </p:style>
-      </p:cxnSp>
-      <p:grpSp>
-        <p:nvGrpSpPr>
-          <p:cNvPr id="38" name="Group 37">
-            <a:extLst>
-              <a:ext uri="{FF2B5EF4-FFF2-40B4-BE49-F238E27FC236}">
-                <a16:creationId xmlns:a16="http://schemas.microsoft.com/office/drawing/2014/main" id="{FD57785F-5ED7-49A8-86E0-7E9316E39A31}"/>
-              </a:ext>
-            </a:extLst>
-          </p:cNvPr>
-          <p:cNvGrpSpPr/>
-          <p:nvPr/>
-        </p:nvGrpSpPr>
-        <p:grpSpPr>
-          <a:xfrm>
-            <a:off x="377759" y="1052279"/>
-            <a:ext cx="3843362" cy="919879"/>
-            <a:chOff x="240958" y="1052279"/>
-            <a:chExt cx="3843362" cy="919879"/>
-          </a:xfrm>
-        </p:grpSpPr>
-        <p:cxnSp>
-          <p:nvCxnSpPr>
-            <p:cNvPr id="17" name="Straight Arrow Connector 16">
-              <a:extLst>
-                <a:ext uri="{FF2B5EF4-FFF2-40B4-BE49-F238E27FC236}">
-                  <a16:creationId xmlns:a16="http://schemas.microsoft.com/office/drawing/2014/main" id="{29F0277E-AD84-48E5-9890-328F2C49D080}"/>
-                </a:ext>
-              </a:extLst>
-            </p:cNvPr>
-            <p:cNvCxnSpPr>
-              <a:cxnSpLocks/>
-              <a:stCxn id="4" idx="2"/>
-              <a:endCxn id="15" idx="0"/>
-            </p:cNvCxnSpPr>
-            <p:nvPr/>
-          </p:nvCxnSpPr>
-          <p:spPr>
-            <a:xfrm flipH="1">
-              <a:off x="2299440" y="1052279"/>
-              <a:ext cx="1" cy="919879"/>
+              <a:off x="2162639" y="1052279"/>
+              <a:ext cx="0" cy="919879"/>
             </a:xfrm>
             <a:prstGeom prst="straightConnector1">
               <a:avLst/>
@@ -7295,7 +5591,7 @@
                   <a:schemeClr val="tx1"/>
                 </a:solidFill>
               </a:rPr>
-              <a:t>:Interval_2016-12-07_2016_12-06</a:t>
+              <a:t>:Interval_2016-12-07_2016-12-06</a:t>
             </a:r>
           </a:p>
         </p:txBody>
@@ -7686,7 +5982,7 @@
 </p:sld>
 </file>
 
-<file path=ppt/slides/slide5.xml><?xml version="1.0" encoding="utf-8"?>
+<file path=ppt/slides/slide4.xml><?xml version="1.0" encoding="utf-8"?>
 <p:sld xmlns:a="http://schemas.openxmlformats.org/drawingml/2006/main" xmlns:r="http://schemas.openxmlformats.org/officeDocument/2006/relationships" xmlns:p="http://schemas.openxmlformats.org/presentationml/2006/main">
   <p:cSld>
     <p:spTree>

</xml_diff>

<commit_message>
reworked documentation for the first constraint.
</commit_message>
<xml_diff>
--- a/doc/images/ImageSources.pptx
+++ b/doc/images/ImageSources.pptx
@@ -258,7 +258,7 @@
           <a:p>
             <a:fld id="{03ABD037-9D82-4436-AC70-ED75D2FE9417}" type="datetimeFigureOut">
               <a:rPr lang="en-US" smtClean="0"/>
-              <a:t>8/1/2019</a:t>
+              <a:t>8/2/2019</a:t>
             </a:fld>
             <a:endParaRPr lang="en-US"/>
           </a:p>
@@ -426,7 +426,7 @@
           <a:p>
             <a:fld id="{03ABD037-9D82-4436-AC70-ED75D2FE9417}" type="datetimeFigureOut">
               <a:rPr lang="en-US" smtClean="0"/>
-              <a:t>8/1/2019</a:t>
+              <a:t>8/2/2019</a:t>
             </a:fld>
             <a:endParaRPr lang="en-US"/>
           </a:p>
@@ -604,7 +604,7 @@
           <a:p>
             <a:fld id="{03ABD037-9D82-4436-AC70-ED75D2FE9417}" type="datetimeFigureOut">
               <a:rPr lang="en-US" smtClean="0"/>
-              <a:t>8/1/2019</a:t>
+              <a:t>8/2/2019</a:t>
             </a:fld>
             <a:endParaRPr lang="en-US"/>
           </a:p>
@@ -772,7 +772,7 @@
           <a:p>
             <a:fld id="{03ABD037-9D82-4436-AC70-ED75D2FE9417}" type="datetimeFigureOut">
               <a:rPr lang="en-US" smtClean="0"/>
-              <a:t>8/1/2019</a:t>
+              <a:t>8/2/2019</a:t>
             </a:fld>
             <a:endParaRPr lang="en-US"/>
           </a:p>
@@ -1017,7 +1017,7 @@
           <a:p>
             <a:fld id="{03ABD037-9D82-4436-AC70-ED75D2FE9417}" type="datetimeFigureOut">
               <a:rPr lang="en-US" smtClean="0"/>
-              <a:t>8/1/2019</a:t>
+              <a:t>8/2/2019</a:t>
             </a:fld>
             <a:endParaRPr lang="en-US"/>
           </a:p>
@@ -1246,7 +1246,7 @@
           <a:p>
             <a:fld id="{03ABD037-9D82-4436-AC70-ED75D2FE9417}" type="datetimeFigureOut">
               <a:rPr lang="en-US" smtClean="0"/>
-              <a:t>8/1/2019</a:t>
+              <a:t>8/2/2019</a:t>
             </a:fld>
             <a:endParaRPr lang="en-US"/>
           </a:p>
@@ -1610,7 +1610,7 @@
           <a:p>
             <a:fld id="{03ABD037-9D82-4436-AC70-ED75D2FE9417}" type="datetimeFigureOut">
               <a:rPr lang="en-US" smtClean="0"/>
-              <a:t>8/1/2019</a:t>
+              <a:t>8/2/2019</a:t>
             </a:fld>
             <a:endParaRPr lang="en-US"/>
           </a:p>
@@ -1727,7 +1727,7 @@
           <a:p>
             <a:fld id="{03ABD037-9D82-4436-AC70-ED75D2FE9417}" type="datetimeFigureOut">
               <a:rPr lang="en-US" smtClean="0"/>
-              <a:t>8/1/2019</a:t>
+              <a:t>8/2/2019</a:t>
             </a:fld>
             <a:endParaRPr lang="en-US"/>
           </a:p>
@@ -1822,7 +1822,7 @@
           <a:p>
             <a:fld id="{03ABD037-9D82-4436-AC70-ED75D2FE9417}" type="datetimeFigureOut">
               <a:rPr lang="en-US" smtClean="0"/>
-              <a:t>8/1/2019</a:t>
+              <a:t>8/2/2019</a:t>
             </a:fld>
             <a:endParaRPr lang="en-US"/>
           </a:p>
@@ -2097,7 +2097,7 @@
           <a:p>
             <a:fld id="{03ABD037-9D82-4436-AC70-ED75D2FE9417}" type="datetimeFigureOut">
               <a:rPr lang="en-US" smtClean="0"/>
-              <a:t>8/1/2019</a:t>
+              <a:t>8/2/2019</a:t>
             </a:fld>
             <a:endParaRPr lang="en-US"/>
           </a:p>
@@ -2349,7 +2349,7 @@
           <a:p>
             <a:fld id="{03ABD037-9D82-4436-AC70-ED75D2FE9417}" type="datetimeFigureOut">
               <a:rPr lang="en-US" smtClean="0"/>
-              <a:t>8/1/2019</a:t>
+              <a:t>8/2/2019</a:t>
             </a:fld>
             <a:endParaRPr lang="en-US"/>
           </a:p>
@@ -2560,7 +2560,7 @@
           <a:p>
             <a:fld id="{03ABD037-9D82-4436-AC70-ED75D2FE9417}" type="datetimeFigureOut">
               <a:rPr lang="en-US" smtClean="0"/>
-              <a:t>8/1/2019</a:t>
+              <a:t>8/2/2019</a:t>
             </a:fld>
             <a:endParaRPr lang="en-US"/>
           </a:p>
@@ -4343,7 +4343,7 @@
         </p:nvSpPr>
         <p:spPr>
           <a:xfrm>
-            <a:off x="5872963" y="598984"/>
+            <a:off x="5872963" y="161662"/>
             <a:ext cx="2971800" cy="457001"/>
           </a:xfrm>
           <a:prstGeom prst="roundRect">
@@ -4425,9 +4425,9 @@
           <p:nvPr/>
         </p:nvCxnSpPr>
         <p:spPr>
-          <a:xfrm>
-            <a:off x="3505313" y="827485"/>
-            <a:ext cx="2367650" cy="0"/>
+          <a:xfrm flipV="1">
+            <a:off x="3505313" y="390163"/>
+            <a:ext cx="2367650" cy="437322"/>
           </a:xfrm>
           <a:prstGeom prst="straightConnector1">
             <a:avLst/>
@@ -5612,7 +5612,7 @@
         </p:nvSpPr>
         <p:spPr>
           <a:xfrm flipH="1">
-            <a:off x="4704311" y="621792"/>
+            <a:off x="4614859" y="462766"/>
             <a:ext cx="329184" cy="369332"/>
           </a:xfrm>
           <a:prstGeom prst="rect">
@@ -5966,6 +5966,195 @@
             <a:r>
               <a:rPr lang="en-US" dirty="0" err="1"/>
               <a:t>hasEnd</a:t>
+            </a:r>
+            <a:endParaRPr lang="en-US" dirty="0"/>
+          </a:p>
+        </p:txBody>
+      </p:sp>
+      <p:sp>
+        <p:nvSpPr>
+          <p:cNvPr id="32" name="Rectangle: Rounded Corners 31">
+            <a:extLst>
+              <a:ext uri="{FF2B5EF4-FFF2-40B4-BE49-F238E27FC236}">
+                <a16:creationId xmlns:a16="http://schemas.microsoft.com/office/drawing/2014/main" id="{011D1156-12EC-4598-9970-0AF968E190D1}"/>
+              </a:ext>
+            </a:extLst>
+          </p:cNvPr>
+          <p:cNvSpPr/>
+          <p:nvPr/>
+        </p:nvSpPr>
+        <p:spPr>
+          <a:xfrm>
+            <a:off x="7811472" y="1250296"/>
+            <a:ext cx="2971800" cy="457001"/>
+          </a:xfrm>
+          <a:prstGeom prst="roundRect">
+            <a:avLst/>
+          </a:prstGeom>
+          <a:solidFill>
+            <a:schemeClr val="bg1"/>
+          </a:solidFill>
+          <a:ln>
+            <a:solidFill>
+              <a:schemeClr val="tx1"/>
+            </a:solidFill>
+          </a:ln>
+        </p:spPr>
+        <p:style>
+          <a:lnRef idx="2">
+            <a:schemeClr val="accent1">
+              <a:shade val="50000"/>
+            </a:schemeClr>
+          </a:lnRef>
+          <a:fillRef idx="1">
+            <a:schemeClr val="accent1"/>
+          </a:fillRef>
+          <a:effectRef idx="0">
+            <a:schemeClr val="accent1"/>
+          </a:effectRef>
+          <a:fontRef idx="minor">
+            <a:schemeClr val="lt1"/>
+          </a:fontRef>
+        </p:style>
+        <p:txBody>
+          <a:bodyPr rtlCol="0" anchor="ctr"/>
+          <a:lstStyle/>
+          <a:p>
+            <a:pPr algn="ctr"/>
+            <a:r>
+              <a:rPr lang="en-US" b="1" dirty="0">
+                <a:solidFill>
+                  <a:schemeClr val="tx1"/>
+                </a:solidFill>
+              </a:rPr>
+              <a:t>“Animal 99T1”</a:t>
+            </a:r>
+            <a:r>
+              <a:rPr lang="en-US" b="1" dirty="0">
+                <a:solidFill>
+                  <a:schemeClr val="accent2">
+                    <a:lumMod val="75000"/>
+                  </a:schemeClr>
+                </a:solidFill>
+              </a:rPr>
+              <a:t>^^</a:t>
+            </a:r>
+            <a:r>
+              <a:rPr lang="en-US" b="1" dirty="0" err="1">
+                <a:solidFill>
+                  <a:schemeClr val="accent2">
+                    <a:lumMod val="75000"/>
+                  </a:schemeClr>
+                </a:solidFill>
+              </a:rPr>
+              <a:t>xsd:string</a:t>
+            </a:r>
+            <a:endParaRPr lang="en-US" b="1" dirty="0">
+              <a:solidFill>
+                <a:schemeClr val="accent2">
+                  <a:lumMod val="75000"/>
+                </a:schemeClr>
+              </a:solidFill>
+            </a:endParaRPr>
+          </a:p>
+        </p:txBody>
+      </p:sp>
+      <p:cxnSp>
+        <p:nvCxnSpPr>
+          <p:cNvPr id="33" name="Straight Arrow Connector 32">
+            <a:extLst>
+              <a:ext uri="{FF2B5EF4-FFF2-40B4-BE49-F238E27FC236}">
+                <a16:creationId xmlns:a16="http://schemas.microsoft.com/office/drawing/2014/main" id="{98C26F41-E40F-4000-A4F9-44F51C0FD964}"/>
+              </a:ext>
+            </a:extLst>
+          </p:cNvPr>
+          <p:cNvCxnSpPr>
+            <a:cxnSpLocks/>
+            <a:stCxn id="4" idx="3"/>
+            <a:endCxn id="32" idx="1"/>
+          </p:cNvCxnSpPr>
+          <p:nvPr/>
+        </p:nvCxnSpPr>
+        <p:spPr>
+          <a:xfrm>
+            <a:off x="3505313" y="827485"/>
+            <a:ext cx="4306159" cy="651312"/>
+          </a:xfrm>
+          <a:prstGeom prst="straightConnector1">
+            <a:avLst/>
+          </a:prstGeom>
+          <a:ln w="50800">
+            <a:solidFill>
+              <a:schemeClr val="bg1">
+                <a:lumMod val="50000"/>
+              </a:schemeClr>
+            </a:solidFill>
+            <a:tailEnd type="triangle"/>
+          </a:ln>
+        </p:spPr>
+        <p:style>
+          <a:lnRef idx="1">
+            <a:schemeClr val="accent1"/>
+          </a:lnRef>
+          <a:fillRef idx="0">
+            <a:schemeClr val="accent1"/>
+          </a:fillRef>
+          <a:effectRef idx="0">
+            <a:schemeClr val="accent1"/>
+          </a:effectRef>
+          <a:fontRef idx="minor">
+            <a:schemeClr val="tx1"/>
+          </a:fontRef>
+        </p:style>
+      </p:cxnSp>
+      <p:sp>
+        <p:nvSpPr>
+          <p:cNvPr id="36" name="TextBox 35">
+            <a:extLst>
+              <a:ext uri="{FF2B5EF4-FFF2-40B4-BE49-F238E27FC236}">
+                <a16:creationId xmlns:a16="http://schemas.microsoft.com/office/drawing/2014/main" id="{933A4379-0D39-48A8-9C14-0C0680E24CAD}"/>
+              </a:ext>
+            </a:extLst>
+          </p:cNvPr>
+          <p:cNvSpPr txBox="1"/>
+          <p:nvPr/>
+        </p:nvSpPr>
+        <p:spPr>
+          <a:xfrm flipH="1">
+            <a:off x="4936224" y="923279"/>
+            <a:ext cx="2150376" cy="369332"/>
+          </a:xfrm>
+          <a:prstGeom prst="rect">
+            <a:avLst/>
+          </a:prstGeom>
+          <a:solidFill>
+            <a:schemeClr val="bg1"/>
+          </a:solidFill>
+        </p:spPr>
+        <p:txBody>
+          <a:bodyPr wrap="square" rtlCol="0">
+            <a:spAutoFit/>
+          </a:bodyPr>
+          <a:lstStyle>
+            <a:defPPr>
+              <a:defRPr lang="en-US"/>
+            </a:defPPr>
+            <a:lvl1pPr>
+              <a:defRPr b="1">
+                <a:solidFill>
+                  <a:schemeClr val="accent2">
+                    <a:lumMod val="75000"/>
+                  </a:schemeClr>
+                </a:solidFill>
+                <a:latin typeface="Courier New" panose="02070309020205020404" pitchFamily="49" charset="0"/>
+                <a:cs typeface="Courier New" panose="02070309020205020404" pitchFamily="49" charset="0"/>
+              </a:defRPr>
+            </a:lvl1pPr>
+          </a:lstStyle>
+          <a:p>
+            <a:r>
+              <a:rPr lang="en-US" dirty="0" err="1"/>
+              <a:t>skos:prefLabel</a:t>
             </a:r>
             <a:endParaRPr lang="en-US" dirty="0"/>
           </a:p>

</xml_diff>

<commit_message>
complete re-work of how shapes are constructed and described.
</commit_message>
<xml_diff>
--- a/doc/images/ImageSources.pptx
+++ b/doc/images/ImageSources.pptx
@@ -10,6 +10,7 @@
     <p:sldId id="262" r:id="rId4"/>
     <p:sldId id="263" r:id="rId5"/>
     <p:sldId id="261" r:id="rId6"/>
+    <p:sldId id="264" r:id="rId7"/>
   </p:sldIdLst>
   <p:sldSz cx="12192000" cy="6858000"/>
   <p:notesSz cx="6858000" cy="9144000"/>
@@ -118,6 +119,7 @@
             <p14:sldId id="262"/>
             <p14:sldId id="263"/>
             <p14:sldId id="261"/>
+            <p14:sldId id="264"/>
           </p14:sldIdLst>
         </p14:section>
       </p14:sectionLst>
@@ -258,7 +260,7 @@
           <a:p>
             <a:fld id="{03ABD037-9D82-4436-AC70-ED75D2FE9417}" type="datetimeFigureOut">
               <a:rPr lang="en-US" smtClean="0"/>
-              <a:t>8/2/2019</a:t>
+              <a:t>8/14/2019</a:t>
             </a:fld>
             <a:endParaRPr lang="en-US"/>
           </a:p>
@@ -426,7 +428,7 @@
           <a:p>
             <a:fld id="{03ABD037-9D82-4436-AC70-ED75D2FE9417}" type="datetimeFigureOut">
               <a:rPr lang="en-US" smtClean="0"/>
-              <a:t>8/2/2019</a:t>
+              <a:t>8/14/2019</a:t>
             </a:fld>
             <a:endParaRPr lang="en-US"/>
           </a:p>
@@ -604,7 +606,7 @@
           <a:p>
             <a:fld id="{03ABD037-9D82-4436-AC70-ED75D2FE9417}" type="datetimeFigureOut">
               <a:rPr lang="en-US" smtClean="0"/>
-              <a:t>8/2/2019</a:t>
+              <a:t>8/14/2019</a:t>
             </a:fld>
             <a:endParaRPr lang="en-US"/>
           </a:p>
@@ -772,7 +774,7 @@
           <a:p>
             <a:fld id="{03ABD037-9D82-4436-AC70-ED75D2FE9417}" type="datetimeFigureOut">
               <a:rPr lang="en-US" smtClean="0"/>
-              <a:t>8/2/2019</a:t>
+              <a:t>8/14/2019</a:t>
             </a:fld>
             <a:endParaRPr lang="en-US"/>
           </a:p>
@@ -1017,7 +1019,7 @@
           <a:p>
             <a:fld id="{03ABD037-9D82-4436-AC70-ED75D2FE9417}" type="datetimeFigureOut">
               <a:rPr lang="en-US" smtClean="0"/>
-              <a:t>8/2/2019</a:t>
+              <a:t>8/14/2019</a:t>
             </a:fld>
             <a:endParaRPr lang="en-US"/>
           </a:p>
@@ -1246,7 +1248,7 @@
           <a:p>
             <a:fld id="{03ABD037-9D82-4436-AC70-ED75D2FE9417}" type="datetimeFigureOut">
               <a:rPr lang="en-US" smtClean="0"/>
-              <a:t>8/2/2019</a:t>
+              <a:t>8/14/2019</a:t>
             </a:fld>
             <a:endParaRPr lang="en-US"/>
           </a:p>
@@ -1610,7 +1612,7 @@
           <a:p>
             <a:fld id="{03ABD037-9D82-4436-AC70-ED75D2FE9417}" type="datetimeFigureOut">
               <a:rPr lang="en-US" smtClean="0"/>
-              <a:t>8/2/2019</a:t>
+              <a:t>8/14/2019</a:t>
             </a:fld>
             <a:endParaRPr lang="en-US"/>
           </a:p>
@@ -1727,7 +1729,7 @@
           <a:p>
             <a:fld id="{03ABD037-9D82-4436-AC70-ED75D2FE9417}" type="datetimeFigureOut">
               <a:rPr lang="en-US" smtClean="0"/>
-              <a:t>8/2/2019</a:t>
+              <a:t>8/14/2019</a:t>
             </a:fld>
             <a:endParaRPr lang="en-US"/>
           </a:p>
@@ -1822,7 +1824,7 @@
           <a:p>
             <a:fld id="{03ABD037-9D82-4436-AC70-ED75D2FE9417}" type="datetimeFigureOut">
               <a:rPr lang="en-US" smtClean="0"/>
-              <a:t>8/2/2019</a:t>
+              <a:t>8/14/2019</a:t>
             </a:fld>
             <a:endParaRPr lang="en-US"/>
           </a:p>
@@ -2097,7 +2099,7 @@
           <a:p>
             <a:fld id="{03ABD037-9D82-4436-AC70-ED75D2FE9417}" type="datetimeFigureOut">
               <a:rPr lang="en-US" smtClean="0"/>
-              <a:t>8/2/2019</a:t>
+              <a:t>8/14/2019</a:t>
             </a:fld>
             <a:endParaRPr lang="en-US"/>
           </a:p>
@@ -2349,7 +2351,7 @@
           <a:p>
             <a:fld id="{03ABD037-9D82-4436-AC70-ED75D2FE9417}" type="datetimeFigureOut">
               <a:rPr lang="en-US" smtClean="0"/>
-              <a:t>8/2/2019</a:t>
+              <a:t>8/14/2019</a:t>
             </a:fld>
             <a:endParaRPr lang="en-US"/>
           </a:p>
@@ -2560,7 +2562,7 @@
           <a:p>
             <a:fld id="{03ABD037-9D82-4436-AC70-ED75D2FE9417}" type="datetimeFigureOut">
               <a:rPr lang="en-US" smtClean="0"/>
-              <a:t>8/2/2019</a:t>
+              <a:t>8/14/2019</a:t>
             </a:fld>
             <a:endParaRPr lang="en-US"/>
           </a:p>
@@ -8473,6 +8475,1549 @@
 </p:sld>
 </file>
 
+<file path=ppt/slides/slide6.xml><?xml version="1.0" encoding="utf-8"?>
+<p:sld xmlns:a="http://schemas.openxmlformats.org/drawingml/2006/main" xmlns:r="http://schemas.openxmlformats.org/officeDocument/2006/relationships" xmlns:p="http://schemas.openxmlformats.org/presentationml/2006/main">
+  <p:cSld>
+    <p:spTree>
+      <p:nvGrpSpPr>
+        <p:cNvPr id="1" name=""/>
+        <p:cNvGrpSpPr/>
+        <p:nvPr/>
+      </p:nvGrpSpPr>
+      <p:grpSpPr>
+        <a:xfrm>
+          <a:off x="0" y="0"/>
+          <a:ext cx="0" cy="0"/>
+          <a:chOff x="0" y="0"/>
+          <a:chExt cx="0" cy="0"/>
+        </a:xfrm>
+      </p:grpSpPr>
+      <p:sp>
+        <p:nvSpPr>
+          <p:cNvPr id="4" name="Rectangle: Rounded Corners 3"/>
+          <p:cNvSpPr/>
+          <p:nvPr/>
+        </p:nvSpPr>
+        <p:spPr>
+          <a:xfrm>
+            <a:off x="533513" y="602691"/>
+            <a:ext cx="2971800" cy="449588"/>
+          </a:xfrm>
+          <a:prstGeom prst="roundRect">
+            <a:avLst/>
+          </a:prstGeom>
+          <a:solidFill>
+            <a:schemeClr val="accent6">
+              <a:lumMod val="40000"/>
+              <a:lumOff val="60000"/>
+            </a:schemeClr>
+          </a:solidFill>
+          <a:ln>
+            <a:solidFill>
+              <a:schemeClr val="tx1"/>
+            </a:solidFill>
+          </a:ln>
+        </p:spPr>
+        <p:style>
+          <a:lnRef idx="2">
+            <a:schemeClr val="accent1">
+              <a:shade val="50000"/>
+            </a:schemeClr>
+          </a:lnRef>
+          <a:fillRef idx="1">
+            <a:schemeClr val="accent1"/>
+          </a:fillRef>
+          <a:effectRef idx="0">
+            <a:schemeClr val="accent1"/>
+          </a:effectRef>
+          <a:fontRef idx="minor">
+            <a:schemeClr val="lt1"/>
+          </a:fontRef>
+        </p:style>
+        <p:txBody>
+          <a:bodyPr rtlCol="0" anchor="ctr"/>
+          <a:lstStyle/>
+          <a:p>
+            <a:pPr algn="ctr"/>
+            <a:r>
+              <a:rPr lang="en-US" sz="1600" dirty="0">
+                <a:solidFill>
+                  <a:schemeClr val="tx1"/>
+                </a:solidFill>
+              </a:rPr>
+              <a:t>:</a:t>
+            </a:r>
+            <a:r>
+              <a:rPr lang="en-US" b="1" dirty="0" err="1">
+                <a:solidFill>
+                  <a:schemeClr val="tx1"/>
+                </a:solidFill>
+              </a:rPr>
+              <a:t>Animal_</a:t>
+            </a:r>
+            <a:r>
+              <a:rPr lang="en-US" b="1" dirty="0" err="1">
+                <a:solidFill>
+                  <a:schemeClr val="bg1">
+                    <a:lumMod val="65000"/>
+                  </a:schemeClr>
+                </a:solidFill>
+              </a:rPr>
+              <a:t>xxx</a:t>
+            </a:r>
+            <a:endParaRPr lang="en-US" b="1" dirty="0">
+              <a:solidFill>
+                <a:schemeClr val="bg1">
+                  <a:lumMod val="65000"/>
+                </a:schemeClr>
+              </a:solidFill>
+            </a:endParaRPr>
+          </a:p>
+        </p:txBody>
+      </p:sp>
+      <p:sp>
+        <p:nvSpPr>
+          <p:cNvPr id="49" name="Rectangle: Rounded Corners 48">
+            <a:extLst>
+              <a:ext uri="{FF2B5EF4-FFF2-40B4-BE49-F238E27FC236}">
+                <a16:creationId xmlns:a16="http://schemas.microsoft.com/office/drawing/2014/main" id="{AC5ADABD-A2F6-4C9F-93BC-ED94E5305351}"/>
+              </a:ext>
+            </a:extLst>
+          </p:cNvPr>
+          <p:cNvSpPr/>
+          <p:nvPr/>
+        </p:nvSpPr>
+        <p:spPr>
+          <a:xfrm>
+            <a:off x="4086580" y="3781324"/>
+            <a:ext cx="3154680" cy="457001"/>
+          </a:xfrm>
+          <a:prstGeom prst="roundRect">
+            <a:avLst/>
+          </a:prstGeom>
+          <a:solidFill>
+            <a:schemeClr val="accent6">
+              <a:lumMod val="40000"/>
+              <a:lumOff val="60000"/>
+            </a:schemeClr>
+          </a:solidFill>
+          <a:ln>
+            <a:solidFill>
+              <a:schemeClr val="tx1"/>
+            </a:solidFill>
+          </a:ln>
+        </p:spPr>
+        <p:style>
+          <a:lnRef idx="2">
+            <a:schemeClr val="accent1">
+              <a:shade val="50000"/>
+            </a:schemeClr>
+          </a:lnRef>
+          <a:fillRef idx="1">
+            <a:schemeClr val="accent1"/>
+          </a:fillRef>
+          <a:effectRef idx="0">
+            <a:schemeClr val="accent1"/>
+          </a:effectRef>
+          <a:fontRef idx="minor">
+            <a:schemeClr val="lt1"/>
+          </a:fontRef>
+        </p:style>
+        <p:txBody>
+          <a:bodyPr rtlCol="0" anchor="ctr"/>
+          <a:lstStyle/>
+          <a:p>
+            <a:pPr algn="ctr"/>
+            <a:r>
+              <a:rPr lang="en-US" b="1" dirty="0">
+                <a:solidFill>
+                  <a:schemeClr val="tx1"/>
+                </a:solidFill>
+              </a:rPr>
+              <a:t>:</a:t>
+            </a:r>
+            <a:r>
+              <a:rPr lang="en-US" b="1" dirty="0" err="1">
+                <a:solidFill>
+                  <a:schemeClr val="tx1"/>
+                </a:solidFill>
+              </a:rPr>
+              <a:t>Species_</a:t>
+            </a:r>
+            <a:r>
+              <a:rPr lang="en-US" b="1" dirty="0" err="1">
+                <a:solidFill>
+                  <a:schemeClr val="bg1">
+                    <a:lumMod val="65000"/>
+                  </a:schemeClr>
+                </a:solidFill>
+              </a:rPr>
+              <a:t>xxx</a:t>
+            </a:r>
+            <a:endParaRPr lang="en-US" b="1" dirty="0">
+              <a:solidFill>
+                <a:schemeClr val="bg1">
+                  <a:lumMod val="65000"/>
+                </a:schemeClr>
+              </a:solidFill>
+            </a:endParaRPr>
+          </a:p>
+        </p:txBody>
+      </p:sp>
+      <p:sp>
+        <p:nvSpPr>
+          <p:cNvPr id="53" name="Rectangle: Rounded Corners 52">
+            <a:extLst>
+              <a:ext uri="{FF2B5EF4-FFF2-40B4-BE49-F238E27FC236}">
+                <a16:creationId xmlns:a16="http://schemas.microsoft.com/office/drawing/2014/main" id="{5F64002F-F42A-4F15-A63A-C21552CDF952}"/>
+              </a:ext>
+            </a:extLst>
+          </p:cNvPr>
+          <p:cNvSpPr/>
+          <p:nvPr/>
+        </p:nvSpPr>
+        <p:spPr>
+          <a:xfrm>
+            <a:off x="4086580" y="4433597"/>
+            <a:ext cx="3154680" cy="457001"/>
+          </a:xfrm>
+          <a:prstGeom prst="roundRect">
+            <a:avLst/>
+          </a:prstGeom>
+          <a:solidFill>
+            <a:schemeClr val="accent6">
+              <a:lumMod val="40000"/>
+              <a:lumOff val="60000"/>
+            </a:schemeClr>
+          </a:solidFill>
+          <a:ln>
+            <a:solidFill>
+              <a:schemeClr val="tx1"/>
+            </a:solidFill>
+          </a:ln>
+        </p:spPr>
+        <p:style>
+          <a:lnRef idx="2">
+            <a:schemeClr val="accent1">
+              <a:shade val="50000"/>
+            </a:schemeClr>
+          </a:lnRef>
+          <a:fillRef idx="1">
+            <a:schemeClr val="accent1"/>
+          </a:fillRef>
+          <a:effectRef idx="0">
+            <a:schemeClr val="accent1"/>
+          </a:effectRef>
+          <a:fontRef idx="minor">
+            <a:schemeClr val="lt1"/>
+          </a:fontRef>
+        </p:style>
+        <p:txBody>
+          <a:bodyPr rtlCol="0" anchor="ctr"/>
+          <a:lstStyle/>
+          <a:p>
+            <a:pPr algn="ctr"/>
+            <a:r>
+              <a:rPr lang="en-US" b="1" dirty="0">
+                <a:solidFill>
+                  <a:schemeClr val="tx1"/>
+                </a:solidFill>
+              </a:rPr>
+              <a:t>:</a:t>
+            </a:r>
+            <a:r>
+              <a:rPr lang="en-US" b="1" dirty="0" err="1">
+                <a:solidFill>
+                  <a:schemeClr val="tx1"/>
+                </a:solidFill>
+              </a:rPr>
+              <a:t>SexDataCollection_</a:t>
+            </a:r>
+            <a:r>
+              <a:rPr lang="en-US" b="1" dirty="0" err="1">
+                <a:solidFill>
+                  <a:schemeClr val="bg1">
+                    <a:lumMod val="65000"/>
+                  </a:schemeClr>
+                </a:solidFill>
+              </a:rPr>
+              <a:t>xxx</a:t>
+            </a:r>
+            <a:endParaRPr lang="en-US" b="1" dirty="0">
+              <a:solidFill>
+                <a:schemeClr val="bg1">
+                  <a:lumMod val="65000"/>
+                </a:schemeClr>
+              </a:solidFill>
+            </a:endParaRPr>
+          </a:p>
+        </p:txBody>
+      </p:sp>
+      <p:sp>
+        <p:nvSpPr>
+          <p:cNvPr id="56" name="Rectangle: Rounded Corners 55">
+            <a:extLst>
+              <a:ext uri="{FF2B5EF4-FFF2-40B4-BE49-F238E27FC236}">
+                <a16:creationId xmlns:a16="http://schemas.microsoft.com/office/drawing/2014/main" id="{1F23C94D-E114-4BD9-9A4C-05D2B7B591B2}"/>
+              </a:ext>
+            </a:extLst>
+          </p:cNvPr>
+          <p:cNvSpPr/>
+          <p:nvPr/>
+        </p:nvSpPr>
+        <p:spPr>
+          <a:xfrm>
+            <a:off x="4086580" y="5927476"/>
+            <a:ext cx="3154680" cy="457001"/>
+          </a:xfrm>
+          <a:prstGeom prst="roundRect">
+            <a:avLst/>
+          </a:prstGeom>
+          <a:solidFill>
+            <a:schemeClr val="accent6">
+              <a:lumMod val="40000"/>
+              <a:lumOff val="60000"/>
+            </a:schemeClr>
+          </a:solidFill>
+          <a:ln>
+            <a:solidFill>
+              <a:schemeClr val="tx1"/>
+            </a:solidFill>
+          </a:ln>
+        </p:spPr>
+        <p:style>
+          <a:lnRef idx="2">
+            <a:schemeClr val="accent1">
+              <a:shade val="50000"/>
+            </a:schemeClr>
+          </a:lnRef>
+          <a:fillRef idx="1">
+            <a:schemeClr val="accent1"/>
+          </a:fillRef>
+          <a:effectRef idx="0">
+            <a:schemeClr val="accent1"/>
+          </a:effectRef>
+          <a:fontRef idx="minor">
+            <a:schemeClr val="lt1"/>
+          </a:fontRef>
+        </p:style>
+        <p:txBody>
+          <a:bodyPr rtlCol="0" anchor="ctr"/>
+          <a:lstStyle/>
+          <a:p>
+            <a:pPr algn="ctr"/>
+            <a:r>
+              <a:rPr lang="en-US" b="1" dirty="0">
+                <a:solidFill>
+                  <a:schemeClr val="tx1"/>
+                </a:solidFill>
+              </a:rPr>
+              <a:t>:</a:t>
+            </a:r>
+            <a:r>
+              <a:rPr lang="en-US" b="1" dirty="0" err="1">
+                <a:solidFill>
+                  <a:schemeClr val="tx1"/>
+                </a:solidFill>
+              </a:rPr>
+              <a:t>Randomization_</a:t>
+            </a:r>
+            <a:r>
+              <a:rPr lang="en-US" b="1" dirty="0" err="1">
+                <a:solidFill>
+                  <a:schemeClr val="bg1">
+                    <a:lumMod val="65000"/>
+                  </a:schemeClr>
+                </a:solidFill>
+              </a:rPr>
+              <a:t>xxx</a:t>
+            </a:r>
+            <a:endParaRPr lang="en-US" b="1" dirty="0">
+              <a:solidFill>
+                <a:schemeClr val="bg1">
+                  <a:lumMod val="65000"/>
+                </a:schemeClr>
+              </a:solidFill>
+            </a:endParaRPr>
+          </a:p>
+        </p:txBody>
+      </p:sp>
+      <p:cxnSp>
+        <p:nvCxnSpPr>
+          <p:cNvPr id="13" name="Connector: Elbow 12">
+            <a:extLst>
+              <a:ext uri="{FF2B5EF4-FFF2-40B4-BE49-F238E27FC236}">
+                <a16:creationId xmlns:a16="http://schemas.microsoft.com/office/drawing/2014/main" id="{B02F595C-6FA7-487B-8F8B-F2471EB73866}"/>
+              </a:ext>
+            </a:extLst>
+          </p:cNvPr>
+          <p:cNvCxnSpPr>
+            <a:stCxn id="4" idx="2"/>
+            <a:endCxn id="15" idx="1"/>
+          </p:cNvCxnSpPr>
+          <p:nvPr/>
+        </p:nvCxnSpPr>
+        <p:spPr>
+          <a:xfrm rot="16200000" flipH="1">
+            <a:off x="2226496" y="845195"/>
+            <a:ext cx="1653000" cy="2067167"/>
+          </a:xfrm>
+          <a:prstGeom prst="bentConnector2">
+            <a:avLst/>
+          </a:prstGeom>
+          <a:ln w="38100">
+            <a:solidFill>
+              <a:schemeClr val="bg1">
+                <a:lumMod val="50000"/>
+              </a:schemeClr>
+            </a:solidFill>
+            <a:tailEnd type="triangle"/>
+          </a:ln>
+        </p:spPr>
+        <p:style>
+          <a:lnRef idx="1">
+            <a:schemeClr val="accent1"/>
+          </a:lnRef>
+          <a:fillRef idx="0">
+            <a:schemeClr val="accent1"/>
+          </a:fillRef>
+          <a:effectRef idx="0">
+            <a:schemeClr val="accent1"/>
+          </a:effectRef>
+          <a:fontRef idx="minor">
+            <a:schemeClr val="tx1"/>
+          </a:fontRef>
+        </p:style>
+      </p:cxnSp>
+      <p:cxnSp>
+        <p:nvCxnSpPr>
+          <p:cNvPr id="18" name="Connector: Elbow 17">
+            <a:extLst>
+              <a:ext uri="{FF2B5EF4-FFF2-40B4-BE49-F238E27FC236}">
+                <a16:creationId xmlns:a16="http://schemas.microsoft.com/office/drawing/2014/main" id="{CD6414D9-631D-433C-88C5-FE1C50A9B1CB}"/>
+              </a:ext>
+            </a:extLst>
+          </p:cNvPr>
+          <p:cNvCxnSpPr>
+            <a:stCxn id="4" idx="2"/>
+            <a:endCxn id="41" idx="1"/>
+          </p:cNvCxnSpPr>
+          <p:nvPr/>
+        </p:nvCxnSpPr>
+        <p:spPr>
+          <a:xfrm rot="16200000" flipH="1">
+            <a:off x="2878769" y="192922"/>
+            <a:ext cx="348454" cy="2067167"/>
+          </a:xfrm>
+          <a:prstGeom prst="bentConnector2">
+            <a:avLst/>
+          </a:prstGeom>
+          <a:ln w="38100">
+            <a:solidFill>
+              <a:schemeClr val="bg1">
+                <a:lumMod val="50000"/>
+              </a:schemeClr>
+            </a:solidFill>
+            <a:tailEnd type="triangle"/>
+          </a:ln>
+        </p:spPr>
+        <p:style>
+          <a:lnRef idx="1">
+            <a:schemeClr val="accent1"/>
+          </a:lnRef>
+          <a:fillRef idx="0">
+            <a:schemeClr val="accent1"/>
+          </a:fillRef>
+          <a:effectRef idx="0">
+            <a:schemeClr val="accent1"/>
+          </a:effectRef>
+          <a:fontRef idx="minor">
+            <a:schemeClr val="tx1"/>
+          </a:fontRef>
+        </p:style>
+      </p:cxnSp>
+      <p:cxnSp>
+        <p:nvCxnSpPr>
+          <p:cNvPr id="20" name="Connector: Elbow 19">
+            <a:extLst>
+              <a:ext uri="{FF2B5EF4-FFF2-40B4-BE49-F238E27FC236}">
+                <a16:creationId xmlns:a16="http://schemas.microsoft.com/office/drawing/2014/main" id="{15B8C948-92DD-413C-AF47-55CD80736997}"/>
+              </a:ext>
+            </a:extLst>
+          </p:cNvPr>
+          <p:cNvCxnSpPr>
+            <a:stCxn id="4" idx="2"/>
+            <a:endCxn id="45" idx="1"/>
+          </p:cNvCxnSpPr>
+          <p:nvPr/>
+        </p:nvCxnSpPr>
+        <p:spPr>
+          <a:xfrm rot="16200000" flipH="1">
+            <a:off x="2552633" y="519058"/>
+            <a:ext cx="1000727" cy="2067167"/>
+          </a:xfrm>
+          <a:prstGeom prst="bentConnector2">
+            <a:avLst/>
+          </a:prstGeom>
+          <a:ln w="38100">
+            <a:solidFill>
+              <a:schemeClr val="bg1">
+                <a:lumMod val="50000"/>
+              </a:schemeClr>
+            </a:solidFill>
+            <a:tailEnd type="triangle"/>
+          </a:ln>
+        </p:spPr>
+        <p:style>
+          <a:lnRef idx="1">
+            <a:schemeClr val="accent1"/>
+          </a:lnRef>
+          <a:fillRef idx="0">
+            <a:schemeClr val="accent1"/>
+          </a:fillRef>
+          <a:effectRef idx="0">
+            <a:schemeClr val="accent1"/>
+          </a:effectRef>
+          <a:fontRef idx="minor">
+            <a:schemeClr val="tx1"/>
+          </a:fontRef>
+        </p:style>
+      </p:cxnSp>
+      <p:cxnSp>
+        <p:nvCxnSpPr>
+          <p:cNvPr id="24" name="Connector: Elbow 23">
+            <a:extLst>
+              <a:ext uri="{FF2B5EF4-FFF2-40B4-BE49-F238E27FC236}">
+                <a16:creationId xmlns:a16="http://schemas.microsoft.com/office/drawing/2014/main" id="{5FFE9110-6CB5-42E6-8DEB-418D562B6DF1}"/>
+              </a:ext>
+            </a:extLst>
+          </p:cNvPr>
+          <p:cNvCxnSpPr>
+            <a:stCxn id="4" idx="2"/>
+            <a:endCxn id="46" idx="1"/>
+          </p:cNvCxnSpPr>
+          <p:nvPr/>
+        </p:nvCxnSpPr>
+        <p:spPr>
+          <a:xfrm rot="16200000" flipH="1">
+            <a:off x="1900360" y="1171331"/>
+            <a:ext cx="2305273" cy="2067167"/>
+          </a:xfrm>
+          <a:prstGeom prst="bentConnector2">
+            <a:avLst/>
+          </a:prstGeom>
+          <a:ln w="38100">
+            <a:solidFill>
+              <a:schemeClr val="bg1">
+                <a:lumMod val="50000"/>
+              </a:schemeClr>
+            </a:solidFill>
+            <a:tailEnd type="triangle"/>
+          </a:ln>
+        </p:spPr>
+        <p:style>
+          <a:lnRef idx="1">
+            <a:schemeClr val="accent1"/>
+          </a:lnRef>
+          <a:fillRef idx="0">
+            <a:schemeClr val="accent1"/>
+          </a:fillRef>
+          <a:effectRef idx="0">
+            <a:schemeClr val="accent1"/>
+          </a:effectRef>
+          <a:fontRef idx="minor">
+            <a:schemeClr val="tx1"/>
+          </a:fontRef>
+        </p:style>
+      </p:cxnSp>
+      <p:cxnSp>
+        <p:nvCxnSpPr>
+          <p:cNvPr id="26" name="Connector: Elbow 25">
+            <a:extLst>
+              <a:ext uri="{FF2B5EF4-FFF2-40B4-BE49-F238E27FC236}">
+                <a16:creationId xmlns:a16="http://schemas.microsoft.com/office/drawing/2014/main" id="{71D8102A-9E78-41F9-AB1B-A42EE1A78BEF}"/>
+              </a:ext>
+            </a:extLst>
+          </p:cNvPr>
+          <p:cNvCxnSpPr>
+            <a:stCxn id="4" idx="2"/>
+            <a:endCxn id="49" idx="1"/>
+          </p:cNvCxnSpPr>
+          <p:nvPr/>
+        </p:nvCxnSpPr>
+        <p:spPr>
+          <a:xfrm rot="16200000" flipH="1">
+            <a:off x="1574223" y="1497468"/>
+            <a:ext cx="2957546" cy="2067167"/>
+          </a:xfrm>
+          <a:prstGeom prst="bentConnector2">
+            <a:avLst/>
+          </a:prstGeom>
+          <a:ln w="38100">
+            <a:solidFill>
+              <a:schemeClr val="bg1">
+                <a:lumMod val="50000"/>
+              </a:schemeClr>
+            </a:solidFill>
+            <a:tailEnd type="triangle"/>
+          </a:ln>
+        </p:spPr>
+        <p:style>
+          <a:lnRef idx="1">
+            <a:schemeClr val="accent1"/>
+          </a:lnRef>
+          <a:fillRef idx="0">
+            <a:schemeClr val="accent1"/>
+          </a:fillRef>
+          <a:effectRef idx="0">
+            <a:schemeClr val="accent1"/>
+          </a:effectRef>
+          <a:fontRef idx="minor">
+            <a:schemeClr val="tx1"/>
+          </a:fontRef>
+        </p:style>
+      </p:cxnSp>
+      <p:cxnSp>
+        <p:nvCxnSpPr>
+          <p:cNvPr id="28" name="Connector: Elbow 27">
+            <a:extLst>
+              <a:ext uri="{FF2B5EF4-FFF2-40B4-BE49-F238E27FC236}">
+                <a16:creationId xmlns:a16="http://schemas.microsoft.com/office/drawing/2014/main" id="{BACEB9BC-CE69-4F8C-854D-9AE705A007EC}"/>
+              </a:ext>
+            </a:extLst>
+          </p:cNvPr>
+          <p:cNvCxnSpPr>
+            <a:stCxn id="4" idx="2"/>
+            <a:endCxn id="53" idx="1"/>
+          </p:cNvCxnSpPr>
+          <p:nvPr/>
+        </p:nvCxnSpPr>
+        <p:spPr>
+          <a:xfrm rot="16200000" flipH="1">
+            <a:off x="1248087" y="1823604"/>
+            <a:ext cx="3609819" cy="2067167"/>
+          </a:xfrm>
+          <a:prstGeom prst="bentConnector2">
+            <a:avLst/>
+          </a:prstGeom>
+          <a:ln w="38100">
+            <a:solidFill>
+              <a:schemeClr val="bg1">
+                <a:lumMod val="50000"/>
+              </a:schemeClr>
+            </a:solidFill>
+            <a:tailEnd type="triangle"/>
+          </a:ln>
+        </p:spPr>
+        <p:style>
+          <a:lnRef idx="1">
+            <a:schemeClr val="accent1"/>
+          </a:lnRef>
+          <a:fillRef idx="0">
+            <a:schemeClr val="accent1"/>
+          </a:fillRef>
+          <a:effectRef idx="0">
+            <a:schemeClr val="accent1"/>
+          </a:effectRef>
+          <a:fontRef idx="minor">
+            <a:schemeClr val="tx1"/>
+          </a:fontRef>
+        </p:style>
+      </p:cxnSp>
+      <p:cxnSp>
+        <p:nvCxnSpPr>
+          <p:cNvPr id="31" name="Connector: Elbow 30">
+            <a:extLst>
+              <a:ext uri="{FF2B5EF4-FFF2-40B4-BE49-F238E27FC236}">
+                <a16:creationId xmlns:a16="http://schemas.microsoft.com/office/drawing/2014/main" id="{3006BFAB-1A04-47C4-9E9C-3D159771D7A3}"/>
+              </a:ext>
+            </a:extLst>
+          </p:cNvPr>
+          <p:cNvCxnSpPr>
+            <a:stCxn id="4" idx="2"/>
+            <a:endCxn id="54" idx="1"/>
+          </p:cNvCxnSpPr>
+          <p:nvPr/>
+        </p:nvCxnSpPr>
+        <p:spPr>
+          <a:xfrm rot="16200000" flipH="1">
+            <a:off x="874618" y="2197073"/>
+            <a:ext cx="4356757" cy="2067167"/>
+          </a:xfrm>
+          <a:prstGeom prst="bentConnector2">
+            <a:avLst/>
+          </a:prstGeom>
+          <a:ln w="38100">
+            <a:solidFill>
+              <a:schemeClr val="bg1">
+                <a:lumMod val="50000"/>
+              </a:schemeClr>
+            </a:solidFill>
+            <a:tailEnd type="triangle"/>
+          </a:ln>
+        </p:spPr>
+        <p:style>
+          <a:lnRef idx="1">
+            <a:schemeClr val="accent1"/>
+          </a:lnRef>
+          <a:fillRef idx="0">
+            <a:schemeClr val="accent1"/>
+          </a:fillRef>
+          <a:effectRef idx="0">
+            <a:schemeClr val="accent1"/>
+          </a:effectRef>
+          <a:fontRef idx="minor">
+            <a:schemeClr val="tx1"/>
+          </a:fontRef>
+        </p:style>
+      </p:cxnSp>
+      <p:cxnSp>
+        <p:nvCxnSpPr>
+          <p:cNvPr id="35" name="Connector: Elbow 34">
+            <a:extLst>
+              <a:ext uri="{FF2B5EF4-FFF2-40B4-BE49-F238E27FC236}">
+                <a16:creationId xmlns:a16="http://schemas.microsoft.com/office/drawing/2014/main" id="{995AB819-BF1E-47FD-AD9E-F3CFCE0F9BDE}"/>
+              </a:ext>
+            </a:extLst>
+          </p:cNvPr>
+          <p:cNvCxnSpPr>
+            <a:stCxn id="4" idx="2"/>
+            <a:endCxn id="56" idx="1"/>
+          </p:cNvCxnSpPr>
+          <p:nvPr/>
+        </p:nvCxnSpPr>
+        <p:spPr>
+          <a:xfrm rot="16200000" flipH="1">
+            <a:off x="501147" y="2570544"/>
+            <a:ext cx="5103698" cy="2067167"/>
+          </a:xfrm>
+          <a:prstGeom prst="bentConnector2">
+            <a:avLst/>
+          </a:prstGeom>
+          <a:ln w="38100">
+            <a:solidFill>
+              <a:schemeClr val="bg1">
+                <a:lumMod val="50000"/>
+              </a:schemeClr>
+            </a:solidFill>
+            <a:tailEnd type="triangle"/>
+          </a:ln>
+        </p:spPr>
+        <p:style>
+          <a:lnRef idx="1">
+            <a:schemeClr val="accent1"/>
+          </a:lnRef>
+          <a:fillRef idx="0">
+            <a:schemeClr val="accent1"/>
+          </a:fillRef>
+          <a:effectRef idx="0">
+            <a:schemeClr val="accent1"/>
+          </a:effectRef>
+          <a:fontRef idx="minor">
+            <a:schemeClr val="tx1"/>
+          </a:fontRef>
+        </p:style>
+      </p:cxnSp>
+      <p:sp>
+        <p:nvSpPr>
+          <p:cNvPr id="37" name="TextBox 36">
+            <a:extLst>
+              <a:ext uri="{FF2B5EF4-FFF2-40B4-BE49-F238E27FC236}">
+                <a16:creationId xmlns:a16="http://schemas.microsoft.com/office/drawing/2014/main" id="{94D1285C-D475-4761-AB59-AAF30FB04556}"/>
+              </a:ext>
+            </a:extLst>
+          </p:cNvPr>
+          <p:cNvSpPr txBox="1"/>
+          <p:nvPr/>
+        </p:nvSpPr>
+        <p:spPr>
+          <a:xfrm>
+            <a:off x="7451835" y="567559"/>
+            <a:ext cx="3074881" cy="461665"/>
+          </a:xfrm>
+          <a:prstGeom prst="rect">
+            <a:avLst/>
+          </a:prstGeom>
+          <a:noFill/>
+        </p:spPr>
+        <p:txBody>
+          <a:bodyPr wrap="none" rtlCol="0">
+            <a:spAutoFit/>
+          </a:bodyPr>
+          <a:lstStyle/>
+          <a:p>
+            <a:r>
+              <a:rPr lang="en-US" sz="2400" b="1" dirty="0">
+                <a:solidFill>
+                  <a:srgbClr val="0033CC"/>
+                </a:solidFill>
+              </a:rPr>
+              <a:t>SEND RULE </a:t>
+            </a:r>
+            <a:r>
+              <a:rPr lang="en-US" sz="2000" dirty="0">
+                <a:solidFill>
+                  <a:srgbClr val="0033CC"/>
+                </a:solidFill>
+              </a:rPr>
+              <a:t>(DM Domain)</a:t>
+            </a:r>
+          </a:p>
+        </p:txBody>
+      </p:sp>
+      <p:grpSp>
+        <p:nvGrpSpPr>
+          <p:cNvPr id="62" name="Group 61">
+            <a:extLst>
+              <a:ext uri="{FF2B5EF4-FFF2-40B4-BE49-F238E27FC236}">
+                <a16:creationId xmlns:a16="http://schemas.microsoft.com/office/drawing/2014/main" id="{4BDF3735-69F5-4F62-A230-5168088C4245}"/>
+              </a:ext>
+            </a:extLst>
+          </p:cNvPr>
+          <p:cNvGrpSpPr/>
+          <p:nvPr/>
+        </p:nvGrpSpPr>
+        <p:grpSpPr>
+          <a:xfrm>
+            <a:off x="4086580" y="2476778"/>
+            <a:ext cx="4309661" cy="457001"/>
+            <a:chOff x="4086580" y="2556040"/>
+            <a:chExt cx="4309661" cy="457001"/>
+          </a:xfrm>
+        </p:grpSpPr>
+        <p:sp>
+          <p:nvSpPr>
+            <p:cNvPr id="15" name="Rectangle: Rounded Corners 14">
+              <a:extLst>
+                <a:ext uri="{FF2B5EF4-FFF2-40B4-BE49-F238E27FC236}">
+                  <a16:creationId xmlns:a16="http://schemas.microsoft.com/office/drawing/2014/main" id="{F2D1CDB2-6DA6-45BF-B57E-8A1B3116DAB8}"/>
+                </a:ext>
+              </a:extLst>
+            </p:cNvPr>
+            <p:cNvSpPr/>
+            <p:nvPr/>
+          </p:nvSpPr>
+          <p:spPr>
+            <a:xfrm>
+              <a:off x="4086580" y="2556040"/>
+              <a:ext cx="3154680" cy="457001"/>
+            </a:xfrm>
+            <a:prstGeom prst="roundRect">
+              <a:avLst/>
+            </a:prstGeom>
+            <a:solidFill>
+              <a:schemeClr val="accent6">
+                <a:lumMod val="40000"/>
+                <a:lumOff val="60000"/>
+              </a:schemeClr>
+            </a:solidFill>
+            <a:ln>
+              <a:solidFill>
+                <a:schemeClr val="tx1"/>
+              </a:solidFill>
+            </a:ln>
+          </p:spPr>
+          <p:style>
+            <a:lnRef idx="2">
+              <a:schemeClr val="accent1">
+                <a:shade val="50000"/>
+              </a:schemeClr>
+            </a:lnRef>
+            <a:fillRef idx="1">
+              <a:schemeClr val="accent1"/>
+            </a:fillRef>
+            <a:effectRef idx="0">
+              <a:schemeClr val="accent1"/>
+            </a:effectRef>
+            <a:fontRef idx="minor">
+              <a:schemeClr val="lt1"/>
+            </a:fontRef>
+          </p:style>
+          <p:txBody>
+            <a:bodyPr rtlCol="0" anchor="ctr"/>
+            <a:lstStyle/>
+            <a:p>
+              <a:pPr algn="ctr"/>
+              <a:r>
+                <a:rPr lang="en-US" b="1" dirty="0">
+                  <a:solidFill>
+                    <a:schemeClr val="tx1"/>
+                  </a:solidFill>
+                </a:rPr>
+                <a:t>:Interval_ </a:t>
+              </a:r>
+              <a:r>
+                <a:rPr lang="en-US" b="1" dirty="0">
+                  <a:solidFill>
+                    <a:schemeClr val="bg1">
+                      <a:lumMod val="65000"/>
+                    </a:schemeClr>
+                  </a:solidFill>
+                </a:rPr>
+                <a:t>xxx</a:t>
+              </a:r>
+            </a:p>
+          </p:txBody>
+        </p:sp>
+        <p:sp>
+          <p:nvSpPr>
+            <p:cNvPr id="65" name="TextBox 64">
+              <a:extLst>
+                <a:ext uri="{FF2B5EF4-FFF2-40B4-BE49-F238E27FC236}">
+                  <a16:creationId xmlns:a16="http://schemas.microsoft.com/office/drawing/2014/main" id="{5D224BE6-72F7-4AE8-A204-3798AF08CCE5}"/>
+                </a:ext>
+              </a:extLst>
+            </p:cNvPr>
+            <p:cNvSpPr txBox="1"/>
+            <p:nvPr/>
+          </p:nvSpPr>
+          <p:spPr>
+            <a:xfrm>
+              <a:off x="7488620" y="2599874"/>
+              <a:ext cx="907621" cy="369332"/>
+            </a:xfrm>
+            <a:prstGeom prst="rect">
+              <a:avLst/>
+            </a:prstGeom>
+            <a:noFill/>
+          </p:spPr>
+          <p:txBody>
+            <a:bodyPr wrap="none" rtlCol="0">
+              <a:spAutoFit/>
+            </a:bodyPr>
+            <a:lstStyle/>
+            <a:p>
+              <a:r>
+                <a:rPr lang="en-US" dirty="0">
+                  <a:solidFill>
+                    <a:srgbClr val="0033CC"/>
+                  </a:solidFill>
+                </a:rPr>
+                <a:t>SD1002</a:t>
+              </a:r>
+            </a:p>
+          </p:txBody>
+        </p:sp>
+      </p:grpSp>
+      <p:grpSp>
+        <p:nvGrpSpPr>
+          <p:cNvPr id="61" name="Group 60">
+            <a:extLst>
+              <a:ext uri="{FF2B5EF4-FFF2-40B4-BE49-F238E27FC236}">
+                <a16:creationId xmlns:a16="http://schemas.microsoft.com/office/drawing/2014/main" id="{B2B4E601-7A39-4F5A-8F8E-3F358A5F1D38}"/>
+              </a:ext>
+            </a:extLst>
+          </p:cNvPr>
+          <p:cNvGrpSpPr/>
+          <p:nvPr/>
+        </p:nvGrpSpPr>
+        <p:grpSpPr>
+          <a:xfrm>
+            <a:off x="4086580" y="1824505"/>
+            <a:ext cx="4303249" cy="457001"/>
+            <a:chOff x="4086580" y="1845414"/>
+            <a:chExt cx="4303249" cy="457001"/>
+          </a:xfrm>
+        </p:grpSpPr>
+        <p:sp>
+          <p:nvSpPr>
+            <p:cNvPr id="45" name="Rectangle: Rounded Corners 44">
+              <a:extLst>
+                <a:ext uri="{FF2B5EF4-FFF2-40B4-BE49-F238E27FC236}">
+                  <a16:creationId xmlns:a16="http://schemas.microsoft.com/office/drawing/2014/main" id="{B9A69A35-10B3-4874-B928-C93C5AEC02C5}"/>
+                </a:ext>
+              </a:extLst>
+            </p:cNvPr>
+            <p:cNvSpPr/>
+            <p:nvPr/>
+          </p:nvSpPr>
+          <p:spPr>
+            <a:xfrm>
+              <a:off x="4086580" y="1845414"/>
+              <a:ext cx="3154680" cy="457001"/>
+            </a:xfrm>
+            <a:prstGeom prst="roundRect">
+              <a:avLst/>
+            </a:prstGeom>
+            <a:solidFill>
+              <a:schemeClr val="accent6">
+                <a:lumMod val="40000"/>
+                <a:lumOff val="60000"/>
+              </a:schemeClr>
+            </a:solidFill>
+            <a:ln>
+              <a:solidFill>
+                <a:schemeClr val="tx1"/>
+              </a:solidFill>
+            </a:ln>
+          </p:spPr>
+          <p:style>
+            <a:lnRef idx="2">
+              <a:schemeClr val="accent1">
+                <a:shade val="50000"/>
+              </a:schemeClr>
+            </a:lnRef>
+            <a:fillRef idx="1">
+              <a:schemeClr val="accent1"/>
+            </a:fillRef>
+            <a:effectRef idx="0">
+              <a:schemeClr val="accent1"/>
+            </a:effectRef>
+            <a:fontRef idx="minor">
+              <a:schemeClr val="lt1"/>
+            </a:fontRef>
+          </p:style>
+          <p:txBody>
+            <a:bodyPr rtlCol="0" anchor="ctr"/>
+            <a:lstStyle/>
+            <a:p>
+              <a:pPr algn="ctr"/>
+              <a:r>
+                <a:rPr lang="en-US" b="1" dirty="0">
+                  <a:solidFill>
+                    <a:schemeClr val="tx1"/>
+                  </a:solidFill>
+                </a:rPr>
+                <a:t>:</a:t>
+              </a:r>
+              <a:r>
+                <a:rPr lang="en-US" b="1" dirty="0" err="1">
+                  <a:solidFill>
+                    <a:schemeClr val="tx1"/>
+                  </a:solidFill>
+                </a:rPr>
+                <a:t>UniqueSubjectIdentifier_</a:t>
+              </a:r>
+              <a:r>
+                <a:rPr lang="en-US" b="1" dirty="0" err="1">
+                  <a:solidFill>
+                    <a:schemeClr val="bg1">
+                      <a:lumMod val="65000"/>
+                    </a:schemeClr>
+                  </a:solidFill>
+                </a:rPr>
+                <a:t>xxx</a:t>
+              </a:r>
+              <a:endParaRPr lang="en-US" b="1" dirty="0">
+                <a:solidFill>
+                  <a:schemeClr val="bg1">
+                    <a:lumMod val="65000"/>
+                  </a:schemeClr>
+                </a:solidFill>
+              </a:endParaRPr>
+            </a:p>
+          </p:txBody>
+        </p:sp>
+        <p:sp>
+          <p:nvSpPr>
+            <p:cNvPr id="66" name="TextBox 65">
+              <a:extLst>
+                <a:ext uri="{FF2B5EF4-FFF2-40B4-BE49-F238E27FC236}">
+                  <a16:creationId xmlns:a16="http://schemas.microsoft.com/office/drawing/2014/main" id="{5EA58D63-D138-4D74-85D3-68642E78BDC5}"/>
+                </a:ext>
+              </a:extLst>
+            </p:cNvPr>
+            <p:cNvSpPr txBox="1"/>
+            <p:nvPr/>
+          </p:nvSpPr>
+          <p:spPr>
+            <a:xfrm>
+              <a:off x="7488620" y="1889248"/>
+              <a:ext cx="901209" cy="369332"/>
+            </a:xfrm>
+            <a:prstGeom prst="rect">
+              <a:avLst/>
+            </a:prstGeom>
+            <a:noFill/>
+          </p:spPr>
+          <p:txBody>
+            <a:bodyPr wrap="none" rtlCol="0">
+              <a:spAutoFit/>
+            </a:bodyPr>
+            <a:lstStyle/>
+            <a:p>
+              <a:r>
+                <a:rPr lang="en-US" dirty="0">
+                  <a:solidFill>
+                    <a:srgbClr val="0033CC"/>
+                  </a:solidFill>
+                </a:rPr>
+                <a:t>SD0083</a:t>
+              </a:r>
+            </a:p>
+          </p:txBody>
+        </p:sp>
+      </p:grpSp>
+      <p:grpSp>
+        <p:nvGrpSpPr>
+          <p:cNvPr id="60" name="Group 59">
+            <a:extLst>
+              <a:ext uri="{FF2B5EF4-FFF2-40B4-BE49-F238E27FC236}">
+                <a16:creationId xmlns:a16="http://schemas.microsoft.com/office/drawing/2014/main" id="{5423FC14-C7A9-41CF-958D-3D62827C4F64}"/>
+              </a:ext>
+            </a:extLst>
+          </p:cNvPr>
+          <p:cNvGrpSpPr/>
+          <p:nvPr/>
+        </p:nvGrpSpPr>
+        <p:grpSpPr>
+          <a:xfrm>
+            <a:off x="4086580" y="1172232"/>
+            <a:ext cx="4303249" cy="457001"/>
+            <a:chOff x="4086580" y="1172232"/>
+            <a:chExt cx="4303249" cy="457001"/>
+          </a:xfrm>
+        </p:grpSpPr>
+        <p:sp>
+          <p:nvSpPr>
+            <p:cNvPr id="41" name="Rectangle: Rounded Corners 40">
+              <a:extLst>
+                <a:ext uri="{FF2B5EF4-FFF2-40B4-BE49-F238E27FC236}">
+                  <a16:creationId xmlns:a16="http://schemas.microsoft.com/office/drawing/2014/main" id="{96684C95-C42A-41D0-B366-B571197353D3}"/>
+                </a:ext>
+              </a:extLst>
+            </p:cNvPr>
+            <p:cNvSpPr/>
+            <p:nvPr/>
+          </p:nvSpPr>
+          <p:spPr>
+            <a:xfrm>
+              <a:off x="4086580" y="1172232"/>
+              <a:ext cx="3154680" cy="457001"/>
+            </a:xfrm>
+            <a:prstGeom prst="roundRect">
+              <a:avLst/>
+            </a:prstGeom>
+            <a:solidFill>
+              <a:schemeClr val="accent6">
+                <a:lumMod val="40000"/>
+                <a:lumOff val="60000"/>
+              </a:schemeClr>
+            </a:solidFill>
+            <a:ln>
+              <a:solidFill>
+                <a:schemeClr val="tx1"/>
+              </a:solidFill>
+            </a:ln>
+          </p:spPr>
+          <p:style>
+            <a:lnRef idx="2">
+              <a:schemeClr val="accent1">
+                <a:shade val="50000"/>
+              </a:schemeClr>
+            </a:lnRef>
+            <a:fillRef idx="1">
+              <a:schemeClr val="accent1"/>
+            </a:fillRef>
+            <a:effectRef idx="0">
+              <a:schemeClr val="accent1"/>
+            </a:effectRef>
+            <a:fontRef idx="minor">
+              <a:schemeClr val="lt1"/>
+            </a:fontRef>
+          </p:style>
+          <p:txBody>
+            <a:bodyPr rtlCol="0" anchor="ctr"/>
+            <a:lstStyle/>
+            <a:p>
+              <a:pPr algn="ctr"/>
+              <a:r>
+                <a:rPr lang="en-US" b="1" dirty="0">
+                  <a:solidFill>
+                    <a:schemeClr val="tx1"/>
+                  </a:solidFill>
+                </a:rPr>
+                <a:t>:</a:t>
+              </a:r>
+              <a:r>
+                <a:rPr lang="en-US" b="1" dirty="0" err="1">
+                  <a:solidFill>
+                    <a:schemeClr val="tx1"/>
+                  </a:solidFill>
+                </a:rPr>
+                <a:t>SubjectIdentifier_</a:t>
+              </a:r>
+              <a:r>
+                <a:rPr lang="en-US" b="1" dirty="0" err="1">
+                  <a:solidFill>
+                    <a:schemeClr val="bg1">
+                      <a:lumMod val="65000"/>
+                    </a:schemeClr>
+                  </a:solidFill>
+                </a:rPr>
+                <a:t>xxx</a:t>
+              </a:r>
+              <a:endParaRPr lang="en-US" b="1" dirty="0">
+                <a:solidFill>
+                  <a:schemeClr val="bg1">
+                    <a:lumMod val="65000"/>
+                  </a:schemeClr>
+                </a:solidFill>
+              </a:endParaRPr>
+            </a:p>
+          </p:txBody>
+        </p:sp>
+        <p:sp>
+          <p:nvSpPr>
+            <p:cNvPr id="67" name="TextBox 66">
+              <a:extLst>
+                <a:ext uri="{FF2B5EF4-FFF2-40B4-BE49-F238E27FC236}">
+                  <a16:creationId xmlns:a16="http://schemas.microsoft.com/office/drawing/2014/main" id="{C9C7BDF3-D3D9-48BD-9F4F-5AD3A12FEAEA}"/>
+                </a:ext>
+              </a:extLst>
+            </p:cNvPr>
+            <p:cNvSpPr txBox="1"/>
+            <p:nvPr/>
+          </p:nvSpPr>
+          <p:spPr>
+            <a:xfrm>
+              <a:off x="7488620" y="1216066"/>
+              <a:ext cx="901209" cy="369332"/>
+            </a:xfrm>
+            <a:prstGeom prst="rect">
+              <a:avLst/>
+            </a:prstGeom>
+            <a:noFill/>
+          </p:spPr>
+          <p:txBody>
+            <a:bodyPr wrap="none" rtlCol="0">
+              <a:spAutoFit/>
+            </a:bodyPr>
+            <a:lstStyle/>
+            <a:p>
+              <a:r>
+                <a:rPr lang="en-US" dirty="0">
+                  <a:solidFill>
+                    <a:srgbClr val="0033CC"/>
+                  </a:solidFill>
+                </a:rPr>
+                <a:t>SD1001</a:t>
+              </a:r>
+            </a:p>
+          </p:txBody>
+        </p:sp>
+      </p:grpSp>
+      <p:grpSp>
+        <p:nvGrpSpPr>
+          <p:cNvPr id="72" name="Group 71">
+            <a:extLst>
+              <a:ext uri="{FF2B5EF4-FFF2-40B4-BE49-F238E27FC236}">
+                <a16:creationId xmlns:a16="http://schemas.microsoft.com/office/drawing/2014/main" id="{CAB79C9D-37A8-4F24-822B-19B5481CB369}"/>
+              </a:ext>
+            </a:extLst>
+          </p:cNvPr>
+          <p:cNvGrpSpPr/>
+          <p:nvPr/>
+        </p:nvGrpSpPr>
+        <p:grpSpPr>
+          <a:xfrm>
+            <a:off x="4086580" y="5085870"/>
+            <a:ext cx="7669555" cy="646331"/>
+            <a:chOff x="4086580" y="5155324"/>
+            <a:chExt cx="7669555" cy="646331"/>
+          </a:xfrm>
+        </p:grpSpPr>
+        <p:sp>
+          <p:nvSpPr>
+            <p:cNvPr id="54" name="Rectangle: Rounded Corners 53">
+              <a:extLst>
+                <a:ext uri="{FF2B5EF4-FFF2-40B4-BE49-F238E27FC236}">
+                  <a16:creationId xmlns:a16="http://schemas.microsoft.com/office/drawing/2014/main" id="{F3CCF06A-9EA7-441F-B0EE-8FE67B1BE6B9}"/>
+                </a:ext>
+              </a:extLst>
+            </p:cNvPr>
+            <p:cNvSpPr/>
+            <p:nvPr/>
+          </p:nvSpPr>
+          <p:spPr>
+            <a:xfrm>
+              <a:off x="4086580" y="5249989"/>
+              <a:ext cx="3154680" cy="457001"/>
+            </a:xfrm>
+            <a:prstGeom prst="roundRect">
+              <a:avLst/>
+            </a:prstGeom>
+            <a:solidFill>
+              <a:schemeClr val="accent6">
+                <a:lumMod val="40000"/>
+                <a:lumOff val="60000"/>
+              </a:schemeClr>
+            </a:solidFill>
+            <a:ln>
+              <a:solidFill>
+                <a:schemeClr val="tx1"/>
+              </a:solidFill>
+            </a:ln>
+          </p:spPr>
+          <p:style>
+            <a:lnRef idx="2">
+              <a:schemeClr val="accent1">
+                <a:shade val="50000"/>
+              </a:schemeClr>
+            </a:lnRef>
+            <a:fillRef idx="1">
+              <a:schemeClr val="accent1"/>
+            </a:fillRef>
+            <a:effectRef idx="0">
+              <a:schemeClr val="accent1"/>
+            </a:effectRef>
+            <a:fontRef idx="minor">
+              <a:schemeClr val="lt1"/>
+            </a:fontRef>
+          </p:style>
+          <p:txBody>
+            <a:bodyPr rtlCol="0" anchor="ctr"/>
+            <a:lstStyle/>
+            <a:p>
+              <a:pPr algn="ctr"/>
+              <a:r>
+                <a:rPr lang="en-US" b="1" dirty="0">
+                  <a:solidFill>
+                    <a:schemeClr val="tx1"/>
+                  </a:solidFill>
+                </a:rPr>
+                <a:t>:</a:t>
+              </a:r>
+              <a:r>
+                <a:rPr lang="en-US" b="1" dirty="0" err="1">
+                  <a:solidFill>
+                    <a:schemeClr val="tx1"/>
+                  </a:solidFill>
+                </a:rPr>
+                <a:t>AgeDataCollection_</a:t>
+              </a:r>
+              <a:r>
+                <a:rPr lang="en-US" b="1" dirty="0" err="1">
+                  <a:solidFill>
+                    <a:schemeClr val="bg1">
+                      <a:lumMod val="65000"/>
+                    </a:schemeClr>
+                  </a:solidFill>
+                </a:rPr>
+                <a:t>xxx</a:t>
+              </a:r>
+              <a:endParaRPr lang="en-US" b="1" dirty="0">
+                <a:solidFill>
+                  <a:schemeClr val="bg1">
+                    <a:lumMod val="65000"/>
+                  </a:schemeClr>
+                </a:solidFill>
+              </a:endParaRPr>
+            </a:p>
+          </p:txBody>
+        </p:sp>
+        <p:sp>
+          <p:nvSpPr>
+            <p:cNvPr id="68" name="TextBox 67">
+              <a:extLst>
+                <a:ext uri="{FF2B5EF4-FFF2-40B4-BE49-F238E27FC236}">
+                  <a16:creationId xmlns:a16="http://schemas.microsoft.com/office/drawing/2014/main" id="{7FF25D90-0557-4EDD-8A98-20605F11B1E6}"/>
+                </a:ext>
+              </a:extLst>
+            </p:cNvPr>
+            <p:cNvSpPr txBox="1"/>
+            <p:nvPr/>
+          </p:nvSpPr>
+          <p:spPr>
+            <a:xfrm>
+              <a:off x="7488620" y="5155324"/>
+              <a:ext cx="4267515" cy="646331"/>
+            </a:xfrm>
+            <a:prstGeom prst="rect">
+              <a:avLst/>
+            </a:prstGeom>
+            <a:noFill/>
+          </p:spPr>
+          <p:txBody>
+            <a:bodyPr wrap="none" rtlCol="0">
+              <a:spAutoFit/>
+            </a:bodyPr>
+            <a:lstStyle/>
+            <a:p>
+              <a:r>
+                <a:rPr lang="en-US" dirty="0">
+                  <a:solidFill>
+                    <a:srgbClr val="0033CC"/>
+                  </a:solidFill>
+                </a:rPr>
+                <a:t>SD0084, SD1129, SD1121, SD2019, SD2023,</a:t>
+              </a:r>
+            </a:p>
+            <a:p>
+              <a:r>
+                <a:rPr lang="en-US" dirty="0">
+                  <a:solidFill>
+                    <a:srgbClr val="0033CC"/>
+                  </a:solidFill>
+                </a:rPr>
+                <a:t>SD2020, SD2012, SD2022</a:t>
+              </a:r>
+            </a:p>
+          </p:txBody>
+        </p:sp>
+      </p:grpSp>
+      <p:grpSp>
+        <p:nvGrpSpPr>
+          <p:cNvPr id="71" name="Group 70">
+            <a:extLst>
+              <a:ext uri="{FF2B5EF4-FFF2-40B4-BE49-F238E27FC236}">
+                <a16:creationId xmlns:a16="http://schemas.microsoft.com/office/drawing/2014/main" id="{23591D3D-FDFC-4E53-A3EA-706DE35139F6}"/>
+              </a:ext>
+            </a:extLst>
+          </p:cNvPr>
+          <p:cNvGrpSpPr/>
+          <p:nvPr/>
+        </p:nvGrpSpPr>
+        <p:grpSpPr>
+          <a:xfrm>
+            <a:off x="4086580" y="3129051"/>
+            <a:ext cx="4303249" cy="457001"/>
+            <a:chOff x="4118111" y="3186824"/>
+            <a:chExt cx="4303249" cy="457001"/>
+          </a:xfrm>
+        </p:grpSpPr>
+        <p:sp>
+          <p:nvSpPr>
+            <p:cNvPr id="46" name="Rectangle: Rounded Corners 45">
+              <a:extLst>
+                <a:ext uri="{FF2B5EF4-FFF2-40B4-BE49-F238E27FC236}">
+                  <a16:creationId xmlns:a16="http://schemas.microsoft.com/office/drawing/2014/main" id="{9273A411-079F-48E2-AD6C-9DB949A0F839}"/>
+                </a:ext>
+              </a:extLst>
+            </p:cNvPr>
+            <p:cNvSpPr/>
+            <p:nvPr/>
+          </p:nvSpPr>
+          <p:spPr>
+            <a:xfrm>
+              <a:off x="4118111" y="3186824"/>
+              <a:ext cx="3154680" cy="457001"/>
+            </a:xfrm>
+            <a:prstGeom prst="roundRect">
+              <a:avLst/>
+            </a:prstGeom>
+            <a:solidFill>
+              <a:schemeClr val="accent6">
+                <a:lumMod val="40000"/>
+                <a:lumOff val="60000"/>
+              </a:schemeClr>
+            </a:solidFill>
+            <a:ln>
+              <a:solidFill>
+                <a:schemeClr val="tx1"/>
+              </a:solidFill>
+            </a:ln>
+          </p:spPr>
+          <p:style>
+            <a:lnRef idx="2">
+              <a:schemeClr val="accent1">
+                <a:shade val="50000"/>
+              </a:schemeClr>
+            </a:lnRef>
+            <a:fillRef idx="1">
+              <a:schemeClr val="accent1"/>
+            </a:fillRef>
+            <a:effectRef idx="0">
+              <a:schemeClr val="accent1"/>
+            </a:effectRef>
+            <a:fontRef idx="minor">
+              <a:schemeClr val="lt1"/>
+            </a:fontRef>
+          </p:style>
+          <p:txBody>
+            <a:bodyPr rtlCol="0" anchor="ctr"/>
+            <a:lstStyle/>
+            <a:p>
+              <a:pPr algn="ctr"/>
+              <a:r>
+                <a:rPr lang="en-US" b="1" dirty="0">
+                  <a:solidFill>
+                    <a:schemeClr val="tx1"/>
+                  </a:solidFill>
+                </a:rPr>
+                <a:t>:</a:t>
+              </a:r>
+              <a:r>
+                <a:rPr lang="en-US" b="1" dirty="0" err="1">
+                  <a:solidFill>
+                    <a:schemeClr val="tx1"/>
+                  </a:solidFill>
+                </a:rPr>
+                <a:t>Set_</a:t>
+              </a:r>
+              <a:r>
+                <a:rPr lang="en-US" b="1" dirty="0" err="1">
+                  <a:solidFill>
+                    <a:schemeClr val="bg1">
+                      <a:lumMod val="65000"/>
+                    </a:schemeClr>
+                  </a:solidFill>
+                </a:rPr>
+                <a:t>xxx</a:t>
+              </a:r>
+              <a:endParaRPr lang="en-US" b="1" dirty="0">
+                <a:solidFill>
+                  <a:schemeClr val="bg1">
+                    <a:lumMod val="65000"/>
+                  </a:schemeClr>
+                </a:solidFill>
+              </a:endParaRPr>
+            </a:p>
+          </p:txBody>
+        </p:sp>
+        <p:sp>
+          <p:nvSpPr>
+            <p:cNvPr id="69" name="TextBox 68">
+              <a:extLst>
+                <a:ext uri="{FF2B5EF4-FFF2-40B4-BE49-F238E27FC236}">
+                  <a16:creationId xmlns:a16="http://schemas.microsoft.com/office/drawing/2014/main" id="{6F203C4D-B611-4A8A-BD66-4B1E38326E02}"/>
+                </a:ext>
+              </a:extLst>
+            </p:cNvPr>
+            <p:cNvSpPr txBox="1"/>
+            <p:nvPr/>
+          </p:nvSpPr>
+          <p:spPr>
+            <a:xfrm>
+              <a:off x="7520151" y="3230658"/>
+              <a:ext cx="901209" cy="369332"/>
+            </a:xfrm>
+            <a:prstGeom prst="rect">
+              <a:avLst/>
+            </a:prstGeom>
+            <a:noFill/>
+          </p:spPr>
+          <p:txBody>
+            <a:bodyPr wrap="none" rtlCol="0">
+              <a:spAutoFit/>
+            </a:bodyPr>
+            <a:lstStyle/>
+            <a:p>
+              <a:r>
+                <a:rPr lang="en-US" dirty="0">
+                  <a:solidFill>
+                    <a:srgbClr val="0033CC"/>
+                  </a:solidFill>
+                </a:rPr>
+                <a:t>SD1259</a:t>
+              </a:r>
+            </a:p>
+          </p:txBody>
+        </p:sp>
+      </p:grpSp>
+    </p:spTree>
+    <p:extLst>
+      <p:ext uri="{BB962C8B-B14F-4D97-AF65-F5344CB8AC3E}">
+        <p14:creationId xmlns:p14="http://schemas.microsoft.com/office/powerpoint/2010/main" val="10956214"/>
+      </p:ext>
+    </p:extLst>
+  </p:cSld>
+  <p:clrMapOvr>
+    <a:masterClrMapping/>
+  </p:clrMapOvr>
+</p:sld>
+</file>
+
 <file path=ppt/theme/theme1.xml><?xml version="1.0" encoding="utf-8"?>
 <a:theme xmlns:a="http://schemas.openxmlformats.org/drawingml/2006/main" name="Office Theme">
   <a:themeElements>

</xml_diff>

<commit_message>
USUBJID shapes and testing
</commit_message>
<xml_diff>
--- a/doc/images/ImageSources.pptx
+++ b/doc/images/ImageSources.pptx
@@ -260,7 +260,7 @@
           <a:p>
             <a:fld id="{03ABD037-9D82-4436-AC70-ED75D2FE9417}" type="datetimeFigureOut">
               <a:rPr lang="en-US" smtClean="0"/>
-              <a:t>8/14/2019</a:t>
+              <a:t>8/15/2019</a:t>
             </a:fld>
             <a:endParaRPr lang="en-US"/>
           </a:p>
@@ -428,7 +428,7 @@
           <a:p>
             <a:fld id="{03ABD037-9D82-4436-AC70-ED75D2FE9417}" type="datetimeFigureOut">
               <a:rPr lang="en-US" smtClean="0"/>
-              <a:t>8/14/2019</a:t>
+              <a:t>8/15/2019</a:t>
             </a:fld>
             <a:endParaRPr lang="en-US"/>
           </a:p>
@@ -606,7 +606,7 @@
           <a:p>
             <a:fld id="{03ABD037-9D82-4436-AC70-ED75D2FE9417}" type="datetimeFigureOut">
               <a:rPr lang="en-US" smtClean="0"/>
-              <a:t>8/14/2019</a:t>
+              <a:t>8/15/2019</a:t>
             </a:fld>
             <a:endParaRPr lang="en-US"/>
           </a:p>
@@ -774,7 +774,7 @@
           <a:p>
             <a:fld id="{03ABD037-9D82-4436-AC70-ED75D2FE9417}" type="datetimeFigureOut">
               <a:rPr lang="en-US" smtClean="0"/>
-              <a:t>8/14/2019</a:t>
+              <a:t>8/15/2019</a:t>
             </a:fld>
             <a:endParaRPr lang="en-US"/>
           </a:p>
@@ -1019,7 +1019,7 @@
           <a:p>
             <a:fld id="{03ABD037-9D82-4436-AC70-ED75D2FE9417}" type="datetimeFigureOut">
               <a:rPr lang="en-US" smtClean="0"/>
-              <a:t>8/14/2019</a:t>
+              <a:t>8/15/2019</a:t>
             </a:fld>
             <a:endParaRPr lang="en-US"/>
           </a:p>
@@ -1248,7 +1248,7 @@
           <a:p>
             <a:fld id="{03ABD037-9D82-4436-AC70-ED75D2FE9417}" type="datetimeFigureOut">
               <a:rPr lang="en-US" smtClean="0"/>
-              <a:t>8/14/2019</a:t>
+              <a:t>8/15/2019</a:t>
             </a:fld>
             <a:endParaRPr lang="en-US"/>
           </a:p>
@@ -1612,7 +1612,7 @@
           <a:p>
             <a:fld id="{03ABD037-9D82-4436-AC70-ED75D2FE9417}" type="datetimeFigureOut">
               <a:rPr lang="en-US" smtClean="0"/>
-              <a:t>8/14/2019</a:t>
+              <a:t>8/15/2019</a:t>
             </a:fld>
             <a:endParaRPr lang="en-US"/>
           </a:p>
@@ -1729,7 +1729,7 @@
           <a:p>
             <a:fld id="{03ABD037-9D82-4436-AC70-ED75D2FE9417}" type="datetimeFigureOut">
               <a:rPr lang="en-US" smtClean="0"/>
-              <a:t>8/14/2019</a:t>
+              <a:t>8/15/2019</a:t>
             </a:fld>
             <a:endParaRPr lang="en-US"/>
           </a:p>
@@ -1824,7 +1824,7 @@
           <a:p>
             <a:fld id="{03ABD037-9D82-4436-AC70-ED75D2FE9417}" type="datetimeFigureOut">
               <a:rPr lang="en-US" smtClean="0"/>
-              <a:t>8/14/2019</a:t>
+              <a:t>8/15/2019</a:t>
             </a:fld>
             <a:endParaRPr lang="en-US"/>
           </a:p>
@@ -2099,7 +2099,7 @@
           <a:p>
             <a:fld id="{03ABD037-9D82-4436-AC70-ED75D2FE9417}" type="datetimeFigureOut">
               <a:rPr lang="en-US" smtClean="0"/>
-              <a:t>8/14/2019</a:t>
+              <a:t>8/15/2019</a:t>
             </a:fld>
             <a:endParaRPr lang="en-US"/>
           </a:p>
@@ -2351,7 +2351,7 @@
           <a:p>
             <a:fld id="{03ABD037-9D82-4436-AC70-ED75D2FE9417}" type="datetimeFigureOut">
               <a:rPr lang="en-US" smtClean="0"/>
-              <a:t>8/14/2019</a:t>
+              <a:t>8/15/2019</a:t>
             </a:fld>
             <a:endParaRPr lang="en-US"/>
           </a:p>
@@ -2562,7 +2562,7 @@
           <a:p>
             <a:fld id="{03ABD037-9D82-4436-AC70-ED75D2FE9417}" type="datetimeFigureOut">
               <a:rPr lang="en-US" smtClean="0"/>
-              <a:t>8/14/2019</a:t>
+              <a:t>8/15/2019</a:t>
             </a:fld>
             <a:endParaRPr lang="en-US"/>
           </a:p>
@@ -8500,21 +8500,23 @@
         </p:nvSpPr>
         <p:spPr>
           <a:xfrm>
-            <a:off x="533513" y="602691"/>
-            <a:ext cx="2971800" cy="449588"/>
+            <a:off x="324794" y="602691"/>
+            <a:ext cx="1828800" cy="449588"/>
           </a:xfrm>
           <a:prstGeom prst="roundRect">
             <a:avLst/>
           </a:prstGeom>
           <a:solidFill>
-            <a:schemeClr val="accent6">
+            <a:schemeClr val="accent1">
               <a:lumMod val="40000"/>
               <a:lumOff val="60000"/>
             </a:schemeClr>
           </a:solidFill>
-          <a:ln>
+          <a:ln w="38100">
             <a:solidFill>
-              <a:schemeClr val="tx1"/>
+              <a:schemeClr val="accent1">
+                <a:lumMod val="75000"/>
+              </a:schemeClr>
             </a:solidFill>
           </a:ln>
         </p:spPr>
@@ -8540,7 +8542,7 @@
           <a:p>
             <a:pPr algn="ctr"/>
             <a:r>
-              <a:rPr lang="en-US" sz="1600" dirty="0">
+              <a:rPr lang="en-US" b="1" dirty="0">
                 <a:solidFill>
                   <a:schemeClr val="tx1"/>
                 </a:solidFill>
@@ -8556,286 +8558,19 @@
               <a:t>Animal_</a:t>
             </a:r>
             <a:r>
-              <a:rPr lang="en-US" b="1" dirty="0" err="1">
+              <a:rPr lang="en-US" dirty="0" err="1">
                 <a:solidFill>
                   <a:schemeClr val="bg1">
-                    <a:lumMod val="65000"/>
+                    <a:lumMod val="50000"/>
                   </a:schemeClr>
                 </a:solidFill>
               </a:rPr>
               <a:t>xxx</a:t>
             </a:r>
-            <a:endParaRPr lang="en-US" b="1" dirty="0">
+            <a:endParaRPr lang="en-US" dirty="0">
               <a:solidFill>
                 <a:schemeClr val="bg1">
-                  <a:lumMod val="65000"/>
-                </a:schemeClr>
-              </a:solidFill>
-            </a:endParaRPr>
-          </a:p>
-        </p:txBody>
-      </p:sp>
-      <p:sp>
-        <p:nvSpPr>
-          <p:cNvPr id="49" name="Rectangle: Rounded Corners 48">
-            <a:extLst>
-              <a:ext uri="{FF2B5EF4-FFF2-40B4-BE49-F238E27FC236}">
-                <a16:creationId xmlns:a16="http://schemas.microsoft.com/office/drawing/2014/main" id="{AC5ADABD-A2F6-4C9F-93BC-ED94E5305351}"/>
-              </a:ext>
-            </a:extLst>
-          </p:cNvPr>
-          <p:cNvSpPr/>
-          <p:nvPr/>
-        </p:nvSpPr>
-        <p:spPr>
-          <a:xfrm>
-            <a:off x="4086580" y="3781324"/>
-            <a:ext cx="3154680" cy="457001"/>
-          </a:xfrm>
-          <a:prstGeom prst="roundRect">
-            <a:avLst/>
-          </a:prstGeom>
-          <a:solidFill>
-            <a:schemeClr val="accent6">
-              <a:lumMod val="40000"/>
-              <a:lumOff val="60000"/>
-            </a:schemeClr>
-          </a:solidFill>
-          <a:ln>
-            <a:solidFill>
-              <a:schemeClr val="tx1"/>
-            </a:solidFill>
-          </a:ln>
-        </p:spPr>
-        <p:style>
-          <a:lnRef idx="2">
-            <a:schemeClr val="accent1">
-              <a:shade val="50000"/>
-            </a:schemeClr>
-          </a:lnRef>
-          <a:fillRef idx="1">
-            <a:schemeClr val="accent1"/>
-          </a:fillRef>
-          <a:effectRef idx="0">
-            <a:schemeClr val="accent1"/>
-          </a:effectRef>
-          <a:fontRef idx="minor">
-            <a:schemeClr val="lt1"/>
-          </a:fontRef>
-        </p:style>
-        <p:txBody>
-          <a:bodyPr rtlCol="0" anchor="ctr"/>
-          <a:lstStyle/>
-          <a:p>
-            <a:pPr algn="ctr"/>
-            <a:r>
-              <a:rPr lang="en-US" b="1" dirty="0">
-                <a:solidFill>
-                  <a:schemeClr val="tx1"/>
-                </a:solidFill>
-              </a:rPr>
-              <a:t>:</a:t>
-            </a:r>
-            <a:r>
-              <a:rPr lang="en-US" b="1" dirty="0" err="1">
-                <a:solidFill>
-                  <a:schemeClr val="tx1"/>
-                </a:solidFill>
-              </a:rPr>
-              <a:t>Species_</a:t>
-            </a:r>
-            <a:r>
-              <a:rPr lang="en-US" b="1" dirty="0" err="1">
-                <a:solidFill>
-                  <a:schemeClr val="bg1">
-                    <a:lumMod val="65000"/>
-                  </a:schemeClr>
-                </a:solidFill>
-              </a:rPr>
-              <a:t>xxx</a:t>
-            </a:r>
-            <a:endParaRPr lang="en-US" b="1" dirty="0">
-              <a:solidFill>
-                <a:schemeClr val="bg1">
-                  <a:lumMod val="65000"/>
-                </a:schemeClr>
-              </a:solidFill>
-            </a:endParaRPr>
-          </a:p>
-        </p:txBody>
-      </p:sp>
-      <p:sp>
-        <p:nvSpPr>
-          <p:cNvPr id="53" name="Rectangle: Rounded Corners 52">
-            <a:extLst>
-              <a:ext uri="{FF2B5EF4-FFF2-40B4-BE49-F238E27FC236}">
-                <a16:creationId xmlns:a16="http://schemas.microsoft.com/office/drawing/2014/main" id="{5F64002F-F42A-4F15-A63A-C21552CDF952}"/>
-              </a:ext>
-            </a:extLst>
-          </p:cNvPr>
-          <p:cNvSpPr/>
-          <p:nvPr/>
-        </p:nvSpPr>
-        <p:spPr>
-          <a:xfrm>
-            <a:off x="4086580" y="4433597"/>
-            <a:ext cx="3154680" cy="457001"/>
-          </a:xfrm>
-          <a:prstGeom prst="roundRect">
-            <a:avLst/>
-          </a:prstGeom>
-          <a:solidFill>
-            <a:schemeClr val="accent6">
-              <a:lumMod val="40000"/>
-              <a:lumOff val="60000"/>
-            </a:schemeClr>
-          </a:solidFill>
-          <a:ln>
-            <a:solidFill>
-              <a:schemeClr val="tx1"/>
-            </a:solidFill>
-          </a:ln>
-        </p:spPr>
-        <p:style>
-          <a:lnRef idx="2">
-            <a:schemeClr val="accent1">
-              <a:shade val="50000"/>
-            </a:schemeClr>
-          </a:lnRef>
-          <a:fillRef idx="1">
-            <a:schemeClr val="accent1"/>
-          </a:fillRef>
-          <a:effectRef idx="0">
-            <a:schemeClr val="accent1"/>
-          </a:effectRef>
-          <a:fontRef idx="minor">
-            <a:schemeClr val="lt1"/>
-          </a:fontRef>
-        </p:style>
-        <p:txBody>
-          <a:bodyPr rtlCol="0" anchor="ctr"/>
-          <a:lstStyle/>
-          <a:p>
-            <a:pPr algn="ctr"/>
-            <a:r>
-              <a:rPr lang="en-US" b="1" dirty="0">
-                <a:solidFill>
-                  <a:schemeClr val="tx1"/>
-                </a:solidFill>
-              </a:rPr>
-              <a:t>:</a:t>
-            </a:r>
-            <a:r>
-              <a:rPr lang="en-US" b="1" dirty="0" err="1">
-                <a:solidFill>
-                  <a:schemeClr val="tx1"/>
-                </a:solidFill>
-              </a:rPr>
-              <a:t>SexDataCollection_</a:t>
-            </a:r>
-            <a:r>
-              <a:rPr lang="en-US" b="1" dirty="0" err="1">
-                <a:solidFill>
-                  <a:schemeClr val="bg1">
-                    <a:lumMod val="65000"/>
-                  </a:schemeClr>
-                </a:solidFill>
-              </a:rPr>
-              <a:t>xxx</a:t>
-            </a:r>
-            <a:endParaRPr lang="en-US" b="1" dirty="0">
-              <a:solidFill>
-                <a:schemeClr val="bg1">
-                  <a:lumMod val="65000"/>
-                </a:schemeClr>
-              </a:solidFill>
-            </a:endParaRPr>
-          </a:p>
-        </p:txBody>
-      </p:sp>
-      <p:sp>
-        <p:nvSpPr>
-          <p:cNvPr id="56" name="Rectangle: Rounded Corners 55">
-            <a:extLst>
-              <a:ext uri="{FF2B5EF4-FFF2-40B4-BE49-F238E27FC236}">
-                <a16:creationId xmlns:a16="http://schemas.microsoft.com/office/drawing/2014/main" id="{1F23C94D-E114-4BD9-9A4C-05D2B7B591B2}"/>
-              </a:ext>
-            </a:extLst>
-          </p:cNvPr>
-          <p:cNvSpPr/>
-          <p:nvPr/>
-        </p:nvSpPr>
-        <p:spPr>
-          <a:xfrm>
-            <a:off x="4086580" y="5927476"/>
-            <a:ext cx="3154680" cy="457001"/>
-          </a:xfrm>
-          <a:prstGeom prst="roundRect">
-            <a:avLst/>
-          </a:prstGeom>
-          <a:solidFill>
-            <a:schemeClr val="accent6">
-              <a:lumMod val="40000"/>
-              <a:lumOff val="60000"/>
-            </a:schemeClr>
-          </a:solidFill>
-          <a:ln>
-            <a:solidFill>
-              <a:schemeClr val="tx1"/>
-            </a:solidFill>
-          </a:ln>
-        </p:spPr>
-        <p:style>
-          <a:lnRef idx="2">
-            <a:schemeClr val="accent1">
-              <a:shade val="50000"/>
-            </a:schemeClr>
-          </a:lnRef>
-          <a:fillRef idx="1">
-            <a:schemeClr val="accent1"/>
-          </a:fillRef>
-          <a:effectRef idx="0">
-            <a:schemeClr val="accent1"/>
-          </a:effectRef>
-          <a:fontRef idx="minor">
-            <a:schemeClr val="lt1"/>
-          </a:fontRef>
-        </p:style>
-        <p:txBody>
-          <a:bodyPr rtlCol="0" anchor="ctr"/>
-          <a:lstStyle/>
-          <a:p>
-            <a:pPr algn="ctr"/>
-            <a:r>
-              <a:rPr lang="en-US" b="1" dirty="0">
-                <a:solidFill>
-                  <a:schemeClr val="tx1"/>
-                </a:solidFill>
-              </a:rPr>
-              <a:t>:</a:t>
-            </a:r>
-            <a:r>
-              <a:rPr lang="en-US" b="1" dirty="0" err="1">
-                <a:solidFill>
-                  <a:schemeClr val="tx1"/>
-                </a:solidFill>
-              </a:rPr>
-              <a:t>Randomization_</a:t>
-            </a:r>
-            <a:r>
-              <a:rPr lang="en-US" b="1" dirty="0" err="1">
-                <a:solidFill>
-                  <a:schemeClr val="bg1">
-                    <a:lumMod val="65000"/>
-                  </a:schemeClr>
-                </a:solidFill>
-              </a:rPr>
-              <a:t>xxx</a:t>
-            </a:r>
-            <a:endParaRPr lang="en-US" b="1" dirty="0">
-              <a:solidFill>
-                <a:schemeClr val="bg1">
-                  <a:lumMod val="65000"/>
+                  <a:lumMod val="50000"/>
                 </a:schemeClr>
               </a:solidFill>
             </a:endParaRPr>
@@ -8859,8 +8594,8 @@
         </p:nvCxnSpPr>
         <p:spPr>
           <a:xfrm rot="16200000" flipH="1">
-            <a:off x="2226496" y="845195"/>
-            <a:ext cx="1653000" cy="2067167"/>
+            <a:off x="571229" y="1720243"/>
+            <a:ext cx="1910125" cy="574195"/>
           </a:xfrm>
           <a:prstGeom prst="bentConnector2">
             <a:avLst/>
@@ -8906,8 +8641,8 @@
         </p:nvCxnSpPr>
         <p:spPr>
           <a:xfrm rot="16200000" flipH="1">
-            <a:off x="2878769" y="192922"/>
-            <a:ext cx="348454" cy="2067167"/>
+            <a:off x="896182" y="1395290"/>
+            <a:ext cx="1260219" cy="574195"/>
           </a:xfrm>
           <a:prstGeom prst="bentConnector2">
             <a:avLst/>
@@ -8953,8 +8688,8 @@
         </p:nvCxnSpPr>
         <p:spPr>
           <a:xfrm rot="16200000" flipH="1">
-            <a:off x="2552633" y="519058"/>
-            <a:ext cx="1000727" cy="2067167"/>
+            <a:off x="1221135" y="1070337"/>
+            <a:ext cx="610313" cy="574195"/>
           </a:xfrm>
           <a:prstGeom prst="bentConnector2">
             <a:avLst/>
@@ -9000,8 +8735,8 @@
         </p:nvCxnSpPr>
         <p:spPr>
           <a:xfrm rot="16200000" flipH="1">
-            <a:off x="1900360" y="1171331"/>
-            <a:ext cx="2305273" cy="2067167"/>
+            <a:off x="246276" y="2045196"/>
+            <a:ext cx="2560031" cy="574195"/>
           </a:xfrm>
           <a:prstGeom prst="bentConnector2">
             <a:avLst/>
@@ -9047,8 +8782,8 @@
         </p:nvCxnSpPr>
         <p:spPr>
           <a:xfrm rot="16200000" flipH="1">
-            <a:off x="1574223" y="1497468"/>
-            <a:ext cx="2957546" cy="2067167"/>
+            <a:off x="-78677" y="2370149"/>
+            <a:ext cx="3209937" cy="574195"/>
           </a:xfrm>
           <a:prstGeom prst="bentConnector2">
             <a:avLst/>
@@ -9094,8 +8829,8 @@
         </p:nvCxnSpPr>
         <p:spPr>
           <a:xfrm rot="16200000" flipH="1">
-            <a:off x="1248087" y="1823604"/>
-            <a:ext cx="3609819" cy="2067167"/>
+            <a:off x="-403630" y="2695102"/>
+            <a:ext cx="3859843" cy="574195"/>
           </a:xfrm>
           <a:prstGeom prst="bentConnector2">
             <a:avLst/>
@@ -9141,8 +8876,8 @@
         </p:nvCxnSpPr>
         <p:spPr>
           <a:xfrm rot="16200000" flipH="1">
-            <a:off x="874618" y="2197073"/>
-            <a:ext cx="4356757" cy="2067167"/>
+            <a:off x="-775916" y="3067388"/>
+            <a:ext cx="4604414" cy="574195"/>
           </a:xfrm>
           <a:prstGeom prst="bentConnector2">
             <a:avLst/>
@@ -9188,8 +8923,8 @@
         </p:nvCxnSpPr>
         <p:spPr>
           <a:xfrm rot="16200000" flipH="1">
-            <a:off x="501147" y="2570544"/>
-            <a:ext cx="5103698" cy="2067167"/>
+            <a:off x="-1148201" y="3439673"/>
+            <a:ext cx="5348984" cy="574195"/>
           </a:xfrm>
           <a:prstGeom prst="bentConnector2">
             <a:avLst/>
@@ -9232,7 +8967,7 @@
         </p:nvSpPr>
         <p:spPr>
           <a:xfrm>
-            <a:off x="7451835" y="567559"/>
+            <a:off x="8100050" y="1019504"/>
             <a:ext cx="3074881" cy="461665"/>
           </a:xfrm>
           <a:prstGeom prst="rect">
@@ -9247,12 +8982,20 @@
           <a:lstStyle/>
           <a:p>
             <a:r>
+              <a:rPr lang="en-US" sz="2400" b="1" u="sng" dirty="0">
+                <a:solidFill>
+                  <a:srgbClr val="0033CC"/>
+                </a:solidFill>
+              </a:rPr>
+              <a:t>SEND RULE</a:t>
+            </a:r>
+            <a:r>
               <a:rPr lang="en-US" sz="2400" b="1" dirty="0">
                 <a:solidFill>
                   <a:srgbClr val="0033CC"/>
                 </a:solidFill>
               </a:rPr>
-              <a:t>SEND RULE </a:t>
+              <a:t> </a:t>
             </a:r>
             <a:r>
               <a:rPr lang="en-US" sz="2000" dirty="0">
@@ -9265,12 +9008,676 @@
           </a:p>
         </p:txBody>
       </p:sp>
+      <p:sp>
+        <p:nvSpPr>
+          <p:cNvPr id="33" name="TextBox 32">
+            <a:extLst>
+              <a:ext uri="{FF2B5EF4-FFF2-40B4-BE49-F238E27FC236}">
+                <a16:creationId xmlns:a16="http://schemas.microsoft.com/office/drawing/2014/main" id="{62C8A6F8-EA4B-4D89-829A-5E9E2E668D49}"/>
+              </a:ext>
+            </a:extLst>
+          </p:cNvPr>
+          <p:cNvSpPr txBox="1"/>
+          <p:nvPr/>
+        </p:nvSpPr>
+        <p:spPr>
+          <a:xfrm>
+            <a:off x="5160580" y="115614"/>
+            <a:ext cx="968535" cy="461665"/>
+          </a:xfrm>
+          <a:prstGeom prst="rect">
+            <a:avLst/>
+          </a:prstGeom>
+          <a:noFill/>
+        </p:spPr>
+        <p:txBody>
+          <a:bodyPr wrap="none" rtlCol="0">
+            <a:spAutoFit/>
+          </a:bodyPr>
+          <a:lstStyle/>
+          <a:p>
+            <a:r>
+              <a:rPr lang="en-US" sz="2400" b="1" u="sng" dirty="0">
+                <a:solidFill>
+                  <a:schemeClr val="accent6">
+                    <a:lumMod val="75000"/>
+                  </a:schemeClr>
+                </a:solidFill>
+              </a:rPr>
+              <a:t>Shape</a:t>
+            </a:r>
+            <a:endParaRPr lang="en-US" sz="2000" u="sng" dirty="0">
+              <a:solidFill>
+                <a:schemeClr val="accent6">
+                  <a:lumMod val="75000"/>
+                </a:schemeClr>
+              </a:solidFill>
+            </a:endParaRPr>
+          </a:p>
+        </p:txBody>
+      </p:sp>
+      <p:sp>
+        <p:nvSpPr>
+          <p:cNvPr id="34" name="TextBox 33">
+            <a:extLst>
+              <a:ext uri="{FF2B5EF4-FFF2-40B4-BE49-F238E27FC236}">
+                <a16:creationId xmlns:a16="http://schemas.microsoft.com/office/drawing/2014/main" id="{3E9AD37C-99D0-4839-8FDA-6C1DE8ED6077}"/>
+              </a:ext>
+            </a:extLst>
+          </p:cNvPr>
+          <p:cNvSpPr txBox="1"/>
+          <p:nvPr/>
+        </p:nvSpPr>
+        <p:spPr>
+          <a:xfrm>
+            <a:off x="5160580" y="607949"/>
+            <a:ext cx="2109873" cy="369332"/>
+          </a:xfrm>
+          <a:prstGeom prst="rect">
+            <a:avLst/>
+          </a:prstGeom>
+          <a:noFill/>
+        </p:spPr>
+        <p:txBody>
+          <a:bodyPr wrap="none" rtlCol="0">
+            <a:spAutoFit/>
+          </a:bodyPr>
+          <a:lstStyle/>
+          <a:p>
+            <a:r>
+              <a:rPr lang="en-US" dirty="0" err="1">
+                <a:solidFill>
+                  <a:schemeClr val="accent6">
+                    <a:lumMod val="75000"/>
+                  </a:schemeClr>
+                </a:solidFill>
+              </a:rPr>
+              <a:t>AnimalSubjectShape</a:t>
+            </a:r>
+            <a:endParaRPr lang="en-US" dirty="0">
+              <a:solidFill>
+                <a:schemeClr val="accent6">
+                  <a:lumMod val="75000"/>
+                </a:schemeClr>
+              </a:solidFill>
+            </a:endParaRPr>
+          </a:p>
+        </p:txBody>
+      </p:sp>
+      <p:sp>
+        <p:nvSpPr>
+          <p:cNvPr id="45" name="Rectangle: Rounded Corners 44">
+            <a:extLst>
+              <a:ext uri="{FF2B5EF4-FFF2-40B4-BE49-F238E27FC236}">
+                <a16:creationId xmlns:a16="http://schemas.microsoft.com/office/drawing/2014/main" id="{B9A69A35-10B3-4874-B928-C93C5AEC02C5}"/>
+              </a:ext>
+            </a:extLst>
+          </p:cNvPr>
+          <p:cNvSpPr/>
+          <p:nvPr/>
+        </p:nvSpPr>
+        <p:spPr>
+          <a:xfrm>
+            <a:off x="1813389" y="1434091"/>
+            <a:ext cx="3154680" cy="457001"/>
+          </a:xfrm>
+          <a:prstGeom prst="roundRect">
+            <a:avLst/>
+          </a:prstGeom>
+          <a:solidFill>
+            <a:schemeClr val="accent1">
+              <a:lumMod val="40000"/>
+              <a:lumOff val="60000"/>
+            </a:schemeClr>
+          </a:solidFill>
+          <a:ln w="38100">
+            <a:solidFill>
+              <a:schemeClr val="accent1">
+                <a:lumMod val="75000"/>
+              </a:schemeClr>
+            </a:solidFill>
+          </a:ln>
+        </p:spPr>
+        <p:style>
+          <a:lnRef idx="2">
+            <a:schemeClr val="accent1">
+              <a:shade val="50000"/>
+            </a:schemeClr>
+          </a:lnRef>
+          <a:fillRef idx="1">
+            <a:schemeClr val="accent1"/>
+          </a:fillRef>
+          <a:effectRef idx="0">
+            <a:schemeClr val="accent1"/>
+          </a:effectRef>
+          <a:fontRef idx="minor">
+            <a:schemeClr val="lt1"/>
+          </a:fontRef>
+        </p:style>
+        <p:txBody>
+          <a:bodyPr rtlCol="0" anchor="ctr"/>
+          <a:lstStyle/>
+          <a:p>
+            <a:pPr algn="ctr"/>
+            <a:r>
+              <a:rPr lang="en-US" b="1" dirty="0">
+                <a:solidFill>
+                  <a:schemeClr val="tx1"/>
+                </a:solidFill>
+              </a:rPr>
+              <a:t>:</a:t>
+            </a:r>
+            <a:r>
+              <a:rPr lang="en-US" b="1" dirty="0" err="1">
+                <a:solidFill>
+                  <a:schemeClr val="tx1"/>
+                </a:solidFill>
+              </a:rPr>
+              <a:t>UniqueSubjectIdentifier_</a:t>
+            </a:r>
+            <a:r>
+              <a:rPr lang="en-US" dirty="0" err="1">
+                <a:solidFill>
+                  <a:schemeClr val="bg1">
+                    <a:lumMod val="50000"/>
+                  </a:schemeClr>
+                </a:solidFill>
+              </a:rPr>
+              <a:t>xxx</a:t>
+            </a:r>
+            <a:endParaRPr lang="en-US" dirty="0">
+              <a:solidFill>
+                <a:schemeClr val="bg1">
+                  <a:lumMod val="50000"/>
+                </a:schemeClr>
+              </a:solidFill>
+            </a:endParaRPr>
+          </a:p>
+        </p:txBody>
+      </p:sp>
+      <p:sp>
+        <p:nvSpPr>
+          <p:cNvPr id="67" name="TextBox 66">
+            <a:extLst>
+              <a:ext uri="{FF2B5EF4-FFF2-40B4-BE49-F238E27FC236}">
+                <a16:creationId xmlns:a16="http://schemas.microsoft.com/office/drawing/2014/main" id="{C9C7BDF3-D3D9-48BD-9F4F-5AD3A12FEAEA}"/>
+              </a:ext>
+            </a:extLst>
+          </p:cNvPr>
+          <p:cNvSpPr txBox="1"/>
+          <p:nvPr/>
+        </p:nvSpPr>
+        <p:spPr>
+          <a:xfrm>
+            <a:off x="8109989" y="2137123"/>
+            <a:ext cx="901209" cy="369332"/>
+          </a:xfrm>
+          <a:prstGeom prst="rect">
+            <a:avLst/>
+          </a:prstGeom>
+          <a:noFill/>
+        </p:spPr>
+        <p:txBody>
+          <a:bodyPr wrap="none" rtlCol="0">
+            <a:spAutoFit/>
+          </a:bodyPr>
+          <a:lstStyle>
+            <a:defPPr>
+              <a:defRPr lang="en-US"/>
+            </a:defPPr>
+            <a:lvl1pPr>
+              <a:defRPr>
+                <a:solidFill>
+                  <a:srgbClr val="0033CC"/>
+                </a:solidFill>
+              </a:defRPr>
+            </a:lvl1pPr>
+          </a:lstStyle>
+          <a:p>
+            <a:r>
+              <a:rPr lang="en-US" dirty="0"/>
+              <a:t>SD1001</a:t>
+            </a:r>
+          </a:p>
+        </p:txBody>
+      </p:sp>
+      <p:sp>
+        <p:nvSpPr>
+          <p:cNvPr id="6" name="TextBox 5">
+            <a:extLst>
+              <a:ext uri="{FF2B5EF4-FFF2-40B4-BE49-F238E27FC236}">
+                <a16:creationId xmlns:a16="http://schemas.microsoft.com/office/drawing/2014/main" id="{5B1D4099-CC90-4185-8F8A-EA5B20B71FD1}"/>
+              </a:ext>
+            </a:extLst>
+          </p:cNvPr>
+          <p:cNvSpPr txBox="1"/>
+          <p:nvPr/>
+        </p:nvSpPr>
+        <p:spPr>
+          <a:xfrm>
+            <a:off x="5160580" y="1338779"/>
+            <a:ext cx="2915670" cy="646331"/>
+          </a:xfrm>
+          <a:prstGeom prst="rect">
+            <a:avLst/>
+          </a:prstGeom>
+          <a:noFill/>
+        </p:spPr>
+        <p:txBody>
+          <a:bodyPr wrap="none" rtlCol="0">
+            <a:spAutoFit/>
+          </a:bodyPr>
+          <a:lstStyle>
+            <a:defPPr>
+              <a:defRPr lang="en-US"/>
+            </a:defPPr>
+            <a:lvl1pPr>
+              <a:defRPr>
+                <a:solidFill>
+                  <a:schemeClr val="accent6">
+                    <a:lumMod val="75000"/>
+                  </a:schemeClr>
+                </a:solidFill>
+              </a:defRPr>
+            </a:lvl1pPr>
+          </a:lstStyle>
+          <a:p>
+            <a:r>
+              <a:rPr lang="en-US" dirty="0"/>
+              <a:t>hasMin1Max1Shape-</a:t>
+            </a:r>
+            <a:r>
+              <a:rPr lang="en-US" b="1" dirty="0"/>
+              <a:t>USubjID</a:t>
+            </a:r>
+          </a:p>
+          <a:p>
+            <a:r>
+              <a:rPr lang="en-US" dirty="0" err="1"/>
+              <a:t>isUniqueShape</a:t>
+            </a:r>
+            <a:r>
+              <a:rPr lang="en-US" b="1" dirty="0" err="1"/>
+              <a:t>-USubjID</a:t>
+            </a:r>
+            <a:r>
+              <a:rPr lang="en-US" b="1" dirty="0"/>
+              <a:t> </a:t>
+            </a:r>
+          </a:p>
+        </p:txBody>
+      </p:sp>
+      <p:sp>
+        <p:nvSpPr>
+          <p:cNvPr id="66" name="TextBox 65">
+            <a:extLst>
+              <a:ext uri="{FF2B5EF4-FFF2-40B4-BE49-F238E27FC236}">
+                <a16:creationId xmlns:a16="http://schemas.microsoft.com/office/drawing/2014/main" id="{5EA58D63-D138-4D74-85D3-68642E78BDC5}"/>
+              </a:ext>
+            </a:extLst>
+          </p:cNvPr>
+          <p:cNvSpPr txBox="1"/>
+          <p:nvPr/>
+        </p:nvSpPr>
+        <p:spPr>
+          <a:xfrm>
+            <a:off x="8109989" y="1451970"/>
+            <a:ext cx="901209" cy="369332"/>
+          </a:xfrm>
+          <a:prstGeom prst="rect">
+            <a:avLst/>
+          </a:prstGeom>
+          <a:noFill/>
+        </p:spPr>
+        <p:txBody>
+          <a:bodyPr wrap="none" rtlCol="0">
+            <a:spAutoFit/>
+          </a:bodyPr>
+          <a:lstStyle/>
+          <a:p>
+            <a:r>
+              <a:rPr lang="en-US" dirty="0">
+                <a:solidFill>
+                  <a:srgbClr val="0033CC"/>
+                </a:solidFill>
+              </a:rPr>
+              <a:t>SD0083</a:t>
+            </a:r>
+          </a:p>
+        </p:txBody>
+      </p:sp>
+      <p:sp>
+        <p:nvSpPr>
+          <p:cNvPr id="41" name="Rectangle: Rounded Corners 40">
+            <a:extLst>
+              <a:ext uri="{FF2B5EF4-FFF2-40B4-BE49-F238E27FC236}">
+                <a16:creationId xmlns:a16="http://schemas.microsoft.com/office/drawing/2014/main" id="{96684C95-C42A-41D0-B366-B571197353D3}"/>
+              </a:ext>
+            </a:extLst>
+          </p:cNvPr>
+          <p:cNvSpPr/>
+          <p:nvPr/>
+        </p:nvSpPr>
+        <p:spPr>
+          <a:xfrm>
+            <a:off x="1813389" y="2083997"/>
+            <a:ext cx="3154680" cy="457001"/>
+          </a:xfrm>
+          <a:prstGeom prst="roundRect">
+            <a:avLst/>
+          </a:prstGeom>
+          <a:solidFill>
+            <a:schemeClr val="accent1">
+              <a:lumMod val="40000"/>
+              <a:lumOff val="60000"/>
+            </a:schemeClr>
+          </a:solidFill>
+          <a:ln w="38100">
+            <a:solidFill>
+              <a:schemeClr val="accent1">
+                <a:lumMod val="75000"/>
+              </a:schemeClr>
+            </a:solidFill>
+          </a:ln>
+        </p:spPr>
+        <p:style>
+          <a:lnRef idx="2">
+            <a:schemeClr val="accent1">
+              <a:shade val="50000"/>
+            </a:schemeClr>
+          </a:lnRef>
+          <a:fillRef idx="1">
+            <a:schemeClr val="accent1"/>
+          </a:fillRef>
+          <a:effectRef idx="0">
+            <a:schemeClr val="accent1"/>
+          </a:effectRef>
+          <a:fontRef idx="minor">
+            <a:schemeClr val="lt1"/>
+          </a:fontRef>
+        </p:style>
+        <p:txBody>
+          <a:bodyPr rtlCol="0" anchor="ctr"/>
+          <a:lstStyle/>
+          <a:p>
+            <a:pPr algn="ctr"/>
+            <a:r>
+              <a:rPr lang="en-US" b="1" u="sng" dirty="0">
+                <a:solidFill>
+                  <a:schemeClr val="tx1"/>
+                </a:solidFill>
+              </a:rPr>
+              <a:t>:</a:t>
+            </a:r>
+            <a:r>
+              <a:rPr lang="en-US" b="1" u="sng" dirty="0" err="1">
+                <a:solidFill>
+                  <a:schemeClr val="tx1"/>
+                </a:solidFill>
+              </a:rPr>
+              <a:t>SubjectIdentifier_</a:t>
+            </a:r>
+            <a:r>
+              <a:rPr lang="en-US" u="sng" dirty="0" err="1">
+                <a:solidFill>
+                  <a:schemeClr val="bg1">
+                    <a:lumMod val="50000"/>
+                  </a:schemeClr>
+                </a:solidFill>
+              </a:rPr>
+              <a:t>xxx</a:t>
+            </a:r>
+            <a:endParaRPr lang="en-US" u="sng" dirty="0">
+              <a:solidFill>
+                <a:schemeClr val="bg1">
+                  <a:lumMod val="50000"/>
+                </a:schemeClr>
+              </a:solidFill>
+            </a:endParaRPr>
+          </a:p>
+        </p:txBody>
+      </p:sp>
+      <p:sp>
+        <p:nvSpPr>
+          <p:cNvPr id="36" name="TextBox 35">
+            <a:extLst>
+              <a:ext uri="{FF2B5EF4-FFF2-40B4-BE49-F238E27FC236}">
+                <a16:creationId xmlns:a16="http://schemas.microsoft.com/office/drawing/2014/main" id="{37C1B666-B42B-44A1-BCF0-D388A8A4B86C}"/>
+              </a:ext>
+            </a:extLst>
+          </p:cNvPr>
+          <p:cNvSpPr txBox="1"/>
+          <p:nvPr/>
+        </p:nvSpPr>
+        <p:spPr>
+          <a:xfrm>
+            <a:off x="5160580" y="1998624"/>
+            <a:ext cx="2768194" cy="646331"/>
+          </a:xfrm>
+          <a:prstGeom prst="rect">
+            <a:avLst/>
+          </a:prstGeom>
+          <a:noFill/>
+        </p:spPr>
+        <p:txBody>
+          <a:bodyPr wrap="none" rtlCol="0">
+            <a:spAutoFit/>
+          </a:bodyPr>
+          <a:lstStyle>
+            <a:defPPr>
+              <a:defRPr lang="en-US"/>
+            </a:defPPr>
+            <a:lvl1pPr>
+              <a:defRPr>
+                <a:solidFill>
+                  <a:schemeClr val="accent6">
+                    <a:lumMod val="75000"/>
+                  </a:schemeClr>
+                </a:solidFill>
+              </a:defRPr>
+            </a:lvl1pPr>
+          </a:lstStyle>
+          <a:p>
+            <a:r>
+              <a:rPr lang="en-US" dirty="0"/>
+              <a:t>hasMin1Max1Shape-</a:t>
+            </a:r>
+            <a:r>
+              <a:rPr lang="en-US" b="1" dirty="0"/>
+              <a:t>SubjID</a:t>
+            </a:r>
+          </a:p>
+          <a:p>
+            <a:r>
+              <a:rPr lang="en-US" dirty="0" err="1"/>
+              <a:t>isUniqueShape-</a:t>
+            </a:r>
+            <a:r>
+              <a:rPr lang="en-US" b="1" dirty="0" err="1"/>
+              <a:t>SubjID</a:t>
+            </a:r>
+            <a:r>
+              <a:rPr lang="en-US" dirty="0"/>
+              <a:t> </a:t>
+            </a:r>
+          </a:p>
+        </p:txBody>
+      </p:sp>
+      <p:sp>
+        <p:nvSpPr>
+          <p:cNvPr id="15" name="Rectangle: Rounded Corners 14">
+            <a:extLst>
+              <a:ext uri="{FF2B5EF4-FFF2-40B4-BE49-F238E27FC236}">
+                <a16:creationId xmlns:a16="http://schemas.microsoft.com/office/drawing/2014/main" id="{F2D1CDB2-6DA6-45BF-B57E-8A1B3116DAB8}"/>
+              </a:ext>
+            </a:extLst>
+          </p:cNvPr>
+          <p:cNvSpPr/>
+          <p:nvPr/>
+        </p:nvSpPr>
+        <p:spPr>
+          <a:xfrm>
+            <a:off x="1813389" y="2733903"/>
+            <a:ext cx="3154680" cy="457001"/>
+          </a:xfrm>
+          <a:prstGeom prst="roundRect">
+            <a:avLst/>
+          </a:prstGeom>
+          <a:solidFill>
+            <a:schemeClr val="accent1">
+              <a:lumMod val="40000"/>
+              <a:lumOff val="60000"/>
+            </a:schemeClr>
+          </a:solidFill>
+          <a:ln w="38100">
+            <a:solidFill>
+              <a:schemeClr val="accent1">
+                <a:lumMod val="75000"/>
+              </a:schemeClr>
+            </a:solidFill>
+          </a:ln>
+        </p:spPr>
+        <p:style>
+          <a:lnRef idx="2">
+            <a:schemeClr val="accent1">
+              <a:shade val="50000"/>
+            </a:schemeClr>
+          </a:lnRef>
+          <a:fillRef idx="1">
+            <a:schemeClr val="accent1"/>
+          </a:fillRef>
+          <a:effectRef idx="0">
+            <a:schemeClr val="accent1"/>
+          </a:effectRef>
+          <a:fontRef idx="minor">
+            <a:schemeClr val="lt1"/>
+          </a:fontRef>
+        </p:style>
+        <p:txBody>
+          <a:bodyPr rtlCol="0" anchor="ctr"/>
+          <a:lstStyle/>
+          <a:p>
+            <a:pPr algn="ctr"/>
+            <a:r>
+              <a:rPr lang="en-US" b="1" dirty="0">
+                <a:solidFill>
+                  <a:schemeClr val="tx1"/>
+                </a:solidFill>
+              </a:rPr>
+              <a:t>:Interval_</a:t>
+            </a:r>
+            <a:r>
+              <a:rPr lang="en-US" dirty="0">
+                <a:solidFill>
+                  <a:schemeClr val="bg1">
+                    <a:lumMod val="50000"/>
+                  </a:schemeClr>
+                </a:solidFill>
+              </a:rPr>
+              <a:t> xxx</a:t>
+            </a:r>
+          </a:p>
+        </p:txBody>
+      </p:sp>
+      <p:sp>
+        <p:nvSpPr>
+          <p:cNvPr id="65" name="TextBox 64">
+            <a:extLst>
+              <a:ext uri="{FF2B5EF4-FFF2-40B4-BE49-F238E27FC236}">
+                <a16:creationId xmlns:a16="http://schemas.microsoft.com/office/drawing/2014/main" id="{5D224BE6-72F7-4AE8-A204-3798AF08CCE5}"/>
+              </a:ext>
+            </a:extLst>
+          </p:cNvPr>
+          <p:cNvSpPr txBox="1"/>
+          <p:nvPr/>
+        </p:nvSpPr>
+        <p:spPr>
+          <a:xfrm>
+            <a:off x="8100050" y="2777737"/>
+            <a:ext cx="1184820" cy="369332"/>
+          </a:xfrm>
+          <a:prstGeom prst="rect">
+            <a:avLst/>
+          </a:prstGeom>
+          <a:noFill/>
+        </p:spPr>
+        <p:txBody>
+          <a:bodyPr wrap="square" rtlCol="0">
+            <a:spAutoFit/>
+          </a:bodyPr>
+          <a:lstStyle/>
+          <a:p>
+            <a:r>
+              <a:rPr lang="en-US" dirty="0">
+                <a:solidFill>
+                  <a:srgbClr val="0033CC"/>
+                </a:solidFill>
+              </a:rPr>
+              <a:t>SD1002</a:t>
+            </a:r>
+          </a:p>
+        </p:txBody>
+      </p:sp>
+      <p:sp>
+        <p:nvSpPr>
+          <p:cNvPr id="38" name="TextBox 37">
+            <a:extLst>
+              <a:ext uri="{FF2B5EF4-FFF2-40B4-BE49-F238E27FC236}">
+                <a16:creationId xmlns:a16="http://schemas.microsoft.com/office/drawing/2014/main" id="{58A3FADE-C48C-40D6-A250-73404B030070}"/>
+              </a:ext>
+            </a:extLst>
+          </p:cNvPr>
+          <p:cNvSpPr txBox="1"/>
+          <p:nvPr/>
+        </p:nvSpPr>
+        <p:spPr>
+          <a:xfrm>
+            <a:off x="5160580" y="2777737"/>
+            <a:ext cx="1843582" cy="369332"/>
+          </a:xfrm>
+          <a:prstGeom prst="rect">
+            <a:avLst/>
+          </a:prstGeom>
+          <a:noFill/>
+        </p:spPr>
+        <p:txBody>
+          <a:bodyPr wrap="none" rtlCol="0">
+            <a:spAutoFit/>
+          </a:bodyPr>
+          <a:lstStyle>
+            <a:defPPr>
+              <a:defRPr lang="en-US"/>
+            </a:defPPr>
+            <a:lvl1pPr>
+              <a:defRPr>
+                <a:solidFill>
+                  <a:schemeClr val="accent6">
+                    <a:lumMod val="75000"/>
+                  </a:schemeClr>
+                </a:solidFill>
+              </a:defRPr>
+            </a:lvl1pPr>
+          </a:lstStyle>
+          <a:p>
+            <a:r>
+              <a:rPr lang="en-US" i="1" dirty="0">
+                <a:solidFill>
+                  <a:schemeClr val="bg1">
+                    <a:lumMod val="50000"/>
+                  </a:schemeClr>
+                </a:solidFill>
+              </a:rPr>
+              <a:t>To be determined</a:t>
+            </a:r>
+          </a:p>
+        </p:txBody>
+      </p:sp>
       <p:grpSp>
         <p:nvGrpSpPr>
-          <p:cNvPr id="62" name="Group 61">
+          <p:cNvPr id="11" name="Group 10">
             <a:extLst>
               <a:ext uri="{FF2B5EF4-FFF2-40B4-BE49-F238E27FC236}">
-                <a16:creationId xmlns:a16="http://schemas.microsoft.com/office/drawing/2014/main" id="{4BDF3735-69F5-4F62-A230-5168088C4245}"/>
+                <a16:creationId xmlns:a16="http://schemas.microsoft.com/office/drawing/2014/main" id="{9A54AA4A-4955-45A6-950C-B11D71165AD6}"/>
               </a:ext>
             </a:extLst>
           </p:cNvPr>
@@ -9279,18 +9686,18 @@
         </p:nvGrpSpPr>
         <p:grpSpPr>
           <a:xfrm>
-            <a:off x="4086580" y="2476778"/>
-            <a:ext cx="4309661" cy="457001"/>
-            <a:chOff x="4086580" y="2556040"/>
-            <a:chExt cx="4309661" cy="457001"/>
+            <a:off x="1813389" y="4033715"/>
+            <a:ext cx="5190773" cy="457001"/>
+            <a:chOff x="1813389" y="4044231"/>
+            <a:chExt cx="5190773" cy="457001"/>
           </a:xfrm>
         </p:grpSpPr>
         <p:sp>
           <p:nvSpPr>
-            <p:cNvPr id="15" name="Rectangle: Rounded Corners 14">
+            <p:cNvPr id="49" name="Rectangle: Rounded Corners 48">
               <a:extLst>
                 <a:ext uri="{FF2B5EF4-FFF2-40B4-BE49-F238E27FC236}">
-                  <a16:creationId xmlns:a16="http://schemas.microsoft.com/office/drawing/2014/main" id="{F2D1CDB2-6DA6-45BF-B57E-8A1B3116DAB8}"/>
+                  <a16:creationId xmlns:a16="http://schemas.microsoft.com/office/drawing/2014/main" id="{AC5ADABD-A2F6-4C9F-93BC-ED94E5305351}"/>
                 </a:ext>
               </a:extLst>
             </p:cNvPr>
@@ -9299,155 +9706,23 @@
           </p:nvSpPr>
           <p:spPr>
             <a:xfrm>
-              <a:off x="4086580" y="2556040"/>
+              <a:off x="1813389" y="4044231"/>
               <a:ext cx="3154680" cy="457001"/>
             </a:xfrm>
             <a:prstGeom prst="roundRect">
               <a:avLst/>
             </a:prstGeom>
             <a:solidFill>
-              <a:schemeClr val="accent6">
+              <a:schemeClr val="accent1">
                 <a:lumMod val="40000"/>
                 <a:lumOff val="60000"/>
               </a:schemeClr>
             </a:solidFill>
-            <a:ln>
+            <a:ln w="38100">
               <a:solidFill>
-                <a:schemeClr val="tx1"/>
-              </a:solidFill>
-            </a:ln>
-          </p:spPr>
-          <p:style>
-            <a:lnRef idx="2">
-              <a:schemeClr val="accent1">
-                <a:shade val="50000"/>
-              </a:schemeClr>
-            </a:lnRef>
-            <a:fillRef idx="1">
-              <a:schemeClr val="accent1"/>
-            </a:fillRef>
-            <a:effectRef idx="0">
-              <a:schemeClr val="accent1"/>
-            </a:effectRef>
-            <a:fontRef idx="minor">
-              <a:schemeClr val="lt1"/>
-            </a:fontRef>
-          </p:style>
-          <p:txBody>
-            <a:bodyPr rtlCol="0" anchor="ctr"/>
-            <a:lstStyle/>
-            <a:p>
-              <a:pPr algn="ctr"/>
-              <a:r>
-                <a:rPr lang="en-US" b="1" dirty="0">
-                  <a:solidFill>
-                    <a:schemeClr val="tx1"/>
-                  </a:solidFill>
-                </a:rPr>
-                <a:t>:Interval_ </a:t>
-              </a:r>
-              <a:r>
-                <a:rPr lang="en-US" b="1" dirty="0">
-                  <a:solidFill>
-                    <a:schemeClr val="bg1">
-                      <a:lumMod val="65000"/>
-                    </a:schemeClr>
-                  </a:solidFill>
-                </a:rPr>
-                <a:t>xxx</a:t>
-              </a:r>
-            </a:p>
-          </p:txBody>
-        </p:sp>
-        <p:sp>
-          <p:nvSpPr>
-            <p:cNvPr id="65" name="TextBox 64">
-              <a:extLst>
-                <a:ext uri="{FF2B5EF4-FFF2-40B4-BE49-F238E27FC236}">
-                  <a16:creationId xmlns:a16="http://schemas.microsoft.com/office/drawing/2014/main" id="{5D224BE6-72F7-4AE8-A204-3798AF08CCE5}"/>
-                </a:ext>
-              </a:extLst>
-            </p:cNvPr>
-            <p:cNvSpPr txBox="1"/>
-            <p:nvPr/>
-          </p:nvSpPr>
-          <p:spPr>
-            <a:xfrm>
-              <a:off x="7488620" y="2599874"/>
-              <a:ext cx="907621" cy="369332"/>
-            </a:xfrm>
-            <a:prstGeom prst="rect">
-              <a:avLst/>
-            </a:prstGeom>
-            <a:noFill/>
-          </p:spPr>
-          <p:txBody>
-            <a:bodyPr wrap="none" rtlCol="0">
-              <a:spAutoFit/>
-            </a:bodyPr>
-            <a:lstStyle/>
-            <a:p>
-              <a:r>
-                <a:rPr lang="en-US" dirty="0">
-                  <a:solidFill>
-                    <a:srgbClr val="0033CC"/>
-                  </a:solidFill>
-                </a:rPr>
-                <a:t>SD1002</a:t>
-              </a:r>
-            </a:p>
-          </p:txBody>
-        </p:sp>
-      </p:grpSp>
-      <p:grpSp>
-        <p:nvGrpSpPr>
-          <p:cNvPr id="61" name="Group 60">
-            <a:extLst>
-              <a:ext uri="{FF2B5EF4-FFF2-40B4-BE49-F238E27FC236}">
-                <a16:creationId xmlns:a16="http://schemas.microsoft.com/office/drawing/2014/main" id="{B2B4E601-7A39-4F5A-8F8E-3F358A5F1D38}"/>
-              </a:ext>
-            </a:extLst>
-          </p:cNvPr>
-          <p:cNvGrpSpPr/>
-          <p:nvPr/>
-        </p:nvGrpSpPr>
-        <p:grpSpPr>
-          <a:xfrm>
-            <a:off x="4086580" y="1824505"/>
-            <a:ext cx="4303249" cy="457001"/>
-            <a:chOff x="4086580" y="1845414"/>
-            <a:chExt cx="4303249" cy="457001"/>
-          </a:xfrm>
-        </p:grpSpPr>
-        <p:sp>
-          <p:nvSpPr>
-            <p:cNvPr id="45" name="Rectangle: Rounded Corners 44">
-              <a:extLst>
-                <a:ext uri="{FF2B5EF4-FFF2-40B4-BE49-F238E27FC236}">
-                  <a16:creationId xmlns:a16="http://schemas.microsoft.com/office/drawing/2014/main" id="{B9A69A35-10B3-4874-B928-C93C5AEC02C5}"/>
-                </a:ext>
-              </a:extLst>
-            </p:cNvPr>
-            <p:cNvSpPr/>
-            <p:nvPr/>
-          </p:nvSpPr>
-          <p:spPr>
-            <a:xfrm>
-              <a:off x="4086580" y="1845414"/>
-              <a:ext cx="3154680" cy="457001"/>
-            </a:xfrm>
-            <a:prstGeom prst="roundRect">
-              <a:avLst/>
-            </a:prstGeom>
-            <a:solidFill>
-              <a:schemeClr val="accent6">
-                <a:lumMod val="40000"/>
-                <a:lumOff val="60000"/>
-              </a:schemeClr>
-            </a:solidFill>
-            <a:ln>
-              <a:solidFill>
-                <a:schemeClr val="tx1"/>
+                <a:schemeClr val="accent1">
+                  <a:lumMod val="75000"/>
+                </a:schemeClr>
               </a:solidFill>
             </a:ln>
           </p:spPr>
@@ -9486,22 +9761,32 @@
                     <a:schemeClr val="tx1"/>
                   </a:solidFill>
                 </a:rPr>
-                <a:t>UniqueSubjectIdentifier_</a:t>
+                <a:t>Species</a:t>
               </a:r>
               <a:r>
                 <a:rPr lang="en-US" b="1" dirty="0" err="1">
                   <a:solidFill>
                     <a:schemeClr val="bg1">
-                      <a:lumMod val="65000"/>
+                      <a:lumMod val="50000"/>
+                    </a:schemeClr>
+                  </a:solidFill>
+                </a:rPr>
+                <a:t>_</a:t>
+              </a:r>
+              <a:r>
+                <a:rPr lang="en-US" dirty="0" err="1">
+                  <a:solidFill>
+                    <a:schemeClr val="bg1">
+                      <a:lumMod val="50000"/>
                     </a:schemeClr>
                   </a:solidFill>
                 </a:rPr>
                 <a:t>xxx</a:t>
               </a:r>
-              <a:endParaRPr lang="en-US" b="1" dirty="0">
+              <a:endParaRPr lang="en-US" dirty="0">
                 <a:solidFill>
                   <a:schemeClr val="bg1">
-                    <a:lumMod val="65000"/>
+                    <a:lumMod val="50000"/>
                   </a:schemeClr>
                 </a:solidFill>
               </a:endParaRPr>
@@ -9510,10 +9795,10 @@
         </p:sp>
         <p:sp>
           <p:nvSpPr>
-            <p:cNvPr id="66" name="TextBox 65">
+            <p:cNvPr id="39" name="TextBox 38">
               <a:extLst>
                 <a:ext uri="{FF2B5EF4-FFF2-40B4-BE49-F238E27FC236}">
-                  <a16:creationId xmlns:a16="http://schemas.microsoft.com/office/drawing/2014/main" id="{5EA58D63-D138-4D74-85D3-68642E78BDC5}"/>
+                  <a16:creationId xmlns:a16="http://schemas.microsoft.com/office/drawing/2014/main" id="{9BCDEF6C-8ACD-4C64-9691-3B347D187B31}"/>
                 </a:ext>
               </a:extLst>
             </p:cNvPr>
@@ -9522,8 +9807,8 @@
           </p:nvSpPr>
           <p:spPr>
             <a:xfrm>
-              <a:off x="7488620" y="1889248"/>
-              <a:ext cx="901209" cy="369332"/>
+              <a:off x="5160580" y="4088065"/>
+              <a:ext cx="1843582" cy="369332"/>
             </a:xfrm>
             <a:prstGeom prst="rect">
               <a:avLst/>
@@ -9534,15 +9819,30 @@
             <a:bodyPr wrap="none" rtlCol="0">
               <a:spAutoFit/>
             </a:bodyPr>
-            <a:lstStyle/>
+            <a:lstStyle>
+              <a:defPPr>
+                <a:defRPr lang="en-US"/>
+              </a:defPPr>
+              <a:lvl1pPr>
+                <a:defRPr>
+                  <a:solidFill>
+                    <a:schemeClr val="accent6">
+                      <a:lumMod val="75000"/>
+                    </a:schemeClr>
+                  </a:solidFill>
+                </a:defRPr>
+              </a:lvl1pPr>
+            </a:lstStyle>
             <a:p>
               <a:r>
-                <a:rPr lang="en-US" dirty="0">
+                <a:rPr lang="en-US" i="1" dirty="0">
                   <a:solidFill>
-                    <a:srgbClr val="0033CC"/>
+                    <a:schemeClr val="bg1">
+                      <a:lumMod val="50000"/>
+                    </a:schemeClr>
                   </a:solidFill>
                 </a:rPr>
-                <a:t>SD0083</a:t>
+                <a:t>To be determined</a:t>
               </a:r>
             </a:p>
           </p:txBody>
@@ -9550,10 +9850,10 @@
       </p:grpSp>
       <p:grpSp>
         <p:nvGrpSpPr>
-          <p:cNvPr id="60" name="Group 59">
+          <p:cNvPr id="12" name="Group 11">
             <a:extLst>
               <a:ext uri="{FF2B5EF4-FFF2-40B4-BE49-F238E27FC236}">
-                <a16:creationId xmlns:a16="http://schemas.microsoft.com/office/drawing/2014/main" id="{5423FC14-C7A9-41CF-958D-3D62827C4F64}"/>
+                <a16:creationId xmlns:a16="http://schemas.microsoft.com/office/drawing/2014/main" id="{EF555A0F-6638-4F09-8610-CBBD263F1E5A}"/>
               </a:ext>
             </a:extLst>
           </p:cNvPr>
@@ -9562,18 +9862,18 @@
         </p:nvGrpSpPr>
         <p:grpSpPr>
           <a:xfrm>
-            <a:off x="4086580" y="1172232"/>
-            <a:ext cx="4303249" cy="457001"/>
-            <a:chOff x="4086580" y="1172232"/>
-            <a:chExt cx="4303249" cy="457001"/>
+            <a:off x="1813389" y="4683621"/>
+            <a:ext cx="5190773" cy="457001"/>
+            <a:chOff x="1813389" y="4682072"/>
+            <a:chExt cx="5190773" cy="457001"/>
           </a:xfrm>
         </p:grpSpPr>
         <p:sp>
           <p:nvSpPr>
-            <p:cNvPr id="41" name="Rectangle: Rounded Corners 40">
+            <p:cNvPr id="53" name="Rectangle: Rounded Corners 52">
               <a:extLst>
                 <a:ext uri="{FF2B5EF4-FFF2-40B4-BE49-F238E27FC236}">
-                  <a16:creationId xmlns:a16="http://schemas.microsoft.com/office/drawing/2014/main" id="{96684C95-C42A-41D0-B366-B571197353D3}"/>
+                  <a16:creationId xmlns:a16="http://schemas.microsoft.com/office/drawing/2014/main" id="{5F64002F-F42A-4F15-A63A-C21552CDF952}"/>
                 </a:ext>
               </a:extLst>
             </p:cNvPr>
@@ -9582,21 +9882,23 @@
           </p:nvSpPr>
           <p:spPr>
             <a:xfrm>
-              <a:off x="4086580" y="1172232"/>
+              <a:off x="1813389" y="4682072"/>
               <a:ext cx="3154680" cy="457001"/>
             </a:xfrm>
             <a:prstGeom prst="roundRect">
               <a:avLst/>
             </a:prstGeom>
             <a:solidFill>
-              <a:schemeClr val="accent6">
+              <a:schemeClr val="accent1">
                 <a:lumMod val="40000"/>
                 <a:lumOff val="60000"/>
               </a:schemeClr>
             </a:solidFill>
-            <a:ln>
+            <a:ln w="38100">
               <a:solidFill>
-                <a:schemeClr val="tx1"/>
+                <a:schemeClr val="accent1">
+                  <a:lumMod val="75000"/>
+                </a:schemeClr>
               </a:solidFill>
             </a:ln>
           </p:spPr>
@@ -9635,22 +9937,22 @@
                     <a:schemeClr val="tx1"/>
                   </a:solidFill>
                 </a:rPr>
-                <a:t>SubjectIdentifier_</a:t>
+                <a:t>SexDataCollection_</a:t>
               </a:r>
               <a:r>
-                <a:rPr lang="en-US" b="1" dirty="0" err="1">
+                <a:rPr lang="en-US" dirty="0" err="1">
                   <a:solidFill>
                     <a:schemeClr val="bg1">
-                      <a:lumMod val="65000"/>
+                      <a:lumMod val="50000"/>
                     </a:schemeClr>
                   </a:solidFill>
                 </a:rPr>
                 <a:t>xxx</a:t>
               </a:r>
-              <a:endParaRPr lang="en-US" b="1" dirty="0">
+              <a:endParaRPr lang="en-US" dirty="0">
                 <a:solidFill>
                   <a:schemeClr val="bg1">
-                    <a:lumMod val="65000"/>
+                    <a:lumMod val="50000"/>
                   </a:schemeClr>
                 </a:solidFill>
               </a:endParaRPr>
@@ -9659,10 +9961,10 @@
         </p:sp>
         <p:sp>
           <p:nvSpPr>
-            <p:cNvPr id="67" name="TextBox 66">
+            <p:cNvPr id="40" name="TextBox 39">
               <a:extLst>
                 <a:ext uri="{FF2B5EF4-FFF2-40B4-BE49-F238E27FC236}">
-                  <a16:creationId xmlns:a16="http://schemas.microsoft.com/office/drawing/2014/main" id="{C9C7BDF3-D3D9-48BD-9F4F-5AD3A12FEAEA}"/>
+                  <a16:creationId xmlns:a16="http://schemas.microsoft.com/office/drawing/2014/main" id="{95D47E7F-AFD7-4306-A43A-9F8DA1FD0CD4}"/>
                 </a:ext>
               </a:extLst>
             </p:cNvPr>
@@ -9671,8 +9973,8 @@
           </p:nvSpPr>
           <p:spPr>
             <a:xfrm>
-              <a:off x="7488620" y="1216066"/>
-              <a:ext cx="901209" cy="369332"/>
+              <a:off x="5160580" y="4725906"/>
+              <a:ext cx="1843582" cy="369332"/>
             </a:xfrm>
             <a:prstGeom prst="rect">
               <a:avLst/>
@@ -9683,26 +9985,235 @@
             <a:bodyPr wrap="none" rtlCol="0">
               <a:spAutoFit/>
             </a:bodyPr>
-            <a:lstStyle/>
+            <a:lstStyle>
+              <a:defPPr>
+                <a:defRPr lang="en-US"/>
+              </a:defPPr>
+              <a:lvl1pPr>
+                <a:defRPr>
+                  <a:solidFill>
+                    <a:schemeClr val="accent6">
+                      <a:lumMod val="75000"/>
+                    </a:schemeClr>
+                  </a:solidFill>
+                </a:defRPr>
+              </a:lvl1pPr>
+            </a:lstStyle>
             <a:p>
               <a:r>
-                <a:rPr lang="en-US" dirty="0">
+                <a:rPr lang="en-US" i="1" dirty="0">
                   <a:solidFill>
-                    <a:srgbClr val="0033CC"/>
+                    <a:schemeClr val="bg1">
+                      <a:lumMod val="50000"/>
+                    </a:schemeClr>
                   </a:solidFill>
                 </a:rPr>
-                <a:t>SD1001</a:t>
+                <a:t>To be determined</a:t>
               </a:r>
             </a:p>
           </p:txBody>
         </p:sp>
       </p:grpSp>
+      <p:sp>
+        <p:nvSpPr>
+          <p:cNvPr id="54" name="Rectangle: Rounded Corners 53">
+            <a:extLst>
+              <a:ext uri="{FF2B5EF4-FFF2-40B4-BE49-F238E27FC236}">
+                <a16:creationId xmlns:a16="http://schemas.microsoft.com/office/drawing/2014/main" id="{F3CCF06A-9EA7-441F-B0EE-8FE67B1BE6B9}"/>
+              </a:ext>
+            </a:extLst>
+          </p:cNvPr>
+          <p:cNvSpPr/>
+          <p:nvPr/>
+        </p:nvSpPr>
+        <p:spPr>
+          <a:xfrm>
+            <a:off x="1813389" y="5428192"/>
+            <a:ext cx="3154680" cy="457001"/>
+          </a:xfrm>
+          <a:prstGeom prst="roundRect">
+            <a:avLst/>
+          </a:prstGeom>
+          <a:solidFill>
+            <a:schemeClr val="accent1">
+              <a:lumMod val="40000"/>
+              <a:lumOff val="60000"/>
+            </a:schemeClr>
+          </a:solidFill>
+          <a:ln w="38100">
+            <a:solidFill>
+              <a:schemeClr val="accent1">
+                <a:lumMod val="75000"/>
+              </a:schemeClr>
+            </a:solidFill>
+          </a:ln>
+        </p:spPr>
+        <p:style>
+          <a:lnRef idx="2">
+            <a:schemeClr val="accent1">
+              <a:shade val="50000"/>
+            </a:schemeClr>
+          </a:lnRef>
+          <a:fillRef idx="1">
+            <a:schemeClr val="accent1"/>
+          </a:fillRef>
+          <a:effectRef idx="0">
+            <a:schemeClr val="accent1"/>
+          </a:effectRef>
+          <a:fontRef idx="minor">
+            <a:schemeClr val="lt1"/>
+          </a:fontRef>
+        </p:style>
+        <p:txBody>
+          <a:bodyPr rtlCol="0" anchor="ctr"/>
+          <a:lstStyle/>
+          <a:p>
+            <a:pPr algn="ctr"/>
+            <a:r>
+              <a:rPr lang="en-US" b="1" dirty="0">
+                <a:solidFill>
+                  <a:schemeClr val="tx1"/>
+                </a:solidFill>
+              </a:rPr>
+              <a:t>:</a:t>
+            </a:r>
+            <a:r>
+              <a:rPr lang="en-US" b="1" dirty="0" err="1">
+                <a:solidFill>
+                  <a:schemeClr val="tx1"/>
+                </a:solidFill>
+              </a:rPr>
+              <a:t>AgeDataCollection_</a:t>
+            </a:r>
+            <a:r>
+              <a:rPr lang="en-US" dirty="0" err="1">
+                <a:solidFill>
+                  <a:schemeClr val="bg1">
+                    <a:lumMod val="50000"/>
+                  </a:schemeClr>
+                </a:solidFill>
+              </a:rPr>
+              <a:t>xxx</a:t>
+            </a:r>
+            <a:endParaRPr lang="en-US" dirty="0">
+              <a:solidFill>
+                <a:schemeClr val="bg1">
+                  <a:lumMod val="50000"/>
+                </a:schemeClr>
+              </a:solidFill>
+            </a:endParaRPr>
+          </a:p>
+        </p:txBody>
+      </p:sp>
+      <p:sp>
+        <p:nvSpPr>
+          <p:cNvPr id="68" name="TextBox 67">
+            <a:extLst>
+              <a:ext uri="{FF2B5EF4-FFF2-40B4-BE49-F238E27FC236}">
+                <a16:creationId xmlns:a16="http://schemas.microsoft.com/office/drawing/2014/main" id="{7FF25D90-0557-4EDD-8A98-20605F11B1E6}"/>
+              </a:ext>
+            </a:extLst>
+          </p:cNvPr>
+          <p:cNvSpPr txBox="1"/>
+          <p:nvPr/>
+        </p:nvSpPr>
+        <p:spPr>
+          <a:xfrm>
+            <a:off x="8100050" y="5333527"/>
+            <a:ext cx="4253840" cy="584775"/>
+          </a:xfrm>
+          <a:prstGeom prst="rect">
+            <a:avLst/>
+          </a:prstGeom>
+          <a:noFill/>
+        </p:spPr>
+        <p:txBody>
+          <a:bodyPr wrap="square" rtlCol="0">
+            <a:spAutoFit/>
+          </a:bodyPr>
+          <a:lstStyle/>
+          <a:p>
+            <a:r>
+              <a:rPr lang="en-US" sz="1600" dirty="0">
+                <a:solidFill>
+                  <a:srgbClr val="0033CC"/>
+                </a:solidFill>
+              </a:rPr>
+              <a:t>SD0084, SD1129, SD1121, SD2019, SD2023,</a:t>
+            </a:r>
+          </a:p>
+          <a:p>
+            <a:r>
+              <a:rPr lang="en-US" sz="1600" dirty="0">
+                <a:solidFill>
+                  <a:srgbClr val="0033CC"/>
+                </a:solidFill>
+              </a:rPr>
+              <a:t>SD2020, SD2012, SD2022</a:t>
+            </a:r>
+          </a:p>
+        </p:txBody>
+      </p:sp>
+      <p:sp>
+        <p:nvSpPr>
+          <p:cNvPr id="42" name="TextBox 41">
+            <a:extLst>
+              <a:ext uri="{FF2B5EF4-FFF2-40B4-BE49-F238E27FC236}">
+                <a16:creationId xmlns:a16="http://schemas.microsoft.com/office/drawing/2014/main" id="{4A6ED15C-54D6-4E35-813D-0D965E6185AA}"/>
+              </a:ext>
+            </a:extLst>
+          </p:cNvPr>
+          <p:cNvSpPr txBox="1"/>
+          <p:nvPr/>
+        </p:nvSpPr>
+        <p:spPr>
+          <a:xfrm>
+            <a:off x="5160580" y="5472026"/>
+            <a:ext cx="1843582" cy="369332"/>
+          </a:xfrm>
+          <a:prstGeom prst="rect">
+            <a:avLst/>
+          </a:prstGeom>
+          <a:noFill/>
+        </p:spPr>
+        <p:txBody>
+          <a:bodyPr wrap="none" rtlCol="0">
+            <a:spAutoFit/>
+          </a:bodyPr>
+          <a:lstStyle>
+            <a:defPPr>
+              <a:defRPr lang="en-US"/>
+            </a:defPPr>
+            <a:lvl1pPr>
+              <a:defRPr>
+                <a:solidFill>
+                  <a:schemeClr val="accent6">
+                    <a:lumMod val="75000"/>
+                  </a:schemeClr>
+                </a:solidFill>
+              </a:defRPr>
+            </a:lvl1pPr>
+          </a:lstStyle>
+          <a:p>
+            <a:r>
+              <a:rPr lang="en-US" i="1" dirty="0">
+                <a:solidFill>
+                  <a:schemeClr val="bg1">
+                    <a:lumMod val="50000"/>
+                  </a:schemeClr>
+                </a:solidFill>
+              </a:rPr>
+              <a:t>To be determined</a:t>
+            </a:r>
+          </a:p>
+        </p:txBody>
+      </p:sp>
       <p:grpSp>
         <p:nvGrpSpPr>
-          <p:cNvPr id="72" name="Group 71">
+          <p:cNvPr id="16" name="Group 15">
             <a:extLst>
               <a:ext uri="{FF2B5EF4-FFF2-40B4-BE49-F238E27FC236}">
-                <a16:creationId xmlns:a16="http://schemas.microsoft.com/office/drawing/2014/main" id="{CAB79C9D-37A8-4F24-822B-19B5481CB369}"/>
+                <a16:creationId xmlns:a16="http://schemas.microsoft.com/office/drawing/2014/main" id="{21AB15E0-DB92-4174-88C3-5E9E56C245CB}"/>
               </a:ext>
             </a:extLst>
           </p:cNvPr>
@@ -9711,18 +10222,18 @@
         </p:nvGrpSpPr>
         <p:grpSpPr>
           <a:xfrm>
-            <a:off x="4086580" y="5085870"/>
-            <a:ext cx="7669555" cy="646331"/>
-            <a:chOff x="4086580" y="5155324"/>
-            <a:chExt cx="7669555" cy="646331"/>
+            <a:off x="1813389" y="6172762"/>
+            <a:ext cx="5190773" cy="457001"/>
+            <a:chOff x="1813389" y="6172762"/>
+            <a:chExt cx="5190773" cy="457001"/>
           </a:xfrm>
         </p:grpSpPr>
         <p:sp>
           <p:nvSpPr>
-            <p:cNvPr id="54" name="Rectangle: Rounded Corners 53">
+            <p:cNvPr id="56" name="Rectangle: Rounded Corners 55">
               <a:extLst>
                 <a:ext uri="{FF2B5EF4-FFF2-40B4-BE49-F238E27FC236}">
-                  <a16:creationId xmlns:a16="http://schemas.microsoft.com/office/drawing/2014/main" id="{F3CCF06A-9EA7-441F-B0EE-8FE67B1BE6B9}"/>
+                  <a16:creationId xmlns:a16="http://schemas.microsoft.com/office/drawing/2014/main" id="{1F23C94D-E114-4BD9-9A4C-05D2B7B591B2}"/>
                 </a:ext>
               </a:extLst>
             </p:cNvPr>
@@ -9731,21 +10242,23 @@
           </p:nvSpPr>
           <p:spPr>
             <a:xfrm>
-              <a:off x="4086580" y="5249989"/>
+              <a:off x="1813389" y="6172762"/>
               <a:ext cx="3154680" cy="457001"/>
             </a:xfrm>
             <a:prstGeom prst="roundRect">
               <a:avLst/>
             </a:prstGeom>
             <a:solidFill>
-              <a:schemeClr val="accent6">
+              <a:schemeClr val="accent1">
                 <a:lumMod val="40000"/>
                 <a:lumOff val="60000"/>
               </a:schemeClr>
             </a:solidFill>
-            <a:ln>
+            <a:ln w="38100">
               <a:solidFill>
-                <a:schemeClr val="tx1"/>
+                <a:schemeClr val="accent1">
+                  <a:lumMod val="75000"/>
+                </a:schemeClr>
               </a:solidFill>
             </a:ln>
           </p:spPr>
@@ -9784,22 +10297,22 @@
                     <a:schemeClr val="tx1"/>
                   </a:solidFill>
                 </a:rPr>
-                <a:t>AgeDataCollection_</a:t>
+                <a:t>Randomization_</a:t>
               </a:r>
               <a:r>
-                <a:rPr lang="en-US" b="1" dirty="0" err="1">
+                <a:rPr lang="en-US" dirty="0" err="1">
                   <a:solidFill>
                     <a:schemeClr val="bg1">
-                      <a:lumMod val="65000"/>
+                      <a:lumMod val="50000"/>
                     </a:schemeClr>
                   </a:solidFill>
                 </a:rPr>
                 <a:t>xxx</a:t>
               </a:r>
-              <a:endParaRPr lang="en-US" b="1" dirty="0">
+              <a:endParaRPr lang="en-US" dirty="0">
                 <a:solidFill>
                   <a:schemeClr val="bg1">
-                    <a:lumMod val="65000"/>
+                    <a:lumMod val="50000"/>
                   </a:schemeClr>
                 </a:solidFill>
               </a:endParaRPr>
@@ -9808,10 +10321,10 @@
         </p:sp>
         <p:sp>
           <p:nvSpPr>
-            <p:cNvPr id="68" name="TextBox 67">
+            <p:cNvPr id="43" name="TextBox 42">
               <a:extLst>
                 <a:ext uri="{FF2B5EF4-FFF2-40B4-BE49-F238E27FC236}">
-                  <a16:creationId xmlns:a16="http://schemas.microsoft.com/office/drawing/2014/main" id="{7FF25D90-0557-4EDD-8A98-20605F11B1E6}"/>
+                  <a16:creationId xmlns:a16="http://schemas.microsoft.com/office/drawing/2014/main" id="{906CB266-FF31-4429-958E-840EE8BE2A55}"/>
                 </a:ext>
               </a:extLst>
             </p:cNvPr>
@@ -9820,8 +10333,8 @@
           </p:nvSpPr>
           <p:spPr>
             <a:xfrm>
-              <a:off x="7488620" y="5155324"/>
-              <a:ext cx="4267515" cy="646331"/>
+              <a:off x="5160580" y="6216596"/>
+              <a:ext cx="1843582" cy="369332"/>
             </a:xfrm>
             <a:prstGeom prst="rect">
               <a:avLst/>
@@ -9832,179 +10345,219 @@
             <a:bodyPr wrap="none" rtlCol="0">
               <a:spAutoFit/>
             </a:bodyPr>
-            <a:lstStyle/>
+            <a:lstStyle>
+              <a:defPPr>
+                <a:defRPr lang="en-US"/>
+              </a:defPPr>
+              <a:lvl1pPr>
+                <a:defRPr>
+                  <a:solidFill>
+                    <a:schemeClr val="accent6">
+                      <a:lumMod val="75000"/>
+                    </a:schemeClr>
+                  </a:solidFill>
+                </a:defRPr>
+              </a:lvl1pPr>
+            </a:lstStyle>
             <a:p>
               <a:r>
-                <a:rPr lang="en-US" dirty="0">
+                <a:rPr lang="en-US" i="1" dirty="0">
                   <a:solidFill>
-                    <a:srgbClr val="0033CC"/>
+                    <a:schemeClr val="bg1">
+                      <a:lumMod val="50000"/>
+                    </a:schemeClr>
                   </a:solidFill>
                 </a:rPr>
-                <a:t>SD0084, SD1129, SD1121, SD2019, SD2023,</a:t>
-              </a:r>
-            </a:p>
-            <a:p>
-              <a:r>
-                <a:rPr lang="en-US" dirty="0">
-                  <a:solidFill>
-                    <a:srgbClr val="0033CC"/>
-                  </a:solidFill>
-                </a:rPr>
-                <a:t>SD2020, SD2012, SD2022</a:t>
+                <a:t>To be determined</a:t>
               </a:r>
             </a:p>
           </p:txBody>
         </p:sp>
       </p:grpSp>
-      <p:grpSp>
-        <p:nvGrpSpPr>
-          <p:cNvPr id="71" name="Group 70">
+      <p:sp>
+        <p:nvSpPr>
+          <p:cNvPr id="46" name="Rectangle: Rounded Corners 45">
             <a:extLst>
               <a:ext uri="{FF2B5EF4-FFF2-40B4-BE49-F238E27FC236}">
-                <a16:creationId xmlns:a16="http://schemas.microsoft.com/office/drawing/2014/main" id="{23591D3D-FDFC-4E53-A3EA-706DE35139F6}"/>
+                <a16:creationId xmlns:a16="http://schemas.microsoft.com/office/drawing/2014/main" id="{9273A411-079F-48E2-AD6C-9DB949A0F839}"/>
               </a:ext>
             </a:extLst>
           </p:cNvPr>
-          <p:cNvGrpSpPr/>
-          <p:nvPr/>
-        </p:nvGrpSpPr>
-        <p:grpSpPr>
-          <a:xfrm>
-            <a:off x="4086580" y="3129051"/>
-            <a:ext cx="4303249" cy="457001"/>
-            <a:chOff x="4118111" y="3186824"/>
-            <a:chExt cx="4303249" cy="457001"/>
-          </a:xfrm>
-        </p:grpSpPr>
-        <p:sp>
-          <p:nvSpPr>
-            <p:cNvPr id="46" name="Rectangle: Rounded Corners 45">
-              <a:extLst>
-                <a:ext uri="{FF2B5EF4-FFF2-40B4-BE49-F238E27FC236}">
-                  <a16:creationId xmlns:a16="http://schemas.microsoft.com/office/drawing/2014/main" id="{9273A411-079F-48E2-AD6C-9DB949A0F839}"/>
-                </a:ext>
-              </a:extLst>
-            </p:cNvPr>
-            <p:cNvSpPr/>
-            <p:nvPr/>
-          </p:nvSpPr>
-          <p:spPr>
-            <a:xfrm>
-              <a:off x="4118111" y="3186824"/>
-              <a:ext cx="3154680" cy="457001"/>
-            </a:xfrm>
-            <a:prstGeom prst="roundRect">
-              <a:avLst/>
-            </a:prstGeom>
+          <p:cNvSpPr/>
+          <p:nvPr/>
+        </p:nvSpPr>
+        <p:spPr>
+          <a:xfrm>
+            <a:off x="1813389" y="3383809"/>
+            <a:ext cx="3154680" cy="457001"/>
+          </a:xfrm>
+          <a:prstGeom prst="roundRect">
+            <a:avLst/>
+          </a:prstGeom>
+          <a:solidFill>
+            <a:schemeClr val="accent1">
+              <a:lumMod val="40000"/>
+              <a:lumOff val="60000"/>
+            </a:schemeClr>
+          </a:solidFill>
+          <a:ln w="38100">
             <a:solidFill>
-              <a:schemeClr val="accent6">
-                <a:lumMod val="40000"/>
-                <a:lumOff val="60000"/>
+              <a:schemeClr val="accent1">
+                <a:lumMod val="75000"/>
               </a:schemeClr>
             </a:solidFill>
-            <a:ln>
+          </a:ln>
+        </p:spPr>
+        <p:style>
+          <a:lnRef idx="2">
+            <a:schemeClr val="accent1">
+              <a:shade val="50000"/>
+            </a:schemeClr>
+          </a:lnRef>
+          <a:fillRef idx="1">
+            <a:schemeClr val="accent1"/>
+          </a:fillRef>
+          <a:effectRef idx="0">
+            <a:schemeClr val="accent1"/>
+          </a:effectRef>
+          <a:fontRef idx="minor">
+            <a:schemeClr val="lt1"/>
+          </a:fontRef>
+        </p:style>
+        <p:txBody>
+          <a:bodyPr rtlCol="0" anchor="ctr"/>
+          <a:lstStyle/>
+          <a:p>
+            <a:pPr algn="ctr"/>
+            <a:r>
+              <a:rPr lang="en-US" b="1" dirty="0">
+                <a:solidFill>
+                  <a:schemeClr val="tx1"/>
+                </a:solidFill>
+              </a:rPr>
+              <a:t>:</a:t>
+            </a:r>
+            <a:r>
+              <a:rPr lang="en-US" b="1" dirty="0" err="1">
+                <a:solidFill>
+                  <a:schemeClr val="tx1"/>
+                </a:solidFill>
+              </a:rPr>
+              <a:t>Set_</a:t>
+            </a:r>
+            <a:r>
+              <a:rPr lang="en-US" dirty="0" err="1">
+                <a:solidFill>
+                  <a:schemeClr val="bg1">
+                    <a:lumMod val="50000"/>
+                  </a:schemeClr>
+                </a:solidFill>
+              </a:rPr>
+              <a:t>xxx</a:t>
+            </a:r>
+            <a:endParaRPr lang="en-US" dirty="0">
               <a:solidFill>
-                <a:schemeClr val="tx1"/>
+                <a:schemeClr val="bg1">
+                  <a:lumMod val="50000"/>
+                </a:schemeClr>
               </a:solidFill>
-            </a:ln>
-          </p:spPr>
-          <p:style>
-            <a:lnRef idx="2">
-              <a:schemeClr val="accent1">
-                <a:shade val="50000"/>
-              </a:schemeClr>
-            </a:lnRef>
-            <a:fillRef idx="1">
-              <a:schemeClr val="accent1"/>
-            </a:fillRef>
-            <a:effectRef idx="0">
-              <a:schemeClr val="accent1"/>
-            </a:effectRef>
-            <a:fontRef idx="minor">
-              <a:schemeClr val="lt1"/>
-            </a:fontRef>
-          </p:style>
-          <p:txBody>
-            <a:bodyPr rtlCol="0" anchor="ctr"/>
-            <a:lstStyle/>
-            <a:p>
-              <a:pPr algn="ctr"/>
-              <a:r>
-                <a:rPr lang="en-US" b="1" dirty="0">
-                  <a:solidFill>
-                    <a:schemeClr val="tx1"/>
-                  </a:solidFill>
-                </a:rPr>
-                <a:t>:</a:t>
-              </a:r>
-              <a:r>
-                <a:rPr lang="en-US" b="1" dirty="0" err="1">
-                  <a:solidFill>
-                    <a:schemeClr val="tx1"/>
-                  </a:solidFill>
-                </a:rPr>
-                <a:t>Set_</a:t>
-              </a:r>
-              <a:r>
-                <a:rPr lang="en-US" b="1" dirty="0" err="1">
-                  <a:solidFill>
-                    <a:schemeClr val="bg1">
-                      <a:lumMod val="65000"/>
-                    </a:schemeClr>
-                  </a:solidFill>
-                </a:rPr>
-                <a:t>xxx</a:t>
-              </a:r>
-              <a:endParaRPr lang="en-US" b="1" dirty="0">
+            </a:endParaRPr>
+          </a:p>
+        </p:txBody>
+      </p:sp>
+      <p:sp>
+        <p:nvSpPr>
+          <p:cNvPr id="69" name="TextBox 68">
+            <a:extLst>
+              <a:ext uri="{FF2B5EF4-FFF2-40B4-BE49-F238E27FC236}">
+                <a16:creationId xmlns:a16="http://schemas.microsoft.com/office/drawing/2014/main" id="{6F203C4D-B611-4A8A-BD66-4B1E38326E02}"/>
+              </a:ext>
+            </a:extLst>
+          </p:cNvPr>
+          <p:cNvSpPr txBox="1"/>
+          <p:nvPr/>
+        </p:nvSpPr>
+        <p:spPr>
+          <a:xfrm>
+            <a:off x="8100050" y="3427643"/>
+            <a:ext cx="1605234" cy="369332"/>
+          </a:xfrm>
+          <a:prstGeom prst="rect">
+            <a:avLst/>
+          </a:prstGeom>
+          <a:noFill/>
+        </p:spPr>
+        <p:txBody>
+          <a:bodyPr wrap="square" rtlCol="0">
+            <a:spAutoFit/>
+          </a:bodyPr>
+          <a:lstStyle/>
+          <a:p>
+            <a:r>
+              <a:rPr lang="en-US" dirty="0">
+                <a:solidFill>
+                  <a:srgbClr val="0033CC"/>
+                </a:solidFill>
+              </a:rPr>
+              <a:t>SD1259</a:t>
+            </a:r>
+          </a:p>
+        </p:txBody>
+      </p:sp>
+      <p:sp>
+        <p:nvSpPr>
+          <p:cNvPr id="44" name="TextBox 43">
+            <a:extLst>
+              <a:ext uri="{FF2B5EF4-FFF2-40B4-BE49-F238E27FC236}">
+                <a16:creationId xmlns:a16="http://schemas.microsoft.com/office/drawing/2014/main" id="{7BC92E35-82EE-42ED-B41A-ED552C39B4B2}"/>
+              </a:ext>
+            </a:extLst>
+          </p:cNvPr>
+          <p:cNvSpPr txBox="1"/>
+          <p:nvPr/>
+        </p:nvSpPr>
+        <p:spPr>
+          <a:xfrm>
+            <a:off x="5160580" y="3427643"/>
+            <a:ext cx="1792014" cy="369332"/>
+          </a:xfrm>
+          <a:prstGeom prst="rect">
+            <a:avLst/>
+          </a:prstGeom>
+          <a:noFill/>
+        </p:spPr>
+        <p:txBody>
+          <a:bodyPr wrap="square" rtlCol="0">
+            <a:spAutoFit/>
+          </a:bodyPr>
+          <a:lstStyle>
+            <a:defPPr>
+              <a:defRPr lang="en-US"/>
+            </a:defPPr>
+            <a:lvl1pPr>
+              <a:defRPr>
+                <a:solidFill>
+                  <a:schemeClr val="accent6">
+                    <a:lumMod val="75000"/>
+                  </a:schemeClr>
+                </a:solidFill>
+              </a:defRPr>
+            </a:lvl1pPr>
+          </a:lstStyle>
+          <a:p>
+            <a:r>
+              <a:rPr lang="en-US" i="1" dirty="0">
                 <a:solidFill>
                   <a:schemeClr val="bg1">
-                    <a:lumMod val="65000"/>
+                    <a:lumMod val="50000"/>
                   </a:schemeClr>
                 </a:solidFill>
-              </a:endParaRPr>
-            </a:p>
-          </p:txBody>
-        </p:sp>
-        <p:sp>
-          <p:nvSpPr>
-            <p:cNvPr id="69" name="TextBox 68">
-              <a:extLst>
-                <a:ext uri="{FF2B5EF4-FFF2-40B4-BE49-F238E27FC236}">
-                  <a16:creationId xmlns:a16="http://schemas.microsoft.com/office/drawing/2014/main" id="{6F203C4D-B611-4A8A-BD66-4B1E38326E02}"/>
-                </a:ext>
-              </a:extLst>
-            </p:cNvPr>
-            <p:cNvSpPr txBox="1"/>
-            <p:nvPr/>
-          </p:nvSpPr>
-          <p:spPr>
-            <a:xfrm>
-              <a:off x="7520151" y="3230658"/>
-              <a:ext cx="901209" cy="369332"/>
-            </a:xfrm>
-            <a:prstGeom prst="rect">
-              <a:avLst/>
-            </a:prstGeom>
-            <a:noFill/>
-          </p:spPr>
-          <p:txBody>
-            <a:bodyPr wrap="none" rtlCol="0">
-              <a:spAutoFit/>
-            </a:bodyPr>
-            <a:lstStyle/>
-            <a:p>
-              <a:r>
-                <a:rPr lang="en-US" dirty="0">
-                  <a:solidFill>
-                    <a:srgbClr val="0033CC"/>
-                  </a:solidFill>
-                </a:rPr>
-                <a:t>SD1259</a:t>
-              </a:r>
-            </a:p>
-          </p:txBody>
-        </p:sp>
-      </p:grpSp>
+              </a:rPr>
+              <a:t>To be determined</a:t>
+            </a:r>
+          </a:p>
+        </p:txBody>
+      </p:sp>
     </p:spTree>
     <p:extLst>
       <p:ext uri="{BB962C8B-B14F-4D97-AF65-F5344CB8AC3E}">

</xml_diff>

<commit_message>
push prior to branch for OWL dev
</commit_message>
<xml_diff>
--- a/doc/images/ImageSources.pptx
+++ b/doc/images/ImageSources.pptx
@@ -10,11 +10,12 @@
     <p:sldId id="264" r:id="rId4"/>
     <p:sldId id="265" r:id="rId5"/>
     <p:sldId id="268" r:id="rId6"/>
-    <p:sldId id="267" r:id="rId7"/>
-    <p:sldId id="266" r:id="rId8"/>
-    <p:sldId id="261" r:id="rId9"/>
-    <p:sldId id="259" r:id="rId10"/>
-    <p:sldId id="260" r:id="rId11"/>
+    <p:sldId id="269" r:id="rId7"/>
+    <p:sldId id="267" r:id="rId8"/>
+    <p:sldId id="266" r:id="rId9"/>
+    <p:sldId id="261" r:id="rId10"/>
+    <p:sldId id="259" r:id="rId11"/>
+    <p:sldId id="260" r:id="rId12"/>
   </p:sldIdLst>
   <p:sldSz cx="12192000" cy="6858000"/>
   <p:notesSz cx="6858000" cy="9144000"/>
@@ -123,6 +124,7 @@
             <p14:sldId id="264"/>
             <p14:sldId id="265"/>
             <p14:sldId id="268"/>
+            <p14:sldId id="269"/>
             <p14:sldId id="267"/>
             <p14:sldId id="266"/>
             <p14:sldId id="261"/>
@@ -4798,8 +4800,8 @@
         </p:nvSpPr>
         <p:spPr>
           <a:xfrm>
-            <a:off x="9673772" y="6488668"/>
-            <a:ext cx="3185885" cy="369332"/>
+            <a:off x="8810172" y="6488668"/>
+            <a:ext cx="4049486" cy="369332"/>
           </a:xfrm>
           <a:prstGeom prst="rect">
             <a:avLst/>
@@ -4818,7 +4820,7 @@
                   <a:srgbClr val="FF0000"/>
                 </a:solidFill>
               </a:rPr>
-              <a:t>RefIntervalDataFail.PNG</a:t>
+              <a:t>RefIntervalStructureDateFail.PNG</a:t>
             </a:r>
           </a:p>
         </p:txBody>
@@ -4837,6 +4839,708 @@
 </file>
 
 <file path=ppt/slides/slide10.xml><?xml version="1.0" encoding="utf-8"?>
+<p:sld xmlns:a="http://schemas.openxmlformats.org/drawingml/2006/main" xmlns:r="http://schemas.openxmlformats.org/officeDocument/2006/relationships" xmlns:p="http://schemas.openxmlformats.org/presentationml/2006/main">
+  <p:cSld>
+    <p:spTree>
+      <p:nvGrpSpPr>
+        <p:cNvPr id="1" name=""/>
+        <p:cNvGrpSpPr/>
+        <p:nvPr/>
+      </p:nvGrpSpPr>
+      <p:grpSpPr>
+        <a:xfrm>
+          <a:off x="0" y="0"/>
+          <a:ext cx="0" cy="0"/>
+          <a:chOff x="0" y="0"/>
+          <a:chExt cx="0" cy="0"/>
+        </a:xfrm>
+      </p:grpSpPr>
+      <p:sp>
+        <p:nvSpPr>
+          <p:cNvPr id="15" name="Rectangle: Rounded Corners 14">
+            <a:extLst>
+              <a:ext uri="{FF2B5EF4-FFF2-40B4-BE49-F238E27FC236}">
+                <a16:creationId xmlns:a16="http://schemas.microsoft.com/office/drawing/2014/main" id="{FA40E339-40A8-448E-A741-015329DCA7D1}"/>
+              </a:ext>
+            </a:extLst>
+          </p:cNvPr>
+          <p:cNvSpPr/>
+          <p:nvPr/>
+        </p:nvSpPr>
+        <p:spPr>
+          <a:xfrm>
+            <a:off x="357810" y="648361"/>
+            <a:ext cx="9044608" cy="4576782"/>
+          </a:xfrm>
+          <a:prstGeom prst="roundRect">
+            <a:avLst/>
+          </a:prstGeom>
+          <a:solidFill>
+            <a:schemeClr val="bg1">
+              <a:lumMod val="95000"/>
+            </a:schemeClr>
+          </a:solidFill>
+          <a:ln>
+            <a:solidFill>
+              <a:schemeClr val="tx1"/>
+            </a:solidFill>
+          </a:ln>
+        </p:spPr>
+        <p:style>
+          <a:lnRef idx="2">
+            <a:schemeClr val="accent1">
+              <a:shade val="50000"/>
+            </a:schemeClr>
+          </a:lnRef>
+          <a:fillRef idx="1">
+            <a:schemeClr val="accent1"/>
+          </a:fillRef>
+          <a:effectRef idx="0">
+            <a:schemeClr val="accent1"/>
+          </a:effectRef>
+          <a:fontRef idx="minor">
+            <a:schemeClr val="lt1"/>
+          </a:fontRef>
+        </p:style>
+        <p:txBody>
+          <a:bodyPr rtlCol="0" anchor="ctr"/>
+          <a:lstStyle/>
+          <a:p>
+            <a:pPr algn="ctr"/>
+            <a:endParaRPr lang="en-US" b="1" dirty="0">
+              <a:solidFill>
+                <a:schemeClr val="tx1"/>
+              </a:solidFill>
+            </a:endParaRPr>
+          </a:p>
+        </p:txBody>
+      </p:sp>
+      <p:sp>
+        <p:nvSpPr>
+          <p:cNvPr id="4" name="Rectangle: Rounded Corners 3"/>
+          <p:cNvSpPr/>
+          <p:nvPr/>
+        </p:nvSpPr>
+        <p:spPr>
+          <a:xfrm>
+            <a:off x="814595" y="1959429"/>
+            <a:ext cx="6400800" cy="957942"/>
+          </a:xfrm>
+          <a:prstGeom prst="roundRect">
+            <a:avLst/>
+          </a:prstGeom>
+          <a:solidFill>
+            <a:schemeClr val="accent6">
+              <a:lumMod val="40000"/>
+              <a:lumOff val="60000"/>
+            </a:schemeClr>
+          </a:solidFill>
+          <a:ln>
+            <a:solidFill>
+              <a:schemeClr val="tx1"/>
+            </a:solidFill>
+          </a:ln>
+        </p:spPr>
+        <p:style>
+          <a:lnRef idx="2">
+            <a:schemeClr val="accent1">
+              <a:shade val="50000"/>
+            </a:schemeClr>
+          </a:lnRef>
+          <a:fillRef idx="1">
+            <a:schemeClr val="accent1"/>
+          </a:fillRef>
+          <a:effectRef idx="0">
+            <a:schemeClr val="accent1"/>
+          </a:effectRef>
+          <a:fontRef idx="minor">
+            <a:schemeClr val="lt1"/>
+          </a:fontRef>
+        </p:style>
+        <p:txBody>
+          <a:bodyPr rtlCol="0" anchor="ctr"/>
+          <a:lstStyle/>
+          <a:p>
+            <a:pPr algn="ctr"/>
+            <a:endParaRPr lang="en-US" b="1" dirty="0">
+              <a:solidFill>
+                <a:schemeClr val="accent1">
+                  <a:lumMod val="75000"/>
+                </a:schemeClr>
+              </a:solidFill>
+            </a:endParaRPr>
+          </a:p>
+        </p:txBody>
+      </p:sp>
+      <p:sp>
+        <p:nvSpPr>
+          <p:cNvPr id="5" name="Rectangle: Rounded Corners 4"/>
+          <p:cNvSpPr/>
+          <p:nvPr/>
+        </p:nvSpPr>
+        <p:spPr>
+          <a:xfrm>
+            <a:off x="814595" y="3596046"/>
+            <a:ext cx="6400800" cy="478998"/>
+          </a:xfrm>
+          <a:prstGeom prst="roundRect">
+            <a:avLst/>
+          </a:prstGeom>
+          <a:solidFill>
+            <a:srgbClr val="E1AD48"/>
+          </a:solidFill>
+          <a:ln>
+            <a:solidFill>
+              <a:schemeClr val="tx1"/>
+            </a:solidFill>
+          </a:ln>
+        </p:spPr>
+        <p:style>
+          <a:lnRef idx="2">
+            <a:schemeClr val="accent1">
+              <a:shade val="50000"/>
+            </a:schemeClr>
+          </a:lnRef>
+          <a:fillRef idx="1">
+            <a:schemeClr val="accent1"/>
+          </a:fillRef>
+          <a:effectRef idx="0">
+            <a:schemeClr val="accent1"/>
+          </a:effectRef>
+          <a:fontRef idx="minor">
+            <a:schemeClr val="lt1"/>
+          </a:fontRef>
+        </p:style>
+        <p:txBody>
+          <a:bodyPr rtlCol="0" anchor="ctr"/>
+          <a:lstStyle/>
+          <a:p>
+            <a:pPr algn="ctr"/>
+            <a:endParaRPr lang="en-US" b="1" dirty="0">
+              <a:solidFill>
+                <a:schemeClr val="tx1"/>
+              </a:solidFill>
+            </a:endParaRPr>
+          </a:p>
+        </p:txBody>
+      </p:sp>
+      <p:sp>
+        <p:nvSpPr>
+          <p:cNvPr id="17" name="Rectangle: Rounded Corners 16">
+            <a:extLst>
+              <a:ext uri="{FF2B5EF4-FFF2-40B4-BE49-F238E27FC236}">
+                <a16:creationId xmlns:a16="http://schemas.microsoft.com/office/drawing/2014/main" id="{02929941-0200-42D9-8465-064446A2AC2E}"/>
+              </a:ext>
+            </a:extLst>
+          </p:cNvPr>
+          <p:cNvSpPr/>
+          <p:nvPr/>
+        </p:nvSpPr>
+        <p:spPr>
+          <a:xfrm>
+            <a:off x="814595" y="3028094"/>
+            <a:ext cx="6400800" cy="457001"/>
+          </a:xfrm>
+          <a:prstGeom prst="roundRect">
+            <a:avLst/>
+          </a:prstGeom>
+          <a:solidFill>
+            <a:schemeClr val="accent1">
+              <a:lumMod val="40000"/>
+              <a:lumOff val="60000"/>
+            </a:schemeClr>
+          </a:solidFill>
+          <a:ln>
+            <a:solidFill>
+              <a:schemeClr val="tx1"/>
+            </a:solidFill>
+          </a:ln>
+        </p:spPr>
+        <p:style>
+          <a:lnRef idx="2">
+            <a:schemeClr val="accent1">
+              <a:shade val="50000"/>
+            </a:schemeClr>
+          </a:lnRef>
+          <a:fillRef idx="1">
+            <a:schemeClr val="accent1"/>
+          </a:fillRef>
+          <a:effectRef idx="0">
+            <a:schemeClr val="accent1"/>
+          </a:effectRef>
+          <a:fontRef idx="minor">
+            <a:schemeClr val="lt1"/>
+          </a:fontRef>
+        </p:style>
+        <p:txBody>
+          <a:bodyPr rtlCol="0" anchor="ctr"/>
+          <a:lstStyle/>
+          <a:p>
+            <a:pPr algn="ctr"/>
+            <a:endParaRPr lang="en-US" b="1" dirty="0">
+              <a:solidFill>
+                <a:schemeClr val="tx1"/>
+              </a:solidFill>
+            </a:endParaRPr>
+          </a:p>
+        </p:txBody>
+      </p:sp>
+      <p:sp>
+        <p:nvSpPr>
+          <p:cNvPr id="18" name="Rectangle: Rounded Corners 17">
+            <a:extLst>
+              <a:ext uri="{FF2B5EF4-FFF2-40B4-BE49-F238E27FC236}">
+                <a16:creationId xmlns:a16="http://schemas.microsoft.com/office/drawing/2014/main" id="{A5947EC4-2512-4FDD-A2AE-6E8E1DF5BBDA}"/>
+              </a:ext>
+            </a:extLst>
+          </p:cNvPr>
+          <p:cNvSpPr/>
+          <p:nvPr/>
+        </p:nvSpPr>
+        <p:spPr>
+          <a:xfrm>
+            <a:off x="814595" y="4165889"/>
+            <a:ext cx="6400800" cy="478998"/>
+          </a:xfrm>
+          <a:prstGeom prst="roundRect">
+            <a:avLst/>
+          </a:prstGeom>
+          <a:solidFill>
+            <a:schemeClr val="bg1">
+              <a:lumMod val="75000"/>
+            </a:schemeClr>
+          </a:solidFill>
+          <a:ln>
+            <a:solidFill>
+              <a:schemeClr val="tx1"/>
+            </a:solidFill>
+          </a:ln>
+        </p:spPr>
+        <p:style>
+          <a:lnRef idx="2">
+            <a:schemeClr val="accent1">
+              <a:shade val="50000"/>
+            </a:schemeClr>
+          </a:lnRef>
+          <a:fillRef idx="1">
+            <a:schemeClr val="accent1"/>
+          </a:fillRef>
+          <a:effectRef idx="0">
+            <a:schemeClr val="accent1"/>
+          </a:effectRef>
+          <a:fontRef idx="minor">
+            <a:schemeClr val="lt1"/>
+          </a:fontRef>
+        </p:style>
+        <p:txBody>
+          <a:bodyPr rtlCol="0" anchor="ctr"/>
+          <a:lstStyle/>
+          <a:p>
+            <a:pPr algn="ctr"/>
+            <a:endParaRPr lang="en-US" b="1" dirty="0">
+              <a:solidFill>
+                <a:schemeClr val="tx1"/>
+              </a:solidFill>
+            </a:endParaRPr>
+          </a:p>
+        </p:txBody>
+      </p:sp>
+      <p:sp>
+        <p:nvSpPr>
+          <p:cNvPr id="19" name="TextBox 18">
+            <a:extLst>
+              <a:ext uri="{FF2B5EF4-FFF2-40B4-BE49-F238E27FC236}">
+                <a16:creationId xmlns:a16="http://schemas.microsoft.com/office/drawing/2014/main" id="{4F329E82-4FE1-4EE2-909E-1739258B41D6}"/>
+              </a:ext>
+            </a:extLst>
+          </p:cNvPr>
+          <p:cNvSpPr txBox="1"/>
+          <p:nvPr/>
+        </p:nvSpPr>
+        <p:spPr>
+          <a:xfrm>
+            <a:off x="7235686" y="2219738"/>
+            <a:ext cx="1930337" cy="461665"/>
+          </a:xfrm>
+          <a:prstGeom prst="rect">
+            <a:avLst/>
+          </a:prstGeom>
+          <a:noFill/>
+        </p:spPr>
+        <p:txBody>
+          <a:bodyPr wrap="none" rtlCol="0">
+            <a:spAutoFit/>
+          </a:bodyPr>
+          <a:lstStyle/>
+          <a:p>
+            <a:r>
+              <a:rPr lang="en-US" sz="2400" b="1" dirty="0">
+                <a:solidFill>
+                  <a:schemeClr val="accent6">
+                    <a:lumMod val="50000"/>
+                  </a:schemeClr>
+                </a:solidFill>
+              </a:rPr>
+              <a:t>SD1002Shape</a:t>
+            </a:r>
+          </a:p>
+        </p:txBody>
+      </p:sp>
+      <p:sp>
+        <p:nvSpPr>
+          <p:cNvPr id="21" name="TextBox 20">
+            <a:extLst>
+              <a:ext uri="{FF2B5EF4-FFF2-40B4-BE49-F238E27FC236}">
+                <a16:creationId xmlns:a16="http://schemas.microsoft.com/office/drawing/2014/main" id="{83A70331-5F59-4C46-A0E7-1DE702D8904E}"/>
+              </a:ext>
+            </a:extLst>
+          </p:cNvPr>
+          <p:cNvSpPr txBox="1"/>
+          <p:nvPr/>
+        </p:nvSpPr>
+        <p:spPr>
+          <a:xfrm>
+            <a:off x="7235686" y="4181061"/>
+            <a:ext cx="2004075" cy="461665"/>
+          </a:xfrm>
+          <a:prstGeom prst="rect">
+            <a:avLst/>
+          </a:prstGeom>
+          <a:noFill/>
+        </p:spPr>
+        <p:txBody>
+          <a:bodyPr wrap="none" rtlCol="0">
+            <a:spAutoFit/>
+          </a:bodyPr>
+          <a:lstStyle/>
+          <a:p>
+            <a:r>
+              <a:rPr lang="en-US" sz="2400" i="1" dirty="0">
+                <a:solidFill>
+                  <a:schemeClr val="bg1">
+                    <a:lumMod val="65000"/>
+                  </a:schemeClr>
+                </a:solidFill>
+              </a:rPr>
+              <a:t>...more shapes</a:t>
+            </a:r>
+          </a:p>
+        </p:txBody>
+      </p:sp>
+      <p:sp>
+        <p:nvSpPr>
+          <p:cNvPr id="22" name="TextBox 21">
+            <a:extLst>
+              <a:ext uri="{FF2B5EF4-FFF2-40B4-BE49-F238E27FC236}">
+                <a16:creationId xmlns:a16="http://schemas.microsoft.com/office/drawing/2014/main" id="{5604566B-9473-44E6-A9F0-16B413C2F315}"/>
+              </a:ext>
+            </a:extLst>
+          </p:cNvPr>
+          <p:cNvSpPr txBox="1"/>
+          <p:nvPr/>
+        </p:nvSpPr>
+        <p:spPr>
+          <a:xfrm>
+            <a:off x="7235686" y="2988364"/>
+            <a:ext cx="1930337" cy="461665"/>
+          </a:xfrm>
+          <a:prstGeom prst="rect">
+            <a:avLst/>
+          </a:prstGeom>
+          <a:noFill/>
+        </p:spPr>
+        <p:txBody>
+          <a:bodyPr wrap="none" rtlCol="0">
+            <a:spAutoFit/>
+          </a:bodyPr>
+          <a:lstStyle/>
+          <a:p>
+            <a:r>
+              <a:rPr lang="en-US" sz="2400" b="1" dirty="0">
+                <a:solidFill>
+                  <a:schemeClr val="accent1">
+                    <a:lumMod val="75000"/>
+                  </a:schemeClr>
+                </a:solidFill>
+              </a:rPr>
+              <a:t>SD1001Shape</a:t>
+            </a:r>
+          </a:p>
+        </p:txBody>
+      </p:sp>
+      <p:sp>
+        <p:nvSpPr>
+          <p:cNvPr id="23" name="TextBox 22">
+            <a:extLst>
+              <a:ext uri="{FF2B5EF4-FFF2-40B4-BE49-F238E27FC236}">
+                <a16:creationId xmlns:a16="http://schemas.microsoft.com/office/drawing/2014/main" id="{CD7F6E51-1BA6-4815-8455-7C3C94C69EA6}"/>
+              </a:ext>
+            </a:extLst>
+          </p:cNvPr>
+          <p:cNvSpPr txBox="1"/>
+          <p:nvPr/>
+        </p:nvSpPr>
+        <p:spPr>
+          <a:xfrm>
+            <a:off x="7235686" y="3637721"/>
+            <a:ext cx="1930337" cy="461665"/>
+          </a:xfrm>
+          <a:prstGeom prst="rect">
+            <a:avLst/>
+          </a:prstGeom>
+          <a:noFill/>
+        </p:spPr>
+        <p:txBody>
+          <a:bodyPr wrap="none" rtlCol="0">
+            <a:spAutoFit/>
+          </a:bodyPr>
+          <a:lstStyle/>
+          <a:p>
+            <a:r>
+              <a:rPr lang="en-US" sz="2400" b="1" dirty="0">
+                <a:solidFill>
+                  <a:schemeClr val="accent2">
+                    <a:lumMod val="75000"/>
+                  </a:schemeClr>
+                </a:solidFill>
+              </a:rPr>
+              <a:t>SD0083Shape</a:t>
+            </a:r>
+          </a:p>
+        </p:txBody>
+      </p:sp>
+      <p:sp>
+        <p:nvSpPr>
+          <p:cNvPr id="45" name="TextBox 44">
+            <a:extLst>
+              <a:ext uri="{FF2B5EF4-FFF2-40B4-BE49-F238E27FC236}">
+                <a16:creationId xmlns:a16="http://schemas.microsoft.com/office/drawing/2014/main" id="{DCEB2144-B3F4-48FC-863E-2B0381C57201}"/>
+              </a:ext>
+            </a:extLst>
+          </p:cNvPr>
+          <p:cNvSpPr txBox="1"/>
+          <p:nvPr/>
+        </p:nvSpPr>
+        <p:spPr>
+          <a:xfrm>
+            <a:off x="690260" y="817724"/>
+            <a:ext cx="6543266" cy="4047262"/>
+          </a:xfrm>
+          <a:prstGeom prst="rect">
+            <a:avLst/>
+          </a:prstGeom>
+          <a:noFill/>
+        </p:spPr>
+        <p:txBody>
+          <a:bodyPr wrap="square" rtlCol="0">
+            <a:spAutoFit/>
+          </a:bodyPr>
+          <a:lstStyle/>
+          <a:p>
+            <a:pPr>
+              <a:spcBef>
+                <a:spcPts val="600"/>
+              </a:spcBef>
+              <a:spcAft>
+                <a:spcPts val="600"/>
+              </a:spcAft>
+            </a:pPr>
+            <a:r>
+              <a:rPr lang="en-US" sz="2400" dirty="0"/>
+              <a:t>study:Subject_CJ16050_00M01</a:t>
+            </a:r>
+          </a:p>
+          <a:p>
+            <a:pPr>
+              <a:lnSpc>
+                <a:spcPct val="150000"/>
+              </a:lnSpc>
+            </a:pPr>
+            <a:r>
+              <a:rPr lang="en-US" sz="2400" dirty="0"/>
+              <a:t>    a                           </a:t>
+            </a:r>
+            <a:r>
+              <a:rPr lang="en-US" sz="2400" dirty="0" err="1"/>
+              <a:t>study:AnimalSubject</a:t>
+            </a:r>
+            <a:r>
+              <a:rPr lang="en-US" sz="2400" dirty="0"/>
+              <a:t> ;</a:t>
+            </a:r>
+          </a:p>
+          <a:p>
+            <a:pPr>
+              <a:lnSpc>
+                <a:spcPct val="150000"/>
+              </a:lnSpc>
+            </a:pPr>
+            <a:r>
+              <a:rPr lang="en-US" sz="2400" dirty="0"/>
+              <a:t>    </a:t>
+            </a:r>
+            <a:r>
+              <a:rPr lang="en-US" sz="2400" dirty="0" err="1"/>
+              <a:t>study:rfendtc</a:t>
+            </a:r>
+            <a:r>
+              <a:rPr lang="en-US" sz="2400" dirty="0"/>
+              <a:t>      "2016-12-07"^^</a:t>
+            </a:r>
+            <a:r>
+              <a:rPr lang="en-US" sz="2400" dirty="0" err="1"/>
+              <a:t>xsd:date</a:t>
+            </a:r>
+            <a:r>
+              <a:rPr lang="en-US" sz="2400" dirty="0"/>
+              <a:t> ;</a:t>
+            </a:r>
+          </a:p>
+          <a:p>
+            <a:pPr>
+              <a:lnSpc>
+                <a:spcPct val="150000"/>
+              </a:lnSpc>
+            </a:pPr>
+            <a:r>
+              <a:rPr lang="en-US" sz="2400" dirty="0"/>
+              <a:t>    </a:t>
+            </a:r>
+            <a:r>
+              <a:rPr lang="en-US" sz="2400" dirty="0" err="1"/>
+              <a:t>study:rfstdtc</a:t>
+            </a:r>
+            <a:r>
+              <a:rPr lang="en-US" sz="2400" dirty="0"/>
+              <a:t>       "2016-12-07"^^</a:t>
+            </a:r>
+            <a:r>
+              <a:rPr lang="en-US" sz="2400" dirty="0" err="1"/>
+              <a:t>xsd:date</a:t>
+            </a:r>
+            <a:r>
+              <a:rPr lang="en-US" sz="2400" dirty="0"/>
+              <a:t>  ;</a:t>
+            </a:r>
+          </a:p>
+          <a:p>
+            <a:pPr>
+              <a:lnSpc>
+                <a:spcPct val="150000"/>
+              </a:lnSpc>
+            </a:pPr>
+            <a:r>
+              <a:rPr lang="en-US" sz="2400" dirty="0"/>
+              <a:t>    </a:t>
+            </a:r>
+            <a:r>
+              <a:rPr lang="en-US" sz="2400" dirty="0" err="1"/>
+              <a:t>study:subjid</a:t>
+            </a:r>
+            <a:r>
+              <a:rPr lang="en-US" sz="2400" dirty="0"/>
+              <a:t>        “00M01"^^</a:t>
+            </a:r>
+            <a:r>
+              <a:rPr lang="en-US" sz="2400" dirty="0" err="1"/>
+              <a:t>xsd:string</a:t>
+            </a:r>
+            <a:r>
+              <a:rPr lang="en-US" sz="2400" dirty="0"/>
+              <a:t> ;</a:t>
+            </a:r>
+          </a:p>
+          <a:p>
+            <a:pPr>
+              <a:lnSpc>
+                <a:spcPct val="150000"/>
+              </a:lnSpc>
+            </a:pPr>
+            <a:r>
+              <a:rPr lang="en-US" sz="2400" dirty="0"/>
+              <a:t>    </a:t>
+            </a:r>
+            <a:r>
+              <a:rPr lang="en-US" sz="2400" dirty="0" err="1"/>
+              <a:t>study:usubjid</a:t>
+            </a:r>
+            <a:r>
+              <a:rPr lang="en-US" sz="2400" dirty="0"/>
+              <a:t>     “CJ16050_00M01” ^^</a:t>
+            </a:r>
+            <a:r>
+              <a:rPr lang="en-US" sz="2400" dirty="0" err="1"/>
+              <a:t>xsd:string</a:t>
+            </a:r>
+            <a:r>
+              <a:rPr lang="en-US" sz="2400" dirty="0"/>
+              <a:t> ;</a:t>
+            </a:r>
+          </a:p>
+          <a:p>
+            <a:endParaRPr lang="en-US" sz="2400" dirty="0"/>
+          </a:p>
+          <a:p>
+            <a:endParaRPr lang="en-US" sz="2400" dirty="0"/>
+          </a:p>
+        </p:txBody>
+      </p:sp>
+      <p:sp>
+        <p:nvSpPr>
+          <p:cNvPr id="13" name="TextBox 12">
+            <a:extLst>
+              <a:ext uri="{FF2B5EF4-FFF2-40B4-BE49-F238E27FC236}">
+                <a16:creationId xmlns:a16="http://schemas.microsoft.com/office/drawing/2014/main" id="{47A2AA95-FF59-4D21-BCDB-A931A9C8AB84}"/>
+              </a:ext>
+            </a:extLst>
+          </p:cNvPr>
+          <p:cNvSpPr txBox="1"/>
+          <p:nvPr/>
+        </p:nvSpPr>
+        <p:spPr>
+          <a:xfrm>
+            <a:off x="877558" y="4174965"/>
+            <a:ext cx="1714508" cy="461665"/>
+          </a:xfrm>
+          <a:prstGeom prst="rect">
+            <a:avLst/>
+          </a:prstGeom>
+          <a:noFill/>
+        </p:spPr>
+        <p:txBody>
+          <a:bodyPr wrap="none" rtlCol="0">
+            <a:spAutoFit/>
+          </a:bodyPr>
+          <a:lstStyle/>
+          <a:p>
+            <a:r>
+              <a:rPr lang="en-US" sz="2400" i="1" dirty="0">
+                <a:solidFill>
+                  <a:schemeClr val="tx1">
+                    <a:lumMod val="50000"/>
+                    <a:lumOff val="50000"/>
+                  </a:schemeClr>
+                </a:solidFill>
+              </a:rPr>
+              <a:t>...more data</a:t>
+            </a:r>
+          </a:p>
+        </p:txBody>
+      </p:sp>
+    </p:spTree>
+    <p:extLst>
+      <p:ext uri="{BB962C8B-B14F-4D97-AF65-F5344CB8AC3E}">
+        <p14:creationId xmlns:p14="http://schemas.microsoft.com/office/powerpoint/2010/main" val="3442749000"/>
+      </p:ext>
+    </p:extLst>
+  </p:cSld>
+  <p:clrMapOvr>
+    <a:masterClrMapping/>
+  </p:clrMapOvr>
+</p:sld>
+</file>
+
+<file path=ppt/slides/slide11.xml><?xml version="1.0" encoding="utf-8"?>
 <p:sld xmlns:a="http://schemas.openxmlformats.org/drawingml/2006/main" xmlns:r="http://schemas.openxmlformats.org/officeDocument/2006/relationships" xmlns:p="http://schemas.openxmlformats.org/presentationml/2006/main">
   <p:cSld>
     <p:spTree>
@@ -7114,8 +7818,8 @@
         </p:nvSpPr>
         <p:spPr>
           <a:xfrm>
-            <a:off x="9209315" y="6387068"/>
-            <a:ext cx="3185885" cy="369332"/>
+            <a:off x="8287657" y="6387068"/>
+            <a:ext cx="4107543" cy="369332"/>
           </a:xfrm>
           <a:prstGeom prst="rect">
             <a:avLst/>
@@ -7141,7 +7845,7 @@
           <a:p>
             <a:r>
               <a:rPr lang="en-US" dirty="0"/>
-              <a:t>RefIntervalMissEndDate.PNG</a:t>
+              <a:t>RefIntervalStructureMissEndDate.PNG</a:t>
             </a:r>
           </a:p>
         </p:txBody>
@@ -8091,7 +8795,7 @@
         </p:nvSpPr>
         <p:spPr>
           <a:xfrm>
-            <a:off x="9586686" y="6488668"/>
+            <a:off x="9122229" y="6488668"/>
             <a:ext cx="3185885" cy="369332"/>
           </a:xfrm>
           <a:prstGeom prst="rect">
@@ -8118,7 +8822,7 @@
           <a:p>
             <a:r>
               <a:rPr lang="en-US" dirty="0"/>
-              <a:t>AnimaSubjectShape.PNG</a:t>
+              <a:t>AnimalSubjectStructure.PNG</a:t>
             </a:r>
           </a:p>
         </p:txBody>
@@ -8820,7 +9524,7 @@
         </p:nvSpPr>
         <p:spPr>
           <a:xfrm>
-            <a:off x="10123714" y="6379031"/>
+            <a:off x="9688285" y="6320974"/>
             <a:ext cx="3185885" cy="369332"/>
           </a:xfrm>
           <a:prstGeom prst="rect">
@@ -8847,7 +9551,7 @@
           <a:p>
             <a:r>
               <a:rPr lang="en-US" dirty="0"/>
-              <a:t>IntervalShape.PNG</a:t>
+              <a:t>IntervalStructure.PNG</a:t>
             </a:r>
           </a:p>
         </p:txBody>
@@ -8884,14 +9588,90 @@
       </p:grpSpPr>
       <p:sp>
         <p:nvSpPr>
-          <p:cNvPr id="4" name="Rectangle: Rounded Corners 3"/>
+          <p:cNvPr id="45" name="Rectangle: Rounded Corners 44">
+            <a:extLst>
+              <a:ext uri="{FF2B5EF4-FFF2-40B4-BE49-F238E27FC236}">
+                <a16:creationId xmlns:a16="http://schemas.microsoft.com/office/drawing/2014/main" id="{B9A69A35-10B3-4874-B928-C93C5AEC02C5}"/>
+              </a:ext>
+            </a:extLst>
+          </p:cNvPr>
           <p:cNvSpPr/>
           <p:nvPr/>
         </p:nvSpPr>
         <p:spPr>
           <a:xfrm>
-            <a:off x="324794" y="602691"/>
-            <a:ext cx="1828800" cy="449588"/>
+            <a:off x="1740819" y="1332492"/>
+            <a:ext cx="3154680" cy="457001"/>
+          </a:xfrm>
+          <a:prstGeom prst="roundRect">
+            <a:avLst/>
+          </a:prstGeom>
+          <a:solidFill>
+            <a:srgbClr val="E4ECF8"/>
+          </a:solidFill>
+          <a:ln w="38100">
+            <a:solidFill>
+              <a:schemeClr val="accent1">
+                <a:lumMod val="75000"/>
+              </a:schemeClr>
+            </a:solidFill>
+          </a:ln>
+        </p:spPr>
+        <p:style>
+          <a:lnRef idx="2">
+            <a:schemeClr val="accent1">
+              <a:shade val="50000"/>
+            </a:schemeClr>
+          </a:lnRef>
+          <a:fillRef idx="1">
+            <a:schemeClr val="accent1"/>
+          </a:fillRef>
+          <a:effectRef idx="0">
+            <a:schemeClr val="accent1"/>
+          </a:effectRef>
+          <a:fontRef idx="minor">
+            <a:schemeClr val="lt1"/>
+          </a:fontRef>
+        </p:style>
+        <p:txBody>
+          <a:bodyPr rtlCol="0" anchor="ctr"/>
+          <a:lstStyle/>
+          <a:p>
+            <a:pPr algn="ctr"/>
+            <a:r>
+              <a:rPr lang="en-US" b="1" dirty="0" err="1">
+                <a:solidFill>
+                  <a:schemeClr val="tx1"/>
+                </a:solidFill>
+              </a:rPr>
+              <a:t>study:Subject</a:t>
+            </a:r>
+            <a:endParaRPr lang="en-US" dirty="0">
+              <a:solidFill>
+                <a:schemeClr val="bg1">
+                  <a:lumMod val="50000"/>
+                </a:schemeClr>
+              </a:solidFill>
+            </a:endParaRPr>
+          </a:p>
+        </p:txBody>
+      </p:sp>
+      <p:sp>
+        <p:nvSpPr>
+          <p:cNvPr id="19" name="Rectangle: Rounded Corners 18">
+            <a:extLst>
+              <a:ext uri="{FF2B5EF4-FFF2-40B4-BE49-F238E27FC236}">
+                <a16:creationId xmlns:a16="http://schemas.microsoft.com/office/drawing/2014/main" id="{1A2C1608-A407-426E-907C-FD5043DF9366}"/>
+              </a:ext>
+            </a:extLst>
+          </p:cNvPr>
+          <p:cNvSpPr/>
+          <p:nvPr/>
+        </p:nvSpPr>
+        <p:spPr>
+          <a:xfrm>
+            <a:off x="3925218" y="3473004"/>
+            <a:ext cx="3154680" cy="457001"/>
           </a:xfrm>
           <a:prstGeom prst="roundRect">
             <a:avLst/>
@@ -8939,9 +9719,9 @@
                   </a:schemeClr>
                 </a:solidFill>
               </a:rPr>
-              <a:t>time:Interval</a:t>
-            </a:r>
-            <a:endParaRPr lang="en-US" b="1" dirty="0">
+              <a:t>study:HumanSubject</a:t>
+            </a:r>
+            <a:endParaRPr lang="en-US" dirty="0">
               <a:solidFill>
                 <a:schemeClr val="tx1">
                   <a:lumMod val="50000"/>
@@ -8952,59 +9732,12 @@
           </a:p>
         </p:txBody>
       </p:sp>
-      <p:cxnSp>
-        <p:nvCxnSpPr>
-          <p:cNvPr id="20" name="Connector: Elbow 19">
-            <a:extLst>
-              <a:ext uri="{FF2B5EF4-FFF2-40B4-BE49-F238E27FC236}">
-                <a16:creationId xmlns:a16="http://schemas.microsoft.com/office/drawing/2014/main" id="{15B8C948-92DD-413C-AF47-55CD80736997}"/>
-              </a:ext>
-            </a:extLst>
-          </p:cNvPr>
-          <p:cNvCxnSpPr>
-            <a:stCxn id="4" idx="2"/>
-            <a:endCxn id="45" idx="1"/>
-          </p:cNvCxnSpPr>
-          <p:nvPr/>
-        </p:nvCxnSpPr>
-        <p:spPr>
-          <a:xfrm rot="16200000" flipH="1">
-            <a:off x="1235649" y="1055823"/>
-            <a:ext cx="508714" cy="501625"/>
-          </a:xfrm>
-          <a:prstGeom prst="bentConnector2">
-            <a:avLst/>
-          </a:prstGeom>
-          <a:ln w="38100">
-            <a:solidFill>
-              <a:schemeClr val="bg1">
-                <a:lumMod val="75000"/>
-              </a:schemeClr>
-            </a:solidFill>
-            <a:tailEnd type="triangle"/>
-          </a:ln>
-        </p:spPr>
-        <p:style>
-          <a:lnRef idx="1">
-            <a:schemeClr val="accent1"/>
-          </a:lnRef>
-          <a:fillRef idx="0">
-            <a:schemeClr val="accent1"/>
-          </a:fillRef>
-          <a:effectRef idx="0">
-            <a:schemeClr val="accent1"/>
-          </a:effectRef>
-          <a:fontRef idx="minor">
-            <a:schemeClr val="tx1"/>
-          </a:fontRef>
-        </p:style>
-      </p:cxnSp>
-      <p:sp>
-        <p:nvSpPr>
-          <p:cNvPr id="45" name="Rectangle: Rounded Corners 44">
-            <a:extLst>
-              <a:ext uri="{FF2B5EF4-FFF2-40B4-BE49-F238E27FC236}">
-                <a16:creationId xmlns:a16="http://schemas.microsoft.com/office/drawing/2014/main" id="{B9A69A35-10B3-4874-B928-C93C5AEC02C5}"/>
+      <p:sp>
+        <p:nvSpPr>
+          <p:cNvPr id="21" name="Rectangle: Rounded Corners 20">
+            <a:extLst>
+              <a:ext uri="{FF2B5EF4-FFF2-40B4-BE49-F238E27FC236}">
+                <a16:creationId xmlns:a16="http://schemas.microsoft.com/office/drawing/2014/main" id="{8C8E85FE-0F55-4A00-B762-C24CE31745D5}"/>
               </a:ext>
             </a:extLst>
           </p:cNvPr>
@@ -9013,78 +9746,8 @@
         </p:nvSpPr>
         <p:spPr>
           <a:xfrm>
-            <a:off x="1740819" y="1332492"/>
-            <a:ext cx="3154680" cy="457001"/>
-          </a:xfrm>
-          <a:prstGeom prst="roundRect">
-            <a:avLst/>
-          </a:prstGeom>
-          <a:solidFill>
-            <a:srgbClr val="E4ECF8"/>
-          </a:solidFill>
-          <a:ln w="38100">
-            <a:solidFill>
-              <a:schemeClr val="accent1">
-                <a:lumMod val="75000"/>
-              </a:schemeClr>
-            </a:solidFill>
-          </a:ln>
-        </p:spPr>
-        <p:style>
-          <a:lnRef idx="2">
-            <a:schemeClr val="accent1">
-              <a:shade val="50000"/>
-            </a:schemeClr>
-          </a:lnRef>
-          <a:fillRef idx="1">
-            <a:schemeClr val="accent1"/>
-          </a:fillRef>
-          <a:effectRef idx="0">
-            <a:schemeClr val="accent1"/>
-          </a:effectRef>
-          <a:fontRef idx="minor">
-            <a:schemeClr val="lt1"/>
-          </a:fontRef>
-        </p:style>
-        <p:txBody>
-          <a:bodyPr rtlCol="0" anchor="ctr"/>
-          <a:lstStyle/>
-          <a:p>
-            <a:pPr algn="ctr"/>
-            <a:r>
-              <a:rPr lang="en-US" b="1" dirty="0" err="1">
-                <a:solidFill>
-                  <a:schemeClr val="tx1"/>
-                </a:solidFill>
-              </a:rPr>
-              <a:t>study:EntityInterval</a:t>
-            </a:r>
-            <a:endParaRPr lang="en-US" dirty="0">
-              <a:solidFill>
-                <a:schemeClr val="bg1">
-                  <a:lumMod val="50000"/>
-                </a:schemeClr>
-              </a:solidFill>
-            </a:endParaRPr>
-          </a:p>
-        </p:txBody>
-      </p:sp>
-      <p:sp>
-        <p:nvSpPr>
-          <p:cNvPr id="19" name="Rectangle: Rounded Corners 18">
-            <a:extLst>
-              <a:ext uri="{FF2B5EF4-FFF2-40B4-BE49-F238E27FC236}">
-                <a16:creationId xmlns:a16="http://schemas.microsoft.com/office/drawing/2014/main" id="{1A2C1608-A407-426E-907C-FD5043DF9366}"/>
-              </a:ext>
-            </a:extLst>
-          </p:cNvPr>
-          <p:cNvSpPr/>
-          <p:nvPr/>
-        </p:nvSpPr>
-        <p:spPr>
-          <a:xfrm>
-            <a:off x="3925217" y="2779151"/>
-            <a:ext cx="3154680" cy="457001"/>
+            <a:off x="5935446" y="2774728"/>
+            <a:ext cx="3317412" cy="457001"/>
           </a:xfrm>
           <a:prstGeom prst="roundRect">
             <a:avLst/>
@@ -9132,9 +9795,9 @@
                   </a:schemeClr>
                 </a:solidFill>
               </a:rPr>
-              <a:t>study:Lifespan</a:t>
-            </a:r>
-            <a:endParaRPr lang="en-US" dirty="0">
+              <a:t>study:AnimalStudySubject</a:t>
+            </a:r>
+            <a:endParaRPr lang="en-US" b="1" dirty="0">
               <a:solidFill>
                 <a:schemeClr val="tx1">
                   <a:lumMod val="50000"/>
@@ -9147,10 +9810,10 @@
       </p:sp>
       <p:sp>
         <p:nvSpPr>
-          <p:cNvPr id="21" name="Rectangle: Rounded Corners 20">
-            <a:extLst>
-              <a:ext uri="{FF2B5EF4-FFF2-40B4-BE49-F238E27FC236}">
-                <a16:creationId xmlns:a16="http://schemas.microsoft.com/office/drawing/2014/main" id="{8C8E85FE-0F55-4A00-B762-C24CE31745D5}"/>
+          <p:cNvPr id="22" name="Rectangle: Rounded Corners 21">
+            <a:extLst>
+              <a:ext uri="{FF2B5EF4-FFF2-40B4-BE49-F238E27FC236}">
+                <a16:creationId xmlns:a16="http://schemas.microsoft.com/office/drawing/2014/main" id="{730C2E2E-7644-4198-9FC8-2000D81E3B1C}"/>
               </a:ext>
             </a:extLst>
           </p:cNvPr>
@@ -9159,7 +9822,316 @@
         </p:nvSpPr>
         <p:spPr>
           <a:xfrm>
-            <a:off x="3925217" y="3481850"/>
+            <a:off x="3925217" y="2076452"/>
+            <a:ext cx="3154680" cy="457001"/>
+          </a:xfrm>
+          <a:prstGeom prst="roundRect">
+            <a:avLst/>
+          </a:prstGeom>
+          <a:solidFill>
+            <a:srgbClr val="E4ECF8"/>
+          </a:solidFill>
+          <a:ln w="38100">
+            <a:solidFill>
+              <a:schemeClr val="accent1">
+                <a:lumMod val="75000"/>
+              </a:schemeClr>
+            </a:solidFill>
+          </a:ln>
+        </p:spPr>
+        <p:style>
+          <a:lnRef idx="2">
+            <a:schemeClr val="accent1">
+              <a:shade val="50000"/>
+            </a:schemeClr>
+          </a:lnRef>
+          <a:fillRef idx="1">
+            <a:schemeClr val="accent1"/>
+          </a:fillRef>
+          <a:effectRef idx="0">
+            <a:schemeClr val="accent1"/>
+          </a:effectRef>
+          <a:fontRef idx="minor">
+            <a:schemeClr val="lt1"/>
+          </a:fontRef>
+        </p:style>
+        <p:txBody>
+          <a:bodyPr rtlCol="0" anchor="ctr"/>
+          <a:lstStyle/>
+          <a:p>
+            <a:pPr algn="ctr"/>
+            <a:r>
+              <a:rPr lang="en-US" b="1" dirty="0" err="1">
+                <a:solidFill>
+                  <a:schemeClr val="tx1"/>
+                </a:solidFill>
+              </a:rPr>
+              <a:t>study:AnimalSubject</a:t>
+            </a:r>
+            <a:endParaRPr lang="en-US" b="1" dirty="0">
+              <a:solidFill>
+                <a:schemeClr val="tx1"/>
+              </a:solidFill>
+            </a:endParaRPr>
+          </a:p>
+        </p:txBody>
+      </p:sp>
+      <p:cxnSp>
+        <p:nvCxnSpPr>
+          <p:cNvPr id="29" name="Connector: Elbow 28">
+            <a:extLst>
+              <a:ext uri="{FF2B5EF4-FFF2-40B4-BE49-F238E27FC236}">
+                <a16:creationId xmlns:a16="http://schemas.microsoft.com/office/drawing/2014/main" id="{B595185C-F242-454F-B004-8D58BB67D373}"/>
+              </a:ext>
+            </a:extLst>
+          </p:cNvPr>
+          <p:cNvCxnSpPr>
+            <a:cxnSpLocks/>
+            <a:stCxn id="45" idx="2"/>
+            <a:endCxn id="19" idx="1"/>
+          </p:cNvCxnSpPr>
+          <p:nvPr/>
+        </p:nvCxnSpPr>
+        <p:spPr>
+          <a:xfrm rot="16200000" flipH="1">
+            <a:off x="2665682" y="2441969"/>
+            <a:ext cx="1912012" cy="607059"/>
+          </a:xfrm>
+          <a:prstGeom prst="bentConnector2">
+            <a:avLst/>
+          </a:prstGeom>
+          <a:ln w="38100">
+            <a:solidFill>
+              <a:schemeClr val="bg1">
+                <a:lumMod val="75000"/>
+              </a:schemeClr>
+            </a:solidFill>
+            <a:tailEnd type="triangle"/>
+          </a:ln>
+        </p:spPr>
+        <p:style>
+          <a:lnRef idx="1">
+            <a:schemeClr val="accent1"/>
+          </a:lnRef>
+          <a:fillRef idx="0">
+            <a:schemeClr val="accent1"/>
+          </a:fillRef>
+          <a:effectRef idx="0">
+            <a:schemeClr val="accent1"/>
+          </a:effectRef>
+          <a:fontRef idx="minor">
+            <a:schemeClr val="tx1"/>
+          </a:fontRef>
+        </p:style>
+      </p:cxnSp>
+      <p:cxnSp>
+        <p:nvCxnSpPr>
+          <p:cNvPr id="35" name="Connector: Elbow 34">
+            <a:extLst>
+              <a:ext uri="{FF2B5EF4-FFF2-40B4-BE49-F238E27FC236}">
+                <a16:creationId xmlns:a16="http://schemas.microsoft.com/office/drawing/2014/main" id="{077E5DA3-509A-4D16-841F-AE7F8CEE6CAF}"/>
+              </a:ext>
+            </a:extLst>
+          </p:cNvPr>
+          <p:cNvCxnSpPr>
+            <a:cxnSpLocks/>
+            <a:stCxn id="22" idx="2"/>
+            <a:endCxn id="21" idx="1"/>
+          </p:cNvCxnSpPr>
+          <p:nvPr/>
+        </p:nvCxnSpPr>
+        <p:spPr>
+          <a:xfrm rot="16200000" flipH="1">
+            <a:off x="5484113" y="2551896"/>
+            <a:ext cx="469776" cy="432889"/>
+          </a:xfrm>
+          <a:prstGeom prst="bentConnector2">
+            <a:avLst/>
+          </a:prstGeom>
+          <a:ln w="38100">
+            <a:solidFill>
+              <a:schemeClr val="bg1">
+                <a:lumMod val="75000"/>
+              </a:schemeClr>
+            </a:solidFill>
+            <a:tailEnd type="triangle"/>
+          </a:ln>
+        </p:spPr>
+        <p:style>
+          <a:lnRef idx="1">
+            <a:schemeClr val="accent1"/>
+          </a:lnRef>
+          <a:fillRef idx="0">
+            <a:schemeClr val="accent1"/>
+          </a:fillRef>
+          <a:effectRef idx="0">
+            <a:schemeClr val="accent1"/>
+          </a:effectRef>
+          <a:fontRef idx="minor">
+            <a:schemeClr val="tx1"/>
+          </a:fontRef>
+        </p:style>
+      </p:cxnSp>
+      <p:cxnSp>
+        <p:nvCxnSpPr>
+          <p:cNvPr id="38" name="Connector: Elbow 37">
+            <a:extLst>
+              <a:ext uri="{FF2B5EF4-FFF2-40B4-BE49-F238E27FC236}">
+                <a16:creationId xmlns:a16="http://schemas.microsoft.com/office/drawing/2014/main" id="{9009E932-C6B9-49B6-9F6E-27689BA0E87C}"/>
+              </a:ext>
+            </a:extLst>
+          </p:cNvPr>
+          <p:cNvCxnSpPr>
+            <a:cxnSpLocks/>
+            <a:stCxn id="45" idx="2"/>
+            <a:endCxn id="22" idx="1"/>
+          </p:cNvCxnSpPr>
+          <p:nvPr/>
+        </p:nvCxnSpPr>
+        <p:spPr>
+          <a:xfrm rot="16200000" flipH="1">
+            <a:off x="3363958" y="1743694"/>
+            <a:ext cx="515460" cy="607058"/>
+          </a:xfrm>
+          <a:prstGeom prst="bentConnector2">
+            <a:avLst/>
+          </a:prstGeom>
+          <a:ln w="38100">
+            <a:solidFill>
+              <a:schemeClr val="bg1">
+                <a:lumMod val="50000"/>
+              </a:schemeClr>
+            </a:solidFill>
+            <a:tailEnd type="triangle"/>
+          </a:ln>
+        </p:spPr>
+        <p:style>
+          <a:lnRef idx="1">
+            <a:schemeClr val="accent1"/>
+          </a:lnRef>
+          <a:fillRef idx="0">
+            <a:schemeClr val="accent1"/>
+          </a:fillRef>
+          <a:effectRef idx="0">
+            <a:schemeClr val="accent1"/>
+          </a:effectRef>
+          <a:fontRef idx="minor">
+            <a:schemeClr val="tx1"/>
+          </a:fontRef>
+        </p:style>
+      </p:cxnSp>
+      <p:sp>
+        <p:nvSpPr>
+          <p:cNvPr id="31" name="TextBox 30">
+            <a:extLst>
+              <a:ext uri="{FF2B5EF4-FFF2-40B4-BE49-F238E27FC236}">
+                <a16:creationId xmlns:a16="http://schemas.microsoft.com/office/drawing/2014/main" id="{6683751D-EA79-403D-849F-F258967C9023}"/>
+              </a:ext>
+            </a:extLst>
+          </p:cNvPr>
+          <p:cNvSpPr txBox="1"/>
+          <p:nvPr/>
+        </p:nvSpPr>
+        <p:spPr>
+          <a:xfrm>
+            <a:off x="391887" y="5934670"/>
+            <a:ext cx="5936343" cy="923330"/>
+          </a:xfrm>
+          <a:prstGeom prst="rect">
+            <a:avLst/>
+          </a:prstGeom>
+          <a:noFill/>
+        </p:spPr>
+        <p:txBody>
+          <a:bodyPr wrap="square" rtlCol="0">
+            <a:spAutoFit/>
+          </a:bodyPr>
+          <a:lstStyle/>
+          <a:p>
+            <a:r>
+              <a:rPr lang="en-US" dirty="0"/>
+              <a:t>Structure for defining a rule around </a:t>
+            </a:r>
+            <a:r>
+              <a:rPr lang="en-US" dirty="0" err="1"/>
+              <a:t>AnimalSubject</a:t>
+            </a:r>
+            <a:r>
+              <a:rPr lang="en-US" dirty="0"/>
+              <a:t> IRI can use </a:t>
+            </a:r>
+            <a:r>
+              <a:rPr lang="en-US" dirty="0" err="1"/>
+              <a:t>study:Subject</a:t>
+            </a:r>
+            <a:r>
+              <a:rPr lang="en-US" dirty="0"/>
+              <a:t> for SUBJID, USUBJID because both Animal and Human Study Subjects have these things. </a:t>
+            </a:r>
+          </a:p>
+        </p:txBody>
+      </p:sp>
+      <p:sp>
+        <p:nvSpPr>
+          <p:cNvPr id="43" name="TextBox 42">
+            <a:extLst>
+              <a:ext uri="{FF2B5EF4-FFF2-40B4-BE49-F238E27FC236}">
+                <a16:creationId xmlns:a16="http://schemas.microsoft.com/office/drawing/2014/main" id="{B781ED87-517D-4273-8DF9-A282AE1826BC}"/>
+              </a:ext>
+            </a:extLst>
+          </p:cNvPr>
+          <p:cNvSpPr txBox="1"/>
+          <p:nvPr/>
+        </p:nvSpPr>
+        <p:spPr>
+          <a:xfrm>
+            <a:off x="8606972" y="6488668"/>
+            <a:ext cx="3454400" cy="369332"/>
+          </a:xfrm>
+          <a:prstGeom prst="rect">
+            <a:avLst/>
+          </a:prstGeom>
+          <a:noFill/>
+        </p:spPr>
+        <p:txBody>
+          <a:bodyPr wrap="square" rtlCol="0">
+            <a:spAutoFit/>
+          </a:bodyPr>
+          <a:lstStyle>
+            <a:defPPr>
+              <a:defRPr lang="en-US"/>
+            </a:defPPr>
+            <a:lvl1pPr>
+              <a:defRPr b="1">
+                <a:solidFill>
+                  <a:srgbClr val="FF0000"/>
+                </a:solidFill>
+              </a:defRPr>
+            </a:lvl1pPr>
+          </a:lstStyle>
+          <a:p>
+            <a:r>
+              <a:rPr lang="en-US" dirty="0"/>
+              <a:t>AnimalSubjectOWLStructure.PNG</a:t>
+            </a:r>
+          </a:p>
+        </p:txBody>
+      </p:sp>
+      <p:sp>
+        <p:nvSpPr>
+          <p:cNvPr id="48" name="Rectangle: Rounded Corners 47">
+            <a:extLst>
+              <a:ext uri="{FF2B5EF4-FFF2-40B4-BE49-F238E27FC236}">
+                <a16:creationId xmlns:a16="http://schemas.microsoft.com/office/drawing/2014/main" id="{1223A9CE-8691-436F-8532-CED64FCBD85D}"/>
+              </a:ext>
+            </a:extLst>
+          </p:cNvPr>
+          <p:cNvSpPr/>
+          <p:nvPr/>
+        </p:nvSpPr>
+        <p:spPr>
+          <a:xfrm>
+            <a:off x="5935446" y="4171279"/>
             <a:ext cx="3317412" cy="457001"/>
           </a:xfrm>
           <a:prstGeom prst="roundRect">
@@ -9208,7 +10180,7 @@
                   </a:schemeClr>
                 </a:solidFill>
               </a:rPr>
-              <a:t>study:MedicalConditionInterval</a:t>
+              <a:t>study:AnimalStudySubject</a:t>
             </a:r>
             <a:endParaRPr lang="en-US" b="1" dirty="0">
               <a:solidFill>
@@ -9221,170 +10193,26 @@
           </a:p>
         </p:txBody>
       </p:sp>
-      <p:sp>
-        <p:nvSpPr>
-          <p:cNvPr id="22" name="Rectangle: Rounded Corners 21">
-            <a:extLst>
-              <a:ext uri="{FF2B5EF4-FFF2-40B4-BE49-F238E27FC236}">
-                <a16:creationId xmlns:a16="http://schemas.microsoft.com/office/drawing/2014/main" id="{730C2E2E-7644-4198-9FC8-2000D81E3B1C}"/>
-              </a:ext>
-            </a:extLst>
-          </p:cNvPr>
-          <p:cNvSpPr/>
-          <p:nvPr/>
-        </p:nvSpPr>
-        <p:spPr>
-          <a:xfrm>
-            <a:off x="3925217" y="2076452"/>
-            <a:ext cx="3154680" cy="457001"/>
-          </a:xfrm>
-          <a:prstGeom prst="roundRect">
-            <a:avLst/>
-          </a:prstGeom>
-          <a:solidFill>
-            <a:srgbClr val="E4ECF8"/>
-          </a:solidFill>
-          <a:ln w="38100">
-            <a:solidFill>
-              <a:schemeClr val="accent1">
-                <a:lumMod val="75000"/>
-              </a:schemeClr>
-            </a:solidFill>
-          </a:ln>
-        </p:spPr>
-        <p:style>
-          <a:lnRef idx="2">
-            <a:schemeClr val="accent1">
-              <a:shade val="50000"/>
-            </a:schemeClr>
-          </a:lnRef>
-          <a:fillRef idx="1">
-            <a:schemeClr val="accent1"/>
-          </a:fillRef>
-          <a:effectRef idx="0">
-            <a:schemeClr val="accent1"/>
-          </a:effectRef>
-          <a:fontRef idx="minor">
-            <a:schemeClr val="lt1"/>
-          </a:fontRef>
-        </p:style>
-        <p:txBody>
-          <a:bodyPr rtlCol="0" anchor="ctr"/>
-          <a:lstStyle/>
-          <a:p>
-            <a:pPr algn="ctr"/>
-            <a:r>
-              <a:rPr lang="en-US" b="1" dirty="0" err="1">
-                <a:solidFill>
-                  <a:schemeClr val="tx1"/>
-                </a:solidFill>
-              </a:rPr>
-              <a:t>study:ReferenceInterval</a:t>
-            </a:r>
-            <a:endParaRPr lang="en-US" b="1" dirty="0">
-              <a:solidFill>
-                <a:schemeClr val="tx1"/>
-              </a:solidFill>
-            </a:endParaRPr>
-          </a:p>
-        </p:txBody>
-      </p:sp>
-      <p:sp>
-        <p:nvSpPr>
-          <p:cNvPr id="23" name="Rectangle: Rounded Corners 22">
-            <a:extLst>
-              <a:ext uri="{FF2B5EF4-FFF2-40B4-BE49-F238E27FC236}">
-                <a16:creationId xmlns:a16="http://schemas.microsoft.com/office/drawing/2014/main" id="{AAC2089E-AC68-4D8D-9DB3-C3EA5CBC3B86}"/>
-              </a:ext>
-            </a:extLst>
-          </p:cNvPr>
-          <p:cNvSpPr/>
-          <p:nvPr/>
-        </p:nvSpPr>
-        <p:spPr>
-          <a:xfrm>
-            <a:off x="3925217" y="4184548"/>
-            <a:ext cx="3346440" cy="457001"/>
-          </a:xfrm>
-          <a:prstGeom prst="roundRect">
-            <a:avLst/>
-          </a:prstGeom>
-          <a:solidFill>
-            <a:schemeClr val="bg1">
-              <a:lumMod val="95000"/>
-            </a:schemeClr>
-          </a:solidFill>
-          <a:ln w="38100">
-            <a:solidFill>
-              <a:schemeClr val="bg1">
-                <a:lumMod val="65000"/>
-              </a:schemeClr>
-            </a:solidFill>
-          </a:ln>
-        </p:spPr>
-        <p:style>
-          <a:lnRef idx="2">
-            <a:schemeClr val="accent1">
-              <a:shade val="50000"/>
-            </a:schemeClr>
-          </a:lnRef>
-          <a:fillRef idx="1">
-            <a:schemeClr val="accent1"/>
-          </a:fillRef>
-          <a:effectRef idx="0">
-            <a:schemeClr val="accent1"/>
-          </a:effectRef>
-          <a:fontRef idx="minor">
-            <a:schemeClr val="lt1"/>
-          </a:fontRef>
-        </p:style>
-        <p:txBody>
-          <a:bodyPr rtlCol="0" anchor="ctr"/>
-          <a:lstStyle/>
-          <a:p>
-            <a:pPr algn="ctr"/>
-            <a:r>
-              <a:rPr lang="en-US" b="1" dirty="0" err="1">
-                <a:solidFill>
-                  <a:schemeClr val="tx1">
-                    <a:lumMod val="50000"/>
-                    <a:lumOff val="50000"/>
-                  </a:schemeClr>
-                </a:solidFill>
-              </a:rPr>
-              <a:t>study:StudyParticipationInterval</a:t>
-            </a:r>
-            <a:endParaRPr lang="en-US" b="1" dirty="0">
-              <a:solidFill>
-                <a:schemeClr val="tx1">
-                  <a:lumMod val="50000"/>
-                  <a:lumOff val="50000"/>
-                </a:schemeClr>
-              </a:solidFill>
-            </a:endParaRPr>
-          </a:p>
-        </p:txBody>
-      </p:sp>
       <p:cxnSp>
         <p:nvCxnSpPr>
-          <p:cNvPr id="25" name="Connector: Elbow 24">
-            <a:extLst>
-              <a:ext uri="{FF2B5EF4-FFF2-40B4-BE49-F238E27FC236}">
-                <a16:creationId xmlns:a16="http://schemas.microsoft.com/office/drawing/2014/main" id="{E9CA3D01-94AF-4529-8DED-9DF4680EFD89}"/>
+          <p:cNvPr id="49" name="Connector: Elbow 48">
+            <a:extLst>
+              <a:ext uri="{FF2B5EF4-FFF2-40B4-BE49-F238E27FC236}">
+                <a16:creationId xmlns:a16="http://schemas.microsoft.com/office/drawing/2014/main" id="{9A2BC915-6F83-44EC-BA3C-A508E6A73D45}"/>
               </a:ext>
             </a:extLst>
           </p:cNvPr>
           <p:cNvCxnSpPr>
             <a:cxnSpLocks/>
-            <a:stCxn id="45" idx="2"/>
-            <a:endCxn id="21" idx="1"/>
+            <a:stCxn id="19" idx="2"/>
+            <a:endCxn id="48" idx="1"/>
           </p:cNvCxnSpPr>
           <p:nvPr/>
         </p:nvCxnSpPr>
         <p:spPr>
           <a:xfrm rot="16200000" flipH="1">
-            <a:off x="2661259" y="2446393"/>
-            <a:ext cx="1920858" cy="607058"/>
+            <a:off x="5484115" y="3948448"/>
+            <a:ext cx="469775" cy="432888"/>
           </a:xfrm>
           <a:prstGeom prst="bentConnector2">
             <a:avLst/>
@@ -9413,231 +10241,6 @@
           </a:fontRef>
         </p:style>
       </p:cxnSp>
-      <p:cxnSp>
-        <p:nvCxnSpPr>
-          <p:cNvPr id="29" name="Connector: Elbow 28">
-            <a:extLst>
-              <a:ext uri="{FF2B5EF4-FFF2-40B4-BE49-F238E27FC236}">
-                <a16:creationId xmlns:a16="http://schemas.microsoft.com/office/drawing/2014/main" id="{B595185C-F242-454F-B004-8D58BB67D373}"/>
-              </a:ext>
-            </a:extLst>
-          </p:cNvPr>
-          <p:cNvCxnSpPr>
-            <a:cxnSpLocks/>
-            <a:stCxn id="45" idx="2"/>
-            <a:endCxn id="19" idx="1"/>
-          </p:cNvCxnSpPr>
-          <p:nvPr/>
-        </p:nvCxnSpPr>
-        <p:spPr>
-          <a:xfrm rot="16200000" flipH="1">
-            <a:off x="3012609" y="2095043"/>
-            <a:ext cx="1218159" cy="607058"/>
-          </a:xfrm>
-          <a:prstGeom prst="bentConnector2">
-            <a:avLst/>
-          </a:prstGeom>
-          <a:ln w="38100">
-            <a:solidFill>
-              <a:schemeClr val="bg1">
-                <a:lumMod val="75000"/>
-              </a:schemeClr>
-            </a:solidFill>
-            <a:tailEnd type="triangle"/>
-          </a:ln>
-        </p:spPr>
-        <p:style>
-          <a:lnRef idx="1">
-            <a:schemeClr val="accent1"/>
-          </a:lnRef>
-          <a:fillRef idx="0">
-            <a:schemeClr val="accent1"/>
-          </a:fillRef>
-          <a:effectRef idx="0">
-            <a:schemeClr val="accent1"/>
-          </a:effectRef>
-          <a:fontRef idx="minor">
-            <a:schemeClr val="tx1"/>
-          </a:fontRef>
-        </p:style>
-      </p:cxnSp>
-      <p:cxnSp>
-        <p:nvCxnSpPr>
-          <p:cNvPr id="35" name="Connector: Elbow 34">
-            <a:extLst>
-              <a:ext uri="{FF2B5EF4-FFF2-40B4-BE49-F238E27FC236}">
-                <a16:creationId xmlns:a16="http://schemas.microsoft.com/office/drawing/2014/main" id="{077E5DA3-509A-4D16-841F-AE7F8CEE6CAF}"/>
-              </a:ext>
-            </a:extLst>
-          </p:cNvPr>
-          <p:cNvCxnSpPr>
-            <a:cxnSpLocks/>
-            <a:stCxn id="45" idx="2"/>
-            <a:endCxn id="23" idx="1"/>
-          </p:cNvCxnSpPr>
-          <p:nvPr/>
-        </p:nvCxnSpPr>
-        <p:spPr>
-          <a:xfrm rot="16200000" flipH="1">
-            <a:off x="2309910" y="2797742"/>
-            <a:ext cx="2623556" cy="607058"/>
-          </a:xfrm>
-          <a:prstGeom prst="bentConnector2">
-            <a:avLst/>
-          </a:prstGeom>
-          <a:ln w="38100">
-            <a:solidFill>
-              <a:schemeClr val="bg1">
-                <a:lumMod val="75000"/>
-              </a:schemeClr>
-            </a:solidFill>
-            <a:tailEnd type="triangle"/>
-          </a:ln>
-        </p:spPr>
-        <p:style>
-          <a:lnRef idx="1">
-            <a:schemeClr val="accent1"/>
-          </a:lnRef>
-          <a:fillRef idx="0">
-            <a:schemeClr val="accent1"/>
-          </a:fillRef>
-          <a:effectRef idx="0">
-            <a:schemeClr val="accent1"/>
-          </a:effectRef>
-          <a:fontRef idx="minor">
-            <a:schemeClr val="tx1"/>
-          </a:fontRef>
-        </p:style>
-      </p:cxnSp>
-      <p:cxnSp>
-        <p:nvCxnSpPr>
-          <p:cNvPr id="38" name="Connector: Elbow 37">
-            <a:extLst>
-              <a:ext uri="{FF2B5EF4-FFF2-40B4-BE49-F238E27FC236}">
-                <a16:creationId xmlns:a16="http://schemas.microsoft.com/office/drawing/2014/main" id="{9009E932-C6B9-49B6-9F6E-27689BA0E87C}"/>
-              </a:ext>
-            </a:extLst>
-          </p:cNvPr>
-          <p:cNvCxnSpPr>
-            <a:cxnSpLocks/>
-            <a:stCxn id="45" idx="2"/>
-            <a:endCxn id="22" idx="1"/>
-          </p:cNvCxnSpPr>
-          <p:nvPr/>
-        </p:nvCxnSpPr>
-        <p:spPr>
-          <a:xfrm rot="16200000" flipH="1">
-            <a:off x="3363958" y="1743694"/>
-            <a:ext cx="515460" cy="607058"/>
-          </a:xfrm>
-          <a:prstGeom prst="bentConnector2">
-            <a:avLst/>
-          </a:prstGeom>
-          <a:ln w="38100">
-            <a:solidFill>
-              <a:schemeClr val="bg1">
-                <a:lumMod val="50000"/>
-              </a:schemeClr>
-            </a:solidFill>
-            <a:tailEnd type="triangle"/>
-          </a:ln>
-        </p:spPr>
-        <p:style>
-          <a:lnRef idx="1">
-            <a:schemeClr val="accent1"/>
-          </a:lnRef>
-          <a:fillRef idx="0">
-            <a:schemeClr val="accent1"/>
-          </a:fillRef>
-          <a:effectRef idx="0">
-            <a:schemeClr val="accent1"/>
-          </a:effectRef>
-          <a:fontRef idx="minor">
-            <a:schemeClr val="tx1"/>
-          </a:fontRef>
-        </p:style>
-      </p:cxnSp>
-      <p:sp>
-        <p:nvSpPr>
-          <p:cNvPr id="31" name="TextBox 30">
-            <a:extLst>
-              <a:ext uri="{FF2B5EF4-FFF2-40B4-BE49-F238E27FC236}">
-                <a16:creationId xmlns:a16="http://schemas.microsoft.com/office/drawing/2014/main" id="{6683751D-EA79-403D-849F-F258967C9023}"/>
-              </a:ext>
-            </a:extLst>
-          </p:cNvPr>
-          <p:cNvSpPr txBox="1"/>
-          <p:nvPr/>
-        </p:nvSpPr>
-        <p:spPr>
-          <a:xfrm>
-            <a:off x="406401" y="6023429"/>
-            <a:ext cx="5936343" cy="646331"/>
-          </a:xfrm>
-          <a:prstGeom prst="rect">
-            <a:avLst/>
-          </a:prstGeom>
-          <a:noFill/>
-        </p:spPr>
-        <p:txBody>
-          <a:bodyPr wrap="square" rtlCol="0">
-            <a:spAutoFit/>
-          </a:bodyPr>
-          <a:lstStyle/>
-          <a:p>
-            <a:r>
-              <a:rPr lang="en-US" dirty="0"/>
-              <a:t>Structure for defining a rule around Reference Interval can use Entity Interval if all subclasses play by the same rule. </a:t>
-            </a:r>
-          </a:p>
-        </p:txBody>
-      </p:sp>
-      <p:sp>
-        <p:nvSpPr>
-          <p:cNvPr id="43" name="TextBox 42">
-            <a:extLst>
-              <a:ext uri="{FF2B5EF4-FFF2-40B4-BE49-F238E27FC236}">
-                <a16:creationId xmlns:a16="http://schemas.microsoft.com/office/drawing/2014/main" id="{B781ED87-517D-4273-8DF9-A282AE1826BC}"/>
-              </a:ext>
-            </a:extLst>
-          </p:cNvPr>
-          <p:cNvSpPr txBox="1"/>
-          <p:nvPr/>
-        </p:nvSpPr>
-        <p:spPr>
-          <a:xfrm>
-            <a:off x="9383486" y="6488668"/>
-            <a:ext cx="3185885" cy="369332"/>
-          </a:xfrm>
-          <a:prstGeom prst="rect">
-            <a:avLst/>
-          </a:prstGeom>
-          <a:noFill/>
-        </p:spPr>
-        <p:txBody>
-          <a:bodyPr wrap="square" rtlCol="0">
-            <a:spAutoFit/>
-          </a:bodyPr>
-          <a:lstStyle>
-            <a:defPPr>
-              <a:defRPr lang="en-US"/>
-            </a:defPPr>
-            <a:lvl1pPr>
-              <a:defRPr b="1">
-                <a:solidFill>
-                  <a:srgbClr val="FF0000"/>
-                </a:solidFill>
-              </a:defRPr>
-            </a:lvl1pPr>
-          </a:lstStyle>
-          <a:p>
-            <a:r>
-              <a:rPr lang="en-US" dirty="0"/>
-              <a:t>EntityIntervalStructure.PNG</a:t>
-            </a:r>
-          </a:p>
-        </p:txBody>
-      </p:sp>
     </p:spTree>
     <p:extLst>
       <p:ext uri="{BB962C8B-B14F-4D97-AF65-F5344CB8AC3E}">
@@ -9670,6 +10273,792 @@
       </p:grpSpPr>
       <p:sp>
         <p:nvSpPr>
+          <p:cNvPr id="4" name="Rectangle: Rounded Corners 3"/>
+          <p:cNvSpPr/>
+          <p:nvPr/>
+        </p:nvSpPr>
+        <p:spPr>
+          <a:xfrm>
+            <a:off x="324794" y="602691"/>
+            <a:ext cx="1828800" cy="449588"/>
+          </a:xfrm>
+          <a:prstGeom prst="roundRect">
+            <a:avLst/>
+          </a:prstGeom>
+          <a:solidFill>
+            <a:schemeClr val="bg1">
+              <a:lumMod val="95000"/>
+            </a:schemeClr>
+          </a:solidFill>
+          <a:ln w="38100">
+            <a:solidFill>
+              <a:schemeClr val="bg1">
+                <a:lumMod val="65000"/>
+              </a:schemeClr>
+            </a:solidFill>
+          </a:ln>
+        </p:spPr>
+        <p:style>
+          <a:lnRef idx="2">
+            <a:schemeClr val="accent1">
+              <a:shade val="50000"/>
+            </a:schemeClr>
+          </a:lnRef>
+          <a:fillRef idx="1">
+            <a:schemeClr val="accent1"/>
+          </a:fillRef>
+          <a:effectRef idx="0">
+            <a:schemeClr val="accent1"/>
+          </a:effectRef>
+          <a:fontRef idx="minor">
+            <a:schemeClr val="lt1"/>
+          </a:fontRef>
+        </p:style>
+        <p:txBody>
+          <a:bodyPr rtlCol="0" anchor="ctr"/>
+          <a:lstStyle/>
+          <a:p>
+            <a:pPr algn="ctr"/>
+            <a:r>
+              <a:rPr lang="en-US" b="1" dirty="0" err="1">
+                <a:solidFill>
+                  <a:schemeClr val="tx1">
+                    <a:lumMod val="50000"/>
+                    <a:lumOff val="50000"/>
+                  </a:schemeClr>
+                </a:solidFill>
+              </a:rPr>
+              <a:t>time:Interval</a:t>
+            </a:r>
+            <a:endParaRPr lang="en-US" b="1" dirty="0">
+              <a:solidFill>
+                <a:schemeClr val="tx1">
+                  <a:lumMod val="50000"/>
+                  <a:lumOff val="50000"/>
+                </a:schemeClr>
+              </a:solidFill>
+            </a:endParaRPr>
+          </a:p>
+        </p:txBody>
+      </p:sp>
+      <p:cxnSp>
+        <p:nvCxnSpPr>
+          <p:cNvPr id="20" name="Connector: Elbow 19">
+            <a:extLst>
+              <a:ext uri="{FF2B5EF4-FFF2-40B4-BE49-F238E27FC236}">
+                <a16:creationId xmlns:a16="http://schemas.microsoft.com/office/drawing/2014/main" id="{15B8C948-92DD-413C-AF47-55CD80736997}"/>
+              </a:ext>
+            </a:extLst>
+          </p:cNvPr>
+          <p:cNvCxnSpPr>
+            <a:stCxn id="4" idx="2"/>
+            <a:endCxn id="45" idx="1"/>
+          </p:cNvCxnSpPr>
+          <p:nvPr/>
+        </p:nvCxnSpPr>
+        <p:spPr>
+          <a:xfrm rot="16200000" flipH="1">
+            <a:off x="1235649" y="1055823"/>
+            <a:ext cx="508714" cy="501625"/>
+          </a:xfrm>
+          <a:prstGeom prst="bentConnector2">
+            <a:avLst/>
+          </a:prstGeom>
+          <a:ln w="38100">
+            <a:solidFill>
+              <a:schemeClr val="bg1">
+                <a:lumMod val="75000"/>
+              </a:schemeClr>
+            </a:solidFill>
+            <a:tailEnd type="triangle"/>
+          </a:ln>
+        </p:spPr>
+        <p:style>
+          <a:lnRef idx="1">
+            <a:schemeClr val="accent1"/>
+          </a:lnRef>
+          <a:fillRef idx="0">
+            <a:schemeClr val="accent1"/>
+          </a:fillRef>
+          <a:effectRef idx="0">
+            <a:schemeClr val="accent1"/>
+          </a:effectRef>
+          <a:fontRef idx="minor">
+            <a:schemeClr val="tx1"/>
+          </a:fontRef>
+        </p:style>
+      </p:cxnSp>
+      <p:sp>
+        <p:nvSpPr>
+          <p:cNvPr id="45" name="Rectangle: Rounded Corners 44">
+            <a:extLst>
+              <a:ext uri="{FF2B5EF4-FFF2-40B4-BE49-F238E27FC236}">
+                <a16:creationId xmlns:a16="http://schemas.microsoft.com/office/drawing/2014/main" id="{B9A69A35-10B3-4874-B928-C93C5AEC02C5}"/>
+              </a:ext>
+            </a:extLst>
+          </p:cNvPr>
+          <p:cNvSpPr/>
+          <p:nvPr/>
+        </p:nvSpPr>
+        <p:spPr>
+          <a:xfrm>
+            <a:off x="1740819" y="1332492"/>
+            <a:ext cx="3154680" cy="457001"/>
+          </a:xfrm>
+          <a:prstGeom prst="roundRect">
+            <a:avLst/>
+          </a:prstGeom>
+          <a:solidFill>
+            <a:srgbClr val="E4ECF8"/>
+          </a:solidFill>
+          <a:ln w="38100">
+            <a:solidFill>
+              <a:schemeClr val="accent1">
+                <a:lumMod val="75000"/>
+              </a:schemeClr>
+            </a:solidFill>
+          </a:ln>
+        </p:spPr>
+        <p:style>
+          <a:lnRef idx="2">
+            <a:schemeClr val="accent1">
+              <a:shade val="50000"/>
+            </a:schemeClr>
+          </a:lnRef>
+          <a:fillRef idx="1">
+            <a:schemeClr val="accent1"/>
+          </a:fillRef>
+          <a:effectRef idx="0">
+            <a:schemeClr val="accent1"/>
+          </a:effectRef>
+          <a:fontRef idx="minor">
+            <a:schemeClr val="lt1"/>
+          </a:fontRef>
+        </p:style>
+        <p:txBody>
+          <a:bodyPr rtlCol="0" anchor="ctr"/>
+          <a:lstStyle/>
+          <a:p>
+            <a:pPr algn="ctr"/>
+            <a:r>
+              <a:rPr lang="en-US" b="1" dirty="0" err="1">
+                <a:solidFill>
+                  <a:schemeClr val="tx1"/>
+                </a:solidFill>
+              </a:rPr>
+              <a:t>study:EntityInterval</a:t>
+            </a:r>
+            <a:endParaRPr lang="en-US" dirty="0">
+              <a:solidFill>
+                <a:schemeClr val="bg1">
+                  <a:lumMod val="50000"/>
+                </a:schemeClr>
+              </a:solidFill>
+            </a:endParaRPr>
+          </a:p>
+        </p:txBody>
+      </p:sp>
+      <p:sp>
+        <p:nvSpPr>
+          <p:cNvPr id="19" name="Rectangle: Rounded Corners 18">
+            <a:extLst>
+              <a:ext uri="{FF2B5EF4-FFF2-40B4-BE49-F238E27FC236}">
+                <a16:creationId xmlns:a16="http://schemas.microsoft.com/office/drawing/2014/main" id="{1A2C1608-A407-426E-907C-FD5043DF9366}"/>
+              </a:ext>
+            </a:extLst>
+          </p:cNvPr>
+          <p:cNvSpPr/>
+          <p:nvPr/>
+        </p:nvSpPr>
+        <p:spPr>
+          <a:xfrm>
+            <a:off x="3925217" y="2779151"/>
+            <a:ext cx="3154680" cy="457001"/>
+          </a:xfrm>
+          <a:prstGeom prst="roundRect">
+            <a:avLst/>
+          </a:prstGeom>
+          <a:solidFill>
+            <a:schemeClr val="bg1">
+              <a:lumMod val="95000"/>
+            </a:schemeClr>
+          </a:solidFill>
+          <a:ln w="38100">
+            <a:solidFill>
+              <a:schemeClr val="bg1">
+                <a:lumMod val="65000"/>
+              </a:schemeClr>
+            </a:solidFill>
+          </a:ln>
+        </p:spPr>
+        <p:style>
+          <a:lnRef idx="2">
+            <a:schemeClr val="accent1">
+              <a:shade val="50000"/>
+            </a:schemeClr>
+          </a:lnRef>
+          <a:fillRef idx="1">
+            <a:schemeClr val="accent1"/>
+          </a:fillRef>
+          <a:effectRef idx="0">
+            <a:schemeClr val="accent1"/>
+          </a:effectRef>
+          <a:fontRef idx="minor">
+            <a:schemeClr val="lt1"/>
+          </a:fontRef>
+        </p:style>
+        <p:txBody>
+          <a:bodyPr rtlCol="0" anchor="ctr"/>
+          <a:lstStyle/>
+          <a:p>
+            <a:pPr algn="ctr"/>
+            <a:r>
+              <a:rPr lang="en-US" b="1" dirty="0" err="1">
+                <a:solidFill>
+                  <a:schemeClr val="tx1">
+                    <a:lumMod val="50000"/>
+                    <a:lumOff val="50000"/>
+                  </a:schemeClr>
+                </a:solidFill>
+              </a:rPr>
+              <a:t>study:Lifespan</a:t>
+            </a:r>
+            <a:endParaRPr lang="en-US" dirty="0">
+              <a:solidFill>
+                <a:schemeClr val="tx1">
+                  <a:lumMod val="50000"/>
+                  <a:lumOff val="50000"/>
+                </a:schemeClr>
+              </a:solidFill>
+            </a:endParaRPr>
+          </a:p>
+        </p:txBody>
+      </p:sp>
+      <p:sp>
+        <p:nvSpPr>
+          <p:cNvPr id="21" name="Rectangle: Rounded Corners 20">
+            <a:extLst>
+              <a:ext uri="{FF2B5EF4-FFF2-40B4-BE49-F238E27FC236}">
+                <a16:creationId xmlns:a16="http://schemas.microsoft.com/office/drawing/2014/main" id="{8C8E85FE-0F55-4A00-B762-C24CE31745D5}"/>
+              </a:ext>
+            </a:extLst>
+          </p:cNvPr>
+          <p:cNvSpPr/>
+          <p:nvPr/>
+        </p:nvSpPr>
+        <p:spPr>
+          <a:xfrm>
+            <a:off x="3925217" y="3481850"/>
+            <a:ext cx="3317412" cy="457001"/>
+          </a:xfrm>
+          <a:prstGeom prst="roundRect">
+            <a:avLst/>
+          </a:prstGeom>
+          <a:solidFill>
+            <a:schemeClr val="bg1">
+              <a:lumMod val="95000"/>
+            </a:schemeClr>
+          </a:solidFill>
+          <a:ln w="38100">
+            <a:solidFill>
+              <a:schemeClr val="bg1">
+                <a:lumMod val="65000"/>
+              </a:schemeClr>
+            </a:solidFill>
+          </a:ln>
+        </p:spPr>
+        <p:style>
+          <a:lnRef idx="2">
+            <a:schemeClr val="accent1">
+              <a:shade val="50000"/>
+            </a:schemeClr>
+          </a:lnRef>
+          <a:fillRef idx="1">
+            <a:schemeClr val="accent1"/>
+          </a:fillRef>
+          <a:effectRef idx="0">
+            <a:schemeClr val="accent1"/>
+          </a:effectRef>
+          <a:fontRef idx="minor">
+            <a:schemeClr val="lt1"/>
+          </a:fontRef>
+        </p:style>
+        <p:txBody>
+          <a:bodyPr rtlCol="0" anchor="ctr"/>
+          <a:lstStyle/>
+          <a:p>
+            <a:pPr algn="ctr"/>
+            <a:r>
+              <a:rPr lang="en-US" b="1" dirty="0" err="1">
+                <a:solidFill>
+                  <a:schemeClr val="tx1">
+                    <a:lumMod val="50000"/>
+                    <a:lumOff val="50000"/>
+                  </a:schemeClr>
+                </a:solidFill>
+              </a:rPr>
+              <a:t>study:MedicalConditionInterval</a:t>
+            </a:r>
+            <a:endParaRPr lang="en-US" b="1" dirty="0">
+              <a:solidFill>
+                <a:schemeClr val="tx1">
+                  <a:lumMod val="50000"/>
+                  <a:lumOff val="50000"/>
+                </a:schemeClr>
+              </a:solidFill>
+            </a:endParaRPr>
+          </a:p>
+        </p:txBody>
+      </p:sp>
+      <p:sp>
+        <p:nvSpPr>
+          <p:cNvPr id="22" name="Rectangle: Rounded Corners 21">
+            <a:extLst>
+              <a:ext uri="{FF2B5EF4-FFF2-40B4-BE49-F238E27FC236}">
+                <a16:creationId xmlns:a16="http://schemas.microsoft.com/office/drawing/2014/main" id="{730C2E2E-7644-4198-9FC8-2000D81E3B1C}"/>
+              </a:ext>
+            </a:extLst>
+          </p:cNvPr>
+          <p:cNvSpPr/>
+          <p:nvPr/>
+        </p:nvSpPr>
+        <p:spPr>
+          <a:xfrm>
+            <a:off x="3925217" y="2076452"/>
+            <a:ext cx="3154680" cy="457001"/>
+          </a:xfrm>
+          <a:prstGeom prst="roundRect">
+            <a:avLst/>
+          </a:prstGeom>
+          <a:solidFill>
+            <a:srgbClr val="E4ECF8"/>
+          </a:solidFill>
+          <a:ln w="38100">
+            <a:solidFill>
+              <a:schemeClr val="accent1">
+                <a:lumMod val="75000"/>
+              </a:schemeClr>
+            </a:solidFill>
+          </a:ln>
+        </p:spPr>
+        <p:style>
+          <a:lnRef idx="2">
+            <a:schemeClr val="accent1">
+              <a:shade val="50000"/>
+            </a:schemeClr>
+          </a:lnRef>
+          <a:fillRef idx="1">
+            <a:schemeClr val="accent1"/>
+          </a:fillRef>
+          <a:effectRef idx="0">
+            <a:schemeClr val="accent1"/>
+          </a:effectRef>
+          <a:fontRef idx="minor">
+            <a:schemeClr val="lt1"/>
+          </a:fontRef>
+        </p:style>
+        <p:txBody>
+          <a:bodyPr rtlCol="0" anchor="ctr"/>
+          <a:lstStyle/>
+          <a:p>
+            <a:pPr algn="ctr"/>
+            <a:r>
+              <a:rPr lang="en-US" b="1" dirty="0" err="1">
+                <a:solidFill>
+                  <a:schemeClr val="tx1"/>
+                </a:solidFill>
+              </a:rPr>
+              <a:t>study:ReferenceInterval</a:t>
+            </a:r>
+            <a:endParaRPr lang="en-US" b="1" dirty="0">
+              <a:solidFill>
+                <a:schemeClr val="tx1"/>
+              </a:solidFill>
+            </a:endParaRPr>
+          </a:p>
+        </p:txBody>
+      </p:sp>
+      <p:sp>
+        <p:nvSpPr>
+          <p:cNvPr id="23" name="Rectangle: Rounded Corners 22">
+            <a:extLst>
+              <a:ext uri="{FF2B5EF4-FFF2-40B4-BE49-F238E27FC236}">
+                <a16:creationId xmlns:a16="http://schemas.microsoft.com/office/drawing/2014/main" id="{AAC2089E-AC68-4D8D-9DB3-C3EA5CBC3B86}"/>
+              </a:ext>
+            </a:extLst>
+          </p:cNvPr>
+          <p:cNvSpPr/>
+          <p:nvPr/>
+        </p:nvSpPr>
+        <p:spPr>
+          <a:xfrm>
+            <a:off x="3925217" y="4184548"/>
+            <a:ext cx="3346440" cy="457001"/>
+          </a:xfrm>
+          <a:prstGeom prst="roundRect">
+            <a:avLst/>
+          </a:prstGeom>
+          <a:solidFill>
+            <a:schemeClr val="bg1">
+              <a:lumMod val="95000"/>
+            </a:schemeClr>
+          </a:solidFill>
+          <a:ln w="38100">
+            <a:solidFill>
+              <a:schemeClr val="bg1">
+                <a:lumMod val="65000"/>
+              </a:schemeClr>
+            </a:solidFill>
+          </a:ln>
+        </p:spPr>
+        <p:style>
+          <a:lnRef idx="2">
+            <a:schemeClr val="accent1">
+              <a:shade val="50000"/>
+            </a:schemeClr>
+          </a:lnRef>
+          <a:fillRef idx="1">
+            <a:schemeClr val="accent1"/>
+          </a:fillRef>
+          <a:effectRef idx="0">
+            <a:schemeClr val="accent1"/>
+          </a:effectRef>
+          <a:fontRef idx="minor">
+            <a:schemeClr val="lt1"/>
+          </a:fontRef>
+        </p:style>
+        <p:txBody>
+          <a:bodyPr rtlCol="0" anchor="ctr"/>
+          <a:lstStyle/>
+          <a:p>
+            <a:pPr algn="ctr"/>
+            <a:r>
+              <a:rPr lang="en-US" b="1" dirty="0" err="1">
+                <a:solidFill>
+                  <a:schemeClr val="tx1">
+                    <a:lumMod val="50000"/>
+                    <a:lumOff val="50000"/>
+                  </a:schemeClr>
+                </a:solidFill>
+              </a:rPr>
+              <a:t>study:StudyParticipationInterval</a:t>
+            </a:r>
+            <a:endParaRPr lang="en-US" b="1" dirty="0">
+              <a:solidFill>
+                <a:schemeClr val="tx1">
+                  <a:lumMod val="50000"/>
+                  <a:lumOff val="50000"/>
+                </a:schemeClr>
+              </a:solidFill>
+            </a:endParaRPr>
+          </a:p>
+        </p:txBody>
+      </p:sp>
+      <p:cxnSp>
+        <p:nvCxnSpPr>
+          <p:cNvPr id="25" name="Connector: Elbow 24">
+            <a:extLst>
+              <a:ext uri="{FF2B5EF4-FFF2-40B4-BE49-F238E27FC236}">
+                <a16:creationId xmlns:a16="http://schemas.microsoft.com/office/drawing/2014/main" id="{E9CA3D01-94AF-4529-8DED-9DF4680EFD89}"/>
+              </a:ext>
+            </a:extLst>
+          </p:cNvPr>
+          <p:cNvCxnSpPr>
+            <a:cxnSpLocks/>
+            <a:stCxn id="45" idx="2"/>
+            <a:endCxn id="21" idx="1"/>
+          </p:cNvCxnSpPr>
+          <p:nvPr/>
+        </p:nvCxnSpPr>
+        <p:spPr>
+          <a:xfrm rot="16200000" flipH="1">
+            <a:off x="2661259" y="2446393"/>
+            <a:ext cx="1920858" cy="607058"/>
+          </a:xfrm>
+          <a:prstGeom prst="bentConnector2">
+            <a:avLst/>
+          </a:prstGeom>
+          <a:ln w="38100">
+            <a:solidFill>
+              <a:schemeClr val="bg1">
+                <a:lumMod val="75000"/>
+              </a:schemeClr>
+            </a:solidFill>
+            <a:tailEnd type="triangle"/>
+          </a:ln>
+        </p:spPr>
+        <p:style>
+          <a:lnRef idx="1">
+            <a:schemeClr val="accent1"/>
+          </a:lnRef>
+          <a:fillRef idx="0">
+            <a:schemeClr val="accent1"/>
+          </a:fillRef>
+          <a:effectRef idx="0">
+            <a:schemeClr val="accent1"/>
+          </a:effectRef>
+          <a:fontRef idx="minor">
+            <a:schemeClr val="tx1"/>
+          </a:fontRef>
+        </p:style>
+      </p:cxnSp>
+      <p:cxnSp>
+        <p:nvCxnSpPr>
+          <p:cNvPr id="29" name="Connector: Elbow 28">
+            <a:extLst>
+              <a:ext uri="{FF2B5EF4-FFF2-40B4-BE49-F238E27FC236}">
+                <a16:creationId xmlns:a16="http://schemas.microsoft.com/office/drawing/2014/main" id="{B595185C-F242-454F-B004-8D58BB67D373}"/>
+              </a:ext>
+            </a:extLst>
+          </p:cNvPr>
+          <p:cNvCxnSpPr>
+            <a:cxnSpLocks/>
+            <a:stCxn id="45" idx="2"/>
+            <a:endCxn id="19" idx="1"/>
+          </p:cNvCxnSpPr>
+          <p:nvPr/>
+        </p:nvCxnSpPr>
+        <p:spPr>
+          <a:xfrm rot="16200000" flipH="1">
+            <a:off x="3012609" y="2095043"/>
+            <a:ext cx="1218159" cy="607058"/>
+          </a:xfrm>
+          <a:prstGeom prst="bentConnector2">
+            <a:avLst/>
+          </a:prstGeom>
+          <a:ln w="38100">
+            <a:solidFill>
+              <a:schemeClr val="bg1">
+                <a:lumMod val="75000"/>
+              </a:schemeClr>
+            </a:solidFill>
+            <a:tailEnd type="triangle"/>
+          </a:ln>
+        </p:spPr>
+        <p:style>
+          <a:lnRef idx="1">
+            <a:schemeClr val="accent1"/>
+          </a:lnRef>
+          <a:fillRef idx="0">
+            <a:schemeClr val="accent1"/>
+          </a:fillRef>
+          <a:effectRef idx="0">
+            <a:schemeClr val="accent1"/>
+          </a:effectRef>
+          <a:fontRef idx="minor">
+            <a:schemeClr val="tx1"/>
+          </a:fontRef>
+        </p:style>
+      </p:cxnSp>
+      <p:cxnSp>
+        <p:nvCxnSpPr>
+          <p:cNvPr id="35" name="Connector: Elbow 34">
+            <a:extLst>
+              <a:ext uri="{FF2B5EF4-FFF2-40B4-BE49-F238E27FC236}">
+                <a16:creationId xmlns:a16="http://schemas.microsoft.com/office/drawing/2014/main" id="{077E5DA3-509A-4D16-841F-AE7F8CEE6CAF}"/>
+              </a:ext>
+            </a:extLst>
+          </p:cNvPr>
+          <p:cNvCxnSpPr>
+            <a:cxnSpLocks/>
+            <a:stCxn id="45" idx="2"/>
+            <a:endCxn id="23" idx="1"/>
+          </p:cNvCxnSpPr>
+          <p:nvPr/>
+        </p:nvCxnSpPr>
+        <p:spPr>
+          <a:xfrm rot="16200000" flipH="1">
+            <a:off x="2309910" y="2797742"/>
+            <a:ext cx="2623556" cy="607058"/>
+          </a:xfrm>
+          <a:prstGeom prst="bentConnector2">
+            <a:avLst/>
+          </a:prstGeom>
+          <a:ln w="38100">
+            <a:solidFill>
+              <a:schemeClr val="bg1">
+                <a:lumMod val="75000"/>
+              </a:schemeClr>
+            </a:solidFill>
+            <a:tailEnd type="triangle"/>
+          </a:ln>
+        </p:spPr>
+        <p:style>
+          <a:lnRef idx="1">
+            <a:schemeClr val="accent1"/>
+          </a:lnRef>
+          <a:fillRef idx="0">
+            <a:schemeClr val="accent1"/>
+          </a:fillRef>
+          <a:effectRef idx="0">
+            <a:schemeClr val="accent1"/>
+          </a:effectRef>
+          <a:fontRef idx="minor">
+            <a:schemeClr val="tx1"/>
+          </a:fontRef>
+        </p:style>
+      </p:cxnSp>
+      <p:cxnSp>
+        <p:nvCxnSpPr>
+          <p:cNvPr id="38" name="Connector: Elbow 37">
+            <a:extLst>
+              <a:ext uri="{FF2B5EF4-FFF2-40B4-BE49-F238E27FC236}">
+                <a16:creationId xmlns:a16="http://schemas.microsoft.com/office/drawing/2014/main" id="{9009E932-C6B9-49B6-9F6E-27689BA0E87C}"/>
+              </a:ext>
+            </a:extLst>
+          </p:cNvPr>
+          <p:cNvCxnSpPr>
+            <a:cxnSpLocks/>
+            <a:stCxn id="45" idx="2"/>
+            <a:endCxn id="22" idx="1"/>
+          </p:cNvCxnSpPr>
+          <p:nvPr/>
+        </p:nvCxnSpPr>
+        <p:spPr>
+          <a:xfrm rot="16200000" flipH="1">
+            <a:off x="3363958" y="1743694"/>
+            <a:ext cx="515460" cy="607058"/>
+          </a:xfrm>
+          <a:prstGeom prst="bentConnector2">
+            <a:avLst/>
+          </a:prstGeom>
+          <a:ln w="38100">
+            <a:solidFill>
+              <a:schemeClr val="bg1">
+                <a:lumMod val="50000"/>
+              </a:schemeClr>
+            </a:solidFill>
+            <a:tailEnd type="triangle"/>
+          </a:ln>
+        </p:spPr>
+        <p:style>
+          <a:lnRef idx="1">
+            <a:schemeClr val="accent1"/>
+          </a:lnRef>
+          <a:fillRef idx="0">
+            <a:schemeClr val="accent1"/>
+          </a:fillRef>
+          <a:effectRef idx="0">
+            <a:schemeClr val="accent1"/>
+          </a:effectRef>
+          <a:fontRef idx="minor">
+            <a:schemeClr val="tx1"/>
+          </a:fontRef>
+        </p:style>
+      </p:cxnSp>
+      <p:sp>
+        <p:nvSpPr>
+          <p:cNvPr id="31" name="TextBox 30">
+            <a:extLst>
+              <a:ext uri="{FF2B5EF4-FFF2-40B4-BE49-F238E27FC236}">
+                <a16:creationId xmlns:a16="http://schemas.microsoft.com/office/drawing/2014/main" id="{6683751D-EA79-403D-849F-F258967C9023}"/>
+              </a:ext>
+            </a:extLst>
+          </p:cNvPr>
+          <p:cNvSpPr txBox="1"/>
+          <p:nvPr/>
+        </p:nvSpPr>
+        <p:spPr>
+          <a:xfrm>
+            <a:off x="406401" y="6023429"/>
+            <a:ext cx="5936343" cy="646331"/>
+          </a:xfrm>
+          <a:prstGeom prst="rect">
+            <a:avLst/>
+          </a:prstGeom>
+          <a:noFill/>
+        </p:spPr>
+        <p:txBody>
+          <a:bodyPr wrap="square" rtlCol="0">
+            <a:spAutoFit/>
+          </a:bodyPr>
+          <a:lstStyle/>
+          <a:p>
+            <a:r>
+              <a:rPr lang="en-US" dirty="0"/>
+              <a:t>Structure for defining a rule around Reference Interval can use Entity Interval if all subclasses play by the same rule. </a:t>
+            </a:r>
+          </a:p>
+        </p:txBody>
+      </p:sp>
+      <p:sp>
+        <p:nvSpPr>
+          <p:cNvPr id="43" name="TextBox 42">
+            <a:extLst>
+              <a:ext uri="{FF2B5EF4-FFF2-40B4-BE49-F238E27FC236}">
+                <a16:creationId xmlns:a16="http://schemas.microsoft.com/office/drawing/2014/main" id="{B781ED87-517D-4273-8DF9-A282AE1826BC}"/>
+              </a:ext>
+            </a:extLst>
+          </p:cNvPr>
+          <p:cNvSpPr txBox="1"/>
+          <p:nvPr/>
+        </p:nvSpPr>
+        <p:spPr>
+          <a:xfrm>
+            <a:off x="8723086" y="6488668"/>
+            <a:ext cx="3338285" cy="369332"/>
+          </a:xfrm>
+          <a:prstGeom prst="rect">
+            <a:avLst/>
+          </a:prstGeom>
+          <a:noFill/>
+        </p:spPr>
+        <p:txBody>
+          <a:bodyPr wrap="square" rtlCol="0">
+            <a:spAutoFit/>
+          </a:bodyPr>
+          <a:lstStyle>
+            <a:defPPr>
+              <a:defRPr lang="en-US"/>
+            </a:defPPr>
+            <a:lvl1pPr>
+              <a:defRPr b="1">
+                <a:solidFill>
+                  <a:srgbClr val="FF0000"/>
+                </a:solidFill>
+              </a:defRPr>
+            </a:lvl1pPr>
+          </a:lstStyle>
+          <a:p>
+            <a:r>
+              <a:rPr lang="en-US" dirty="0"/>
+              <a:t>EntityIntervalOWLStructure.PNG</a:t>
+            </a:r>
+          </a:p>
+        </p:txBody>
+      </p:sp>
+    </p:spTree>
+    <p:extLst>
+      <p:ext uri="{BB962C8B-B14F-4D97-AF65-F5344CB8AC3E}">
+        <p14:creationId xmlns:p14="http://schemas.microsoft.com/office/powerpoint/2010/main" val="3815836385"/>
+      </p:ext>
+    </p:extLst>
+  </p:cSld>
+  <p:clrMapOvr>
+    <a:masterClrMapping/>
+  </p:clrMapOvr>
+</p:sld>
+</file>
+
+<file path=ppt/slides/slide7.xml><?xml version="1.0" encoding="utf-8"?>
+<p:sld xmlns:a="http://schemas.openxmlformats.org/drawingml/2006/main" xmlns:r="http://schemas.openxmlformats.org/officeDocument/2006/relationships" xmlns:p="http://schemas.openxmlformats.org/presentationml/2006/main">
+  <p:cSld>
+    <p:spTree>
+      <p:nvGrpSpPr>
+        <p:cNvPr id="1" name=""/>
+        <p:cNvGrpSpPr/>
+        <p:nvPr/>
+      </p:nvGrpSpPr>
+      <p:grpSpPr>
+        <a:xfrm>
+          <a:off x="0" y="0"/>
+          <a:ext cx="0" cy="0"/>
+          <a:chOff x="0" y="0"/>
+          <a:chExt cx="0" cy="0"/>
+        </a:xfrm>
+      </p:grpSpPr>
+      <p:sp>
+        <p:nvSpPr>
           <p:cNvPr id="2" name="Title 1">
             <a:extLst>
               <a:ext uri="{FF2B5EF4-FFF2-40B4-BE49-F238E27FC236}">
@@ -9734,7 +11123,7 @@
 </p:sld>
 </file>
 
-<file path=ppt/slides/slide7.xml><?xml version="1.0" encoding="utf-8"?>
+<file path=ppt/slides/slide8.xml><?xml version="1.0" encoding="utf-8"?>
 <p:sld xmlns:a="http://schemas.openxmlformats.org/drawingml/2006/main" xmlns:r="http://schemas.openxmlformats.org/officeDocument/2006/relationships" xmlns:p="http://schemas.openxmlformats.org/presentationml/2006/main">
   <p:cSld>
     <p:spTree>
@@ -11830,559 +13219,6 @@
 </p:sld>
 </file>
 
-<file path=ppt/slides/slide8.xml><?xml version="1.0" encoding="utf-8"?>
-<p:sld xmlns:a="http://schemas.openxmlformats.org/drawingml/2006/main" xmlns:r="http://schemas.openxmlformats.org/officeDocument/2006/relationships" xmlns:p="http://schemas.openxmlformats.org/presentationml/2006/main">
-  <p:cSld>
-    <p:spTree>
-      <p:nvGrpSpPr>
-        <p:cNvPr id="1" name=""/>
-        <p:cNvGrpSpPr/>
-        <p:nvPr/>
-      </p:nvGrpSpPr>
-      <p:grpSpPr>
-        <a:xfrm>
-          <a:off x="0" y="0"/>
-          <a:ext cx="0" cy="0"/>
-          <a:chOff x="0" y="0"/>
-          <a:chExt cx="0" cy="0"/>
-        </a:xfrm>
-      </p:grpSpPr>
-      <p:sp>
-        <p:nvSpPr>
-          <p:cNvPr id="4" name="Rectangle: Rounded Corners 3"/>
-          <p:cNvSpPr/>
-          <p:nvPr/>
-        </p:nvSpPr>
-        <p:spPr>
-          <a:xfrm>
-            <a:off x="6359054" y="800152"/>
-            <a:ext cx="2468880" cy="449588"/>
-          </a:xfrm>
-          <a:prstGeom prst="roundRect">
-            <a:avLst/>
-          </a:prstGeom>
-          <a:solidFill>
-            <a:schemeClr val="accent6">
-              <a:lumMod val="40000"/>
-              <a:lumOff val="60000"/>
-            </a:schemeClr>
-          </a:solidFill>
-          <a:ln>
-            <a:solidFill>
-              <a:schemeClr val="tx1"/>
-            </a:solidFill>
-          </a:ln>
-        </p:spPr>
-        <p:style>
-          <a:lnRef idx="2">
-            <a:schemeClr val="accent1">
-              <a:shade val="50000"/>
-            </a:schemeClr>
-          </a:lnRef>
-          <a:fillRef idx="1">
-            <a:schemeClr val="accent1"/>
-          </a:fillRef>
-          <a:effectRef idx="0">
-            <a:schemeClr val="accent1"/>
-          </a:effectRef>
-          <a:fontRef idx="minor">
-            <a:schemeClr val="lt1"/>
-          </a:fontRef>
-        </p:style>
-        <p:txBody>
-          <a:bodyPr rtlCol="0" anchor="ctr"/>
-          <a:lstStyle/>
-          <a:p>
-            <a:pPr algn="ctr"/>
-            <a:r>
-              <a:rPr lang="en-US" b="1" dirty="0">
-                <a:solidFill>
-                  <a:schemeClr val="tx1"/>
-                </a:solidFill>
-              </a:rPr>
-              <a:t>Person_</a:t>
-            </a:r>
-            <a:r>
-              <a:rPr lang="en-US" b="1" dirty="0">
-                <a:solidFill>
-                  <a:schemeClr val="accent1">
-                    <a:lumMod val="75000"/>
-                  </a:schemeClr>
-                </a:solidFill>
-              </a:rPr>
-              <a:t>01-701-1015</a:t>
-            </a:r>
-          </a:p>
-        </p:txBody>
-      </p:sp>
-      <p:sp>
-        <p:nvSpPr>
-          <p:cNvPr id="5" name="Rectangle: Rounded Corners 4"/>
-          <p:cNvSpPr/>
-          <p:nvPr/>
-        </p:nvSpPr>
-        <p:spPr>
-          <a:xfrm>
-            <a:off x="7348177" y="2628952"/>
-            <a:ext cx="2468880" cy="457001"/>
-          </a:xfrm>
-          <a:prstGeom prst="roundRect">
-            <a:avLst/>
-          </a:prstGeom>
-          <a:solidFill>
-            <a:schemeClr val="accent1">
-              <a:lumMod val="40000"/>
-              <a:lumOff val="60000"/>
-            </a:schemeClr>
-          </a:solidFill>
-          <a:ln>
-            <a:solidFill>
-              <a:schemeClr val="tx1"/>
-            </a:solidFill>
-          </a:ln>
-        </p:spPr>
-        <p:style>
-          <a:lnRef idx="2">
-            <a:schemeClr val="accent1">
-              <a:shade val="50000"/>
-            </a:schemeClr>
-          </a:lnRef>
-          <a:fillRef idx="1">
-            <a:schemeClr val="accent1"/>
-          </a:fillRef>
-          <a:effectRef idx="0">
-            <a:schemeClr val="accent1"/>
-          </a:effectRef>
-          <a:fontRef idx="minor">
-            <a:schemeClr val="lt1"/>
-          </a:fontRef>
-        </p:style>
-        <p:txBody>
-          <a:bodyPr rtlCol="0" anchor="ctr"/>
-          <a:lstStyle/>
-          <a:p>
-            <a:pPr algn="ctr"/>
-            <a:r>
-              <a:rPr lang="en-US" b="1" dirty="0">
-                <a:solidFill>
-                  <a:schemeClr val="tx1"/>
-                </a:solidFill>
-              </a:rPr>
-              <a:t>Medical Condition</a:t>
-            </a:r>
-          </a:p>
-        </p:txBody>
-      </p:sp>
-      <p:sp>
-        <p:nvSpPr>
-          <p:cNvPr id="13" name="Rectangle: Rounded Corners 12"/>
-          <p:cNvSpPr/>
-          <p:nvPr/>
-        </p:nvSpPr>
-        <p:spPr>
-          <a:xfrm>
-            <a:off x="7158066" y="4705104"/>
-            <a:ext cx="2468880" cy="457001"/>
-          </a:xfrm>
-          <a:prstGeom prst="roundRect">
-            <a:avLst/>
-          </a:prstGeom>
-          <a:solidFill>
-            <a:srgbClr val="FFC000"/>
-          </a:solidFill>
-          <a:ln>
-            <a:solidFill>
-              <a:schemeClr val="tx1"/>
-            </a:solidFill>
-          </a:ln>
-        </p:spPr>
-        <p:style>
-          <a:lnRef idx="2">
-            <a:schemeClr val="accent1">
-              <a:shade val="50000"/>
-            </a:schemeClr>
-          </a:lnRef>
-          <a:fillRef idx="1">
-            <a:schemeClr val="accent1"/>
-          </a:fillRef>
-          <a:effectRef idx="0">
-            <a:schemeClr val="accent1"/>
-          </a:effectRef>
-          <a:fontRef idx="minor">
-            <a:schemeClr val="lt1"/>
-          </a:fontRef>
-        </p:style>
-        <p:txBody>
-          <a:bodyPr rtlCol="0" anchor="ctr"/>
-          <a:lstStyle/>
-          <a:p>
-            <a:pPr algn="ctr"/>
-            <a:r>
-              <a:rPr lang="en-US" b="1" dirty="0" err="1">
-                <a:solidFill>
-                  <a:schemeClr val="tx1"/>
-                </a:solidFill>
-              </a:rPr>
-              <a:t>AdverseEvent</a:t>
-            </a:r>
-            <a:endParaRPr lang="en-US" b="1" dirty="0">
-              <a:solidFill>
-                <a:schemeClr val="tx1"/>
-              </a:solidFill>
-            </a:endParaRPr>
-          </a:p>
-        </p:txBody>
-      </p:sp>
-      <p:cxnSp>
-        <p:nvCxnSpPr>
-          <p:cNvPr id="14" name="Straight Arrow Connector 13"/>
-          <p:cNvCxnSpPr>
-            <a:cxnSpLocks/>
-            <a:stCxn id="5" idx="2"/>
-            <a:endCxn id="13" idx="0"/>
-          </p:cNvCxnSpPr>
-          <p:nvPr/>
-        </p:nvCxnSpPr>
-        <p:spPr>
-          <a:xfrm flipH="1">
-            <a:off x="8392506" y="3085953"/>
-            <a:ext cx="190111" cy="1619151"/>
-          </a:xfrm>
-          <a:prstGeom prst="straightConnector1">
-            <a:avLst/>
-          </a:prstGeom>
-          <a:ln w="50800">
-            <a:solidFill>
-              <a:schemeClr val="bg1">
-                <a:lumMod val="50000"/>
-              </a:schemeClr>
-            </a:solidFill>
-            <a:tailEnd type="triangle"/>
-          </a:ln>
-        </p:spPr>
-        <p:style>
-          <a:lnRef idx="1">
-            <a:schemeClr val="accent1"/>
-          </a:lnRef>
-          <a:fillRef idx="0">
-            <a:schemeClr val="accent1"/>
-          </a:fillRef>
-          <a:effectRef idx="0">
-            <a:schemeClr val="accent1"/>
-          </a:effectRef>
-          <a:fontRef idx="minor">
-            <a:schemeClr val="tx1"/>
-          </a:fontRef>
-        </p:style>
-      </p:cxnSp>
-      <p:sp>
-        <p:nvSpPr>
-          <p:cNvPr id="20" name="TextBox 19"/>
-          <p:cNvSpPr txBox="1"/>
-          <p:nvPr/>
-        </p:nvSpPr>
-        <p:spPr>
-          <a:xfrm>
-            <a:off x="9644498" y="739025"/>
-            <a:ext cx="1967829" cy="369332"/>
-          </a:xfrm>
-          <a:prstGeom prst="rect">
-            <a:avLst/>
-          </a:prstGeom>
-          <a:solidFill>
-            <a:schemeClr val="bg1"/>
-          </a:solidFill>
-        </p:spPr>
-        <p:txBody>
-          <a:bodyPr wrap="square" rtlCol="0">
-            <a:spAutoFit/>
-          </a:bodyPr>
-          <a:lstStyle>
-            <a:defPPr>
-              <a:defRPr lang="en-US"/>
-            </a:defPPr>
-            <a:lvl1pPr>
-              <a:defRPr b="1">
-                <a:solidFill>
-                  <a:schemeClr val="accent2">
-                    <a:lumMod val="75000"/>
-                  </a:schemeClr>
-                </a:solidFill>
-                <a:latin typeface="Courier New" panose="02070309020205020404" pitchFamily="49" charset="0"/>
-                <a:cs typeface="Courier New" panose="02070309020205020404" pitchFamily="49" charset="0"/>
-              </a:defRPr>
-            </a:lvl1pPr>
-          </a:lstStyle>
-          <a:p>
-            <a:r>
-              <a:rPr lang="en-US" dirty="0" err="1"/>
-              <a:t>afflictedBy</a:t>
-            </a:r>
-            <a:endParaRPr lang="en-US" dirty="0"/>
-          </a:p>
-        </p:txBody>
-      </p:sp>
-      <p:sp>
-        <p:nvSpPr>
-          <p:cNvPr id="41" name="TextBox 40">
-            <a:extLst>
-              <a:ext uri="{FF2B5EF4-FFF2-40B4-BE49-F238E27FC236}">
-                <a16:creationId xmlns:a16="http://schemas.microsoft.com/office/drawing/2014/main" id="{CCC2A432-EE41-4F21-9AAE-EB569CE224D5}"/>
-              </a:ext>
-            </a:extLst>
-          </p:cNvPr>
-          <p:cNvSpPr txBox="1"/>
-          <p:nvPr/>
-        </p:nvSpPr>
-        <p:spPr>
-          <a:xfrm>
-            <a:off x="8696860" y="1917222"/>
-            <a:ext cx="1740300" cy="369332"/>
-          </a:xfrm>
-          <a:prstGeom prst="rect">
-            <a:avLst/>
-          </a:prstGeom>
-          <a:solidFill>
-            <a:schemeClr val="bg1"/>
-          </a:solidFill>
-        </p:spPr>
-        <p:txBody>
-          <a:bodyPr wrap="square" rtlCol="0">
-            <a:spAutoFit/>
-          </a:bodyPr>
-          <a:lstStyle/>
-          <a:p>
-            <a:r>
-              <a:rPr lang="en-US" b="1" dirty="0">
-                <a:solidFill>
-                  <a:schemeClr val="accent2">
-                    <a:lumMod val="40000"/>
-                    <a:lumOff val="60000"/>
-                  </a:schemeClr>
-                </a:solidFill>
-                <a:latin typeface="Courier New" panose="02070309020205020404" pitchFamily="49" charset="0"/>
-                <a:cs typeface="Courier New" panose="02070309020205020404" pitchFamily="49" charset="0"/>
-              </a:rPr>
-              <a:t>severity</a:t>
-            </a:r>
-          </a:p>
-        </p:txBody>
-      </p:sp>
-      <p:sp>
-        <p:nvSpPr>
-          <p:cNvPr id="7" name="TextBox 6"/>
-          <p:cNvSpPr txBox="1"/>
-          <p:nvPr/>
-        </p:nvSpPr>
-        <p:spPr>
-          <a:xfrm>
-            <a:off x="7665887" y="3569559"/>
-            <a:ext cx="1643348" cy="369332"/>
-          </a:xfrm>
-          <a:prstGeom prst="rect">
-            <a:avLst/>
-          </a:prstGeom>
-          <a:solidFill>
-            <a:schemeClr val="bg1"/>
-          </a:solidFill>
-        </p:spPr>
-        <p:txBody>
-          <a:bodyPr wrap="square" rtlCol="0">
-            <a:spAutoFit/>
-          </a:bodyPr>
-          <a:lstStyle>
-            <a:defPPr>
-              <a:defRPr lang="en-US"/>
-            </a:defPPr>
-            <a:lvl1pPr>
-              <a:defRPr b="1">
-                <a:solidFill>
-                  <a:schemeClr val="accent2">
-                    <a:lumMod val="75000"/>
-                  </a:schemeClr>
-                </a:solidFill>
-                <a:latin typeface="Courier New" panose="02070309020205020404" pitchFamily="49" charset="0"/>
-                <a:cs typeface="Courier New" panose="02070309020205020404" pitchFamily="49" charset="0"/>
-              </a:defRPr>
-            </a:lvl1pPr>
-          </a:lstStyle>
-          <a:p>
-            <a:r>
-              <a:rPr lang="en-US" dirty="0" err="1"/>
-              <a:t>subClassOf</a:t>
-            </a:r>
-            <a:endParaRPr lang="en-US" dirty="0"/>
-          </a:p>
-        </p:txBody>
-      </p:sp>
-      <p:sp>
-        <p:nvSpPr>
-          <p:cNvPr id="45" name="TextBox 44">
-            <a:extLst>
-              <a:ext uri="{FF2B5EF4-FFF2-40B4-BE49-F238E27FC236}">
-                <a16:creationId xmlns:a16="http://schemas.microsoft.com/office/drawing/2014/main" id="{DCEB2144-B3F4-48FC-863E-2B0381C57201}"/>
-              </a:ext>
-            </a:extLst>
-          </p:cNvPr>
-          <p:cNvSpPr txBox="1"/>
-          <p:nvPr/>
-        </p:nvSpPr>
-        <p:spPr>
-          <a:xfrm>
-            <a:off x="603175" y="837054"/>
-            <a:ext cx="4975721" cy="3139321"/>
-          </a:xfrm>
-          <a:prstGeom prst="rect">
-            <a:avLst/>
-          </a:prstGeom>
-          <a:noFill/>
-        </p:spPr>
-        <p:txBody>
-          <a:bodyPr wrap="none" rtlCol="0">
-            <a:spAutoFit/>
-          </a:bodyPr>
-          <a:lstStyle/>
-          <a:p>
-            <a:r>
-              <a:rPr lang="en-US" dirty="0"/>
-              <a:t>study:Subject_CJ16050_00M01</a:t>
-            </a:r>
-          </a:p>
-          <a:p>
-            <a:r>
-              <a:rPr lang="en-US" dirty="0"/>
-              <a:t>    a                           </a:t>
-            </a:r>
-            <a:r>
-              <a:rPr lang="en-US" dirty="0" err="1"/>
-              <a:t>study:StudySubject</a:t>
-            </a:r>
-            <a:r>
-              <a:rPr lang="en-US" dirty="0"/>
-              <a:t> ;</a:t>
-            </a:r>
-          </a:p>
-          <a:p>
-            <a:r>
-              <a:rPr lang="en-US" dirty="0"/>
-              <a:t>    </a:t>
-            </a:r>
-            <a:r>
-              <a:rPr lang="en-US" dirty="0" err="1"/>
-              <a:t>study:rfendtc</a:t>
-            </a:r>
-            <a:r>
-              <a:rPr lang="en-US" dirty="0"/>
-              <a:t>      "2016-12-07"^^</a:t>
-            </a:r>
-            <a:r>
-              <a:rPr lang="en-US" dirty="0" err="1"/>
-              <a:t>xsd:date</a:t>
-            </a:r>
-            <a:r>
-              <a:rPr lang="en-US" dirty="0"/>
-              <a:t> ;</a:t>
-            </a:r>
-          </a:p>
-          <a:p>
-            <a:r>
-              <a:rPr lang="en-US" dirty="0"/>
-              <a:t>    </a:t>
-            </a:r>
-            <a:r>
-              <a:rPr lang="en-US" dirty="0" err="1"/>
-              <a:t>study:rfstdtc</a:t>
-            </a:r>
-            <a:r>
-              <a:rPr lang="en-US" dirty="0"/>
-              <a:t>       "2016-12-07"^^</a:t>
-            </a:r>
-            <a:r>
-              <a:rPr lang="en-US" dirty="0" err="1"/>
-              <a:t>xsd:date</a:t>
-            </a:r>
-            <a:r>
-              <a:rPr lang="en-US" dirty="0"/>
-              <a:t>  ;</a:t>
-            </a:r>
-          </a:p>
-          <a:p>
-            <a:r>
-              <a:rPr lang="en-US" dirty="0"/>
-              <a:t>    </a:t>
-            </a:r>
-            <a:r>
-              <a:rPr lang="en-US" dirty="0" err="1"/>
-              <a:t>study:subjid</a:t>
-            </a:r>
-            <a:r>
-              <a:rPr lang="en-US" dirty="0"/>
-              <a:t>        “CJ16050_00M01"^^</a:t>
-            </a:r>
-            <a:r>
-              <a:rPr lang="en-US" dirty="0" err="1"/>
-              <a:t>xsd:string</a:t>
-            </a:r>
-            <a:r>
-              <a:rPr lang="en-US" dirty="0"/>
-              <a:t> ;</a:t>
-            </a:r>
-          </a:p>
-          <a:p>
-            <a:r>
-              <a:rPr lang="en-US" dirty="0"/>
-              <a:t>    </a:t>
-            </a:r>
-            <a:r>
-              <a:rPr lang="en-US" dirty="0" err="1"/>
-              <a:t>study:usubjid</a:t>
-            </a:r>
-            <a:r>
-              <a:rPr lang="en-US" dirty="0"/>
-              <a:t>     “CJ16050_00M01” ^^</a:t>
-            </a:r>
-            <a:r>
-              <a:rPr lang="en-US" dirty="0" err="1"/>
-              <a:t>xsd:string</a:t>
-            </a:r>
-            <a:r>
-              <a:rPr lang="en-US" dirty="0"/>
-              <a:t> ;</a:t>
-            </a:r>
-          </a:p>
-          <a:p>
-            <a:r>
-              <a:rPr lang="en-US" dirty="0"/>
-              <a:t>.</a:t>
-            </a:r>
-          </a:p>
-          <a:p>
-            <a:endParaRPr lang="en-US" dirty="0"/>
-          </a:p>
-          <a:p>
-            <a:endParaRPr lang="en-US" dirty="0"/>
-          </a:p>
-          <a:p>
-            <a:endParaRPr lang="en-US" dirty="0"/>
-          </a:p>
-          <a:p>
-            <a:endParaRPr lang="en-US" dirty="0"/>
-          </a:p>
-        </p:txBody>
-      </p:sp>
-    </p:spTree>
-    <p:extLst>
-      <p:ext uri="{BB962C8B-B14F-4D97-AF65-F5344CB8AC3E}">
-        <p14:creationId xmlns:p14="http://schemas.microsoft.com/office/powerpoint/2010/main" val="2932786974"/>
-      </p:ext>
-    </p:extLst>
-  </p:cSld>
-  <p:clrMapOvr>
-    <a:masterClrMapping/>
-  </p:clrMapOvr>
-</p:sld>
-</file>
-
 <file path=ppt/slides/slide9.xml><?xml version="1.0" encoding="utf-8"?>
 <p:sld xmlns:a="http://schemas.openxmlformats.org/drawingml/2006/main" xmlns:r="http://schemas.openxmlformats.org/officeDocument/2006/relationships" xmlns:p="http://schemas.openxmlformats.org/presentationml/2006/main">
   <p:cSld>
@@ -12402,74 +13238,14 @@
       </p:grpSpPr>
       <p:sp>
         <p:nvSpPr>
-          <p:cNvPr id="15" name="Rectangle: Rounded Corners 14">
-            <a:extLst>
-              <a:ext uri="{FF2B5EF4-FFF2-40B4-BE49-F238E27FC236}">
-                <a16:creationId xmlns:a16="http://schemas.microsoft.com/office/drawing/2014/main" id="{FA40E339-40A8-448E-A741-015329DCA7D1}"/>
-              </a:ext>
-            </a:extLst>
-          </p:cNvPr>
-          <p:cNvSpPr/>
-          <p:nvPr/>
-        </p:nvSpPr>
-        <p:spPr>
-          <a:xfrm>
-            <a:off x="357810" y="648361"/>
-            <a:ext cx="9044608" cy="4576782"/>
-          </a:xfrm>
-          <a:prstGeom prst="roundRect">
-            <a:avLst/>
-          </a:prstGeom>
-          <a:solidFill>
-            <a:schemeClr val="bg1">
-              <a:lumMod val="95000"/>
-            </a:schemeClr>
-          </a:solidFill>
-          <a:ln>
-            <a:solidFill>
-              <a:schemeClr val="tx1"/>
-            </a:solidFill>
-          </a:ln>
-        </p:spPr>
-        <p:style>
-          <a:lnRef idx="2">
-            <a:schemeClr val="accent1">
-              <a:shade val="50000"/>
-            </a:schemeClr>
-          </a:lnRef>
-          <a:fillRef idx="1">
-            <a:schemeClr val="accent1"/>
-          </a:fillRef>
-          <a:effectRef idx="0">
-            <a:schemeClr val="accent1"/>
-          </a:effectRef>
-          <a:fontRef idx="minor">
-            <a:schemeClr val="lt1"/>
-          </a:fontRef>
-        </p:style>
-        <p:txBody>
-          <a:bodyPr rtlCol="0" anchor="ctr"/>
-          <a:lstStyle/>
-          <a:p>
-            <a:pPr algn="ctr"/>
-            <a:endParaRPr lang="en-US" b="1" dirty="0">
-              <a:solidFill>
-                <a:schemeClr val="tx1"/>
-              </a:solidFill>
-            </a:endParaRPr>
-          </a:p>
-        </p:txBody>
-      </p:sp>
-      <p:sp>
-        <p:nvSpPr>
           <p:cNvPr id="4" name="Rectangle: Rounded Corners 3"/>
           <p:cNvSpPr/>
           <p:nvPr/>
         </p:nvSpPr>
         <p:spPr>
           <a:xfrm>
-            <a:off x="814595" y="1959429"/>
-            <a:ext cx="6400800" cy="957942"/>
+            <a:off x="6359054" y="800152"/>
+            <a:ext cx="2468880" cy="449588"/>
           </a:xfrm>
           <a:prstGeom prst="roundRect">
             <a:avLst/>
@@ -12507,13 +13283,24 @@
           <a:lstStyle/>
           <a:p>
             <a:pPr algn="ctr"/>
-            <a:endParaRPr lang="en-US" b="1" dirty="0">
-              <a:solidFill>
-                <a:schemeClr val="accent1">
-                  <a:lumMod val="75000"/>
-                </a:schemeClr>
-              </a:solidFill>
-            </a:endParaRPr>
+            <a:r>
+              <a:rPr lang="en-US" b="1" dirty="0">
+                <a:solidFill>
+                  <a:schemeClr val="tx1"/>
+                </a:solidFill>
+              </a:rPr>
+              <a:t>Person_</a:t>
+            </a:r>
+            <a:r>
+              <a:rPr lang="en-US" b="1" dirty="0">
+                <a:solidFill>
+                  <a:schemeClr val="accent1">
+                    <a:lumMod val="75000"/>
+                  </a:schemeClr>
+                </a:solidFill>
+              </a:rPr>
+              <a:t>01-701-1015</a:t>
+            </a:r>
           </a:p>
         </p:txBody>
       </p:sp>
@@ -12525,66 +13312,8 @@
         </p:nvSpPr>
         <p:spPr>
           <a:xfrm>
-            <a:off x="814595" y="3596046"/>
-            <a:ext cx="6400800" cy="478998"/>
-          </a:xfrm>
-          <a:prstGeom prst="roundRect">
-            <a:avLst/>
-          </a:prstGeom>
-          <a:solidFill>
-            <a:srgbClr val="E1AD48"/>
-          </a:solidFill>
-          <a:ln>
-            <a:solidFill>
-              <a:schemeClr val="tx1"/>
-            </a:solidFill>
-          </a:ln>
-        </p:spPr>
-        <p:style>
-          <a:lnRef idx="2">
-            <a:schemeClr val="accent1">
-              <a:shade val="50000"/>
-            </a:schemeClr>
-          </a:lnRef>
-          <a:fillRef idx="1">
-            <a:schemeClr val="accent1"/>
-          </a:fillRef>
-          <a:effectRef idx="0">
-            <a:schemeClr val="accent1"/>
-          </a:effectRef>
-          <a:fontRef idx="minor">
-            <a:schemeClr val="lt1"/>
-          </a:fontRef>
-        </p:style>
-        <p:txBody>
-          <a:bodyPr rtlCol="0" anchor="ctr"/>
-          <a:lstStyle/>
-          <a:p>
-            <a:pPr algn="ctr"/>
-            <a:endParaRPr lang="en-US" b="1" dirty="0">
-              <a:solidFill>
-                <a:schemeClr val="tx1"/>
-              </a:solidFill>
-            </a:endParaRPr>
-          </a:p>
-        </p:txBody>
-      </p:sp>
-      <p:sp>
-        <p:nvSpPr>
-          <p:cNvPr id="17" name="Rectangle: Rounded Corners 16">
-            <a:extLst>
-              <a:ext uri="{FF2B5EF4-FFF2-40B4-BE49-F238E27FC236}">
-                <a16:creationId xmlns:a16="http://schemas.microsoft.com/office/drawing/2014/main" id="{02929941-0200-42D9-8465-064446A2AC2E}"/>
-              </a:ext>
-            </a:extLst>
-          </p:cNvPr>
-          <p:cNvSpPr/>
-          <p:nvPr/>
-        </p:nvSpPr>
-        <p:spPr>
-          <a:xfrm>
-            <a:off x="814595" y="3028094"/>
-            <a:ext cx="6400800" cy="457001"/>
+            <a:off x="7348177" y="2628952"/>
+            <a:ext cx="2468880" cy="457001"/>
           </a:xfrm>
           <a:prstGeom prst="roundRect">
             <a:avLst/>
@@ -12622,38 +13351,33 @@
           <a:lstStyle/>
           <a:p>
             <a:pPr algn="ctr"/>
-            <a:endParaRPr lang="en-US" b="1" dirty="0">
-              <a:solidFill>
-                <a:schemeClr val="tx1"/>
-              </a:solidFill>
-            </a:endParaRPr>
-          </a:p>
-        </p:txBody>
-      </p:sp>
-      <p:sp>
-        <p:nvSpPr>
-          <p:cNvPr id="18" name="Rectangle: Rounded Corners 17">
-            <a:extLst>
-              <a:ext uri="{FF2B5EF4-FFF2-40B4-BE49-F238E27FC236}">
-                <a16:creationId xmlns:a16="http://schemas.microsoft.com/office/drawing/2014/main" id="{A5947EC4-2512-4FDD-A2AE-6E8E1DF5BBDA}"/>
-              </a:ext>
-            </a:extLst>
-          </p:cNvPr>
+            <a:r>
+              <a:rPr lang="en-US" b="1" dirty="0">
+                <a:solidFill>
+                  <a:schemeClr val="tx1"/>
+                </a:solidFill>
+              </a:rPr>
+              <a:t>Medical Condition</a:t>
+            </a:r>
+          </a:p>
+        </p:txBody>
+      </p:sp>
+      <p:sp>
+        <p:nvSpPr>
+          <p:cNvPr id="13" name="Rectangle: Rounded Corners 12"/>
           <p:cNvSpPr/>
           <p:nvPr/>
         </p:nvSpPr>
         <p:spPr>
           <a:xfrm>
-            <a:off x="814595" y="4165889"/>
-            <a:ext cx="6400800" cy="478998"/>
+            <a:off x="7158066" y="4705104"/>
+            <a:ext cx="2468880" cy="457001"/>
           </a:xfrm>
           <a:prstGeom prst="roundRect">
             <a:avLst/>
           </a:prstGeom>
           <a:solidFill>
-            <a:schemeClr val="bg1">
-              <a:lumMod val="75000"/>
-            </a:schemeClr>
+            <a:srgbClr val="FFC000"/>
           </a:solidFill>
           <a:ln>
             <a:solidFill>
@@ -12682,6 +13406,14 @@
           <a:lstStyle/>
           <a:p>
             <a:pPr algn="ctr"/>
+            <a:r>
+              <a:rPr lang="en-US" b="1" dirty="0" err="1">
+                <a:solidFill>
+                  <a:schemeClr val="tx1"/>
+                </a:solidFill>
+              </a:rPr>
+              <a:t>AdverseEvent</a:t>
+            </a:r>
             <a:endParaRPr lang="en-US" b="1" dirty="0">
               <a:solidFill>
                 <a:schemeClr val="tx1"/>
@@ -12690,22 +13422,204 @@
           </a:p>
         </p:txBody>
       </p:sp>
-      <p:sp>
-        <p:nvSpPr>
-          <p:cNvPr id="19" name="TextBox 18">
-            <a:extLst>
-              <a:ext uri="{FF2B5EF4-FFF2-40B4-BE49-F238E27FC236}">
-                <a16:creationId xmlns:a16="http://schemas.microsoft.com/office/drawing/2014/main" id="{4F329E82-4FE1-4EE2-909E-1739258B41D6}"/>
-              </a:ext>
-            </a:extLst>
-          </p:cNvPr>
+      <p:cxnSp>
+        <p:nvCxnSpPr>
+          <p:cNvPr id="14" name="Straight Arrow Connector 13"/>
+          <p:cNvCxnSpPr>
+            <a:cxnSpLocks/>
+            <a:stCxn id="5" idx="2"/>
+            <a:endCxn id="13" idx="0"/>
+          </p:cNvCxnSpPr>
+          <p:nvPr/>
+        </p:nvCxnSpPr>
+        <p:spPr>
+          <a:xfrm flipH="1">
+            <a:off x="8392506" y="3085953"/>
+            <a:ext cx="190111" cy="1619151"/>
+          </a:xfrm>
+          <a:prstGeom prst="straightConnector1">
+            <a:avLst/>
+          </a:prstGeom>
+          <a:ln w="50800">
+            <a:solidFill>
+              <a:schemeClr val="bg1">
+                <a:lumMod val="50000"/>
+              </a:schemeClr>
+            </a:solidFill>
+            <a:tailEnd type="triangle"/>
+          </a:ln>
+        </p:spPr>
+        <p:style>
+          <a:lnRef idx="1">
+            <a:schemeClr val="accent1"/>
+          </a:lnRef>
+          <a:fillRef idx="0">
+            <a:schemeClr val="accent1"/>
+          </a:fillRef>
+          <a:effectRef idx="0">
+            <a:schemeClr val="accent1"/>
+          </a:effectRef>
+          <a:fontRef idx="minor">
+            <a:schemeClr val="tx1"/>
+          </a:fontRef>
+        </p:style>
+      </p:cxnSp>
+      <p:sp>
+        <p:nvSpPr>
+          <p:cNvPr id="20" name="TextBox 19"/>
           <p:cNvSpPr txBox="1"/>
           <p:nvPr/>
         </p:nvSpPr>
         <p:spPr>
           <a:xfrm>
-            <a:off x="7235686" y="2219738"/>
-            <a:ext cx="1930337" cy="461665"/>
+            <a:off x="9644498" y="739025"/>
+            <a:ext cx="1967829" cy="369332"/>
+          </a:xfrm>
+          <a:prstGeom prst="rect">
+            <a:avLst/>
+          </a:prstGeom>
+          <a:solidFill>
+            <a:schemeClr val="bg1"/>
+          </a:solidFill>
+        </p:spPr>
+        <p:txBody>
+          <a:bodyPr wrap="square" rtlCol="0">
+            <a:spAutoFit/>
+          </a:bodyPr>
+          <a:lstStyle>
+            <a:defPPr>
+              <a:defRPr lang="en-US"/>
+            </a:defPPr>
+            <a:lvl1pPr>
+              <a:defRPr b="1">
+                <a:solidFill>
+                  <a:schemeClr val="accent2">
+                    <a:lumMod val="75000"/>
+                  </a:schemeClr>
+                </a:solidFill>
+                <a:latin typeface="Courier New" panose="02070309020205020404" pitchFamily="49" charset="0"/>
+                <a:cs typeface="Courier New" panose="02070309020205020404" pitchFamily="49" charset="0"/>
+              </a:defRPr>
+            </a:lvl1pPr>
+          </a:lstStyle>
+          <a:p>
+            <a:r>
+              <a:rPr lang="en-US" dirty="0" err="1"/>
+              <a:t>afflictedBy</a:t>
+            </a:r>
+            <a:endParaRPr lang="en-US" dirty="0"/>
+          </a:p>
+        </p:txBody>
+      </p:sp>
+      <p:sp>
+        <p:nvSpPr>
+          <p:cNvPr id="41" name="TextBox 40">
+            <a:extLst>
+              <a:ext uri="{FF2B5EF4-FFF2-40B4-BE49-F238E27FC236}">
+                <a16:creationId xmlns:a16="http://schemas.microsoft.com/office/drawing/2014/main" id="{CCC2A432-EE41-4F21-9AAE-EB569CE224D5}"/>
+              </a:ext>
+            </a:extLst>
+          </p:cNvPr>
+          <p:cNvSpPr txBox="1"/>
+          <p:nvPr/>
+        </p:nvSpPr>
+        <p:spPr>
+          <a:xfrm>
+            <a:off x="8696860" y="1917222"/>
+            <a:ext cx="1740300" cy="369332"/>
+          </a:xfrm>
+          <a:prstGeom prst="rect">
+            <a:avLst/>
+          </a:prstGeom>
+          <a:solidFill>
+            <a:schemeClr val="bg1"/>
+          </a:solidFill>
+        </p:spPr>
+        <p:txBody>
+          <a:bodyPr wrap="square" rtlCol="0">
+            <a:spAutoFit/>
+          </a:bodyPr>
+          <a:lstStyle/>
+          <a:p>
+            <a:r>
+              <a:rPr lang="en-US" b="1" dirty="0">
+                <a:solidFill>
+                  <a:schemeClr val="accent2">
+                    <a:lumMod val="40000"/>
+                    <a:lumOff val="60000"/>
+                  </a:schemeClr>
+                </a:solidFill>
+                <a:latin typeface="Courier New" panose="02070309020205020404" pitchFamily="49" charset="0"/>
+                <a:cs typeface="Courier New" panose="02070309020205020404" pitchFamily="49" charset="0"/>
+              </a:rPr>
+              <a:t>severity</a:t>
+            </a:r>
+          </a:p>
+        </p:txBody>
+      </p:sp>
+      <p:sp>
+        <p:nvSpPr>
+          <p:cNvPr id="7" name="TextBox 6"/>
+          <p:cNvSpPr txBox="1"/>
+          <p:nvPr/>
+        </p:nvSpPr>
+        <p:spPr>
+          <a:xfrm>
+            <a:off x="7665887" y="3569559"/>
+            <a:ext cx="1643348" cy="369332"/>
+          </a:xfrm>
+          <a:prstGeom prst="rect">
+            <a:avLst/>
+          </a:prstGeom>
+          <a:solidFill>
+            <a:schemeClr val="bg1"/>
+          </a:solidFill>
+        </p:spPr>
+        <p:txBody>
+          <a:bodyPr wrap="square" rtlCol="0">
+            <a:spAutoFit/>
+          </a:bodyPr>
+          <a:lstStyle>
+            <a:defPPr>
+              <a:defRPr lang="en-US"/>
+            </a:defPPr>
+            <a:lvl1pPr>
+              <a:defRPr b="1">
+                <a:solidFill>
+                  <a:schemeClr val="accent2">
+                    <a:lumMod val="75000"/>
+                  </a:schemeClr>
+                </a:solidFill>
+                <a:latin typeface="Courier New" panose="02070309020205020404" pitchFamily="49" charset="0"/>
+                <a:cs typeface="Courier New" panose="02070309020205020404" pitchFamily="49" charset="0"/>
+              </a:defRPr>
+            </a:lvl1pPr>
+          </a:lstStyle>
+          <a:p>
+            <a:r>
+              <a:rPr lang="en-US" dirty="0" err="1"/>
+              <a:t>subClassOf</a:t>
+            </a:r>
+            <a:endParaRPr lang="en-US" dirty="0"/>
+          </a:p>
+        </p:txBody>
+      </p:sp>
+      <p:sp>
+        <p:nvSpPr>
+          <p:cNvPr id="45" name="TextBox 44">
+            <a:extLst>
+              <a:ext uri="{FF2B5EF4-FFF2-40B4-BE49-F238E27FC236}">
+                <a16:creationId xmlns:a16="http://schemas.microsoft.com/office/drawing/2014/main" id="{DCEB2144-B3F4-48FC-863E-2B0381C57201}"/>
+              </a:ext>
+            </a:extLst>
+          </p:cNvPr>
+          <p:cNvSpPr txBox="1"/>
+          <p:nvPr/>
+        </p:nvSpPr>
+        <p:spPr>
+          <a:xfrm>
+            <a:off x="603175" y="837054"/>
+            <a:ext cx="4975721" cy="3139321"/>
           </a:xfrm>
           <a:prstGeom prst="rect">
             <a:avLst/>
@@ -12719,363 +13633,136 @@
           <a:lstStyle/>
           <a:p>
             <a:r>
-              <a:rPr lang="en-US" sz="2400" b="1" dirty="0">
-                <a:solidFill>
-                  <a:schemeClr val="accent6">
-                    <a:lumMod val="50000"/>
-                  </a:schemeClr>
-                </a:solidFill>
-              </a:rPr>
-              <a:t>SD1002Shape</a:t>
-            </a:r>
-          </a:p>
-        </p:txBody>
-      </p:sp>
-      <p:sp>
-        <p:nvSpPr>
-          <p:cNvPr id="21" name="TextBox 20">
-            <a:extLst>
-              <a:ext uri="{FF2B5EF4-FFF2-40B4-BE49-F238E27FC236}">
-                <a16:creationId xmlns:a16="http://schemas.microsoft.com/office/drawing/2014/main" id="{83A70331-5F59-4C46-A0E7-1DE702D8904E}"/>
-              </a:ext>
-            </a:extLst>
-          </p:cNvPr>
-          <p:cNvSpPr txBox="1"/>
-          <p:nvPr/>
-        </p:nvSpPr>
-        <p:spPr>
-          <a:xfrm>
-            <a:off x="7235686" y="4181061"/>
-            <a:ext cx="2004075" cy="461665"/>
-          </a:xfrm>
-          <a:prstGeom prst="rect">
-            <a:avLst/>
-          </a:prstGeom>
-          <a:noFill/>
-        </p:spPr>
-        <p:txBody>
-          <a:bodyPr wrap="none" rtlCol="0">
-            <a:spAutoFit/>
-          </a:bodyPr>
-          <a:lstStyle/>
-          <a:p>
-            <a:r>
-              <a:rPr lang="en-US" sz="2400" i="1" dirty="0">
-                <a:solidFill>
-                  <a:schemeClr val="bg1">
-                    <a:lumMod val="65000"/>
-                  </a:schemeClr>
-                </a:solidFill>
-              </a:rPr>
-              <a:t>...more shapes</a:t>
-            </a:r>
-          </a:p>
-        </p:txBody>
-      </p:sp>
-      <p:sp>
-        <p:nvSpPr>
-          <p:cNvPr id="22" name="TextBox 21">
-            <a:extLst>
-              <a:ext uri="{FF2B5EF4-FFF2-40B4-BE49-F238E27FC236}">
-                <a16:creationId xmlns:a16="http://schemas.microsoft.com/office/drawing/2014/main" id="{5604566B-9473-44E6-A9F0-16B413C2F315}"/>
-              </a:ext>
-            </a:extLst>
-          </p:cNvPr>
-          <p:cNvSpPr txBox="1"/>
-          <p:nvPr/>
-        </p:nvSpPr>
-        <p:spPr>
-          <a:xfrm>
-            <a:off x="7235686" y="2988364"/>
-            <a:ext cx="1930337" cy="461665"/>
-          </a:xfrm>
-          <a:prstGeom prst="rect">
-            <a:avLst/>
-          </a:prstGeom>
-          <a:noFill/>
-        </p:spPr>
-        <p:txBody>
-          <a:bodyPr wrap="none" rtlCol="0">
-            <a:spAutoFit/>
-          </a:bodyPr>
-          <a:lstStyle/>
-          <a:p>
-            <a:r>
-              <a:rPr lang="en-US" sz="2400" b="1" dirty="0">
-                <a:solidFill>
-                  <a:schemeClr val="accent1">
-                    <a:lumMod val="75000"/>
-                  </a:schemeClr>
-                </a:solidFill>
-              </a:rPr>
-              <a:t>SD1001Shape</a:t>
-            </a:r>
-          </a:p>
-        </p:txBody>
-      </p:sp>
-      <p:sp>
-        <p:nvSpPr>
-          <p:cNvPr id="23" name="TextBox 22">
-            <a:extLst>
-              <a:ext uri="{FF2B5EF4-FFF2-40B4-BE49-F238E27FC236}">
-                <a16:creationId xmlns:a16="http://schemas.microsoft.com/office/drawing/2014/main" id="{CD7F6E51-1BA6-4815-8455-7C3C94C69EA6}"/>
-              </a:ext>
-            </a:extLst>
-          </p:cNvPr>
-          <p:cNvSpPr txBox="1"/>
-          <p:nvPr/>
-        </p:nvSpPr>
-        <p:spPr>
-          <a:xfrm>
-            <a:off x="7235686" y="3637721"/>
-            <a:ext cx="1930337" cy="461665"/>
-          </a:xfrm>
-          <a:prstGeom prst="rect">
-            <a:avLst/>
-          </a:prstGeom>
-          <a:noFill/>
-        </p:spPr>
-        <p:txBody>
-          <a:bodyPr wrap="none" rtlCol="0">
-            <a:spAutoFit/>
-          </a:bodyPr>
-          <a:lstStyle/>
-          <a:p>
-            <a:r>
-              <a:rPr lang="en-US" sz="2400" b="1" dirty="0">
-                <a:solidFill>
-                  <a:schemeClr val="accent2">
-                    <a:lumMod val="75000"/>
-                  </a:schemeClr>
-                </a:solidFill>
-              </a:rPr>
-              <a:t>SD0083Shape</a:t>
-            </a:r>
-          </a:p>
-        </p:txBody>
-      </p:sp>
-      <p:sp>
-        <p:nvSpPr>
-          <p:cNvPr id="45" name="TextBox 44">
-            <a:extLst>
-              <a:ext uri="{FF2B5EF4-FFF2-40B4-BE49-F238E27FC236}">
-                <a16:creationId xmlns:a16="http://schemas.microsoft.com/office/drawing/2014/main" id="{DCEB2144-B3F4-48FC-863E-2B0381C57201}"/>
-              </a:ext>
-            </a:extLst>
-          </p:cNvPr>
-          <p:cNvSpPr txBox="1"/>
-          <p:nvPr/>
-        </p:nvSpPr>
-        <p:spPr>
-          <a:xfrm>
-            <a:off x="690260" y="817724"/>
-            <a:ext cx="6543266" cy="4047262"/>
-          </a:xfrm>
-          <a:prstGeom prst="rect">
-            <a:avLst/>
-          </a:prstGeom>
-          <a:noFill/>
-        </p:spPr>
-        <p:txBody>
-          <a:bodyPr wrap="square" rtlCol="0">
-            <a:spAutoFit/>
-          </a:bodyPr>
-          <a:lstStyle/>
-          <a:p>
-            <a:pPr>
-              <a:spcBef>
-                <a:spcPts val="600"/>
-              </a:spcBef>
-              <a:spcAft>
-                <a:spcPts val="600"/>
-              </a:spcAft>
-            </a:pPr>
-            <a:r>
-              <a:rPr lang="en-US" sz="2400" dirty="0"/>
+              <a:rPr lang="en-US" dirty="0"/>
               <a:t>study:Subject_CJ16050_00M01</a:t>
             </a:r>
           </a:p>
           <a:p>
-            <a:pPr>
-              <a:lnSpc>
-                <a:spcPct val="150000"/>
-              </a:lnSpc>
-            </a:pPr>
-            <a:r>
-              <a:rPr lang="en-US" sz="2400" dirty="0"/>
+            <a:r>
+              <a:rPr lang="en-US" dirty="0"/>
               <a:t>    a                           </a:t>
             </a:r>
             <a:r>
-              <a:rPr lang="en-US" sz="2400" dirty="0" err="1"/>
-              <a:t>study:AnimalSubject</a:t>
-            </a:r>
-            <a:r>
-              <a:rPr lang="en-US" sz="2400" dirty="0"/>
+              <a:rPr lang="en-US" dirty="0" err="1"/>
+              <a:t>study:StudySubject</a:t>
+            </a:r>
+            <a:r>
+              <a:rPr lang="en-US" dirty="0"/>
               <a:t> ;</a:t>
             </a:r>
           </a:p>
           <a:p>
-            <a:pPr>
-              <a:lnSpc>
-                <a:spcPct val="150000"/>
-              </a:lnSpc>
-            </a:pPr>
-            <a:r>
-              <a:rPr lang="en-US" sz="2400" dirty="0"/>
+            <a:r>
+              <a:rPr lang="en-US" dirty="0"/>
               <a:t>    </a:t>
             </a:r>
             <a:r>
-              <a:rPr lang="en-US" sz="2400" dirty="0" err="1"/>
+              <a:rPr lang="en-US" dirty="0" err="1"/>
               <a:t>study:rfendtc</a:t>
             </a:r>
             <a:r>
-              <a:rPr lang="en-US" sz="2400" dirty="0"/>
+              <a:rPr lang="en-US" dirty="0"/>
               <a:t>      "2016-12-07"^^</a:t>
             </a:r>
             <a:r>
-              <a:rPr lang="en-US" sz="2400" dirty="0" err="1"/>
+              <a:rPr lang="en-US" dirty="0" err="1"/>
               <a:t>xsd:date</a:t>
             </a:r>
             <a:r>
-              <a:rPr lang="en-US" sz="2400" dirty="0"/>
+              <a:rPr lang="en-US" dirty="0"/>
               <a:t> ;</a:t>
             </a:r>
           </a:p>
           <a:p>
-            <a:pPr>
-              <a:lnSpc>
-                <a:spcPct val="150000"/>
-              </a:lnSpc>
-            </a:pPr>
-            <a:r>
-              <a:rPr lang="en-US" sz="2400" dirty="0"/>
+            <a:r>
+              <a:rPr lang="en-US" dirty="0"/>
               <a:t>    </a:t>
             </a:r>
             <a:r>
-              <a:rPr lang="en-US" sz="2400" dirty="0" err="1"/>
+              <a:rPr lang="en-US" dirty="0" err="1"/>
               <a:t>study:rfstdtc</a:t>
             </a:r>
             <a:r>
-              <a:rPr lang="en-US" sz="2400" dirty="0"/>
+              <a:rPr lang="en-US" dirty="0"/>
               <a:t>       "2016-12-07"^^</a:t>
             </a:r>
             <a:r>
-              <a:rPr lang="en-US" sz="2400" dirty="0" err="1"/>
+              <a:rPr lang="en-US" dirty="0" err="1"/>
               <a:t>xsd:date</a:t>
             </a:r>
             <a:r>
-              <a:rPr lang="en-US" sz="2400" dirty="0"/>
+              <a:rPr lang="en-US" dirty="0"/>
               <a:t>  ;</a:t>
             </a:r>
           </a:p>
           <a:p>
-            <a:pPr>
-              <a:lnSpc>
-                <a:spcPct val="150000"/>
-              </a:lnSpc>
-            </a:pPr>
-            <a:r>
-              <a:rPr lang="en-US" sz="2400" dirty="0"/>
+            <a:r>
+              <a:rPr lang="en-US" dirty="0"/>
               <a:t>    </a:t>
             </a:r>
             <a:r>
-              <a:rPr lang="en-US" sz="2400" dirty="0" err="1"/>
+              <a:rPr lang="en-US" dirty="0" err="1"/>
               <a:t>study:subjid</a:t>
             </a:r>
             <a:r>
-              <a:rPr lang="en-US" sz="2400" dirty="0"/>
-              <a:t>        “00M01"^^</a:t>
-            </a:r>
-            <a:r>
-              <a:rPr lang="en-US" sz="2400" dirty="0" err="1"/>
+              <a:rPr lang="en-US" dirty="0"/>
+              <a:t>        “CJ16050_00M01"^^</a:t>
+            </a:r>
+            <a:r>
+              <a:rPr lang="en-US" dirty="0" err="1"/>
               <a:t>xsd:string</a:t>
             </a:r>
             <a:r>
-              <a:rPr lang="en-US" sz="2400" dirty="0"/>
+              <a:rPr lang="en-US" dirty="0"/>
               <a:t> ;</a:t>
             </a:r>
           </a:p>
           <a:p>
-            <a:pPr>
-              <a:lnSpc>
-                <a:spcPct val="150000"/>
-              </a:lnSpc>
-            </a:pPr>
-            <a:r>
-              <a:rPr lang="en-US" sz="2400" dirty="0"/>
+            <a:r>
+              <a:rPr lang="en-US" dirty="0"/>
               <a:t>    </a:t>
             </a:r>
             <a:r>
-              <a:rPr lang="en-US" sz="2400" dirty="0" err="1"/>
+              <a:rPr lang="en-US" dirty="0" err="1"/>
               <a:t>study:usubjid</a:t>
             </a:r>
             <a:r>
-              <a:rPr lang="en-US" sz="2400" dirty="0"/>
+              <a:rPr lang="en-US" dirty="0"/>
               <a:t>     “CJ16050_00M01” ^^</a:t>
             </a:r>
             <a:r>
-              <a:rPr lang="en-US" sz="2400" dirty="0" err="1"/>
+              <a:rPr lang="en-US" dirty="0" err="1"/>
               <a:t>xsd:string</a:t>
             </a:r>
             <a:r>
-              <a:rPr lang="en-US" sz="2400" dirty="0"/>
+              <a:rPr lang="en-US" dirty="0"/>
               <a:t> ;</a:t>
             </a:r>
           </a:p>
           <a:p>
-            <a:endParaRPr lang="en-US" sz="2400" dirty="0"/>
-          </a:p>
-          <a:p>
-            <a:endParaRPr lang="en-US" sz="2400" dirty="0"/>
-          </a:p>
-        </p:txBody>
-      </p:sp>
-      <p:sp>
-        <p:nvSpPr>
-          <p:cNvPr id="13" name="TextBox 12">
-            <a:extLst>
-              <a:ext uri="{FF2B5EF4-FFF2-40B4-BE49-F238E27FC236}">
-                <a16:creationId xmlns:a16="http://schemas.microsoft.com/office/drawing/2014/main" id="{47A2AA95-FF59-4D21-BCDB-A931A9C8AB84}"/>
-              </a:ext>
-            </a:extLst>
-          </p:cNvPr>
-          <p:cNvSpPr txBox="1"/>
-          <p:nvPr/>
-        </p:nvSpPr>
-        <p:spPr>
-          <a:xfrm>
-            <a:off x="877558" y="4174965"/>
-            <a:ext cx="1714508" cy="461665"/>
-          </a:xfrm>
-          <a:prstGeom prst="rect">
-            <a:avLst/>
-          </a:prstGeom>
-          <a:noFill/>
-        </p:spPr>
-        <p:txBody>
-          <a:bodyPr wrap="none" rtlCol="0">
-            <a:spAutoFit/>
-          </a:bodyPr>
-          <a:lstStyle/>
-          <a:p>
-            <a:r>
-              <a:rPr lang="en-US" sz="2400" i="1" dirty="0">
-                <a:solidFill>
-                  <a:schemeClr val="tx1">
-                    <a:lumMod val="50000"/>
-                    <a:lumOff val="50000"/>
-                  </a:schemeClr>
-                </a:solidFill>
-              </a:rPr>
-              <a:t>...more data</a:t>
-            </a:r>
+            <a:r>
+              <a:rPr lang="en-US" dirty="0"/>
+              <a:t>.</a:t>
+            </a:r>
+          </a:p>
+          <a:p>
+            <a:endParaRPr lang="en-US" dirty="0"/>
+          </a:p>
+          <a:p>
+            <a:endParaRPr lang="en-US" dirty="0"/>
+          </a:p>
+          <a:p>
+            <a:endParaRPr lang="en-US" dirty="0"/>
+          </a:p>
+          <a:p>
+            <a:endParaRPr lang="en-US" dirty="0"/>
           </a:p>
         </p:txBody>
       </p:sp>
     </p:spTree>
     <p:extLst>
       <p:ext uri="{BB962C8B-B14F-4D97-AF65-F5344CB8AC3E}">
-        <p14:creationId xmlns:p14="http://schemas.microsoft.com/office/powerpoint/2010/main" val="3442749000"/>
+        <p14:creationId xmlns:p14="http://schemas.microsoft.com/office/powerpoint/2010/main" val="2932786974"/>
       </p:ext>
     </p:extLst>
   </p:cSld>

</xml_diff>

<commit_message>
OWL added to existing checks. Ready to merge
</commit_message>
<xml_diff>
--- a/doc/images/ImageSources.pptx
+++ b/doc/images/ImageSources.pptx
@@ -270,7 +270,7 @@
           <a:p>
             <a:fld id="{03ABD037-9D82-4436-AC70-ED75D2FE9417}" type="datetimeFigureOut">
               <a:rPr lang="en-US" smtClean="0"/>
-              <a:t>8/20/2019</a:t>
+              <a:t>8/21/2019</a:t>
             </a:fld>
             <a:endParaRPr lang="en-US"/>
           </a:p>
@@ -438,7 +438,7 @@
           <a:p>
             <a:fld id="{03ABD037-9D82-4436-AC70-ED75D2FE9417}" type="datetimeFigureOut">
               <a:rPr lang="en-US" smtClean="0"/>
-              <a:t>8/20/2019</a:t>
+              <a:t>8/21/2019</a:t>
             </a:fld>
             <a:endParaRPr lang="en-US"/>
           </a:p>
@@ -616,7 +616,7 @@
           <a:p>
             <a:fld id="{03ABD037-9D82-4436-AC70-ED75D2FE9417}" type="datetimeFigureOut">
               <a:rPr lang="en-US" smtClean="0"/>
-              <a:t>8/20/2019</a:t>
+              <a:t>8/21/2019</a:t>
             </a:fld>
             <a:endParaRPr lang="en-US"/>
           </a:p>
@@ -784,7 +784,7 @@
           <a:p>
             <a:fld id="{03ABD037-9D82-4436-AC70-ED75D2FE9417}" type="datetimeFigureOut">
               <a:rPr lang="en-US" smtClean="0"/>
-              <a:t>8/20/2019</a:t>
+              <a:t>8/21/2019</a:t>
             </a:fld>
             <a:endParaRPr lang="en-US"/>
           </a:p>
@@ -1029,7 +1029,7 @@
           <a:p>
             <a:fld id="{03ABD037-9D82-4436-AC70-ED75D2FE9417}" type="datetimeFigureOut">
               <a:rPr lang="en-US" smtClean="0"/>
-              <a:t>8/20/2019</a:t>
+              <a:t>8/21/2019</a:t>
             </a:fld>
             <a:endParaRPr lang="en-US"/>
           </a:p>
@@ -1258,7 +1258,7 @@
           <a:p>
             <a:fld id="{03ABD037-9D82-4436-AC70-ED75D2FE9417}" type="datetimeFigureOut">
               <a:rPr lang="en-US" smtClean="0"/>
-              <a:t>8/20/2019</a:t>
+              <a:t>8/21/2019</a:t>
             </a:fld>
             <a:endParaRPr lang="en-US"/>
           </a:p>
@@ -1622,7 +1622,7 @@
           <a:p>
             <a:fld id="{03ABD037-9D82-4436-AC70-ED75D2FE9417}" type="datetimeFigureOut">
               <a:rPr lang="en-US" smtClean="0"/>
-              <a:t>8/20/2019</a:t>
+              <a:t>8/21/2019</a:t>
             </a:fld>
             <a:endParaRPr lang="en-US"/>
           </a:p>
@@ -1739,7 +1739,7 @@
           <a:p>
             <a:fld id="{03ABD037-9D82-4436-AC70-ED75D2FE9417}" type="datetimeFigureOut">
               <a:rPr lang="en-US" smtClean="0"/>
-              <a:t>8/20/2019</a:t>
+              <a:t>8/21/2019</a:t>
             </a:fld>
             <a:endParaRPr lang="en-US"/>
           </a:p>
@@ -1834,7 +1834,7 @@
           <a:p>
             <a:fld id="{03ABD037-9D82-4436-AC70-ED75D2FE9417}" type="datetimeFigureOut">
               <a:rPr lang="en-US" smtClean="0"/>
-              <a:t>8/20/2019</a:t>
+              <a:t>8/21/2019</a:t>
             </a:fld>
             <a:endParaRPr lang="en-US"/>
           </a:p>
@@ -2109,7 +2109,7 @@
           <a:p>
             <a:fld id="{03ABD037-9D82-4436-AC70-ED75D2FE9417}" type="datetimeFigureOut">
               <a:rPr lang="en-US" smtClean="0"/>
-              <a:t>8/20/2019</a:t>
+              <a:t>8/21/2019</a:t>
             </a:fld>
             <a:endParaRPr lang="en-US"/>
           </a:p>
@@ -2361,7 +2361,7 @@
           <a:p>
             <a:fld id="{03ABD037-9D82-4436-AC70-ED75D2FE9417}" type="datetimeFigureOut">
               <a:rPr lang="en-US" smtClean="0"/>
-              <a:t>8/20/2019</a:t>
+              <a:t>8/21/2019</a:t>
             </a:fld>
             <a:endParaRPr lang="en-US"/>
           </a:p>
@@ -2572,7 +2572,7 @@
           <a:p>
             <a:fld id="{03ABD037-9D82-4436-AC70-ED75D2FE9417}" type="datetimeFigureOut">
               <a:rPr lang="en-US" smtClean="0"/>
-              <a:t>8/20/2019</a:t>
+              <a:t>8/21/2019</a:t>
             </a:fld>
             <a:endParaRPr lang="en-US"/>
           </a:p>
@@ -9588,10 +9588,10 @@
       </p:grpSpPr>
       <p:sp>
         <p:nvSpPr>
-          <p:cNvPr id="45" name="Rectangle: Rounded Corners 44">
-            <a:extLst>
-              <a:ext uri="{FF2B5EF4-FFF2-40B4-BE49-F238E27FC236}">
-                <a16:creationId xmlns:a16="http://schemas.microsoft.com/office/drawing/2014/main" id="{B9A69A35-10B3-4874-B928-C93C5AEC02C5}"/>
+          <p:cNvPr id="19" name="Rectangle: Rounded Corners 18">
+            <a:extLst>
+              <a:ext uri="{FF2B5EF4-FFF2-40B4-BE49-F238E27FC236}">
+                <a16:creationId xmlns:a16="http://schemas.microsoft.com/office/drawing/2014/main" id="{1A2C1608-A407-426E-907C-FD5043DF9366}"/>
               </a:ext>
             </a:extLst>
           </p:cNvPr>
@@ -9600,78 +9600,8 @@
         </p:nvSpPr>
         <p:spPr>
           <a:xfrm>
-            <a:off x="1740819" y="1332492"/>
-            <a:ext cx="3154680" cy="457001"/>
-          </a:xfrm>
-          <a:prstGeom prst="roundRect">
-            <a:avLst/>
-          </a:prstGeom>
-          <a:solidFill>
-            <a:srgbClr val="E4ECF8"/>
-          </a:solidFill>
-          <a:ln w="38100">
-            <a:solidFill>
-              <a:schemeClr val="accent1">
-                <a:lumMod val="75000"/>
-              </a:schemeClr>
-            </a:solidFill>
-          </a:ln>
-        </p:spPr>
-        <p:style>
-          <a:lnRef idx="2">
-            <a:schemeClr val="accent1">
-              <a:shade val="50000"/>
-            </a:schemeClr>
-          </a:lnRef>
-          <a:fillRef idx="1">
-            <a:schemeClr val="accent1"/>
-          </a:fillRef>
-          <a:effectRef idx="0">
-            <a:schemeClr val="accent1"/>
-          </a:effectRef>
-          <a:fontRef idx="minor">
-            <a:schemeClr val="lt1"/>
-          </a:fontRef>
-        </p:style>
-        <p:txBody>
-          <a:bodyPr rtlCol="0" anchor="ctr"/>
-          <a:lstStyle/>
-          <a:p>
-            <a:pPr algn="ctr"/>
-            <a:r>
-              <a:rPr lang="en-US" b="1" dirty="0" err="1">
-                <a:solidFill>
-                  <a:schemeClr val="tx1"/>
-                </a:solidFill>
-              </a:rPr>
-              <a:t>study:Subject</a:t>
-            </a:r>
-            <a:endParaRPr lang="en-US" dirty="0">
-              <a:solidFill>
-                <a:schemeClr val="bg1">
-                  <a:lumMod val="50000"/>
-                </a:schemeClr>
-              </a:solidFill>
-            </a:endParaRPr>
-          </a:p>
-        </p:txBody>
-      </p:sp>
-      <p:sp>
-        <p:nvSpPr>
-          <p:cNvPr id="19" name="Rectangle: Rounded Corners 18">
-            <a:extLst>
-              <a:ext uri="{FF2B5EF4-FFF2-40B4-BE49-F238E27FC236}">
-                <a16:creationId xmlns:a16="http://schemas.microsoft.com/office/drawing/2014/main" id="{1A2C1608-A407-426E-907C-FD5043DF9366}"/>
-              </a:ext>
-            </a:extLst>
-          </p:cNvPr>
-          <p:cNvSpPr/>
-          <p:nvPr/>
-        </p:nvSpPr>
-        <p:spPr>
-          <a:xfrm>
-            <a:off x="3925218" y="3473004"/>
-            <a:ext cx="3154680" cy="457001"/>
+            <a:off x="2350829" y="2388160"/>
+            <a:ext cx="2743200" cy="457001"/>
           </a:xfrm>
           <a:prstGeom prst="roundRect">
             <a:avLst/>
@@ -9746,8 +9676,8 @@
         </p:nvSpPr>
         <p:spPr>
           <a:xfrm>
-            <a:off x="5935446" y="2774728"/>
-            <a:ext cx="3317412" cy="457001"/>
+            <a:off x="5392452" y="3403799"/>
+            <a:ext cx="2743200" cy="457001"/>
           </a:xfrm>
           <a:prstGeom prst="roundRect">
             <a:avLst/>
@@ -9808,94 +9738,26 @@
           </a:p>
         </p:txBody>
       </p:sp>
-      <p:sp>
-        <p:nvSpPr>
-          <p:cNvPr id="22" name="Rectangle: Rounded Corners 21">
-            <a:extLst>
-              <a:ext uri="{FF2B5EF4-FFF2-40B4-BE49-F238E27FC236}">
-                <a16:creationId xmlns:a16="http://schemas.microsoft.com/office/drawing/2014/main" id="{730C2E2E-7644-4198-9FC8-2000D81E3B1C}"/>
-              </a:ext>
-            </a:extLst>
-          </p:cNvPr>
-          <p:cNvSpPr/>
-          <p:nvPr/>
-        </p:nvSpPr>
-        <p:spPr>
-          <a:xfrm>
-            <a:off x="3925217" y="2076452"/>
-            <a:ext cx="3154680" cy="457001"/>
-          </a:xfrm>
-          <a:prstGeom prst="roundRect">
-            <a:avLst/>
-          </a:prstGeom>
-          <a:solidFill>
-            <a:srgbClr val="E4ECF8"/>
-          </a:solidFill>
-          <a:ln w="38100">
-            <a:solidFill>
-              <a:schemeClr val="accent1">
-                <a:lumMod val="75000"/>
-              </a:schemeClr>
-            </a:solidFill>
-          </a:ln>
-        </p:spPr>
-        <p:style>
-          <a:lnRef idx="2">
-            <a:schemeClr val="accent1">
-              <a:shade val="50000"/>
-            </a:schemeClr>
-          </a:lnRef>
-          <a:fillRef idx="1">
-            <a:schemeClr val="accent1"/>
-          </a:fillRef>
-          <a:effectRef idx="0">
-            <a:schemeClr val="accent1"/>
-          </a:effectRef>
-          <a:fontRef idx="minor">
-            <a:schemeClr val="lt1"/>
-          </a:fontRef>
-        </p:style>
-        <p:txBody>
-          <a:bodyPr rtlCol="0" anchor="ctr"/>
-          <a:lstStyle/>
-          <a:p>
-            <a:pPr algn="ctr"/>
-            <a:r>
-              <a:rPr lang="en-US" b="1" dirty="0" err="1">
-                <a:solidFill>
-                  <a:schemeClr val="tx1"/>
-                </a:solidFill>
-              </a:rPr>
-              <a:t>study:AnimalSubject</a:t>
-            </a:r>
-            <a:endParaRPr lang="en-US" b="1" dirty="0">
-              <a:solidFill>
-                <a:schemeClr val="tx1"/>
-              </a:solidFill>
-            </a:endParaRPr>
-          </a:p>
-        </p:txBody>
-      </p:sp>
       <p:cxnSp>
         <p:nvCxnSpPr>
-          <p:cNvPr id="29" name="Connector: Elbow 28">
-            <a:extLst>
-              <a:ext uri="{FF2B5EF4-FFF2-40B4-BE49-F238E27FC236}">
-                <a16:creationId xmlns:a16="http://schemas.microsoft.com/office/drawing/2014/main" id="{B595185C-F242-454F-B004-8D58BB67D373}"/>
+          <p:cNvPr id="38" name="Connector: Elbow 37">
+            <a:extLst>
+              <a:ext uri="{FF2B5EF4-FFF2-40B4-BE49-F238E27FC236}">
+                <a16:creationId xmlns:a16="http://schemas.microsoft.com/office/drawing/2014/main" id="{9009E932-C6B9-49B6-9F6E-27689BA0E87C}"/>
               </a:ext>
             </a:extLst>
           </p:cNvPr>
           <p:cNvCxnSpPr>
             <a:cxnSpLocks/>
-            <a:stCxn id="45" idx="2"/>
-            <a:endCxn id="19" idx="1"/>
+            <a:stCxn id="45" idx="1"/>
+            <a:endCxn id="19" idx="0"/>
           </p:cNvCxnSpPr>
           <p:nvPr/>
         </p:nvCxnSpPr>
         <p:spPr>
-          <a:xfrm rot="16200000" flipH="1">
-            <a:off x="2665682" y="2441969"/>
-            <a:ext cx="1912012" cy="607059"/>
+          <a:xfrm rot="10800000" flipV="1">
+            <a:off x="3722429" y="1648078"/>
+            <a:ext cx="636716" cy="740081"/>
           </a:xfrm>
           <a:prstGeom prst="bentConnector2">
             <a:avLst/>
@@ -9904,102 +9766,6 @@
             <a:solidFill>
               <a:schemeClr val="bg1">
                 <a:lumMod val="75000"/>
-              </a:schemeClr>
-            </a:solidFill>
-            <a:tailEnd type="triangle"/>
-          </a:ln>
-        </p:spPr>
-        <p:style>
-          <a:lnRef idx="1">
-            <a:schemeClr val="accent1"/>
-          </a:lnRef>
-          <a:fillRef idx="0">
-            <a:schemeClr val="accent1"/>
-          </a:fillRef>
-          <a:effectRef idx="0">
-            <a:schemeClr val="accent1"/>
-          </a:effectRef>
-          <a:fontRef idx="minor">
-            <a:schemeClr val="tx1"/>
-          </a:fontRef>
-        </p:style>
-      </p:cxnSp>
-      <p:cxnSp>
-        <p:nvCxnSpPr>
-          <p:cNvPr id="35" name="Connector: Elbow 34">
-            <a:extLst>
-              <a:ext uri="{FF2B5EF4-FFF2-40B4-BE49-F238E27FC236}">
-                <a16:creationId xmlns:a16="http://schemas.microsoft.com/office/drawing/2014/main" id="{077E5DA3-509A-4D16-841F-AE7F8CEE6CAF}"/>
-              </a:ext>
-            </a:extLst>
-          </p:cNvPr>
-          <p:cNvCxnSpPr>
-            <a:cxnSpLocks/>
-            <a:stCxn id="22" idx="2"/>
-            <a:endCxn id="21" idx="1"/>
-          </p:cNvCxnSpPr>
-          <p:nvPr/>
-        </p:nvCxnSpPr>
-        <p:spPr>
-          <a:xfrm rot="16200000" flipH="1">
-            <a:off x="5484113" y="2551896"/>
-            <a:ext cx="469776" cy="432889"/>
-          </a:xfrm>
-          <a:prstGeom prst="bentConnector2">
-            <a:avLst/>
-          </a:prstGeom>
-          <a:ln w="38100">
-            <a:solidFill>
-              <a:schemeClr val="bg1">
-                <a:lumMod val="75000"/>
-              </a:schemeClr>
-            </a:solidFill>
-            <a:tailEnd type="triangle"/>
-          </a:ln>
-        </p:spPr>
-        <p:style>
-          <a:lnRef idx="1">
-            <a:schemeClr val="accent1"/>
-          </a:lnRef>
-          <a:fillRef idx="0">
-            <a:schemeClr val="accent1"/>
-          </a:fillRef>
-          <a:effectRef idx="0">
-            <a:schemeClr val="accent1"/>
-          </a:effectRef>
-          <a:fontRef idx="minor">
-            <a:schemeClr val="tx1"/>
-          </a:fontRef>
-        </p:style>
-      </p:cxnSp>
-      <p:cxnSp>
-        <p:nvCxnSpPr>
-          <p:cNvPr id="38" name="Connector: Elbow 37">
-            <a:extLst>
-              <a:ext uri="{FF2B5EF4-FFF2-40B4-BE49-F238E27FC236}">
-                <a16:creationId xmlns:a16="http://schemas.microsoft.com/office/drawing/2014/main" id="{9009E932-C6B9-49B6-9F6E-27689BA0E87C}"/>
-              </a:ext>
-            </a:extLst>
-          </p:cNvPr>
-          <p:cNvCxnSpPr>
-            <a:cxnSpLocks/>
-            <a:stCxn id="45" idx="2"/>
-            <a:endCxn id="22" idx="1"/>
-          </p:cNvCxnSpPr>
-          <p:nvPr/>
-        </p:nvCxnSpPr>
-        <p:spPr>
-          <a:xfrm rot="16200000" flipH="1">
-            <a:off x="3363958" y="1743694"/>
-            <a:ext cx="515460" cy="607058"/>
-          </a:xfrm>
-          <a:prstGeom prst="bentConnector2">
-            <a:avLst/>
-          </a:prstGeom>
-          <a:ln w="38100">
-            <a:solidFill>
-              <a:schemeClr val="bg1">
-                <a:lumMod val="50000"/>
               </a:schemeClr>
             </a:solidFill>
             <a:tailEnd type="triangle"/>
@@ -10131,8 +9897,8 @@
         </p:nvSpPr>
         <p:spPr>
           <a:xfrm>
-            <a:off x="5935446" y="4171279"/>
-            <a:ext cx="3317412" cy="457001"/>
+            <a:off x="2350829" y="3403799"/>
+            <a:ext cx="2743200" cy="457001"/>
           </a:xfrm>
           <a:prstGeom prst="roundRect">
             <a:avLst/>
@@ -10180,7 +9946,7 @@
                   </a:schemeClr>
                 </a:solidFill>
               </a:rPr>
-              <a:t>study:AnimalStudySubject</a:t>
+              <a:t>study:HumanStudySubject</a:t>
             </a:r>
             <a:endParaRPr lang="en-US" b="1" dirty="0">
               <a:solidFill>
@@ -10193,26 +9959,220 @@
           </a:p>
         </p:txBody>
       </p:sp>
+      <p:sp>
+        <p:nvSpPr>
+          <p:cNvPr id="13" name="Rectangle: Rounded Corners 12">
+            <a:extLst>
+              <a:ext uri="{FF2B5EF4-FFF2-40B4-BE49-F238E27FC236}">
+                <a16:creationId xmlns:a16="http://schemas.microsoft.com/office/drawing/2014/main" id="{F459D007-AF0D-4991-87DF-7CF44E478352}"/>
+              </a:ext>
+            </a:extLst>
+          </p:cNvPr>
+          <p:cNvSpPr/>
+          <p:nvPr/>
+        </p:nvSpPr>
+        <p:spPr>
+          <a:xfrm>
+            <a:off x="7591824" y="1419578"/>
+            <a:ext cx="1828800" cy="457001"/>
+          </a:xfrm>
+          <a:prstGeom prst="roundRect">
+            <a:avLst/>
+          </a:prstGeom>
+          <a:solidFill>
+            <a:srgbClr val="E4ECF8"/>
+          </a:solidFill>
+          <a:ln w="38100">
+            <a:solidFill>
+              <a:schemeClr val="accent1">
+                <a:lumMod val="75000"/>
+              </a:schemeClr>
+            </a:solidFill>
+          </a:ln>
+        </p:spPr>
+        <p:style>
+          <a:lnRef idx="2">
+            <a:schemeClr val="accent1">
+              <a:shade val="50000"/>
+            </a:schemeClr>
+          </a:lnRef>
+          <a:fillRef idx="1">
+            <a:schemeClr val="accent1"/>
+          </a:fillRef>
+          <a:effectRef idx="0">
+            <a:schemeClr val="accent1"/>
+          </a:effectRef>
+          <a:fontRef idx="minor">
+            <a:schemeClr val="lt1"/>
+          </a:fontRef>
+        </p:style>
+        <p:txBody>
+          <a:bodyPr rtlCol="0" anchor="ctr"/>
+          <a:lstStyle/>
+          <a:p>
+            <a:pPr algn="ctr"/>
+            <a:r>
+              <a:rPr lang="en-US" b="1" dirty="0" err="1">
+                <a:solidFill>
+                  <a:schemeClr val="tx1"/>
+                </a:solidFill>
+              </a:rPr>
+              <a:t>study:Animal</a:t>
+            </a:r>
+            <a:endParaRPr lang="en-US" dirty="0">
+              <a:solidFill>
+                <a:schemeClr val="bg1">
+                  <a:lumMod val="50000"/>
+                </a:schemeClr>
+              </a:solidFill>
+            </a:endParaRPr>
+          </a:p>
+        </p:txBody>
+      </p:sp>
       <p:cxnSp>
         <p:nvCxnSpPr>
-          <p:cNvPr id="49" name="Connector: Elbow 48">
-            <a:extLst>
-              <a:ext uri="{FF2B5EF4-FFF2-40B4-BE49-F238E27FC236}">
-                <a16:creationId xmlns:a16="http://schemas.microsoft.com/office/drawing/2014/main" id="{9A2BC915-6F83-44EC-BA3C-A508E6A73D45}"/>
+          <p:cNvPr id="14" name="Connector: Elbow 13">
+            <a:extLst>
+              <a:ext uri="{FF2B5EF4-FFF2-40B4-BE49-F238E27FC236}">
+                <a16:creationId xmlns:a16="http://schemas.microsoft.com/office/drawing/2014/main" id="{E6147DE9-6841-45C5-83B0-4D1CAD973F2D}"/>
               </a:ext>
             </a:extLst>
           </p:cNvPr>
           <p:cNvCxnSpPr>
             <a:cxnSpLocks/>
-            <a:stCxn id="19" idx="2"/>
-            <a:endCxn id="48" idx="1"/>
+            <a:stCxn id="13" idx="2"/>
+            <a:endCxn id="22" idx="3"/>
           </p:cNvCxnSpPr>
           <p:nvPr/>
         </p:nvCxnSpPr>
         <p:spPr>
+          <a:xfrm rot="5400000">
+            <a:off x="7950897" y="2061334"/>
+            <a:ext cx="740082" cy="370572"/>
+          </a:xfrm>
+          <a:prstGeom prst="bentConnector2">
+            <a:avLst/>
+          </a:prstGeom>
+          <a:ln w="38100">
+            <a:solidFill>
+              <a:schemeClr val="bg1">
+                <a:lumMod val="50000"/>
+              </a:schemeClr>
+            </a:solidFill>
+            <a:tailEnd type="triangle"/>
+          </a:ln>
+        </p:spPr>
+        <p:style>
+          <a:lnRef idx="1">
+            <a:schemeClr val="accent1"/>
+          </a:lnRef>
+          <a:fillRef idx="0">
+            <a:schemeClr val="accent1"/>
+          </a:fillRef>
+          <a:effectRef idx="0">
+            <a:schemeClr val="accent1"/>
+          </a:effectRef>
+          <a:fontRef idx="minor">
+            <a:schemeClr val="tx1"/>
+          </a:fontRef>
+        </p:style>
+      </p:cxnSp>
+      <p:sp>
+        <p:nvSpPr>
+          <p:cNvPr id="18" name="Rectangle: Rounded Corners 17">
+            <a:extLst>
+              <a:ext uri="{FF2B5EF4-FFF2-40B4-BE49-F238E27FC236}">
+                <a16:creationId xmlns:a16="http://schemas.microsoft.com/office/drawing/2014/main" id="{F92963CC-E0B2-429E-A830-F8A8175A644F}"/>
+              </a:ext>
+            </a:extLst>
+          </p:cNvPr>
+          <p:cNvSpPr/>
+          <p:nvPr/>
+        </p:nvSpPr>
+        <p:spPr>
+          <a:xfrm>
+            <a:off x="1058226" y="1419578"/>
+            <a:ext cx="1828800" cy="457001"/>
+          </a:xfrm>
+          <a:prstGeom prst="roundRect">
+            <a:avLst/>
+          </a:prstGeom>
+          <a:solidFill>
+            <a:schemeClr val="bg1">
+              <a:lumMod val="95000"/>
+            </a:schemeClr>
+          </a:solidFill>
+          <a:ln w="38100">
+            <a:solidFill>
+              <a:schemeClr val="bg1">
+                <a:lumMod val="65000"/>
+              </a:schemeClr>
+            </a:solidFill>
+          </a:ln>
+        </p:spPr>
+        <p:style>
+          <a:lnRef idx="2">
+            <a:schemeClr val="accent1">
+              <a:shade val="50000"/>
+            </a:schemeClr>
+          </a:lnRef>
+          <a:fillRef idx="1">
+            <a:schemeClr val="accent1"/>
+          </a:fillRef>
+          <a:effectRef idx="0">
+            <a:schemeClr val="accent1"/>
+          </a:effectRef>
+          <a:fontRef idx="minor">
+            <a:schemeClr val="lt1"/>
+          </a:fontRef>
+        </p:style>
+        <p:txBody>
+          <a:bodyPr rtlCol="0" anchor="ctr"/>
+          <a:lstStyle/>
+          <a:p>
+            <a:pPr algn="ctr"/>
+            <a:r>
+              <a:rPr lang="en-US" b="1" dirty="0" err="1">
+                <a:solidFill>
+                  <a:schemeClr val="tx1">
+                    <a:lumMod val="50000"/>
+                    <a:lumOff val="50000"/>
+                  </a:schemeClr>
+                </a:solidFill>
+              </a:rPr>
+              <a:t>study:Person</a:t>
+            </a:r>
+            <a:endParaRPr lang="en-US" b="1" dirty="0">
+              <a:solidFill>
+                <a:schemeClr val="tx1">
+                  <a:lumMod val="50000"/>
+                  <a:lumOff val="50000"/>
+                </a:schemeClr>
+              </a:solidFill>
+            </a:endParaRPr>
+          </a:p>
+        </p:txBody>
+      </p:sp>
+      <p:cxnSp>
+        <p:nvCxnSpPr>
+          <p:cNvPr id="23" name="Connector: Elbow 22">
+            <a:extLst>
+              <a:ext uri="{FF2B5EF4-FFF2-40B4-BE49-F238E27FC236}">
+                <a16:creationId xmlns:a16="http://schemas.microsoft.com/office/drawing/2014/main" id="{0EF4034D-EB2A-45E3-B3A7-A87D9877D19F}"/>
+              </a:ext>
+            </a:extLst>
+          </p:cNvPr>
+          <p:cNvCxnSpPr>
+            <a:cxnSpLocks/>
+            <a:stCxn id="18" idx="2"/>
+            <a:endCxn id="19" idx="1"/>
+          </p:cNvCxnSpPr>
+          <p:nvPr/>
+        </p:nvCxnSpPr>
+        <p:spPr>
           <a:xfrm rot="16200000" flipH="1">
-            <a:off x="5484115" y="3948448"/>
-            <a:ext cx="469775" cy="432888"/>
+            <a:off x="1791686" y="2057518"/>
+            <a:ext cx="740082" cy="378203"/>
           </a:xfrm>
           <a:prstGeom prst="bentConnector2">
             <a:avLst/>
@@ -10241,6 +10201,357 @@
           </a:fontRef>
         </p:style>
       </p:cxnSp>
+      <p:cxnSp>
+        <p:nvCxnSpPr>
+          <p:cNvPr id="32" name="Connector: Elbow 31">
+            <a:extLst>
+              <a:ext uri="{FF2B5EF4-FFF2-40B4-BE49-F238E27FC236}">
+                <a16:creationId xmlns:a16="http://schemas.microsoft.com/office/drawing/2014/main" id="{FE643412-7A2A-4722-ACDE-62E0B1C9A8F2}"/>
+              </a:ext>
+            </a:extLst>
+          </p:cNvPr>
+          <p:cNvCxnSpPr>
+            <a:cxnSpLocks/>
+            <a:stCxn id="45" idx="3"/>
+            <a:endCxn id="22" idx="0"/>
+          </p:cNvCxnSpPr>
+          <p:nvPr/>
+        </p:nvCxnSpPr>
+        <p:spPr>
+          <a:xfrm>
+            <a:off x="6187945" y="1648079"/>
+            <a:ext cx="576107" cy="740081"/>
+          </a:xfrm>
+          <a:prstGeom prst="bentConnector2">
+            <a:avLst/>
+          </a:prstGeom>
+          <a:ln w="38100">
+            <a:solidFill>
+              <a:schemeClr val="bg1">
+                <a:lumMod val="50000"/>
+              </a:schemeClr>
+            </a:solidFill>
+            <a:tailEnd type="triangle"/>
+          </a:ln>
+        </p:spPr>
+        <p:style>
+          <a:lnRef idx="1">
+            <a:schemeClr val="accent1"/>
+          </a:lnRef>
+          <a:fillRef idx="0">
+            <a:schemeClr val="accent1"/>
+          </a:fillRef>
+          <a:effectRef idx="0">
+            <a:schemeClr val="accent1"/>
+          </a:effectRef>
+          <a:fontRef idx="minor">
+            <a:schemeClr val="tx1"/>
+          </a:fontRef>
+        </p:style>
+      </p:cxnSp>
+      <p:cxnSp>
+        <p:nvCxnSpPr>
+          <p:cNvPr id="52" name="Straight Arrow Connector 51">
+            <a:extLst>
+              <a:ext uri="{FF2B5EF4-FFF2-40B4-BE49-F238E27FC236}">
+                <a16:creationId xmlns:a16="http://schemas.microsoft.com/office/drawing/2014/main" id="{F6588316-79CE-4399-918C-582531FCD7AE}"/>
+              </a:ext>
+            </a:extLst>
+          </p:cNvPr>
+          <p:cNvCxnSpPr>
+            <a:stCxn id="19" idx="2"/>
+            <a:endCxn id="48" idx="0"/>
+          </p:cNvCxnSpPr>
+          <p:nvPr/>
+        </p:nvCxnSpPr>
+        <p:spPr>
+          <a:xfrm>
+            <a:off x="3722429" y="2845161"/>
+            <a:ext cx="0" cy="558638"/>
+          </a:xfrm>
+          <a:prstGeom prst="straightConnector1">
+            <a:avLst/>
+          </a:prstGeom>
+          <a:ln w="38100">
+            <a:solidFill>
+              <a:schemeClr val="bg1">
+                <a:lumMod val="75000"/>
+              </a:schemeClr>
+            </a:solidFill>
+            <a:tailEnd type="triangle"/>
+          </a:ln>
+        </p:spPr>
+        <p:style>
+          <a:lnRef idx="1">
+            <a:schemeClr val="accent1"/>
+          </a:lnRef>
+          <a:fillRef idx="0">
+            <a:schemeClr val="accent1"/>
+          </a:fillRef>
+          <a:effectRef idx="0">
+            <a:schemeClr val="accent1"/>
+          </a:effectRef>
+          <a:fontRef idx="minor">
+            <a:schemeClr val="tx1"/>
+          </a:fontRef>
+        </p:style>
+      </p:cxnSp>
+      <p:cxnSp>
+        <p:nvCxnSpPr>
+          <p:cNvPr id="53" name="Straight Arrow Connector 52">
+            <a:extLst>
+              <a:ext uri="{FF2B5EF4-FFF2-40B4-BE49-F238E27FC236}">
+                <a16:creationId xmlns:a16="http://schemas.microsoft.com/office/drawing/2014/main" id="{8AAD4FF1-ADAD-48B4-84FF-5F018684A1DC}"/>
+              </a:ext>
+            </a:extLst>
+          </p:cNvPr>
+          <p:cNvCxnSpPr>
+            <a:cxnSpLocks/>
+            <a:stCxn id="22" idx="2"/>
+            <a:endCxn id="21" idx="0"/>
+          </p:cNvCxnSpPr>
+          <p:nvPr/>
+        </p:nvCxnSpPr>
+        <p:spPr>
+          <a:xfrm>
+            <a:off x="6764052" y="2845161"/>
+            <a:ext cx="0" cy="558638"/>
+          </a:xfrm>
+          <a:prstGeom prst="straightConnector1">
+            <a:avLst/>
+          </a:prstGeom>
+          <a:ln w="38100">
+            <a:solidFill>
+              <a:schemeClr val="bg1">
+                <a:lumMod val="75000"/>
+              </a:schemeClr>
+            </a:solidFill>
+            <a:tailEnd type="triangle"/>
+          </a:ln>
+        </p:spPr>
+        <p:style>
+          <a:lnRef idx="1">
+            <a:schemeClr val="accent1"/>
+          </a:lnRef>
+          <a:fillRef idx="0">
+            <a:schemeClr val="accent1"/>
+          </a:fillRef>
+          <a:effectRef idx="0">
+            <a:schemeClr val="accent1"/>
+          </a:effectRef>
+          <a:fontRef idx="minor">
+            <a:schemeClr val="tx1"/>
+          </a:fontRef>
+        </p:style>
+      </p:cxnSp>
+      <p:sp>
+        <p:nvSpPr>
+          <p:cNvPr id="45" name="Rectangle: Rounded Corners 44">
+            <a:extLst>
+              <a:ext uri="{FF2B5EF4-FFF2-40B4-BE49-F238E27FC236}">
+                <a16:creationId xmlns:a16="http://schemas.microsoft.com/office/drawing/2014/main" id="{B9A69A35-10B3-4874-B928-C93C5AEC02C5}"/>
+              </a:ext>
+            </a:extLst>
+          </p:cNvPr>
+          <p:cNvSpPr/>
+          <p:nvPr/>
+        </p:nvSpPr>
+        <p:spPr>
+          <a:xfrm>
+            <a:off x="4359145" y="1419578"/>
+            <a:ext cx="1828800" cy="457001"/>
+          </a:xfrm>
+          <a:prstGeom prst="roundRect">
+            <a:avLst/>
+          </a:prstGeom>
+          <a:solidFill>
+            <a:srgbClr val="E4ECF8"/>
+          </a:solidFill>
+          <a:ln w="38100">
+            <a:solidFill>
+              <a:schemeClr val="accent1">
+                <a:lumMod val="75000"/>
+              </a:schemeClr>
+            </a:solidFill>
+          </a:ln>
+        </p:spPr>
+        <p:style>
+          <a:lnRef idx="2">
+            <a:schemeClr val="accent1">
+              <a:shade val="50000"/>
+            </a:schemeClr>
+          </a:lnRef>
+          <a:fillRef idx="1">
+            <a:schemeClr val="accent1"/>
+          </a:fillRef>
+          <a:effectRef idx="0">
+            <a:schemeClr val="accent1"/>
+          </a:effectRef>
+          <a:fontRef idx="minor">
+            <a:schemeClr val="lt1"/>
+          </a:fontRef>
+        </p:style>
+        <p:txBody>
+          <a:bodyPr rtlCol="0" anchor="ctr"/>
+          <a:lstStyle/>
+          <a:p>
+            <a:pPr algn="ctr"/>
+            <a:r>
+              <a:rPr lang="en-US" b="1" dirty="0" err="1">
+                <a:solidFill>
+                  <a:schemeClr val="tx1"/>
+                </a:solidFill>
+              </a:rPr>
+              <a:t>study:Subject</a:t>
+            </a:r>
+            <a:endParaRPr lang="en-US" dirty="0">
+              <a:solidFill>
+                <a:schemeClr val="bg1">
+                  <a:lumMod val="50000"/>
+                </a:schemeClr>
+              </a:solidFill>
+            </a:endParaRPr>
+          </a:p>
+        </p:txBody>
+      </p:sp>
+      <p:sp>
+        <p:nvSpPr>
+          <p:cNvPr id="22" name="Rectangle: Rounded Corners 21">
+            <a:extLst>
+              <a:ext uri="{FF2B5EF4-FFF2-40B4-BE49-F238E27FC236}">
+                <a16:creationId xmlns:a16="http://schemas.microsoft.com/office/drawing/2014/main" id="{730C2E2E-7644-4198-9FC8-2000D81E3B1C}"/>
+              </a:ext>
+            </a:extLst>
+          </p:cNvPr>
+          <p:cNvSpPr/>
+          <p:nvPr/>
+        </p:nvSpPr>
+        <p:spPr>
+          <a:xfrm>
+            <a:off x="5392452" y="2388160"/>
+            <a:ext cx="2743200" cy="457001"/>
+          </a:xfrm>
+          <a:prstGeom prst="roundRect">
+            <a:avLst/>
+          </a:prstGeom>
+          <a:solidFill>
+            <a:srgbClr val="E4ECF8"/>
+          </a:solidFill>
+          <a:ln w="38100">
+            <a:solidFill>
+              <a:schemeClr val="accent1">
+                <a:lumMod val="75000"/>
+              </a:schemeClr>
+            </a:solidFill>
+          </a:ln>
+        </p:spPr>
+        <p:style>
+          <a:lnRef idx="2">
+            <a:schemeClr val="accent1">
+              <a:shade val="50000"/>
+            </a:schemeClr>
+          </a:lnRef>
+          <a:fillRef idx="1">
+            <a:schemeClr val="accent1"/>
+          </a:fillRef>
+          <a:effectRef idx="0">
+            <a:schemeClr val="accent1"/>
+          </a:effectRef>
+          <a:fontRef idx="minor">
+            <a:schemeClr val="lt1"/>
+          </a:fontRef>
+        </p:style>
+        <p:txBody>
+          <a:bodyPr rtlCol="0" anchor="ctr"/>
+          <a:lstStyle/>
+          <a:p>
+            <a:pPr algn="ctr"/>
+            <a:r>
+              <a:rPr lang="en-US" b="1" dirty="0" err="1">
+                <a:solidFill>
+                  <a:schemeClr val="tx1"/>
+                </a:solidFill>
+              </a:rPr>
+              <a:t>study:AnimalSubject</a:t>
+            </a:r>
+            <a:endParaRPr lang="en-US" b="1" dirty="0">
+              <a:solidFill>
+                <a:schemeClr val="tx1"/>
+              </a:solidFill>
+            </a:endParaRPr>
+          </a:p>
+        </p:txBody>
+      </p:sp>
+      <p:sp>
+        <p:nvSpPr>
+          <p:cNvPr id="60" name="TextBox 59">
+            <a:extLst>
+              <a:ext uri="{FF2B5EF4-FFF2-40B4-BE49-F238E27FC236}">
+                <a16:creationId xmlns:a16="http://schemas.microsoft.com/office/drawing/2014/main" id="{7589D76B-B4BC-47DC-A225-8FF55D1C25F8}"/>
+              </a:ext>
+            </a:extLst>
+          </p:cNvPr>
+          <p:cNvSpPr txBox="1"/>
+          <p:nvPr/>
+        </p:nvSpPr>
+        <p:spPr>
+          <a:xfrm>
+            <a:off x="8846024" y="2415654"/>
+            <a:ext cx="958917" cy="369332"/>
+          </a:xfrm>
+          <a:prstGeom prst="rect">
+            <a:avLst/>
+          </a:prstGeom>
+          <a:noFill/>
+        </p:spPr>
+        <p:txBody>
+          <a:bodyPr wrap="none" rtlCol="0">
+            <a:spAutoFit/>
+          </a:bodyPr>
+          <a:lstStyle/>
+          <a:p>
+            <a:r>
+              <a:rPr lang="en-US" i="1" dirty="0"/>
+              <a:t>subclass</a:t>
+            </a:r>
+          </a:p>
+        </p:txBody>
+      </p:sp>
+      <p:sp>
+        <p:nvSpPr>
+          <p:cNvPr id="61" name="TextBox 60">
+            <a:extLst>
+              <a:ext uri="{FF2B5EF4-FFF2-40B4-BE49-F238E27FC236}">
+                <a16:creationId xmlns:a16="http://schemas.microsoft.com/office/drawing/2014/main" id="{E12BDFAE-7126-4CC9-ABEC-2B2A8A0926BB}"/>
+              </a:ext>
+            </a:extLst>
+          </p:cNvPr>
+          <p:cNvSpPr txBox="1"/>
+          <p:nvPr/>
+        </p:nvSpPr>
+        <p:spPr>
+          <a:xfrm>
+            <a:off x="8846024" y="3414215"/>
+            <a:ext cx="958917" cy="369332"/>
+          </a:xfrm>
+          <a:prstGeom prst="rect">
+            <a:avLst/>
+          </a:prstGeom>
+          <a:noFill/>
+        </p:spPr>
+        <p:txBody>
+          <a:bodyPr wrap="none" rtlCol="0">
+            <a:spAutoFit/>
+          </a:bodyPr>
+          <a:lstStyle/>
+          <a:p>
+            <a:r>
+              <a:rPr lang="en-US" i="1" dirty="0"/>
+              <a:t>subclass</a:t>
+            </a:r>
+          </a:p>
+        </p:txBody>
+      </p:sp>
     </p:spTree>
     <p:extLst>
       <p:ext uri="{BB962C8B-B14F-4D97-AF65-F5344CB8AC3E}">
@@ -10296,6 +10607,7 @@
                 <a:lumMod val="65000"/>
               </a:schemeClr>
             </a:solidFill>
+            <a:prstDash val="sysDash"/>
           </a:ln>
         </p:spPr>
         <p:style>
@@ -10390,10 +10702,10 @@
       </p:cxnSp>
       <p:sp>
         <p:nvSpPr>
-          <p:cNvPr id="45" name="Rectangle: Rounded Corners 44">
-            <a:extLst>
-              <a:ext uri="{FF2B5EF4-FFF2-40B4-BE49-F238E27FC236}">
-                <a16:creationId xmlns:a16="http://schemas.microsoft.com/office/drawing/2014/main" id="{B9A69A35-10B3-4874-B928-C93C5AEC02C5}"/>
+          <p:cNvPr id="19" name="Rectangle: Rounded Corners 18">
+            <a:extLst>
+              <a:ext uri="{FF2B5EF4-FFF2-40B4-BE49-F238E27FC236}">
+                <a16:creationId xmlns:a16="http://schemas.microsoft.com/office/drawing/2014/main" id="{1A2C1608-A407-426E-907C-FD5043DF9366}"/>
               </a:ext>
             </a:extLst>
           </p:cNvPr>
@@ -10402,78 +10714,8 @@
         </p:nvSpPr>
         <p:spPr>
           <a:xfrm>
-            <a:off x="1740819" y="1332492"/>
-            <a:ext cx="3154680" cy="457001"/>
-          </a:xfrm>
-          <a:prstGeom prst="roundRect">
-            <a:avLst/>
-          </a:prstGeom>
-          <a:solidFill>
-            <a:srgbClr val="E4ECF8"/>
-          </a:solidFill>
-          <a:ln w="38100">
-            <a:solidFill>
-              <a:schemeClr val="accent1">
-                <a:lumMod val="75000"/>
-              </a:schemeClr>
-            </a:solidFill>
-          </a:ln>
-        </p:spPr>
-        <p:style>
-          <a:lnRef idx="2">
-            <a:schemeClr val="accent1">
-              <a:shade val="50000"/>
-            </a:schemeClr>
-          </a:lnRef>
-          <a:fillRef idx="1">
-            <a:schemeClr val="accent1"/>
-          </a:fillRef>
-          <a:effectRef idx="0">
-            <a:schemeClr val="accent1"/>
-          </a:effectRef>
-          <a:fontRef idx="minor">
-            <a:schemeClr val="lt1"/>
-          </a:fontRef>
-        </p:style>
-        <p:txBody>
-          <a:bodyPr rtlCol="0" anchor="ctr"/>
-          <a:lstStyle/>
-          <a:p>
-            <a:pPr algn="ctr"/>
-            <a:r>
-              <a:rPr lang="en-US" b="1" dirty="0" err="1">
-                <a:solidFill>
-                  <a:schemeClr val="tx1"/>
-                </a:solidFill>
-              </a:rPr>
-              <a:t>study:EntityInterval</a:t>
-            </a:r>
-            <a:endParaRPr lang="en-US" dirty="0">
-              <a:solidFill>
-                <a:schemeClr val="bg1">
-                  <a:lumMod val="50000"/>
-                </a:schemeClr>
-              </a:solidFill>
-            </a:endParaRPr>
-          </a:p>
-        </p:txBody>
-      </p:sp>
-      <p:sp>
-        <p:nvSpPr>
-          <p:cNvPr id="19" name="Rectangle: Rounded Corners 18">
-            <a:extLst>
-              <a:ext uri="{FF2B5EF4-FFF2-40B4-BE49-F238E27FC236}">
-                <a16:creationId xmlns:a16="http://schemas.microsoft.com/office/drawing/2014/main" id="{1A2C1608-A407-426E-907C-FD5043DF9366}"/>
-              </a:ext>
-            </a:extLst>
-          </p:cNvPr>
-          <p:cNvSpPr/>
-          <p:nvPr/>
-        </p:nvSpPr>
-        <p:spPr>
-          <a:xfrm>
-            <a:off x="3925217" y="2779151"/>
-            <a:ext cx="3154680" cy="457001"/>
+            <a:off x="3802383" y="2779151"/>
+            <a:ext cx="2743200" cy="457001"/>
           </a:xfrm>
           <a:prstGeom prst="roundRect">
             <a:avLst/>
@@ -10548,8 +10790,8 @@
         </p:nvSpPr>
         <p:spPr>
           <a:xfrm>
-            <a:off x="3925217" y="3481850"/>
-            <a:ext cx="3317412" cy="457001"/>
+            <a:off x="3802383" y="3481850"/>
+            <a:ext cx="3291840" cy="457001"/>
           </a:xfrm>
           <a:prstGeom prst="roundRect">
             <a:avLst/>
@@ -10624,8 +10866,8 @@
         </p:nvSpPr>
         <p:spPr>
           <a:xfrm>
-            <a:off x="3925217" y="2076452"/>
-            <a:ext cx="3154680" cy="457001"/>
+            <a:off x="3802383" y="2076452"/>
+            <a:ext cx="2743200" cy="457001"/>
           </a:xfrm>
           <a:prstGeom prst="roundRect">
             <a:avLst/>
@@ -10692,8 +10934,8 @@
         </p:nvSpPr>
         <p:spPr>
           <a:xfrm>
-            <a:off x="3925217" y="4184548"/>
-            <a:ext cx="3346440" cy="457001"/>
+            <a:off x="3802383" y="4184548"/>
+            <a:ext cx="3291840" cy="457001"/>
           </a:xfrm>
           <a:prstGeom prst="roundRect">
             <a:avLst/>
@@ -10772,8 +11014,8 @@
         </p:nvCxnSpPr>
         <p:spPr>
           <a:xfrm rot="16200000" flipH="1">
-            <a:off x="2661259" y="2446393"/>
-            <a:ext cx="1920858" cy="607058"/>
+            <a:off x="2382672" y="2290640"/>
+            <a:ext cx="1920858" cy="918564"/>
           </a:xfrm>
           <a:prstGeom prst="bentConnector2">
             <a:avLst/>
@@ -10820,8 +11062,8 @@
         </p:nvCxnSpPr>
         <p:spPr>
           <a:xfrm rot="16200000" flipH="1">
-            <a:off x="3012609" y="2095043"/>
-            <a:ext cx="1218159" cy="607058"/>
+            <a:off x="2734022" y="1939290"/>
+            <a:ext cx="1218159" cy="918564"/>
           </a:xfrm>
           <a:prstGeom prst="bentConnector2">
             <a:avLst/>
@@ -10868,8 +11110,8 @@
         </p:nvCxnSpPr>
         <p:spPr>
           <a:xfrm rot="16200000" flipH="1">
-            <a:off x="2309910" y="2797742"/>
-            <a:ext cx="2623556" cy="607058"/>
+            <a:off x="2031323" y="2641989"/>
+            <a:ext cx="2623556" cy="918564"/>
           </a:xfrm>
           <a:prstGeom prst="bentConnector2">
             <a:avLst/>
@@ -10916,8 +11158,8 @@
         </p:nvCxnSpPr>
         <p:spPr>
           <a:xfrm rot="16200000" flipH="1">
-            <a:off x="3363958" y="1743694"/>
-            <a:ext cx="515460" cy="607058"/>
+            <a:off x="3085371" y="1587941"/>
+            <a:ext cx="515460" cy="918564"/>
           </a:xfrm>
           <a:prstGeom prst="bentConnector2">
             <a:avLst/>
@@ -11024,6 +11266,200 @@
               <a:rPr lang="en-US" dirty="0"/>
               <a:t>EntityIntervalOWLStructure.PNG</a:t>
             </a:r>
+          </a:p>
+        </p:txBody>
+      </p:sp>
+      <p:sp>
+        <p:nvSpPr>
+          <p:cNvPr id="15" name="Rectangle: Rounded Corners 14">
+            <a:extLst>
+              <a:ext uri="{FF2B5EF4-FFF2-40B4-BE49-F238E27FC236}">
+                <a16:creationId xmlns:a16="http://schemas.microsoft.com/office/drawing/2014/main" id="{95648EF6-03A6-41AC-AC21-D7171E63D88A}"/>
+              </a:ext>
+            </a:extLst>
+          </p:cNvPr>
+          <p:cNvSpPr/>
+          <p:nvPr/>
+        </p:nvSpPr>
+        <p:spPr>
+          <a:xfrm>
+            <a:off x="1906867" y="4896832"/>
+            <a:ext cx="2286000" cy="457001"/>
+          </a:xfrm>
+          <a:prstGeom prst="roundRect">
+            <a:avLst/>
+          </a:prstGeom>
+          <a:solidFill>
+            <a:schemeClr val="bg1">
+              <a:lumMod val="95000"/>
+            </a:schemeClr>
+          </a:solidFill>
+          <a:ln w="38100">
+            <a:solidFill>
+              <a:schemeClr val="bg1">
+                <a:lumMod val="65000"/>
+              </a:schemeClr>
+            </a:solidFill>
+          </a:ln>
+        </p:spPr>
+        <p:style>
+          <a:lnRef idx="2">
+            <a:schemeClr val="accent1">
+              <a:shade val="50000"/>
+            </a:schemeClr>
+          </a:lnRef>
+          <a:fillRef idx="1">
+            <a:schemeClr val="accent1"/>
+          </a:fillRef>
+          <a:effectRef idx="0">
+            <a:schemeClr val="accent1"/>
+          </a:effectRef>
+          <a:fontRef idx="minor">
+            <a:schemeClr val="lt1"/>
+          </a:fontRef>
+        </p:style>
+        <p:txBody>
+          <a:bodyPr rtlCol="0" anchor="ctr"/>
+          <a:lstStyle/>
+          <a:p>
+            <a:pPr algn="ctr"/>
+            <a:r>
+              <a:rPr lang="en-US" b="1" dirty="0" err="1">
+                <a:solidFill>
+                  <a:schemeClr val="tx1">
+                    <a:lumMod val="50000"/>
+                    <a:lumOff val="50000"/>
+                  </a:schemeClr>
+                </a:solidFill>
+              </a:rPr>
+              <a:t>study:ActivityInterval</a:t>
+            </a:r>
+            <a:endParaRPr lang="en-US" b="1" dirty="0">
+              <a:solidFill>
+                <a:schemeClr val="tx1">
+                  <a:lumMod val="50000"/>
+                  <a:lumOff val="50000"/>
+                </a:schemeClr>
+              </a:solidFill>
+            </a:endParaRPr>
+          </a:p>
+        </p:txBody>
+      </p:sp>
+      <p:cxnSp>
+        <p:nvCxnSpPr>
+          <p:cNvPr id="16" name="Connector: Elbow 15">
+            <a:extLst>
+              <a:ext uri="{FF2B5EF4-FFF2-40B4-BE49-F238E27FC236}">
+                <a16:creationId xmlns:a16="http://schemas.microsoft.com/office/drawing/2014/main" id="{2ED2265B-6747-444D-B144-6712137039E9}"/>
+              </a:ext>
+            </a:extLst>
+          </p:cNvPr>
+          <p:cNvCxnSpPr>
+            <a:cxnSpLocks/>
+            <a:stCxn id="4" idx="2"/>
+            <a:endCxn id="15" idx="1"/>
+          </p:cNvCxnSpPr>
+          <p:nvPr/>
+        </p:nvCxnSpPr>
+        <p:spPr>
+          <a:xfrm rot="16200000" flipH="1">
+            <a:off x="-463497" y="2754969"/>
+            <a:ext cx="4073054" cy="667673"/>
+          </a:xfrm>
+          <a:prstGeom prst="bentConnector2">
+            <a:avLst/>
+          </a:prstGeom>
+          <a:ln w="38100">
+            <a:solidFill>
+              <a:schemeClr val="bg1">
+                <a:lumMod val="75000"/>
+              </a:schemeClr>
+            </a:solidFill>
+            <a:tailEnd type="triangle"/>
+          </a:ln>
+        </p:spPr>
+        <p:style>
+          <a:lnRef idx="1">
+            <a:schemeClr val="accent1"/>
+          </a:lnRef>
+          <a:fillRef idx="0">
+            <a:schemeClr val="accent1"/>
+          </a:fillRef>
+          <a:effectRef idx="0">
+            <a:schemeClr val="accent1"/>
+          </a:effectRef>
+          <a:fontRef idx="minor">
+            <a:schemeClr val="tx1"/>
+          </a:fontRef>
+        </p:style>
+      </p:cxnSp>
+      <p:sp>
+        <p:nvSpPr>
+          <p:cNvPr id="45" name="Rectangle: Rounded Corners 44">
+            <a:extLst>
+              <a:ext uri="{FF2B5EF4-FFF2-40B4-BE49-F238E27FC236}">
+                <a16:creationId xmlns:a16="http://schemas.microsoft.com/office/drawing/2014/main" id="{B9A69A35-10B3-4874-B928-C93C5AEC02C5}"/>
+              </a:ext>
+            </a:extLst>
+          </p:cNvPr>
+          <p:cNvSpPr/>
+          <p:nvPr/>
+        </p:nvSpPr>
+        <p:spPr>
+          <a:xfrm>
+            <a:off x="1740819" y="1332492"/>
+            <a:ext cx="2286000" cy="457001"/>
+          </a:xfrm>
+          <a:prstGeom prst="roundRect">
+            <a:avLst/>
+          </a:prstGeom>
+          <a:solidFill>
+            <a:srgbClr val="E4ECF8"/>
+          </a:solidFill>
+          <a:ln w="38100">
+            <a:solidFill>
+              <a:schemeClr val="accent1">
+                <a:lumMod val="75000"/>
+              </a:schemeClr>
+            </a:solidFill>
+          </a:ln>
+        </p:spPr>
+        <p:style>
+          <a:lnRef idx="2">
+            <a:schemeClr val="accent1">
+              <a:shade val="50000"/>
+            </a:schemeClr>
+          </a:lnRef>
+          <a:fillRef idx="1">
+            <a:schemeClr val="accent1"/>
+          </a:fillRef>
+          <a:effectRef idx="0">
+            <a:schemeClr val="accent1"/>
+          </a:effectRef>
+          <a:fontRef idx="minor">
+            <a:schemeClr val="lt1"/>
+          </a:fontRef>
+        </p:style>
+        <p:txBody>
+          <a:bodyPr rtlCol="0" anchor="ctr"/>
+          <a:lstStyle/>
+          <a:p>
+            <a:pPr algn="ctr"/>
+            <a:r>
+              <a:rPr lang="en-US" b="1" dirty="0" err="1">
+                <a:solidFill>
+                  <a:schemeClr val="tx1"/>
+                </a:solidFill>
+              </a:rPr>
+              <a:t>study:EntityInterval</a:t>
+            </a:r>
+            <a:endParaRPr lang="en-US" dirty="0">
+              <a:solidFill>
+                <a:schemeClr val="bg1">
+                  <a:lumMod val="50000"/>
+                </a:schemeClr>
+              </a:solidFill>
+            </a:endParaRPr>
           </a:p>
         </p:txBody>
       </p:sp>

</xml_diff>

<commit_message>
Added first age check. minor restructure of documentation.
</commit_message>
<xml_diff>
--- a/doc/images/ImageSources.pptx
+++ b/doc/images/ImageSources.pptx
@@ -11,11 +11,12 @@
     <p:sldId id="265" r:id="rId5"/>
     <p:sldId id="268" r:id="rId6"/>
     <p:sldId id="269" r:id="rId7"/>
-    <p:sldId id="267" r:id="rId8"/>
-    <p:sldId id="266" r:id="rId9"/>
-    <p:sldId id="261" r:id="rId10"/>
-    <p:sldId id="259" r:id="rId11"/>
-    <p:sldId id="260" r:id="rId12"/>
+    <p:sldId id="270" r:id="rId8"/>
+    <p:sldId id="267" r:id="rId9"/>
+    <p:sldId id="266" r:id="rId10"/>
+    <p:sldId id="261" r:id="rId11"/>
+    <p:sldId id="259" r:id="rId12"/>
+    <p:sldId id="260" r:id="rId13"/>
   </p:sldIdLst>
   <p:sldSz cx="12192000" cy="6858000"/>
   <p:notesSz cx="6858000" cy="9144000"/>
@@ -125,6 +126,7 @@
             <p14:sldId id="265"/>
             <p14:sldId id="268"/>
             <p14:sldId id="269"/>
+            <p14:sldId id="270"/>
             <p14:sldId id="267"/>
             <p14:sldId id="266"/>
             <p14:sldId id="261"/>
@@ -270,7 +272,7 @@
           <a:p>
             <a:fld id="{03ABD037-9D82-4436-AC70-ED75D2FE9417}" type="datetimeFigureOut">
               <a:rPr lang="en-US" smtClean="0"/>
-              <a:t>8/21/2019</a:t>
+              <a:t>9/4/2019</a:t>
             </a:fld>
             <a:endParaRPr lang="en-US"/>
           </a:p>
@@ -438,7 +440,7 @@
           <a:p>
             <a:fld id="{03ABD037-9D82-4436-AC70-ED75D2FE9417}" type="datetimeFigureOut">
               <a:rPr lang="en-US" smtClean="0"/>
-              <a:t>8/21/2019</a:t>
+              <a:t>9/4/2019</a:t>
             </a:fld>
             <a:endParaRPr lang="en-US"/>
           </a:p>
@@ -616,7 +618,7 @@
           <a:p>
             <a:fld id="{03ABD037-9D82-4436-AC70-ED75D2FE9417}" type="datetimeFigureOut">
               <a:rPr lang="en-US" smtClean="0"/>
-              <a:t>8/21/2019</a:t>
+              <a:t>9/4/2019</a:t>
             </a:fld>
             <a:endParaRPr lang="en-US"/>
           </a:p>
@@ -784,7 +786,7 @@
           <a:p>
             <a:fld id="{03ABD037-9D82-4436-AC70-ED75D2FE9417}" type="datetimeFigureOut">
               <a:rPr lang="en-US" smtClean="0"/>
-              <a:t>8/21/2019</a:t>
+              <a:t>9/4/2019</a:t>
             </a:fld>
             <a:endParaRPr lang="en-US"/>
           </a:p>
@@ -1029,7 +1031,7 @@
           <a:p>
             <a:fld id="{03ABD037-9D82-4436-AC70-ED75D2FE9417}" type="datetimeFigureOut">
               <a:rPr lang="en-US" smtClean="0"/>
-              <a:t>8/21/2019</a:t>
+              <a:t>9/4/2019</a:t>
             </a:fld>
             <a:endParaRPr lang="en-US"/>
           </a:p>
@@ -1258,7 +1260,7 @@
           <a:p>
             <a:fld id="{03ABD037-9D82-4436-AC70-ED75D2FE9417}" type="datetimeFigureOut">
               <a:rPr lang="en-US" smtClean="0"/>
-              <a:t>8/21/2019</a:t>
+              <a:t>9/4/2019</a:t>
             </a:fld>
             <a:endParaRPr lang="en-US"/>
           </a:p>
@@ -1622,7 +1624,7 @@
           <a:p>
             <a:fld id="{03ABD037-9D82-4436-AC70-ED75D2FE9417}" type="datetimeFigureOut">
               <a:rPr lang="en-US" smtClean="0"/>
-              <a:t>8/21/2019</a:t>
+              <a:t>9/4/2019</a:t>
             </a:fld>
             <a:endParaRPr lang="en-US"/>
           </a:p>
@@ -1739,7 +1741,7 @@
           <a:p>
             <a:fld id="{03ABD037-9D82-4436-AC70-ED75D2FE9417}" type="datetimeFigureOut">
               <a:rPr lang="en-US" smtClean="0"/>
-              <a:t>8/21/2019</a:t>
+              <a:t>9/4/2019</a:t>
             </a:fld>
             <a:endParaRPr lang="en-US"/>
           </a:p>
@@ -1834,7 +1836,7 @@
           <a:p>
             <a:fld id="{03ABD037-9D82-4436-AC70-ED75D2FE9417}" type="datetimeFigureOut">
               <a:rPr lang="en-US" smtClean="0"/>
-              <a:t>8/21/2019</a:t>
+              <a:t>9/4/2019</a:t>
             </a:fld>
             <a:endParaRPr lang="en-US"/>
           </a:p>
@@ -2109,7 +2111,7 @@
           <a:p>
             <a:fld id="{03ABD037-9D82-4436-AC70-ED75D2FE9417}" type="datetimeFigureOut">
               <a:rPr lang="en-US" smtClean="0"/>
-              <a:t>8/21/2019</a:t>
+              <a:t>9/4/2019</a:t>
             </a:fld>
             <a:endParaRPr lang="en-US"/>
           </a:p>
@@ -2361,7 +2363,7 @@
           <a:p>
             <a:fld id="{03ABD037-9D82-4436-AC70-ED75D2FE9417}" type="datetimeFigureOut">
               <a:rPr lang="en-US" smtClean="0"/>
-              <a:t>8/21/2019</a:t>
+              <a:t>9/4/2019</a:t>
             </a:fld>
             <a:endParaRPr lang="en-US"/>
           </a:p>
@@ -2572,7 +2574,7 @@
           <a:p>
             <a:fld id="{03ABD037-9D82-4436-AC70-ED75D2FE9417}" type="datetimeFigureOut">
               <a:rPr lang="en-US" smtClean="0"/>
-              <a:t>8/21/2019</a:t>
+              <a:t>9/4/2019</a:t>
             </a:fld>
             <a:endParaRPr lang="en-US"/>
           </a:p>
@@ -4857,6 +4859,559 @@
       </p:grpSpPr>
       <p:sp>
         <p:nvSpPr>
+          <p:cNvPr id="4" name="Rectangle: Rounded Corners 3"/>
+          <p:cNvSpPr/>
+          <p:nvPr/>
+        </p:nvSpPr>
+        <p:spPr>
+          <a:xfrm>
+            <a:off x="6359054" y="800152"/>
+            <a:ext cx="2468880" cy="449588"/>
+          </a:xfrm>
+          <a:prstGeom prst="roundRect">
+            <a:avLst/>
+          </a:prstGeom>
+          <a:solidFill>
+            <a:schemeClr val="accent6">
+              <a:lumMod val="40000"/>
+              <a:lumOff val="60000"/>
+            </a:schemeClr>
+          </a:solidFill>
+          <a:ln>
+            <a:solidFill>
+              <a:schemeClr val="tx1"/>
+            </a:solidFill>
+          </a:ln>
+        </p:spPr>
+        <p:style>
+          <a:lnRef idx="2">
+            <a:schemeClr val="accent1">
+              <a:shade val="50000"/>
+            </a:schemeClr>
+          </a:lnRef>
+          <a:fillRef idx="1">
+            <a:schemeClr val="accent1"/>
+          </a:fillRef>
+          <a:effectRef idx="0">
+            <a:schemeClr val="accent1"/>
+          </a:effectRef>
+          <a:fontRef idx="minor">
+            <a:schemeClr val="lt1"/>
+          </a:fontRef>
+        </p:style>
+        <p:txBody>
+          <a:bodyPr rtlCol="0" anchor="ctr"/>
+          <a:lstStyle/>
+          <a:p>
+            <a:pPr algn="ctr"/>
+            <a:r>
+              <a:rPr lang="en-US" b="1" dirty="0">
+                <a:solidFill>
+                  <a:schemeClr val="tx1"/>
+                </a:solidFill>
+              </a:rPr>
+              <a:t>Person_</a:t>
+            </a:r>
+            <a:r>
+              <a:rPr lang="en-US" b="1" dirty="0">
+                <a:solidFill>
+                  <a:schemeClr val="accent1">
+                    <a:lumMod val="75000"/>
+                  </a:schemeClr>
+                </a:solidFill>
+              </a:rPr>
+              <a:t>01-701-1015</a:t>
+            </a:r>
+          </a:p>
+        </p:txBody>
+      </p:sp>
+      <p:sp>
+        <p:nvSpPr>
+          <p:cNvPr id="5" name="Rectangle: Rounded Corners 4"/>
+          <p:cNvSpPr/>
+          <p:nvPr/>
+        </p:nvSpPr>
+        <p:spPr>
+          <a:xfrm>
+            <a:off x="7348177" y="2628952"/>
+            <a:ext cx="2468880" cy="457001"/>
+          </a:xfrm>
+          <a:prstGeom prst="roundRect">
+            <a:avLst/>
+          </a:prstGeom>
+          <a:solidFill>
+            <a:schemeClr val="accent1">
+              <a:lumMod val="40000"/>
+              <a:lumOff val="60000"/>
+            </a:schemeClr>
+          </a:solidFill>
+          <a:ln>
+            <a:solidFill>
+              <a:schemeClr val="tx1"/>
+            </a:solidFill>
+          </a:ln>
+        </p:spPr>
+        <p:style>
+          <a:lnRef idx="2">
+            <a:schemeClr val="accent1">
+              <a:shade val="50000"/>
+            </a:schemeClr>
+          </a:lnRef>
+          <a:fillRef idx="1">
+            <a:schemeClr val="accent1"/>
+          </a:fillRef>
+          <a:effectRef idx="0">
+            <a:schemeClr val="accent1"/>
+          </a:effectRef>
+          <a:fontRef idx="minor">
+            <a:schemeClr val="lt1"/>
+          </a:fontRef>
+        </p:style>
+        <p:txBody>
+          <a:bodyPr rtlCol="0" anchor="ctr"/>
+          <a:lstStyle/>
+          <a:p>
+            <a:pPr algn="ctr"/>
+            <a:r>
+              <a:rPr lang="en-US" b="1" dirty="0">
+                <a:solidFill>
+                  <a:schemeClr val="tx1"/>
+                </a:solidFill>
+              </a:rPr>
+              <a:t>Medical Condition</a:t>
+            </a:r>
+          </a:p>
+        </p:txBody>
+      </p:sp>
+      <p:sp>
+        <p:nvSpPr>
+          <p:cNvPr id="13" name="Rectangle: Rounded Corners 12"/>
+          <p:cNvSpPr/>
+          <p:nvPr/>
+        </p:nvSpPr>
+        <p:spPr>
+          <a:xfrm>
+            <a:off x="7158066" y="4705104"/>
+            <a:ext cx="2468880" cy="457001"/>
+          </a:xfrm>
+          <a:prstGeom prst="roundRect">
+            <a:avLst/>
+          </a:prstGeom>
+          <a:solidFill>
+            <a:srgbClr val="FFC000"/>
+          </a:solidFill>
+          <a:ln>
+            <a:solidFill>
+              <a:schemeClr val="tx1"/>
+            </a:solidFill>
+          </a:ln>
+        </p:spPr>
+        <p:style>
+          <a:lnRef idx="2">
+            <a:schemeClr val="accent1">
+              <a:shade val="50000"/>
+            </a:schemeClr>
+          </a:lnRef>
+          <a:fillRef idx="1">
+            <a:schemeClr val="accent1"/>
+          </a:fillRef>
+          <a:effectRef idx="0">
+            <a:schemeClr val="accent1"/>
+          </a:effectRef>
+          <a:fontRef idx="minor">
+            <a:schemeClr val="lt1"/>
+          </a:fontRef>
+        </p:style>
+        <p:txBody>
+          <a:bodyPr rtlCol="0" anchor="ctr"/>
+          <a:lstStyle/>
+          <a:p>
+            <a:pPr algn="ctr"/>
+            <a:r>
+              <a:rPr lang="en-US" b="1" dirty="0" err="1">
+                <a:solidFill>
+                  <a:schemeClr val="tx1"/>
+                </a:solidFill>
+              </a:rPr>
+              <a:t>AdverseEvent</a:t>
+            </a:r>
+            <a:endParaRPr lang="en-US" b="1" dirty="0">
+              <a:solidFill>
+                <a:schemeClr val="tx1"/>
+              </a:solidFill>
+            </a:endParaRPr>
+          </a:p>
+        </p:txBody>
+      </p:sp>
+      <p:cxnSp>
+        <p:nvCxnSpPr>
+          <p:cNvPr id="14" name="Straight Arrow Connector 13"/>
+          <p:cNvCxnSpPr>
+            <a:cxnSpLocks/>
+            <a:stCxn id="5" idx="2"/>
+            <a:endCxn id="13" idx="0"/>
+          </p:cNvCxnSpPr>
+          <p:nvPr/>
+        </p:nvCxnSpPr>
+        <p:spPr>
+          <a:xfrm flipH="1">
+            <a:off x="8392506" y="3085953"/>
+            <a:ext cx="190111" cy="1619151"/>
+          </a:xfrm>
+          <a:prstGeom prst="straightConnector1">
+            <a:avLst/>
+          </a:prstGeom>
+          <a:ln w="50800">
+            <a:solidFill>
+              <a:schemeClr val="bg1">
+                <a:lumMod val="50000"/>
+              </a:schemeClr>
+            </a:solidFill>
+            <a:tailEnd type="triangle"/>
+          </a:ln>
+        </p:spPr>
+        <p:style>
+          <a:lnRef idx="1">
+            <a:schemeClr val="accent1"/>
+          </a:lnRef>
+          <a:fillRef idx="0">
+            <a:schemeClr val="accent1"/>
+          </a:fillRef>
+          <a:effectRef idx="0">
+            <a:schemeClr val="accent1"/>
+          </a:effectRef>
+          <a:fontRef idx="minor">
+            <a:schemeClr val="tx1"/>
+          </a:fontRef>
+        </p:style>
+      </p:cxnSp>
+      <p:sp>
+        <p:nvSpPr>
+          <p:cNvPr id="20" name="TextBox 19"/>
+          <p:cNvSpPr txBox="1"/>
+          <p:nvPr/>
+        </p:nvSpPr>
+        <p:spPr>
+          <a:xfrm>
+            <a:off x="9644498" y="739025"/>
+            <a:ext cx="1967829" cy="369332"/>
+          </a:xfrm>
+          <a:prstGeom prst="rect">
+            <a:avLst/>
+          </a:prstGeom>
+          <a:solidFill>
+            <a:schemeClr val="bg1"/>
+          </a:solidFill>
+        </p:spPr>
+        <p:txBody>
+          <a:bodyPr wrap="square" rtlCol="0">
+            <a:spAutoFit/>
+          </a:bodyPr>
+          <a:lstStyle>
+            <a:defPPr>
+              <a:defRPr lang="en-US"/>
+            </a:defPPr>
+            <a:lvl1pPr>
+              <a:defRPr b="1">
+                <a:solidFill>
+                  <a:schemeClr val="accent2">
+                    <a:lumMod val="75000"/>
+                  </a:schemeClr>
+                </a:solidFill>
+                <a:latin typeface="Courier New" panose="02070309020205020404" pitchFamily="49" charset="0"/>
+                <a:cs typeface="Courier New" panose="02070309020205020404" pitchFamily="49" charset="0"/>
+              </a:defRPr>
+            </a:lvl1pPr>
+          </a:lstStyle>
+          <a:p>
+            <a:r>
+              <a:rPr lang="en-US" dirty="0" err="1"/>
+              <a:t>afflictedBy</a:t>
+            </a:r>
+            <a:endParaRPr lang="en-US" dirty="0"/>
+          </a:p>
+        </p:txBody>
+      </p:sp>
+      <p:sp>
+        <p:nvSpPr>
+          <p:cNvPr id="41" name="TextBox 40">
+            <a:extLst>
+              <a:ext uri="{FF2B5EF4-FFF2-40B4-BE49-F238E27FC236}">
+                <a16:creationId xmlns:a16="http://schemas.microsoft.com/office/drawing/2014/main" id="{CCC2A432-EE41-4F21-9AAE-EB569CE224D5}"/>
+              </a:ext>
+            </a:extLst>
+          </p:cNvPr>
+          <p:cNvSpPr txBox="1"/>
+          <p:nvPr/>
+        </p:nvSpPr>
+        <p:spPr>
+          <a:xfrm>
+            <a:off x="8696860" y="1917222"/>
+            <a:ext cx="1740300" cy="369332"/>
+          </a:xfrm>
+          <a:prstGeom prst="rect">
+            <a:avLst/>
+          </a:prstGeom>
+          <a:solidFill>
+            <a:schemeClr val="bg1"/>
+          </a:solidFill>
+        </p:spPr>
+        <p:txBody>
+          <a:bodyPr wrap="square" rtlCol="0">
+            <a:spAutoFit/>
+          </a:bodyPr>
+          <a:lstStyle/>
+          <a:p>
+            <a:r>
+              <a:rPr lang="en-US" b="1" dirty="0">
+                <a:solidFill>
+                  <a:schemeClr val="accent2">
+                    <a:lumMod val="40000"/>
+                    <a:lumOff val="60000"/>
+                  </a:schemeClr>
+                </a:solidFill>
+                <a:latin typeface="Courier New" panose="02070309020205020404" pitchFamily="49" charset="0"/>
+                <a:cs typeface="Courier New" panose="02070309020205020404" pitchFamily="49" charset="0"/>
+              </a:rPr>
+              <a:t>severity</a:t>
+            </a:r>
+          </a:p>
+        </p:txBody>
+      </p:sp>
+      <p:sp>
+        <p:nvSpPr>
+          <p:cNvPr id="7" name="TextBox 6"/>
+          <p:cNvSpPr txBox="1"/>
+          <p:nvPr/>
+        </p:nvSpPr>
+        <p:spPr>
+          <a:xfrm>
+            <a:off x="7665887" y="3569559"/>
+            <a:ext cx="1643348" cy="369332"/>
+          </a:xfrm>
+          <a:prstGeom prst="rect">
+            <a:avLst/>
+          </a:prstGeom>
+          <a:solidFill>
+            <a:schemeClr val="bg1"/>
+          </a:solidFill>
+        </p:spPr>
+        <p:txBody>
+          <a:bodyPr wrap="square" rtlCol="0">
+            <a:spAutoFit/>
+          </a:bodyPr>
+          <a:lstStyle>
+            <a:defPPr>
+              <a:defRPr lang="en-US"/>
+            </a:defPPr>
+            <a:lvl1pPr>
+              <a:defRPr b="1">
+                <a:solidFill>
+                  <a:schemeClr val="accent2">
+                    <a:lumMod val="75000"/>
+                  </a:schemeClr>
+                </a:solidFill>
+                <a:latin typeface="Courier New" panose="02070309020205020404" pitchFamily="49" charset="0"/>
+                <a:cs typeface="Courier New" panose="02070309020205020404" pitchFamily="49" charset="0"/>
+              </a:defRPr>
+            </a:lvl1pPr>
+          </a:lstStyle>
+          <a:p>
+            <a:r>
+              <a:rPr lang="en-US" dirty="0" err="1"/>
+              <a:t>subClassOf</a:t>
+            </a:r>
+            <a:endParaRPr lang="en-US" dirty="0"/>
+          </a:p>
+        </p:txBody>
+      </p:sp>
+      <p:sp>
+        <p:nvSpPr>
+          <p:cNvPr id="45" name="TextBox 44">
+            <a:extLst>
+              <a:ext uri="{FF2B5EF4-FFF2-40B4-BE49-F238E27FC236}">
+                <a16:creationId xmlns:a16="http://schemas.microsoft.com/office/drawing/2014/main" id="{DCEB2144-B3F4-48FC-863E-2B0381C57201}"/>
+              </a:ext>
+            </a:extLst>
+          </p:cNvPr>
+          <p:cNvSpPr txBox="1"/>
+          <p:nvPr/>
+        </p:nvSpPr>
+        <p:spPr>
+          <a:xfrm>
+            <a:off x="603175" y="837054"/>
+            <a:ext cx="4975721" cy="3139321"/>
+          </a:xfrm>
+          <a:prstGeom prst="rect">
+            <a:avLst/>
+          </a:prstGeom>
+          <a:noFill/>
+        </p:spPr>
+        <p:txBody>
+          <a:bodyPr wrap="none" rtlCol="0">
+            <a:spAutoFit/>
+          </a:bodyPr>
+          <a:lstStyle/>
+          <a:p>
+            <a:r>
+              <a:rPr lang="en-US" dirty="0"/>
+              <a:t>study:Subject_CJ16050_00M01</a:t>
+            </a:r>
+          </a:p>
+          <a:p>
+            <a:r>
+              <a:rPr lang="en-US" dirty="0"/>
+              <a:t>    a                           </a:t>
+            </a:r>
+            <a:r>
+              <a:rPr lang="en-US" dirty="0" err="1"/>
+              <a:t>study:StudySubject</a:t>
+            </a:r>
+            <a:r>
+              <a:rPr lang="en-US" dirty="0"/>
+              <a:t> ;</a:t>
+            </a:r>
+          </a:p>
+          <a:p>
+            <a:r>
+              <a:rPr lang="en-US" dirty="0"/>
+              <a:t>    </a:t>
+            </a:r>
+            <a:r>
+              <a:rPr lang="en-US" dirty="0" err="1"/>
+              <a:t>study:rfendtc</a:t>
+            </a:r>
+            <a:r>
+              <a:rPr lang="en-US" dirty="0"/>
+              <a:t>      "2016-12-07"^^</a:t>
+            </a:r>
+            <a:r>
+              <a:rPr lang="en-US" dirty="0" err="1"/>
+              <a:t>xsd:date</a:t>
+            </a:r>
+            <a:r>
+              <a:rPr lang="en-US" dirty="0"/>
+              <a:t> ;</a:t>
+            </a:r>
+          </a:p>
+          <a:p>
+            <a:r>
+              <a:rPr lang="en-US" dirty="0"/>
+              <a:t>    </a:t>
+            </a:r>
+            <a:r>
+              <a:rPr lang="en-US" dirty="0" err="1"/>
+              <a:t>study:rfstdtc</a:t>
+            </a:r>
+            <a:r>
+              <a:rPr lang="en-US" dirty="0"/>
+              <a:t>       "2016-12-07"^^</a:t>
+            </a:r>
+            <a:r>
+              <a:rPr lang="en-US" dirty="0" err="1"/>
+              <a:t>xsd:date</a:t>
+            </a:r>
+            <a:r>
+              <a:rPr lang="en-US" dirty="0"/>
+              <a:t>  ;</a:t>
+            </a:r>
+          </a:p>
+          <a:p>
+            <a:r>
+              <a:rPr lang="en-US" dirty="0"/>
+              <a:t>    </a:t>
+            </a:r>
+            <a:r>
+              <a:rPr lang="en-US" dirty="0" err="1"/>
+              <a:t>study:subjid</a:t>
+            </a:r>
+            <a:r>
+              <a:rPr lang="en-US" dirty="0"/>
+              <a:t>        “CJ16050_00M01"^^</a:t>
+            </a:r>
+            <a:r>
+              <a:rPr lang="en-US" dirty="0" err="1"/>
+              <a:t>xsd:string</a:t>
+            </a:r>
+            <a:r>
+              <a:rPr lang="en-US" dirty="0"/>
+              <a:t> ;</a:t>
+            </a:r>
+          </a:p>
+          <a:p>
+            <a:r>
+              <a:rPr lang="en-US" dirty="0"/>
+              <a:t>    </a:t>
+            </a:r>
+            <a:r>
+              <a:rPr lang="en-US" dirty="0" err="1"/>
+              <a:t>study:usubjid</a:t>
+            </a:r>
+            <a:r>
+              <a:rPr lang="en-US" dirty="0"/>
+              <a:t>     “CJ16050_00M01” ^^</a:t>
+            </a:r>
+            <a:r>
+              <a:rPr lang="en-US" dirty="0" err="1"/>
+              <a:t>xsd:string</a:t>
+            </a:r>
+            <a:r>
+              <a:rPr lang="en-US" dirty="0"/>
+              <a:t> ;</a:t>
+            </a:r>
+          </a:p>
+          <a:p>
+            <a:r>
+              <a:rPr lang="en-US" dirty="0"/>
+              <a:t>.</a:t>
+            </a:r>
+          </a:p>
+          <a:p>
+            <a:endParaRPr lang="en-US" dirty="0"/>
+          </a:p>
+          <a:p>
+            <a:endParaRPr lang="en-US" dirty="0"/>
+          </a:p>
+          <a:p>
+            <a:endParaRPr lang="en-US" dirty="0"/>
+          </a:p>
+          <a:p>
+            <a:endParaRPr lang="en-US" dirty="0"/>
+          </a:p>
+        </p:txBody>
+      </p:sp>
+    </p:spTree>
+    <p:extLst>
+      <p:ext uri="{BB962C8B-B14F-4D97-AF65-F5344CB8AC3E}">
+        <p14:creationId xmlns:p14="http://schemas.microsoft.com/office/powerpoint/2010/main" val="2932786974"/>
+      </p:ext>
+    </p:extLst>
+  </p:cSld>
+  <p:clrMapOvr>
+    <a:masterClrMapping/>
+  </p:clrMapOvr>
+</p:sld>
+</file>
+
+<file path=ppt/slides/slide11.xml><?xml version="1.0" encoding="utf-8"?>
+<p:sld xmlns:a="http://schemas.openxmlformats.org/drawingml/2006/main" xmlns:r="http://schemas.openxmlformats.org/officeDocument/2006/relationships" xmlns:p="http://schemas.openxmlformats.org/presentationml/2006/main">
+  <p:cSld>
+    <p:spTree>
+      <p:nvGrpSpPr>
+        <p:cNvPr id="1" name=""/>
+        <p:cNvGrpSpPr/>
+        <p:nvPr/>
+      </p:nvGrpSpPr>
+      <p:grpSpPr>
+        <a:xfrm>
+          <a:off x="0" y="0"/>
+          <a:ext cx="0" cy="0"/>
+          <a:chOff x="0" y="0"/>
+          <a:chExt cx="0" cy="0"/>
+        </a:xfrm>
+      </p:grpSpPr>
+      <p:sp>
+        <p:nvSpPr>
           <p:cNvPr id="15" name="Rectangle: Rounded Corners 14">
             <a:extLst>
               <a:ext uri="{FF2B5EF4-FFF2-40B4-BE49-F238E27FC236}">
@@ -5540,7 +6095,7 @@
 </p:sld>
 </file>
 
-<file path=ppt/slides/slide11.xml><?xml version="1.0" encoding="utf-8"?>
+<file path=ppt/slides/slide12.xml><?xml version="1.0" encoding="utf-8"?>
 <p:sld xmlns:a="http://schemas.openxmlformats.org/drawingml/2006/main" xmlns:r="http://schemas.openxmlformats.org/officeDocument/2006/relationships" xmlns:p="http://schemas.openxmlformats.org/presentationml/2006/main">
   <p:cSld>
     <p:spTree>
@@ -11495,6 +12050,1854 @@
       </p:grpSpPr>
       <p:sp>
         <p:nvSpPr>
+          <p:cNvPr id="4" name="Rectangle: Rounded Corners 3"/>
+          <p:cNvSpPr/>
+          <p:nvPr/>
+        </p:nvSpPr>
+        <p:spPr>
+          <a:xfrm>
+            <a:off x="957999" y="635348"/>
+            <a:ext cx="2971800" cy="449588"/>
+          </a:xfrm>
+          <a:prstGeom prst="roundRect">
+            <a:avLst/>
+          </a:prstGeom>
+          <a:solidFill>
+            <a:srgbClr val="EEEEBB"/>
+          </a:solidFill>
+          <a:ln w="38100">
+            <a:solidFill>
+              <a:srgbClr val="9E9E27"/>
+            </a:solidFill>
+          </a:ln>
+        </p:spPr>
+        <p:style>
+          <a:lnRef idx="2">
+            <a:schemeClr val="accent1">
+              <a:shade val="50000"/>
+            </a:schemeClr>
+          </a:lnRef>
+          <a:fillRef idx="1">
+            <a:schemeClr val="accent1"/>
+          </a:fillRef>
+          <a:effectRef idx="0">
+            <a:schemeClr val="accent1"/>
+          </a:effectRef>
+          <a:fontRef idx="minor">
+            <a:schemeClr val="lt1"/>
+          </a:fontRef>
+        </p:style>
+        <p:txBody>
+          <a:bodyPr rtlCol="0" anchor="ctr"/>
+          <a:lstStyle/>
+          <a:p>
+            <a:pPr algn="ctr"/>
+            <a:r>
+              <a:rPr lang="en-US" b="1" dirty="0">
+                <a:solidFill>
+                  <a:schemeClr val="tx1"/>
+                </a:solidFill>
+              </a:rPr>
+              <a:t>cj16050:Animal_22218ae1</a:t>
+            </a:r>
+          </a:p>
+        </p:txBody>
+      </p:sp>
+      <p:sp>
+        <p:nvSpPr>
+          <p:cNvPr id="10" name="Rectangle: Rounded Corners 9">
+            <a:extLst>
+              <a:ext uri="{FF2B5EF4-FFF2-40B4-BE49-F238E27FC236}">
+                <a16:creationId xmlns:a16="http://schemas.microsoft.com/office/drawing/2014/main" id="{6B507A6C-DA4D-4A07-AC87-C4CECFA5297B}"/>
+              </a:ext>
+            </a:extLst>
+          </p:cNvPr>
+          <p:cNvSpPr/>
+          <p:nvPr/>
+        </p:nvSpPr>
+        <p:spPr>
+          <a:xfrm>
+            <a:off x="5872963" y="161662"/>
+            <a:ext cx="2971800" cy="457001"/>
+          </a:xfrm>
+          <a:prstGeom prst="roundRect">
+            <a:avLst/>
+          </a:prstGeom>
+          <a:solidFill>
+            <a:srgbClr val="E4ECF8"/>
+          </a:solidFill>
+          <a:ln w="38100">
+            <a:solidFill>
+              <a:schemeClr val="accent1">
+                <a:lumMod val="75000"/>
+              </a:schemeClr>
+            </a:solidFill>
+          </a:ln>
+        </p:spPr>
+        <p:style>
+          <a:lnRef idx="2">
+            <a:schemeClr val="accent1">
+              <a:shade val="50000"/>
+            </a:schemeClr>
+          </a:lnRef>
+          <a:fillRef idx="1">
+            <a:schemeClr val="accent1"/>
+          </a:fillRef>
+          <a:effectRef idx="0">
+            <a:schemeClr val="accent1"/>
+          </a:effectRef>
+          <a:fontRef idx="minor">
+            <a:schemeClr val="lt1"/>
+          </a:fontRef>
+        </p:style>
+        <p:txBody>
+          <a:bodyPr rtlCol="0" anchor="ctr"/>
+          <a:lstStyle/>
+          <a:p>
+            <a:pPr algn="ctr"/>
+            <a:r>
+              <a:rPr lang="en-US" b="1" dirty="0" err="1">
+                <a:solidFill>
+                  <a:schemeClr val="tx1"/>
+                </a:solidFill>
+              </a:rPr>
+              <a:t>study:AnimalSubject</a:t>
+            </a:r>
+            <a:endParaRPr lang="en-US" b="1" dirty="0">
+              <a:solidFill>
+                <a:schemeClr val="tx1"/>
+              </a:solidFill>
+            </a:endParaRPr>
+          </a:p>
+        </p:txBody>
+      </p:sp>
+      <p:cxnSp>
+        <p:nvCxnSpPr>
+          <p:cNvPr id="16" name="Straight Arrow Connector 15">
+            <a:extLst>
+              <a:ext uri="{FF2B5EF4-FFF2-40B4-BE49-F238E27FC236}">
+                <a16:creationId xmlns:a16="http://schemas.microsoft.com/office/drawing/2014/main" id="{2BD3BC57-ACA0-4E8B-A760-B1A2EC9E7B20}"/>
+              </a:ext>
+            </a:extLst>
+          </p:cNvPr>
+          <p:cNvCxnSpPr>
+            <a:cxnSpLocks/>
+            <a:stCxn id="4" idx="3"/>
+            <a:endCxn id="10" idx="1"/>
+          </p:cNvCxnSpPr>
+          <p:nvPr/>
+        </p:nvCxnSpPr>
+        <p:spPr>
+          <a:xfrm flipV="1">
+            <a:off x="3929799" y="390163"/>
+            <a:ext cx="1943164" cy="469979"/>
+          </a:xfrm>
+          <a:prstGeom prst="straightConnector1">
+            <a:avLst/>
+          </a:prstGeom>
+          <a:ln w="50800">
+            <a:solidFill>
+              <a:schemeClr val="bg1">
+                <a:lumMod val="50000"/>
+              </a:schemeClr>
+            </a:solidFill>
+            <a:tailEnd type="triangle"/>
+          </a:ln>
+        </p:spPr>
+        <p:style>
+          <a:lnRef idx="1">
+            <a:schemeClr val="accent1"/>
+          </a:lnRef>
+          <a:fillRef idx="0">
+            <a:schemeClr val="accent1"/>
+          </a:fillRef>
+          <a:effectRef idx="0">
+            <a:schemeClr val="accent1"/>
+          </a:effectRef>
+          <a:fontRef idx="minor">
+            <a:schemeClr val="tx1"/>
+          </a:fontRef>
+        </p:style>
+      </p:cxnSp>
+      <p:sp>
+        <p:nvSpPr>
+          <p:cNvPr id="22" name="Rectangle: Rounded Corners 21">
+            <a:extLst>
+              <a:ext uri="{FF2B5EF4-FFF2-40B4-BE49-F238E27FC236}">
+                <a16:creationId xmlns:a16="http://schemas.microsoft.com/office/drawing/2014/main" id="{A80CEA84-AC4C-4D17-B914-0EB2393DC44E}"/>
+              </a:ext>
+            </a:extLst>
+          </p:cNvPr>
+          <p:cNvSpPr/>
+          <p:nvPr/>
+        </p:nvSpPr>
+        <p:spPr>
+          <a:xfrm>
+            <a:off x="5872963" y="1972158"/>
+            <a:ext cx="2971800" cy="457001"/>
+          </a:xfrm>
+          <a:prstGeom prst="roundRect">
+            <a:avLst/>
+          </a:prstGeom>
+          <a:solidFill>
+            <a:srgbClr val="E4ECF8"/>
+          </a:solidFill>
+          <a:ln w="38100">
+            <a:solidFill>
+              <a:schemeClr val="accent1">
+                <a:lumMod val="75000"/>
+              </a:schemeClr>
+            </a:solidFill>
+          </a:ln>
+        </p:spPr>
+        <p:style>
+          <a:lnRef idx="2">
+            <a:schemeClr val="accent1">
+              <a:shade val="50000"/>
+            </a:schemeClr>
+          </a:lnRef>
+          <a:fillRef idx="1">
+            <a:schemeClr val="accent1"/>
+          </a:fillRef>
+          <a:effectRef idx="0">
+            <a:schemeClr val="accent1"/>
+          </a:effectRef>
+          <a:fontRef idx="minor">
+            <a:schemeClr val="lt1"/>
+          </a:fontRef>
+        </p:style>
+        <p:txBody>
+          <a:bodyPr rtlCol="0" anchor="ctr"/>
+          <a:lstStyle/>
+          <a:p>
+            <a:pPr algn="ctr"/>
+            <a:r>
+              <a:rPr lang="en-US" b="1" dirty="0" err="1">
+                <a:solidFill>
+                  <a:schemeClr val="tx1"/>
+                </a:solidFill>
+              </a:rPr>
+              <a:t>code:AgeDataCollection</a:t>
+            </a:r>
+            <a:endParaRPr lang="en-US" b="1" dirty="0">
+              <a:solidFill>
+                <a:schemeClr val="tx1"/>
+              </a:solidFill>
+            </a:endParaRPr>
+          </a:p>
+        </p:txBody>
+      </p:sp>
+      <p:cxnSp>
+        <p:nvCxnSpPr>
+          <p:cNvPr id="23" name="Straight Arrow Connector 22">
+            <a:extLst>
+              <a:ext uri="{FF2B5EF4-FFF2-40B4-BE49-F238E27FC236}">
+                <a16:creationId xmlns:a16="http://schemas.microsoft.com/office/drawing/2014/main" id="{1DA770EC-9121-483A-9ECC-050B87E2EE9E}"/>
+              </a:ext>
+            </a:extLst>
+          </p:cNvPr>
+          <p:cNvCxnSpPr>
+            <a:cxnSpLocks/>
+            <a:stCxn id="15" idx="3"/>
+            <a:endCxn id="22" idx="1"/>
+          </p:cNvCxnSpPr>
+          <p:nvPr/>
+        </p:nvCxnSpPr>
+        <p:spPr>
+          <a:xfrm>
+            <a:off x="4452257" y="2200659"/>
+            <a:ext cx="1420706" cy="0"/>
+          </a:xfrm>
+          <a:prstGeom prst="straightConnector1">
+            <a:avLst/>
+          </a:prstGeom>
+          <a:ln w="50800">
+            <a:solidFill>
+              <a:schemeClr val="bg1">
+                <a:lumMod val="50000"/>
+              </a:schemeClr>
+            </a:solidFill>
+            <a:tailEnd type="triangle"/>
+          </a:ln>
+        </p:spPr>
+        <p:style>
+          <a:lnRef idx="1">
+            <a:schemeClr val="accent1"/>
+          </a:lnRef>
+          <a:fillRef idx="0">
+            <a:schemeClr val="accent1"/>
+          </a:fillRef>
+          <a:effectRef idx="0">
+            <a:schemeClr val="accent1"/>
+          </a:effectRef>
+          <a:fontRef idx="minor">
+            <a:schemeClr val="tx1"/>
+          </a:fontRef>
+        </p:style>
+      </p:cxnSp>
+      <p:cxnSp>
+        <p:nvCxnSpPr>
+          <p:cNvPr id="30" name="Straight Arrow Connector 29">
+            <a:extLst>
+              <a:ext uri="{FF2B5EF4-FFF2-40B4-BE49-F238E27FC236}">
+                <a16:creationId xmlns:a16="http://schemas.microsoft.com/office/drawing/2014/main" id="{769D4B6A-7F30-4FB5-B811-ACFD7653AAE5}"/>
+              </a:ext>
+            </a:extLst>
+          </p:cNvPr>
+          <p:cNvCxnSpPr>
+            <a:cxnSpLocks/>
+            <a:stCxn id="15" idx="2"/>
+            <a:endCxn id="47" idx="0"/>
+          </p:cNvCxnSpPr>
+          <p:nvPr/>
+        </p:nvCxnSpPr>
+        <p:spPr>
+          <a:xfrm>
+            <a:off x="2443899" y="2429159"/>
+            <a:ext cx="0" cy="1353220"/>
+          </a:xfrm>
+          <a:prstGeom prst="straightConnector1">
+            <a:avLst/>
+          </a:prstGeom>
+          <a:ln w="50800">
+            <a:solidFill>
+              <a:schemeClr val="bg1">
+                <a:lumMod val="50000"/>
+              </a:schemeClr>
+            </a:solidFill>
+            <a:tailEnd type="triangle"/>
+          </a:ln>
+        </p:spPr>
+        <p:style>
+          <a:lnRef idx="1">
+            <a:schemeClr val="accent1"/>
+          </a:lnRef>
+          <a:fillRef idx="0">
+            <a:schemeClr val="accent1"/>
+          </a:fillRef>
+          <a:effectRef idx="0">
+            <a:schemeClr val="accent1"/>
+          </a:effectRef>
+          <a:fontRef idx="minor">
+            <a:schemeClr val="tx1"/>
+          </a:fontRef>
+        </p:style>
+      </p:cxnSp>
+      <p:grpSp>
+        <p:nvGrpSpPr>
+          <p:cNvPr id="38" name="Group 37">
+            <a:extLst>
+              <a:ext uri="{FF2B5EF4-FFF2-40B4-BE49-F238E27FC236}">
+                <a16:creationId xmlns:a16="http://schemas.microsoft.com/office/drawing/2014/main" id="{FD57785F-5ED7-49A8-86E0-7E9316E39A31}"/>
+              </a:ext>
+            </a:extLst>
+          </p:cNvPr>
+          <p:cNvGrpSpPr/>
+          <p:nvPr/>
+        </p:nvGrpSpPr>
+        <p:grpSpPr>
+          <a:xfrm>
+            <a:off x="1183302" y="1084936"/>
+            <a:ext cx="3843362" cy="887222"/>
+            <a:chOff x="1046501" y="1084936"/>
+            <a:chExt cx="3843362" cy="887222"/>
+          </a:xfrm>
+        </p:grpSpPr>
+        <p:cxnSp>
+          <p:nvCxnSpPr>
+            <p:cNvPr id="17" name="Straight Arrow Connector 16">
+              <a:extLst>
+                <a:ext uri="{FF2B5EF4-FFF2-40B4-BE49-F238E27FC236}">
+                  <a16:creationId xmlns:a16="http://schemas.microsoft.com/office/drawing/2014/main" id="{29F0277E-AD84-48E5-9890-328F2C49D080}"/>
+                </a:ext>
+              </a:extLst>
+            </p:cNvPr>
+            <p:cNvCxnSpPr>
+              <a:cxnSpLocks/>
+              <a:stCxn id="4" idx="2"/>
+              <a:endCxn id="15" idx="0"/>
+            </p:cNvCxnSpPr>
+            <p:nvPr/>
+          </p:nvCxnSpPr>
+          <p:spPr>
+            <a:xfrm>
+              <a:off x="2307098" y="1084936"/>
+              <a:ext cx="0" cy="887222"/>
+            </a:xfrm>
+            <a:prstGeom prst="straightConnector1">
+              <a:avLst/>
+            </a:prstGeom>
+            <a:ln w="50800">
+              <a:solidFill>
+                <a:schemeClr val="bg1">
+                  <a:lumMod val="50000"/>
+                </a:schemeClr>
+              </a:solidFill>
+              <a:tailEnd type="triangle"/>
+            </a:ln>
+          </p:spPr>
+          <p:style>
+            <a:lnRef idx="1">
+              <a:schemeClr val="accent1"/>
+            </a:lnRef>
+            <a:fillRef idx="0">
+              <a:schemeClr val="accent1"/>
+            </a:fillRef>
+            <a:effectRef idx="0">
+              <a:schemeClr val="accent1"/>
+            </a:effectRef>
+            <a:fontRef idx="minor">
+              <a:schemeClr val="tx1"/>
+            </a:fontRef>
+          </p:style>
+        </p:cxnSp>
+        <p:sp>
+          <p:nvSpPr>
+            <p:cNvPr id="7" name="TextBox 6"/>
+            <p:cNvSpPr txBox="1"/>
+            <p:nvPr/>
+          </p:nvSpPr>
+          <p:spPr>
+            <a:xfrm>
+              <a:off x="1046501" y="1323618"/>
+              <a:ext cx="3843362" cy="338554"/>
+            </a:xfrm>
+            <a:prstGeom prst="rect">
+              <a:avLst/>
+            </a:prstGeom>
+            <a:solidFill>
+              <a:schemeClr val="bg1"/>
+            </a:solidFill>
+          </p:spPr>
+          <p:txBody>
+            <a:bodyPr wrap="square" rtlCol="0">
+              <a:spAutoFit/>
+            </a:bodyPr>
+            <a:lstStyle>
+              <a:defPPr>
+                <a:defRPr lang="en-US"/>
+              </a:defPPr>
+              <a:lvl1pPr>
+                <a:defRPr b="1">
+                  <a:solidFill>
+                    <a:schemeClr val="accent2">
+                      <a:lumMod val="75000"/>
+                    </a:schemeClr>
+                  </a:solidFill>
+                  <a:latin typeface="Courier New" panose="02070309020205020404" pitchFamily="49" charset="0"/>
+                  <a:cs typeface="Courier New" panose="02070309020205020404" pitchFamily="49" charset="0"/>
+                </a:defRPr>
+              </a:lvl1pPr>
+            </a:lstStyle>
+            <a:p>
+              <a:r>
+                <a:rPr lang="en-US" sz="1600" b="0" dirty="0" err="1"/>
+                <a:t>study:</a:t>
+              </a:r>
+              <a:r>
+                <a:rPr lang="en-US" sz="1600" dirty="0" err="1"/>
+                <a:t>participatesIn</a:t>
+              </a:r>
+              <a:endParaRPr lang="en-US" dirty="0"/>
+            </a:p>
+          </p:txBody>
+        </p:sp>
+      </p:grpSp>
+      <p:sp>
+        <p:nvSpPr>
+          <p:cNvPr id="42" name="TextBox 41">
+            <a:extLst>
+              <a:ext uri="{FF2B5EF4-FFF2-40B4-BE49-F238E27FC236}">
+                <a16:creationId xmlns:a16="http://schemas.microsoft.com/office/drawing/2014/main" id="{E44AC35C-D56A-4BA4-9884-CFA2D845B4FA}"/>
+              </a:ext>
+            </a:extLst>
+          </p:cNvPr>
+          <p:cNvSpPr txBox="1"/>
+          <p:nvPr/>
+        </p:nvSpPr>
+        <p:spPr>
+          <a:xfrm>
+            <a:off x="1934776" y="2748340"/>
+            <a:ext cx="2605874" cy="338554"/>
+          </a:xfrm>
+          <a:prstGeom prst="rect">
+            <a:avLst/>
+          </a:prstGeom>
+          <a:solidFill>
+            <a:schemeClr val="bg1"/>
+          </a:solidFill>
+        </p:spPr>
+        <p:txBody>
+          <a:bodyPr wrap="square" rtlCol="0">
+            <a:spAutoFit/>
+          </a:bodyPr>
+          <a:lstStyle>
+            <a:defPPr>
+              <a:defRPr lang="en-US"/>
+            </a:defPPr>
+            <a:lvl1pPr>
+              <a:defRPr b="1">
+                <a:solidFill>
+                  <a:schemeClr val="accent2">
+                    <a:lumMod val="75000"/>
+                  </a:schemeClr>
+                </a:solidFill>
+                <a:latin typeface="Courier New" panose="02070309020205020404" pitchFamily="49" charset="0"/>
+                <a:cs typeface="Courier New" panose="02070309020205020404" pitchFamily="49" charset="0"/>
+              </a:defRPr>
+            </a:lvl1pPr>
+          </a:lstStyle>
+          <a:p>
+            <a:r>
+              <a:rPr lang="en-US" sz="1600" b="0" dirty="0" err="1"/>
+              <a:t>code:</a:t>
+            </a:r>
+            <a:r>
+              <a:rPr lang="en-US" sz="1600" dirty="0" err="1"/>
+              <a:t>outcome</a:t>
+            </a:r>
+            <a:endParaRPr lang="en-US" dirty="0"/>
+          </a:p>
+        </p:txBody>
+      </p:sp>
+      <p:sp>
+        <p:nvSpPr>
+          <p:cNvPr id="47" name="Rectangle: Rounded Corners 46">
+            <a:extLst>
+              <a:ext uri="{FF2B5EF4-FFF2-40B4-BE49-F238E27FC236}">
+                <a16:creationId xmlns:a16="http://schemas.microsoft.com/office/drawing/2014/main" id="{23F8A56F-9569-488F-9C72-B2665C87B7BA}"/>
+              </a:ext>
+            </a:extLst>
+          </p:cNvPr>
+          <p:cNvSpPr/>
+          <p:nvPr/>
+        </p:nvSpPr>
+        <p:spPr>
+          <a:xfrm>
+            <a:off x="957999" y="3782379"/>
+            <a:ext cx="2971800" cy="457001"/>
+          </a:xfrm>
+          <a:prstGeom prst="roundRect">
+            <a:avLst/>
+          </a:prstGeom>
+          <a:solidFill>
+            <a:srgbClr val="EEEEBB"/>
+          </a:solidFill>
+          <a:ln w="38100">
+            <a:solidFill>
+              <a:srgbClr val="9E9E27"/>
+            </a:solidFill>
+          </a:ln>
+        </p:spPr>
+        <p:style>
+          <a:lnRef idx="2">
+            <a:schemeClr val="accent1">
+              <a:shade val="50000"/>
+            </a:schemeClr>
+          </a:lnRef>
+          <a:fillRef idx="1">
+            <a:schemeClr val="accent1"/>
+          </a:fillRef>
+          <a:effectRef idx="0">
+            <a:schemeClr val="accent1"/>
+          </a:effectRef>
+          <a:fontRef idx="minor">
+            <a:schemeClr val="lt1"/>
+          </a:fontRef>
+        </p:style>
+        <p:txBody>
+          <a:bodyPr rtlCol="0" anchor="ctr"/>
+          <a:lstStyle/>
+          <a:p>
+            <a:pPr algn="ctr"/>
+            <a:r>
+              <a:rPr lang="en-US" b="1" dirty="0">
+                <a:solidFill>
+                  <a:schemeClr val="tx1"/>
+                </a:solidFill>
+              </a:rPr>
+              <a:t>cj16050:Age_8_WEEKS</a:t>
+            </a:r>
+          </a:p>
+        </p:txBody>
+      </p:sp>
+      <p:sp>
+        <p:nvSpPr>
+          <p:cNvPr id="50" name="Rectangle: Rounded Corners 49">
+            <a:extLst>
+              <a:ext uri="{FF2B5EF4-FFF2-40B4-BE49-F238E27FC236}">
+                <a16:creationId xmlns:a16="http://schemas.microsoft.com/office/drawing/2014/main" id="{F3B80F0D-6FEC-490C-B729-BA78FF1A38CA}"/>
+              </a:ext>
+            </a:extLst>
+          </p:cNvPr>
+          <p:cNvSpPr/>
+          <p:nvPr/>
+        </p:nvSpPr>
+        <p:spPr>
+          <a:xfrm>
+            <a:off x="7915994" y="3042828"/>
+            <a:ext cx="2971800" cy="457001"/>
+          </a:xfrm>
+          <a:prstGeom prst="roundRect">
+            <a:avLst/>
+          </a:prstGeom>
+          <a:solidFill>
+            <a:srgbClr val="E4ECF8"/>
+          </a:solidFill>
+          <a:ln w="38100">
+            <a:solidFill>
+              <a:schemeClr val="accent1">
+                <a:lumMod val="75000"/>
+              </a:schemeClr>
+            </a:solidFill>
+          </a:ln>
+        </p:spPr>
+        <p:style>
+          <a:lnRef idx="2">
+            <a:schemeClr val="accent1">
+              <a:shade val="50000"/>
+            </a:schemeClr>
+          </a:lnRef>
+          <a:fillRef idx="1">
+            <a:schemeClr val="accent1"/>
+          </a:fillRef>
+          <a:effectRef idx="0">
+            <a:schemeClr val="accent1"/>
+          </a:effectRef>
+          <a:fontRef idx="minor">
+            <a:schemeClr val="lt1"/>
+          </a:fontRef>
+        </p:style>
+        <p:txBody>
+          <a:bodyPr rtlCol="0" anchor="ctr"/>
+          <a:lstStyle/>
+          <a:p>
+            <a:pPr algn="ctr"/>
+            <a:r>
+              <a:rPr lang="en-US" b="1" dirty="0" err="1">
+                <a:solidFill>
+                  <a:schemeClr val="tx1"/>
+                </a:solidFill>
+              </a:rPr>
+              <a:t>study:Age</a:t>
+            </a:r>
+            <a:endParaRPr lang="en-US" b="1" dirty="0">
+              <a:solidFill>
+                <a:schemeClr val="tx1"/>
+              </a:solidFill>
+            </a:endParaRPr>
+          </a:p>
+        </p:txBody>
+      </p:sp>
+      <p:cxnSp>
+        <p:nvCxnSpPr>
+          <p:cNvPr id="59" name="Straight Arrow Connector 58">
+            <a:extLst>
+              <a:ext uri="{FF2B5EF4-FFF2-40B4-BE49-F238E27FC236}">
+                <a16:creationId xmlns:a16="http://schemas.microsoft.com/office/drawing/2014/main" id="{CC9BF0AA-2E99-4EF2-9F6E-111BE8ACD9AA}"/>
+              </a:ext>
+            </a:extLst>
+          </p:cNvPr>
+          <p:cNvCxnSpPr>
+            <a:cxnSpLocks/>
+          </p:cNvCxnSpPr>
+          <p:nvPr/>
+        </p:nvCxnSpPr>
+        <p:spPr>
+          <a:xfrm>
+            <a:off x="4559300" y="3271329"/>
+            <a:ext cx="3343994" cy="0"/>
+          </a:xfrm>
+          <a:prstGeom prst="straightConnector1">
+            <a:avLst/>
+          </a:prstGeom>
+          <a:ln w="50800">
+            <a:solidFill>
+              <a:schemeClr val="bg1">
+                <a:lumMod val="50000"/>
+              </a:schemeClr>
+            </a:solidFill>
+            <a:tailEnd type="triangle"/>
+          </a:ln>
+        </p:spPr>
+        <p:style>
+          <a:lnRef idx="1">
+            <a:schemeClr val="accent1"/>
+          </a:lnRef>
+          <a:fillRef idx="0">
+            <a:schemeClr val="accent1"/>
+          </a:fillRef>
+          <a:effectRef idx="0">
+            <a:schemeClr val="accent1"/>
+          </a:effectRef>
+          <a:fontRef idx="minor">
+            <a:schemeClr val="tx1"/>
+          </a:fontRef>
+        </p:style>
+      </p:cxnSp>
+      <p:sp>
+        <p:nvSpPr>
+          <p:cNvPr id="63" name="Rectangle: Rounded Corners 62">
+            <a:extLst>
+              <a:ext uri="{FF2B5EF4-FFF2-40B4-BE49-F238E27FC236}">
+                <a16:creationId xmlns:a16="http://schemas.microsoft.com/office/drawing/2014/main" id="{B1630B21-91BA-4E9C-B731-9E61ED2AFA72}"/>
+              </a:ext>
+            </a:extLst>
+          </p:cNvPr>
+          <p:cNvSpPr/>
+          <p:nvPr/>
+        </p:nvSpPr>
+        <p:spPr>
+          <a:xfrm>
+            <a:off x="7915994" y="5765293"/>
+            <a:ext cx="2971800" cy="457001"/>
+          </a:xfrm>
+          <a:prstGeom prst="roundRect">
+            <a:avLst/>
+          </a:prstGeom>
+          <a:solidFill>
+            <a:schemeClr val="bg1"/>
+          </a:solidFill>
+          <a:ln>
+            <a:solidFill>
+              <a:schemeClr val="tx1"/>
+            </a:solidFill>
+          </a:ln>
+        </p:spPr>
+        <p:style>
+          <a:lnRef idx="2">
+            <a:schemeClr val="accent1">
+              <a:shade val="50000"/>
+            </a:schemeClr>
+          </a:lnRef>
+          <a:fillRef idx="1">
+            <a:schemeClr val="accent1"/>
+          </a:fillRef>
+          <a:effectRef idx="0">
+            <a:schemeClr val="accent1"/>
+          </a:effectRef>
+          <a:fontRef idx="minor">
+            <a:schemeClr val="lt1"/>
+          </a:fontRef>
+        </p:style>
+        <p:txBody>
+          <a:bodyPr rtlCol="0" anchor="ctr"/>
+          <a:lstStyle/>
+          <a:p>
+            <a:pPr algn="ctr"/>
+            <a:r>
+              <a:rPr lang="en-US" b="1" dirty="0">
+                <a:solidFill>
+                  <a:schemeClr val="tx1"/>
+                </a:solidFill>
+              </a:rPr>
+              <a:t>“8”</a:t>
+            </a:r>
+            <a:r>
+              <a:rPr lang="en-US" b="1" dirty="0">
+                <a:solidFill>
+                  <a:schemeClr val="accent2">
+                    <a:lumMod val="75000"/>
+                  </a:schemeClr>
+                </a:solidFill>
+              </a:rPr>
+              <a:t>^^</a:t>
+            </a:r>
+            <a:r>
+              <a:rPr lang="en-US" b="1" dirty="0" err="1">
+                <a:solidFill>
+                  <a:schemeClr val="accent2">
+                    <a:lumMod val="75000"/>
+                  </a:schemeClr>
+                </a:solidFill>
+              </a:rPr>
+              <a:t>xsd:int</a:t>
+            </a:r>
+            <a:endParaRPr lang="en-US" b="1" dirty="0">
+              <a:solidFill>
+                <a:schemeClr val="accent2">
+                  <a:lumMod val="75000"/>
+                </a:schemeClr>
+              </a:solidFill>
+            </a:endParaRPr>
+          </a:p>
+        </p:txBody>
+      </p:sp>
+      <p:sp>
+        <p:nvSpPr>
+          <p:cNvPr id="64" name="Rectangle: Rounded Corners 63">
+            <a:extLst>
+              <a:ext uri="{FF2B5EF4-FFF2-40B4-BE49-F238E27FC236}">
+                <a16:creationId xmlns:a16="http://schemas.microsoft.com/office/drawing/2014/main" id="{FF35D29D-668C-4B62-879F-808B1E68966A}"/>
+              </a:ext>
+            </a:extLst>
+          </p:cNvPr>
+          <p:cNvSpPr/>
+          <p:nvPr/>
+        </p:nvSpPr>
+        <p:spPr>
+          <a:xfrm>
+            <a:off x="7915994" y="3950316"/>
+            <a:ext cx="2971800" cy="457001"/>
+          </a:xfrm>
+          <a:prstGeom prst="roundRect">
+            <a:avLst/>
+          </a:prstGeom>
+          <a:solidFill>
+            <a:schemeClr val="bg1"/>
+          </a:solidFill>
+          <a:ln>
+            <a:solidFill>
+              <a:schemeClr val="tx1"/>
+            </a:solidFill>
+          </a:ln>
+        </p:spPr>
+        <p:style>
+          <a:lnRef idx="2">
+            <a:schemeClr val="accent1">
+              <a:shade val="50000"/>
+            </a:schemeClr>
+          </a:lnRef>
+          <a:fillRef idx="1">
+            <a:schemeClr val="accent1"/>
+          </a:fillRef>
+          <a:effectRef idx="0">
+            <a:schemeClr val="accent1"/>
+          </a:effectRef>
+          <a:fontRef idx="minor">
+            <a:schemeClr val="lt1"/>
+          </a:fontRef>
+        </p:style>
+        <p:txBody>
+          <a:bodyPr rtlCol="0" anchor="ctr"/>
+          <a:lstStyle/>
+          <a:p>
+            <a:pPr algn="ctr"/>
+            <a:r>
+              <a:rPr lang="en-US" b="1" dirty="0">
+                <a:solidFill>
+                  <a:schemeClr val="tx1"/>
+                </a:solidFill>
+              </a:rPr>
+              <a:t>“P56D”</a:t>
+            </a:r>
+            <a:r>
+              <a:rPr lang="en-US" b="1" dirty="0">
+                <a:solidFill>
+                  <a:schemeClr val="accent2">
+                    <a:lumMod val="75000"/>
+                  </a:schemeClr>
+                </a:solidFill>
+              </a:rPr>
+              <a:t>^^</a:t>
+            </a:r>
+            <a:r>
+              <a:rPr lang="en-US" b="1" dirty="0" err="1">
+                <a:solidFill>
+                  <a:schemeClr val="accent2">
+                    <a:lumMod val="75000"/>
+                  </a:schemeClr>
+                </a:solidFill>
+              </a:rPr>
+              <a:t>xsd:duration</a:t>
+            </a:r>
+            <a:endParaRPr lang="en-US" b="1" dirty="0">
+              <a:solidFill>
+                <a:schemeClr val="accent2">
+                  <a:lumMod val="75000"/>
+                </a:schemeClr>
+              </a:solidFill>
+            </a:endParaRPr>
+          </a:p>
+        </p:txBody>
+      </p:sp>
+      <p:sp>
+        <p:nvSpPr>
+          <p:cNvPr id="15" name="Rectangle: Rounded Corners 14">
+            <a:extLst>
+              <a:ext uri="{FF2B5EF4-FFF2-40B4-BE49-F238E27FC236}">
+                <a16:creationId xmlns:a16="http://schemas.microsoft.com/office/drawing/2014/main" id="{F2D1CDB2-6DA6-45BF-B57E-8A1B3116DAB8}"/>
+              </a:ext>
+            </a:extLst>
+          </p:cNvPr>
+          <p:cNvSpPr/>
+          <p:nvPr/>
+        </p:nvSpPr>
+        <p:spPr>
+          <a:xfrm>
+            <a:off x="435541" y="1972158"/>
+            <a:ext cx="4016716" cy="457001"/>
+          </a:xfrm>
+          <a:prstGeom prst="roundRect">
+            <a:avLst/>
+          </a:prstGeom>
+          <a:solidFill>
+            <a:srgbClr val="EEEEBB"/>
+          </a:solidFill>
+          <a:ln w="38100">
+            <a:solidFill>
+              <a:srgbClr val="9E9E27"/>
+            </a:solidFill>
+          </a:ln>
+        </p:spPr>
+        <p:style>
+          <a:lnRef idx="2">
+            <a:schemeClr val="accent1">
+              <a:shade val="50000"/>
+            </a:schemeClr>
+          </a:lnRef>
+          <a:fillRef idx="1">
+            <a:schemeClr val="accent1"/>
+          </a:fillRef>
+          <a:effectRef idx="0">
+            <a:schemeClr val="accent1"/>
+          </a:effectRef>
+          <a:fontRef idx="minor">
+            <a:schemeClr val="lt1"/>
+          </a:fontRef>
+        </p:style>
+        <p:txBody>
+          <a:bodyPr rtlCol="0" anchor="ctr"/>
+          <a:lstStyle/>
+          <a:p>
+            <a:pPr algn="ctr"/>
+            <a:r>
+              <a:rPr lang="en-US" b="1" dirty="0">
+                <a:solidFill>
+                  <a:schemeClr val="tx1"/>
+                </a:solidFill>
+              </a:rPr>
+              <a:t>cj16050:AgeDataCollection_22218ae1</a:t>
+            </a:r>
+          </a:p>
+        </p:txBody>
+      </p:sp>
+      <p:sp>
+        <p:nvSpPr>
+          <p:cNvPr id="101" name="TextBox 100">
+            <a:extLst>
+              <a:ext uri="{FF2B5EF4-FFF2-40B4-BE49-F238E27FC236}">
+                <a16:creationId xmlns:a16="http://schemas.microsoft.com/office/drawing/2014/main" id="{C09F5CFC-6F12-41B9-B15E-3BD12189F043}"/>
+              </a:ext>
+            </a:extLst>
+          </p:cNvPr>
+          <p:cNvSpPr txBox="1"/>
+          <p:nvPr/>
+        </p:nvSpPr>
+        <p:spPr>
+          <a:xfrm flipH="1">
+            <a:off x="4614859" y="462766"/>
+            <a:ext cx="329184" cy="369332"/>
+          </a:xfrm>
+          <a:prstGeom prst="rect">
+            <a:avLst/>
+          </a:prstGeom>
+          <a:solidFill>
+            <a:schemeClr val="bg1"/>
+          </a:solidFill>
+        </p:spPr>
+        <p:txBody>
+          <a:bodyPr wrap="square" rtlCol="0">
+            <a:spAutoFit/>
+          </a:bodyPr>
+          <a:lstStyle>
+            <a:defPPr>
+              <a:defRPr lang="en-US"/>
+            </a:defPPr>
+            <a:lvl1pPr>
+              <a:defRPr b="1">
+                <a:solidFill>
+                  <a:schemeClr val="accent2">
+                    <a:lumMod val="75000"/>
+                  </a:schemeClr>
+                </a:solidFill>
+                <a:latin typeface="Courier New" panose="02070309020205020404" pitchFamily="49" charset="0"/>
+                <a:cs typeface="Courier New" panose="02070309020205020404" pitchFamily="49" charset="0"/>
+              </a:defRPr>
+            </a:lvl1pPr>
+          </a:lstStyle>
+          <a:p>
+            <a:r>
+              <a:rPr lang="en-US" dirty="0"/>
+              <a:t>a</a:t>
+            </a:r>
+          </a:p>
+        </p:txBody>
+      </p:sp>
+      <p:sp>
+        <p:nvSpPr>
+          <p:cNvPr id="102" name="TextBox 101">
+            <a:extLst>
+              <a:ext uri="{FF2B5EF4-FFF2-40B4-BE49-F238E27FC236}">
+                <a16:creationId xmlns:a16="http://schemas.microsoft.com/office/drawing/2014/main" id="{C131BC81-344F-4327-B4A7-CB6A075FB769}"/>
+              </a:ext>
+            </a:extLst>
+          </p:cNvPr>
+          <p:cNvSpPr txBox="1"/>
+          <p:nvPr/>
+        </p:nvSpPr>
+        <p:spPr>
+          <a:xfrm flipH="1">
+            <a:off x="4658591" y="2017776"/>
+            <a:ext cx="352321" cy="369332"/>
+          </a:xfrm>
+          <a:prstGeom prst="rect">
+            <a:avLst/>
+          </a:prstGeom>
+          <a:solidFill>
+            <a:schemeClr val="bg1"/>
+          </a:solidFill>
+        </p:spPr>
+        <p:txBody>
+          <a:bodyPr wrap="square" rtlCol="0">
+            <a:spAutoFit/>
+          </a:bodyPr>
+          <a:lstStyle>
+            <a:defPPr>
+              <a:defRPr lang="en-US"/>
+            </a:defPPr>
+            <a:lvl1pPr>
+              <a:defRPr b="1">
+                <a:solidFill>
+                  <a:schemeClr val="accent2">
+                    <a:lumMod val="75000"/>
+                  </a:schemeClr>
+                </a:solidFill>
+                <a:latin typeface="Courier New" panose="02070309020205020404" pitchFamily="49" charset="0"/>
+                <a:cs typeface="Courier New" panose="02070309020205020404" pitchFamily="49" charset="0"/>
+              </a:defRPr>
+            </a:lvl1pPr>
+          </a:lstStyle>
+          <a:p>
+            <a:r>
+              <a:rPr lang="en-US" dirty="0"/>
+              <a:t>a</a:t>
+            </a:r>
+          </a:p>
+        </p:txBody>
+      </p:sp>
+      <p:sp>
+        <p:nvSpPr>
+          <p:cNvPr id="104" name="TextBox 103">
+            <a:extLst>
+              <a:ext uri="{FF2B5EF4-FFF2-40B4-BE49-F238E27FC236}">
+                <a16:creationId xmlns:a16="http://schemas.microsoft.com/office/drawing/2014/main" id="{03B9BB02-0A20-4035-A314-6500C1A3EFEA}"/>
+              </a:ext>
+            </a:extLst>
+          </p:cNvPr>
+          <p:cNvSpPr txBox="1"/>
+          <p:nvPr/>
+        </p:nvSpPr>
+        <p:spPr>
+          <a:xfrm flipH="1">
+            <a:off x="4422109" y="4846950"/>
+            <a:ext cx="327937" cy="369332"/>
+          </a:xfrm>
+          <a:prstGeom prst="rect">
+            <a:avLst/>
+          </a:prstGeom>
+          <a:solidFill>
+            <a:schemeClr val="bg1"/>
+          </a:solidFill>
+        </p:spPr>
+        <p:txBody>
+          <a:bodyPr wrap="square" rtlCol="0">
+            <a:spAutoFit/>
+          </a:bodyPr>
+          <a:lstStyle>
+            <a:defPPr>
+              <a:defRPr lang="en-US"/>
+            </a:defPPr>
+            <a:lvl1pPr>
+              <a:defRPr b="1">
+                <a:solidFill>
+                  <a:schemeClr val="accent2">
+                    <a:lumMod val="75000"/>
+                  </a:schemeClr>
+                </a:solidFill>
+                <a:latin typeface="Courier New" panose="02070309020205020404" pitchFamily="49" charset="0"/>
+                <a:cs typeface="Courier New" panose="02070309020205020404" pitchFamily="49" charset="0"/>
+              </a:defRPr>
+            </a:lvl1pPr>
+          </a:lstStyle>
+          <a:p>
+            <a:endParaRPr lang="en-US" dirty="0"/>
+          </a:p>
+        </p:txBody>
+      </p:sp>
+      <p:sp>
+        <p:nvSpPr>
+          <p:cNvPr id="32" name="Rectangle: Rounded Corners 31">
+            <a:extLst>
+              <a:ext uri="{FF2B5EF4-FFF2-40B4-BE49-F238E27FC236}">
+                <a16:creationId xmlns:a16="http://schemas.microsoft.com/office/drawing/2014/main" id="{011D1156-12EC-4598-9970-0AF968E190D1}"/>
+              </a:ext>
+            </a:extLst>
+          </p:cNvPr>
+          <p:cNvSpPr/>
+          <p:nvPr/>
+        </p:nvSpPr>
+        <p:spPr>
+          <a:xfrm>
+            <a:off x="7811472" y="1250296"/>
+            <a:ext cx="2971800" cy="457001"/>
+          </a:xfrm>
+          <a:prstGeom prst="roundRect">
+            <a:avLst/>
+          </a:prstGeom>
+          <a:solidFill>
+            <a:schemeClr val="bg1"/>
+          </a:solidFill>
+          <a:ln>
+            <a:solidFill>
+              <a:schemeClr val="tx1"/>
+            </a:solidFill>
+          </a:ln>
+        </p:spPr>
+        <p:style>
+          <a:lnRef idx="2">
+            <a:schemeClr val="accent1">
+              <a:shade val="50000"/>
+            </a:schemeClr>
+          </a:lnRef>
+          <a:fillRef idx="1">
+            <a:schemeClr val="accent1"/>
+          </a:fillRef>
+          <a:effectRef idx="0">
+            <a:schemeClr val="accent1"/>
+          </a:effectRef>
+          <a:fontRef idx="minor">
+            <a:schemeClr val="lt1"/>
+          </a:fontRef>
+        </p:style>
+        <p:txBody>
+          <a:bodyPr rtlCol="0" anchor="ctr"/>
+          <a:lstStyle/>
+          <a:p>
+            <a:pPr algn="ctr"/>
+            <a:r>
+              <a:rPr lang="en-US" b="1" dirty="0">
+                <a:solidFill>
+                  <a:schemeClr val="tx1"/>
+                </a:solidFill>
+              </a:rPr>
+              <a:t>“Animal 99T1”</a:t>
+            </a:r>
+            <a:r>
+              <a:rPr lang="en-US" b="1" dirty="0">
+                <a:solidFill>
+                  <a:schemeClr val="accent2">
+                    <a:lumMod val="75000"/>
+                  </a:schemeClr>
+                </a:solidFill>
+              </a:rPr>
+              <a:t>^^</a:t>
+            </a:r>
+            <a:r>
+              <a:rPr lang="en-US" b="1" dirty="0" err="1">
+                <a:solidFill>
+                  <a:schemeClr val="accent2">
+                    <a:lumMod val="75000"/>
+                  </a:schemeClr>
+                </a:solidFill>
+              </a:rPr>
+              <a:t>xsd:string</a:t>
+            </a:r>
+            <a:endParaRPr lang="en-US" b="1" dirty="0">
+              <a:solidFill>
+                <a:schemeClr val="accent2">
+                  <a:lumMod val="75000"/>
+                </a:schemeClr>
+              </a:solidFill>
+            </a:endParaRPr>
+          </a:p>
+        </p:txBody>
+      </p:sp>
+      <p:cxnSp>
+        <p:nvCxnSpPr>
+          <p:cNvPr id="33" name="Straight Arrow Connector 32">
+            <a:extLst>
+              <a:ext uri="{FF2B5EF4-FFF2-40B4-BE49-F238E27FC236}">
+                <a16:creationId xmlns:a16="http://schemas.microsoft.com/office/drawing/2014/main" id="{98C26F41-E40F-4000-A4F9-44F51C0FD964}"/>
+              </a:ext>
+            </a:extLst>
+          </p:cNvPr>
+          <p:cNvCxnSpPr>
+            <a:cxnSpLocks/>
+            <a:stCxn id="4" idx="3"/>
+            <a:endCxn id="32" idx="1"/>
+          </p:cNvCxnSpPr>
+          <p:nvPr/>
+        </p:nvCxnSpPr>
+        <p:spPr>
+          <a:xfrm>
+            <a:off x="3929799" y="860142"/>
+            <a:ext cx="3881673" cy="618655"/>
+          </a:xfrm>
+          <a:prstGeom prst="straightConnector1">
+            <a:avLst/>
+          </a:prstGeom>
+          <a:ln w="50800">
+            <a:solidFill>
+              <a:schemeClr val="bg1">
+                <a:lumMod val="50000"/>
+              </a:schemeClr>
+            </a:solidFill>
+            <a:tailEnd type="triangle"/>
+          </a:ln>
+        </p:spPr>
+        <p:style>
+          <a:lnRef idx="1">
+            <a:schemeClr val="accent1"/>
+          </a:lnRef>
+          <a:fillRef idx="0">
+            <a:schemeClr val="accent1"/>
+          </a:fillRef>
+          <a:effectRef idx="0">
+            <a:schemeClr val="accent1"/>
+          </a:effectRef>
+          <a:fontRef idx="minor">
+            <a:schemeClr val="tx1"/>
+          </a:fontRef>
+        </p:style>
+      </p:cxnSp>
+      <p:sp>
+        <p:nvSpPr>
+          <p:cNvPr id="36" name="TextBox 35">
+            <a:extLst>
+              <a:ext uri="{FF2B5EF4-FFF2-40B4-BE49-F238E27FC236}">
+                <a16:creationId xmlns:a16="http://schemas.microsoft.com/office/drawing/2014/main" id="{933A4379-0D39-48A8-9C14-0C0680E24CAD}"/>
+              </a:ext>
+            </a:extLst>
+          </p:cNvPr>
+          <p:cNvSpPr txBox="1"/>
+          <p:nvPr/>
+        </p:nvSpPr>
+        <p:spPr>
+          <a:xfrm flipH="1">
+            <a:off x="4936224" y="923279"/>
+            <a:ext cx="2150376" cy="369332"/>
+          </a:xfrm>
+          <a:prstGeom prst="rect">
+            <a:avLst/>
+          </a:prstGeom>
+          <a:solidFill>
+            <a:schemeClr val="bg1"/>
+          </a:solidFill>
+        </p:spPr>
+        <p:txBody>
+          <a:bodyPr wrap="square" rtlCol="0">
+            <a:spAutoFit/>
+          </a:bodyPr>
+          <a:lstStyle>
+            <a:defPPr>
+              <a:defRPr lang="en-US"/>
+            </a:defPPr>
+            <a:lvl1pPr>
+              <a:defRPr b="1">
+                <a:solidFill>
+                  <a:schemeClr val="accent2">
+                    <a:lumMod val="75000"/>
+                  </a:schemeClr>
+                </a:solidFill>
+                <a:latin typeface="Courier New" panose="02070309020205020404" pitchFamily="49" charset="0"/>
+                <a:cs typeface="Courier New" panose="02070309020205020404" pitchFamily="49" charset="0"/>
+              </a:defRPr>
+            </a:lvl1pPr>
+          </a:lstStyle>
+          <a:p>
+            <a:r>
+              <a:rPr lang="en-US" dirty="0" err="1"/>
+              <a:t>skos:prefLabel</a:t>
+            </a:r>
+            <a:endParaRPr lang="en-US" dirty="0"/>
+          </a:p>
+        </p:txBody>
+      </p:sp>
+      <p:sp>
+        <p:nvSpPr>
+          <p:cNvPr id="34" name="TextBox 33">
+            <a:extLst>
+              <a:ext uri="{FF2B5EF4-FFF2-40B4-BE49-F238E27FC236}">
+                <a16:creationId xmlns:a16="http://schemas.microsoft.com/office/drawing/2014/main" id="{E3ED7B76-A1B7-4025-8D84-7ED1B98DAFCD}"/>
+              </a:ext>
+            </a:extLst>
+          </p:cNvPr>
+          <p:cNvSpPr txBox="1"/>
+          <p:nvPr/>
+        </p:nvSpPr>
+        <p:spPr>
+          <a:xfrm>
+            <a:off x="8810172" y="6488668"/>
+            <a:ext cx="4049486" cy="369332"/>
+          </a:xfrm>
+          <a:prstGeom prst="rect">
+            <a:avLst/>
+          </a:prstGeom>
+          <a:noFill/>
+        </p:spPr>
+        <p:txBody>
+          <a:bodyPr wrap="square" rtlCol="0">
+            <a:spAutoFit/>
+          </a:bodyPr>
+          <a:lstStyle/>
+          <a:p>
+            <a:r>
+              <a:rPr lang="en-US" b="1" dirty="0">
+                <a:solidFill>
+                  <a:srgbClr val="FF0000"/>
+                </a:solidFill>
+              </a:rPr>
+              <a:t>AgeStructure.PNG</a:t>
+            </a:r>
+          </a:p>
+        </p:txBody>
+      </p:sp>
+      <p:sp>
+        <p:nvSpPr>
+          <p:cNvPr id="68" name="Rectangle: Rounded Corners 67">
+            <a:extLst>
+              <a:ext uri="{FF2B5EF4-FFF2-40B4-BE49-F238E27FC236}">
+                <a16:creationId xmlns:a16="http://schemas.microsoft.com/office/drawing/2014/main" id="{69EE693F-D44C-4C32-925F-E785365C9E76}"/>
+              </a:ext>
+            </a:extLst>
+          </p:cNvPr>
+          <p:cNvSpPr/>
+          <p:nvPr/>
+        </p:nvSpPr>
+        <p:spPr>
+          <a:xfrm>
+            <a:off x="7915994" y="4857804"/>
+            <a:ext cx="2971800" cy="457001"/>
+          </a:xfrm>
+          <a:prstGeom prst="roundRect">
+            <a:avLst/>
+          </a:prstGeom>
+          <a:solidFill>
+            <a:srgbClr val="E4ECF8"/>
+          </a:solidFill>
+          <a:ln w="38100">
+            <a:solidFill>
+              <a:schemeClr val="accent1">
+                <a:lumMod val="75000"/>
+              </a:schemeClr>
+            </a:solidFill>
+          </a:ln>
+        </p:spPr>
+        <p:style>
+          <a:lnRef idx="2">
+            <a:schemeClr val="accent1">
+              <a:shade val="50000"/>
+            </a:schemeClr>
+          </a:lnRef>
+          <a:fillRef idx="1">
+            <a:schemeClr val="accent1"/>
+          </a:fillRef>
+          <a:effectRef idx="0">
+            <a:schemeClr val="accent1"/>
+          </a:effectRef>
+          <a:fontRef idx="minor">
+            <a:schemeClr val="lt1"/>
+          </a:fontRef>
+        </p:style>
+        <p:txBody>
+          <a:bodyPr rtlCol="0" anchor="ctr"/>
+          <a:lstStyle/>
+          <a:p>
+            <a:pPr algn="ctr"/>
+            <a:r>
+              <a:rPr lang="en-US" b="1" dirty="0" err="1">
+                <a:solidFill>
+                  <a:schemeClr val="tx1"/>
+                </a:solidFill>
+              </a:rPr>
+              <a:t>time:unitWeek</a:t>
+            </a:r>
+            <a:endParaRPr lang="en-US" b="1" dirty="0">
+              <a:solidFill>
+                <a:schemeClr val="tx1"/>
+              </a:solidFill>
+            </a:endParaRPr>
+          </a:p>
+        </p:txBody>
+      </p:sp>
+      <p:sp>
+        <p:nvSpPr>
+          <p:cNvPr id="103" name="TextBox 102">
+            <a:extLst>
+              <a:ext uri="{FF2B5EF4-FFF2-40B4-BE49-F238E27FC236}">
+                <a16:creationId xmlns:a16="http://schemas.microsoft.com/office/drawing/2014/main" id="{1575B748-BC68-4CFD-8CCA-7EB9518B465B}"/>
+              </a:ext>
+            </a:extLst>
+          </p:cNvPr>
+          <p:cNvSpPr txBox="1"/>
+          <p:nvPr/>
+        </p:nvSpPr>
+        <p:spPr>
+          <a:xfrm flipH="1">
+            <a:off x="5850550" y="3084346"/>
+            <a:ext cx="329193" cy="231110"/>
+          </a:xfrm>
+          <a:prstGeom prst="rect">
+            <a:avLst/>
+          </a:prstGeom>
+          <a:solidFill>
+            <a:schemeClr val="bg1"/>
+          </a:solidFill>
+        </p:spPr>
+        <p:txBody>
+          <a:bodyPr wrap="square" rtlCol="0">
+            <a:spAutoFit/>
+          </a:bodyPr>
+          <a:lstStyle>
+            <a:defPPr>
+              <a:defRPr lang="en-US"/>
+            </a:defPPr>
+            <a:lvl1pPr>
+              <a:defRPr b="1">
+                <a:solidFill>
+                  <a:schemeClr val="accent2">
+                    <a:lumMod val="75000"/>
+                  </a:schemeClr>
+                </a:solidFill>
+                <a:latin typeface="Courier New" panose="02070309020205020404" pitchFamily="49" charset="0"/>
+                <a:cs typeface="Courier New" panose="02070309020205020404" pitchFamily="49" charset="0"/>
+              </a:defRPr>
+            </a:lvl1pPr>
+          </a:lstStyle>
+          <a:p>
+            <a:r>
+              <a:rPr lang="en-US" dirty="0"/>
+              <a:t>a</a:t>
+            </a:r>
+          </a:p>
+        </p:txBody>
+      </p:sp>
+      <p:cxnSp>
+        <p:nvCxnSpPr>
+          <p:cNvPr id="95" name="Straight Arrow Connector 94">
+            <a:extLst>
+              <a:ext uri="{FF2B5EF4-FFF2-40B4-BE49-F238E27FC236}">
+                <a16:creationId xmlns:a16="http://schemas.microsoft.com/office/drawing/2014/main" id="{64B2E44E-B298-4D16-A45C-A8147937A180}"/>
+              </a:ext>
+            </a:extLst>
+          </p:cNvPr>
+          <p:cNvCxnSpPr>
+            <a:cxnSpLocks/>
+          </p:cNvCxnSpPr>
+          <p:nvPr/>
+        </p:nvCxnSpPr>
+        <p:spPr>
+          <a:xfrm>
+            <a:off x="4572000" y="3245817"/>
+            <a:ext cx="0" cy="2788617"/>
+          </a:xfrm>
+          <a:prstGeom prst="straightConnector1">
+            <a:avLst/>
+          </a:prstGeom>
+          <a:ln w="50800">
+            <a:solidFill>
+              <a:schemeClr val="bg1">
+                <a:lumMod val="50000"/>
+              </a:schemeClr>
+            </a:solidFill>
+            <a:tailEnd type="none"/>
+          </a:ln>
+        </p:spPr>
+        <p:style>
+          <a:lnRef idx="1">
+            <a:schemeClr val="accent1"/>
+          </a:lnRef>
+          <a:fillRef idx="0">
+            <a:schemeClr val="accent1"/>
+          </a:fillRef>
+          <a:effectRef idx="0">
+            <a:schemeClr val="accent1"/>
+          </a:effectRef>
+          <a:fontRef idx="minor">
+            <a:schemeClr val="tx1"/>
+          </a:fontRef>
+        </p:style>
+      </p:cxnSp>
+      <p:cxnSp>
+        <p:nvCxnSpPr>
+          <p:cNvPr id="97" name="Straight Arrow Connector 96">
+            <a:extLst>
+              <a:ext uri="{FF2B5EF4-FFF2-40B4-BE49-F238E27FC236}">
+                <a16:creationId xmlns:a16="http://schemas.microsoft.com/office/drawing/2014/main" id="{4B47120A-0E13-43B0-85D2-0F5EA53352AD}"/>
+              </a:ext>
+            </a:extLst>
+          </p:cNvPr>
+          <p:cNvCxnSpPr>
+            <a:cxnSpLocks/>
+            <a:stCxn id="47" idx="3"/>
+          </p:cNvCxnSpPr>
+          <p:nvPr/>
+        </p:nvCxnSpPr>
+        <p:spPr>
+          <a:xfrm>
+            <a:off x="3929799" y="4010880"/>
+            <a:ext cx="667601" cy="0"/>
+          </a:xfrm>
+          <a:prstGeom prst="straightConnector1">
+            <a:avLst/>
+          </a:prstGeom>
+          <a:ln w="50800">
+            <a:solidFill>
+              <a:schemeClr val="bg1">
+                <a:lumMod val="50000"/>
+              </a:schemeClr>
+            </a:solidFill>
+            <a:tailEnd type="none"/>
+          </a:ln>
+        </p:spPr>
+        <p:style>
+          <a:lnRef idx="1">
+            <a:schemeClr val="accent1"/>
+          </a:lnRef>
+          <a:fillRef idx="0">
+            <a:schemeClr val="accent1"/>
+          </a:fillRef>
+          <a:effectRef idx="0">
+            <a:schemeClr val="accent1"/>
+          </a:effectRef>
+          <a:fontRef idx="minor">
+            <a:schemeClr val="tx1"/>
+          </a:fontRef>
+        </p:style>
+      </p:cxnSp>
+      <p:cxnSp>
+        <p:nvCxnSpPr>
+          <p:cNvPr id="105" name="Straight Arrow Connector 104">
+            <a:extLst>
+              <a:ext uri="{FF2B5EF4-FFF2-40B4-BE49-F238E27FC236}">
+                <a16:creationId xmlns:a16="http://schemas.microsoft.com/office/drawing/2014/main" id="{032F40BD-5221-4AB5-88B2-1267E01F0E6E}"/>
+              </a:ext>
+            </a:extLst>
+          </p:cNvPr>
+          <p:cNvCxnSpPr>
+            <a:cxnSpLocks/>
+          </p:cNvCxnSpPr>
+          <p:nvPr/>
+        </p:nvCxnSpPr>
+        <p:spPr>
+          <a:xfrm>
+            <a:off x="4559300" y="4198429"/>
+            <a:ext cx="3343994" cy="0"/>
+          </a:xfrm>
+          <a:prstGeom prst="straightConnector1">
+            <a:avLst/>
+          </a:prstGeom>
+          <a:ln w="50800">
+            <a:solidFill>
+              <a:schemeClr val="bg1">
+                <a:lumMod val="50000"/>
+              </a:schemeClr>
+            </a:solidFill>
+            <a:tailEnd type="triangle"/>
+          </a:ln>
+        </p:spPr>
+        <p:style>
+          <a:lnRef idx="1">
+            <a:schemeClr val="accent1"/>
+          </a:lnRef>
+          <a:fillRef idx="0">
+            <a:schemeClr val="accent1"/>
+          </a:fillRef>
+          <a:effectRef idx="0">
+            <a:schemeClr val="accent1"/>
+          </a:effectRef>
+          <a:fontRef idx="minor">
+            <a:schemeClr val="tx1"/>
+          </a:fontRef>
+        </p:style>
+      </p:cxnSp>
+      <p:cxnSp>
+        <p:nvCxnSpPr>
+          <p:cNvPr id="106" name="Straight Arrow Connector 105">
+            <a:extLst>
+              <a:ext uri="{FF2B5EF4-FFF2-40B4-BE49-F238E27FC236}">
+                <a16:creationId xmlns:a16="http://schemas.microsoft.com/office/drawing/2014/main" id="{4A07D89E-2701-4D9E-AE09-59275A98E55C}"/>
+              </a:ext>
+            </a:extLst>
+          </p:cNvPr>
+          <p:cNvCxnSpPr>
+            <a:cxnSpLocks/>
+          </p:cNvCxnSpPr>
+          <p:nvPr/>
+        </p:nvCxnSpPr>
+        <p:spPr>
+          <a:xfrm>
+            <a:off x="4559300" y="5062029"/>
+            <a:ext cx="3343994" cy="0"/>
+          </a:xfrm>
+          <a:prstGeom prst="straightConnector1">
+            <a:avLst/>
+          </a:prstGeom>
+          <a:ln w="50800">
+            <a:solidFill>
+              <a:schemeClr val="bg1">
+                <a:lumMod val="50000"/>
+              </a:schemeClr>
+            </a:solidFill>
+            <a:tailEnd type="triangle"/>
+          </a:ln>
+        </p:spPr>
+        <p:style>
+          <a:lnRef idx="1">
+            <a:schemeClr val="accent1"/>
+          </a:lnRef>
+          <a:fillRef idx="0">
+            <a:schemeClr val="accent1"/>
+          </a:fillRef>
+          <a:effectRef idx="0">
+            <a:schemeClr val="accent1"/>
+          </a:effectRef>
+          <a:fontRef idx="minor">
+            <a:schemeClr val="tx1"/>
+          </a:fontRef>
+        </p:style>
+      </p:cxnSp>
+      <p:cxnSp>
+        <p:nvCxnSpPr>
+          <p:cNvPr id="108" name="Straight Arrow Connector 107">
+            <a:extLst>
+              <a:ext uri="{FF2B5EF4-FFF2-40B4-BE49-F238E27FC236}">
+                <a16:creationId xmlns:a16="http://schemas.microsoft.com/office/drawing/2014/main" id="{0EB79D4F-75AD-404E-8313-3406C5B65DFD}"/>
+              </a:ext>
+            </a:extLst>
+          </p:cNvPr>
+          <p:cNvCxnSpPr>
+            <a:cxnSpLocks/>
+          </p:cNvCxnSpPr>
+          <p:nvPr/>
+        </p:nvCxnSpPr>
+        <p:spPr>
+          <a:xfrm>
+            <a:off x="4547777" y="6014529"/>
+            <a:ext cx="3355517" cy="0"/>
+          </a:xfrm>
+          <a:prstGeom prst="straightConnector1">
+            <a:avLst/>
+          </a:prstGeom>
+          <a:ln w="50800">
+            <a:solidFill>
+              <a:schemeClr val="bg1">
+                <a:lumMod val="50000"/>
+              </a:schemeClr>
+            </a:solidFill>
+            <a:tailEnd type="triangle"/>
+          </a:ln>
+        </p:spPr>
+        <p:style>
+          <a:lnRef idx="1">
+            <a:schemeClr val="accent1"/>
+          </a:lnRef>
+          <a:fillRef idx="0">
+            <a:schemeClr val="accent1"/>
+          </a:fillRef>
+          <a:effectRef idx="0">
+            <a:schemeClr val="accent1"/>
+          </a:effectRef>
+          <a:fontRef idx="minor">
+            <a:schemeClr val="tx1"/>
+          </a:fontRef>
+        </p:style>
+      </p:cxnSp>
+      <p:sp>
+        <p:nvSpPr>
+          <p:cNvPr id="109" name="Rectangle 108">
+            <a:extLst>
+              <a:ext uri="{FF2B5EF4-FFF2-40B4-BE49-F238E27FC236}">
+                <a16:creationId xmlns:a16="http://schemas.microsoft.com/office/drawing/2014/main" id="{7753650D-E3D5-4A84-9104-0960BCEF32EC}"/>
+              </a:ext>
+            </a:extLst>
+          </p:cNvPr>
+          <p:cNvSpPr/>
+          <p:nvPr/>
+        </p:nvSpPr>
+        <p:spPr>
+          <a:xfrm>
+            <a:off x="4659145" y="5799779"/>
+            <a:ext cx="2954505" cy="369332"/>
+          </a:xfrm>
+          <a:prstGeom prst="rect">
+            <a:avLst/>
+          </a:prstGeom>
+          <a:solidFill>
+            <a:schemeClr val="bg1"/>
+          </a:solidFill>
+        </p:spPr>
+        <p:txBody>
+          <a:bodyPr wrap="square" rtlCol="0">
+            <a:spAutoFit/>
+          </a:bodyPr>
+          <a:lstStyle/>
+          <a:p>
+            <a:r>
+              <a:rPr lang="en-US" b="1" dirty="0" err="1">
+                <a:solidFill>
+                  <a:schemeClr val="accent2">
+                    <a:lumMod val="75000"/>
+                  </a:schemeClr>
+                </a:solidFill>
+                <a:latin typeface="Courier New" panose="02070309020205020404" pitchFamily="49" charset="0"/>
+                <a:cs typeface="Courier New" panose="02070309020205020404" pitchFamily="49" charset="0"/>
+              </a:rPr>
+              <a:t>time:numericDuration</a:t>
+            </a:r>
+            <a:endParaRPr lang="en-US" b="1" dirty="0">
+              <a:solidFill>
+                <a:schemeClr val="accent2">
+                  <a:lumMod val="75000"/>
+                </a:schemeClr>
+              </a:solidFill>
+              <a:latin typeface="Courier New" panose="02070309020205020404" pitchFamily="49" charset="0"/>
+              <a:cs typeface="Courier New" panose="02070309020205020404" pitchFamily="49" charset="0"/>
+            </a:endParaRPr>
+          </a:p>
+        </p:txBody>
+      </p:sp>
+      <p:sp>
+        <p:nvSpPr>
+          <p:cNvPr id="107" name="Rectangle 106">
+            <a:extLst>
+              <a:ext uri="{FF2B5EF4-FFF2-40B4-BE49-F238E27FC236}">
+                <a16:creationId xmlns:a16="http://schemas.microsoft.com/office/drawing/2014/main" id="{CBA756AA-71BD-413D-93C8-BAE6C900E028}"/>
+              </a:ext>
+            </a:extLst>
+          </p:cNvPr>
+          <p:cNvSpPr/>
+          <p:nvPr/>
+        </p:nvSpPr>
+        <p:spPr>
+          <a:xfrm>
+            <a:off x="4755126" y="4000500"/>
+            <a:ext cx="2788674" cy="369332"/>
+          </a:xfrm>
+          <a:prstGeom prst="rect">
+            <a:avLst/>
+          </a:prstGeom>
+          <a:solidFill>
+            <a:schemeClr val="bg1"/>
+          </a:solidFill>
+        </p:spPr>
+        <p:txBody>
+          <a:bodyPr wrap="square" rtlCol="0">
+            <a:spAutoFit/>
+          </a:bodyPr>
+          <a:lstStyle/>
+          <a:p>
+            <a:r>
+              <a:rPr lang="en-US" b="1" dirty="0" err="1">
+                <a:solidFill>
+                  <a:schemeClr val="accent2">
+                    <a:lumMod val="75000"/>
+                  </a:schemeClr>
+                </a:solidFill>
+                <a:latin typeface="Courier New" panose="02070309020205020404" pitchFamily="49" charset="0"/>
+                <a:cs typeface="Courier New" panose="02070309020205020404" pitchFamily="49" charset="0"/>
+              </a:rPr>
+              <a:t>time:hasXSDDuration</a:t>
+            </a:r>
+            <a:endParaRPr lang="en-US" b="1" dirty="0">
+              <a:solidFill>
+                <a:schemeClr val="accent2">
+                  <a:lumMod val="75000"/>
+                </a:schemeClr>
+              </a:solidFill>
+              <a:latin typeface="Courier New" panose="02070309020205020404" pitchFamily="49" charset="0"/>
+              <a:cs typeface="Courier New" panose="02070309020205020404" pitchFamily="49" charset="0"/>
+            </a:endParaRPr>
+          </a:p>
+        </p:txBody>
+      </p:sp>
+      <p:sp>
+        <p:nvSpPr>
+          <p:cNvPr id="92" name="Rectangle 91">
+            <a:extLst>
+              <a:ext uri="{FF2B5EF4-FFF2-40B4-BE49-F238E27FC236}">
+                <a16:creationId xmlns:a16="http://schemas.microsoft.com/office/drawing/2014/main" id="{32AE2373-4CFA-45A2-9BAF-0BE6FE35B084}"/>
+              </a:ext>
+            </a:extLst>
+          </p:cNvPr>
+          <p:cNvSpPr/>
+          <p:nvPr/>
+        </p:nvSpPr>
+        <p:spPr>
+          <a:xfrm>
+            <a:off x="5154445" y="4847278"/>
+            <a:ext cx="2021055" cy="372421"/>
+          </a:xfrm>
+          <a:prstGeom prst="rect">
+            <a:avLst/>
+          </a:prstGeom>
+          <a:solidFill>
+            <a:schemeClr val="bg1"/>
+          </a:solidFill>
+        </p:spPr>
+        <p:txBody>
+          <a:bodyPr wrap="square" rtlCol="0">
+            <a:spAutoFit/>
+          </a:bodyPr>
+          <a:lstStyle/>
+          <a:p>
+            <a:r>
+              <a:rPr lang="en-US" b="1" dirty="0" err="1">
+                <a:solidFill>
+                  <a:schemeClr val="accent2">
+                    <a:lumMod val="75000"/>
+                  </a:schemeClr>
+                </a:solidFill>
+                <a:latin typeface="Courier New" panose="02070309020205020404" pitchFamily="49" charset="0"/>
+                <a:cs typeface="Courier New" panose="02070309020205020404" pitchFamily="49" charset="0"/>
+              </a:rPr>
+              <a:t>time:unitType</a:t>
+            </a:r>
+            <a:endParaRPr lang="en-US" b="1" dirty="0">
+              <a:solidFill>
+                <a:schemeClr val="accent2">
+                  <a:lumMod val="75000"/>
+                </a:schemeClr>
+              </a:solidFill>
+              <a:latin typeface="Courier New" panose="02070309020205020404" pitchFamily="49" charset="0"/>
+              <a:cs typeface="Courier New" panose="02070309020205020404" pitchFamily="49" charset="0"/>
+            </a:endParaRPr>
+          </a:p>
+        </p:txBody>
+      </p:sp>
+    </p:spTree>
+    <p:extLst>
+      <p:ext uri="{BB962C8B-B14F-4D97-AF65-F5344CB8AC3E}">
+        <p14:creationId xmlns:p14="http://schemas.microsoft.com/office/powerpoint/2010/main" val="515950704"/>
+      </p:ext>
+    </p:extLst>
+  </p:cSld>
+  <p:clrMapOvr>
+    <a:masterClrMapping/>
+  </p:clrMapOvr>
+</p:sld>
+</file>
+
+<file path=ppt/slides/slide8.xml><?xml version="1.0" encoding="utf-8"?>
+<p:sld xmlns:a="http://schemas.openxmlformats.org/drawingml/2006/main" xmlns:r="http://schemas.openxmlformats.org/officeDocument/2006/relationships" xmlns:p="http://schemas.openxmlformats.org/presentationml/2006/main">
+  <p:cSld>
+    <p:spTree>
+      <p:nvGrpSpPr>
+        <p:cNvPr id="1" name=""/>
+        <p:cNvGrpSpPr/>
+        <p:nvPr/>
+      </p:nvGrpSpPr>
+      <p:grpSpPr>
+        <a:xfrm>
+          <a:off x="0" y="0"/>
+          <a:ext cx="0" cy="0"/>
+          <a:chOff x="0" y="0"/>
+          <a:chExt cx="0" cy="0"/>
+        </a:xfrm>
+      </p:grpSpPr>
+      <p:sp>
+        <p:nvSpPr>
           <p:cNvPr id="2" name="Title 1">
             <a:extLst>
               <a:ext uri="{FF2B5EF4-FFF2-40B4-BE49-F238E27FC236}">
@@ -11559,7 +13962,7 @@
 </p:sld>
 </file>
 
-<file path=ppt/slides/slide8.xml><?xml version="1.0" encoding="utf-8"?>
+<file path=ppt/slides/slide9.xml><?xml version="1.0" encoding="utf-8"?>
 <p:sld xmlns:a="http://schemas.openxmlformats.org/drawingml/2006/main" xmlns:r="http://schemas.openxmlformats.org/officeDocument/2006/relationships" xmlns:p="http://schemas.openxmlformats.org/presentationml/2006/main">
   <p:cSld>
     <p:spTree>
@@ -13646,559 +16049,6 @@
     <p:extLst>
       <p:ext uri="{BB962C8B-B14F-4D97-AF65-F5344CB8AC3E}">
         <p14:creationId xmlns:p14="http://schemas.microsoft.com/office/powerpoint/2010/main" val="4149868494"/>
-      </p:ext>
-    </p:extLst>
-  </p:cSld>
-  <p:clrMapOvr>
-    <a:masterClrMapping/>
-  </p:clrMapOvr>
-</p:sld>
-</file>
-
-<file path=ppt/slides/slide9.xml><?xml version="1.0" encoding="utf-8"?>
-<p:sld xmlns:a="http://schemas.openxmlformats.org/drawingml/2006/main" xmlns:r="http://schemas.openxmlformats.org/officeDocument/2006/relationships" xmlns:p="http://schemas.openxmlformats.org/presentationml/2006/main">
-  <p:cSld>
-    <p:spTree>
-      <p:nvGrpSpPr>
-        <p:cNvPr id="1" name=""/>
-        <p:cNvGrpSpPr/>
-        <p:nvPr/>
-      </p:nvGrpSpPr>
-      <p:grpSpPr>
-        <a:xfrm>
-          <a:off x="0" y="0"/>
-          <a:ext cx="0" cy="0"/>
-          <a:chOff x="0" y="0"/>
-          <a:chExt cx="0" cy="0"/>
-        </a:xfrm>
-      </p:grpSpPr>
-      <p:sp>
-        <p:nvSpPr>
-          <p:cNvPr id="4" name="Rectangle: Rounded Corners 3"/>
-          <p:cNvSpPr/>
-          <p:nvPr/>
-        </p:nvSpPr>
-        <p:spPr>
-          <a:xfrm>
-            <a:off x="6359054" y="800152"/>
-            <a:ext cx="2468880" cy="449588"/>
-          </a:xfrm>
-          <a:prstGeom prst="roundRect">
-            <a:avLst/>
-          </a:prstGeom>
-          <a:solidFill>
-            <a:schemeClr val="accent6">
-              <a:lumMod val="40000"/>
-              <a:lumOff val="60000"/>
-            </a:schemeClr>
-          </a:solidFill>
-          <a:ln>
-            <a:solidFill>
-              <a:schemeClr val="tx1"/>
-            </a:solidFill>
-          </a:ln>
-        </p:spPr>
-        <p:style>
-          <a:lnRef idx="2">
-            <a:schemeClr val="accent1">
-              <a:shade val="50000"/>
-            </a:schemeClr>
-          </a:lnRef>
-          <a:fillRef idx="1">
-            <a:schemeClr val="accent1"/>
-          </a:fillRef>
-          <a:effectRef idx="0">
-            <a:schemeClr val="accent1"/>
-          </a:effectRef>
-          <a:fontRef idx="minor">
-            <a:schemeClr val="lt1"/>
-          </a:fontRef>
-        </p:style>
-        <p:txBody>
-          <a:bodyPr rtlCol="0" anchor="ctr"/>
-          <a:lstStyle/>
-          <a:p>
-            <a:pPr algn="ctr"/>
-            <a:r>
-              <a:rPr lang="en-US" b="1" dirty="0">
-                <a:solidFill>
-                  <a:schemeClr val="tx1"/>
-                </a:solidFill>
-              </a:rPr>
-              <a:t>Person_</a:t>
-            </a:r>
-            <a:r>
-              <a:rPr lang="en-US" b="1" dirty="0">
-                <a:solidFill>
-                  <a:schemeClr val="accent1">
-                    <a:lumMod val="75000"/>
-                  </a:schemeClr>
-                </a:solidFill>
-              </a:rPr>
-              <a:t>01-701-1015</a:t>
-            </a:r>
-          </a:p>
-        </p:txBody>
-      </p:sp>
-      <p:sp>
-        <p:nvSpPr>
-          <p:cNvPr id="5" name="Rectangle: Rounded Corners 4"/>
-          <p:cNvSpPr/>
-          <p:nvPr/>
-        </p:nvSpPr>
-        <p:spPr>
-          <a:xfrm>
-            <a:off x="7348177" y="2628952"/>
-            <a:ext cx="2468880" cy="457001"/>
-          </a:xfrm>
-          <a:prstGeom prst="roundRect">
-            <a:avLst/>
-          </a:prstGeom>
-          <a:solidFill>
-            <a:schemeClr val="accent1">
-              <a:lumMod val="40000"/>
-              <a:lumOff val="60000"/>
-            </a:schemeClr>
-          </a:solidFill>
-          <a:ln>
-            <a:solidFill>
-              <a:schemeClr val="tx1"/>
-            </a:solidFill>
-          </a:ln>
-        </p:spPr>
-        <p:style>
-          <a:lnRef idx="2">
-            <a:schemeClr val="accent1">
-              <a:shade val="50000"/>
-            </a:schemeClr>
-          </a:lnRef>
-          <a:fillRef idx="1">
-            <a:schemeClr val="accent1"/>
-          </a:fillRef>
-          <a:effectRef idx="0">
-            <a:schemeClr val="accent1"/>
-          </a:effectRef>
-          <a:fontRef idx="minor">
-            <a:schemeClr val="lt1"/>
-          </a:fontRef>
-        </p:style>
-        <p:txBody>
-          <a:bodyPr rtlCol="0" anchor="ctr"/>
-          <a:lstStyle/>
-          <a:p>
-            <a:pPr algn="ctr"/>
-            <a:r>
-              <a:rPr lang="en-US" b="1" dirty="0">
-                <a:solidFill>
-                  <a:schemeClr val="tx1"/>
-                </a:solidFill>
-              </a:rPr>
-              <a:t>Medical Condition</a:t>
-            </a:r>
-          </a:p>
-        </p:txBody>
-      </p:sp>
-      <p:sp>
-        <p:nvSpPr>
-          <p:cNvPr id="13" name="Rectangle: Rounded Corners 12"/>
-          <p:cNvSpPr/>
-          <p:nvPr/>
-        </p:nvSpPr>
-        <p:spPr>
-          <a:xfrm>
-            <a:off x="7158066" y="4705104"/>
-            <a:ext cx="2468880" cy="457001"/>
-          </a:xfrm>
-          <a:prstGeom prst="roundRect">
-            <a:avLst/>
-          </a:prstGeom>
-          <a:solidFill>
-            <a:srgbClr val="FFC000"/>
-          </a:solidFill>
-          <a:ln>
-            <a:solidFill>
-              <a:schemeClr val="tx1"/>
-            </a:solidFill>
-          </a:ln>
-        </p:spPr>
-        <p:style>
-          <a:lnRef idx="2">
-            <a:schemeClr val="accent1">
-              <a:shade val="50000"/>
-            </a:schemeClr>
-          </a:lnRef>
-          <a:fillRef idx="1">
-            <a:schemeClr val="accent1"/>
-          </a:fillRef>
-          <a:effectRef idx="0">
-            <a:schemeClr val="accent1"/>
-          </a:effectRef>
-          <a:fontRef idx="minor">
-            <a:schemeClr val="lt1"/>
-          </a:fontRef>
-        </p:style>
-        <p:txBody>
-          <a:bodyPr rtlCol="0" anchor="ctr"/>
-          <a:lstStyle/>
-          <a:p>
-            <a:pPr algn="ctr"/>
-            <a:r>
-              <a:rPr lang="en-US" b="1" dirty="0" err="1">
-                <a:solidFill>
-                  <a:schemeClr val="tx1"/>
-                </a:solidFill>
-              </a:rPr>
-              <a:t>AdverseEvent</a:t>
-            </a:r>
-            <a:endParaRPr lang="en-US" b="1" dirty="0">
-              <a:solidFill>
-                <a:schemeClr val="tx1"/>
-              </a:solidFill>
-            </a:endParaRPr>
-          </a:p>
-        </p:txBody>
-      </p:sp>
-      <p:cxnSp>
-        <p:nvCxnSpPr>
-          <p:cNvPr id="14" name="Straight Arrow Connector 13"/>
-          <p:cNvCxnSpPr>
-            <a:cxnSpLocks/>
-            <a:stCxn id="5" idx="2"/>
-            <a:endCxn id="13" idx="0"/>
-          </p:cNvCxnSpPr>
-          <p:nvPr/>
-        </p:nvCxnSpPr>
-        <p:spPr>
-          <a:xfrm flipH="1">
-            <a:off x="8392506" y="3085953"/>
-            <a:ext cx="190111" cy="1619151"/>
-          </a:xfrm>
-          <a:prstGeom prst="straightConnector1">
-            <a:avLst/>
-          </a:prstGeom>
-          <a:ln w="50800">
-            <a:solidFill>
-              <a:schemeClr val="bg1">
-                <a:lumMod val="50000"/>
-              </a:schemeClr>
-            </a:solidFill>
-            <a:tailEnd type="triangle"/>
-          </a:ln>
-        </p:spPr>
-        <p:style>
-          <a:lnRef idx="1">
-            <a:schemeClr val="accent1"/>
-          </a:lnRef>
-          <a:fillRef idx="0">
-            <a:schemeClr val="accent1"/>
-          </a:fillRef>
-          <a:effectRef idx="0">
-            <a:schemeClr val="accent1"/>
-          </a:effectRef>
-          <a:fontRef idx="minor">
-            <a:schemeClr val="tx1"/>
-          </a:fontRef>
-        </p:style>
-      </p:cxnSp>
-      <p:sp>
-        <p:nvSpPr>
-          <p:cNvPr id="20" name="TextBox 19"/>
-          <p:cNvSpPr txBox="1"/>
-          <p:nvPr/>
-        </p:nvSpPr>
-        <p:spPr>
-          <a:xfrm>
-            <a:off x="9644498" y="739025"/>
-            <a:ext cx="1967829" cy="369332"/>
-          </a:xfrm>
-          <a:prstGeom prst="rect">
-            <a:avLst/>
-          </a:prstGeom>
-          <a:solidFill>
-            <a:schemeClr val="bg1"/>
-          </a:solidFill>
-        </p:spPr>
-        <p:txBody>
-          <a:bodyPr wrap="square" rtlCol="0">
-            <a:spAutoFit/>
-          </a:bodyPr>
-          <a:lstStyle>
-            <a:defPPr>
-              <a:defRPr lang="en-US"/>
-            </a:defPPr>
-            <a:lvl1pPr>
-              <a:defRPr b="1">
-                <a:solidFill>
-                  <a:schemeClr val="accent2">
-                    <a:lumMod val="75000"/>
-                  </a:schemeClr>
-                </a:solidFill>
-                <a:latin typeface="Courier New" panose="02070309020205020404" pitchFamily="49" charset="0"/>
-                <a:cs typeface="Courier New" panose="02070309020205020404" pitchFamily="49" charset="0"/>
-              </a:defRPr>
-            </a:lvl1pPr>
-          </a:lstStyle>
-          <a:p>
-            <a:r>
-              <a:rPr lang="en-US" dirty="0" err="1"/>
-              <a:t>afflictedBy</a:t>
-            </a:r>
-            <a:endParaRPr lang="en-US" dirty="0"/>
-          </a:p>
-        </p:txBody>
-      </p:sp>
-      <p:sp>
-        <p:nvSpPr>
-          <p:cNvPr id="41" name="TextBox 40">
-            <a:extLst>
-              <a:ext uri="{FF2B5EF4-FFF2-40B4-BE49-F238E27FC236}">
-                <a16:creationId xmlns:a16="http://schemas.microsoft.com/office/drawing/2014/main" id="{CCC2A432-EE41-4F21-9AAE-EB569CE224D5}"/>
-              </a:ext>
-            </a:extLst>
-          </p:cNvPr>
-          <p:cNvSpPr txBox="1"/>
-          <p:nvPr/>
-        </p:nvSpPr>
-        <p:spPr>
-          <a:xfrm>
-            <a:off x="8696860" y="1917222"/>
-            <a:ext cx="1740300" cy="369332"/>
-          </a:xfrm>
-          <a:prstGeom prst="rect">
-            <a:avLst/>
-          </a:prstGeom>
-          <a:solidFill>
-            <a:schemeClr val="bg1"/>
-          </a:solidFill>
-        </p:spPr>
-        <p:txBody>
-          <a:bodyPr wrap="square" rtlCol="0">
-            <a:spAutoFit/>
-          </a:bodyPr>
-          <a:lstStyle/>
-          <a:p>
-            <a:r>
-              <a:rPr lang="en-US" b="1" dirty="0">
-                <a:solidFill>
-                  <a:schemeClr val="accent2">
-                    <a:lumMod val="40000"/>
-                    <a:lumOff val="60000"/>
-                  </a:schemeClr>
-                </a:solidFill>
-                <a:latin typeface="Courier New" panose="02070309020205020404" pitchFamily="49" charset="0"/>
-                <a:cs typeface="Courier New" panose="02070309020205020404" pitchFamily="49" charset="0"/>
-              </a:rPr>
-              <a:t>severity</a:t>
-            </a:r>
-          </a:p>
-        </p:txBody>
-      </p:sp>
-      <p:sp>
-        <p:nvSpPr>
-          <p:cNvPr id="7" name="TextBox 6"/>
-          <p:cNvSpPr txBox="1"/>
-          <p:nvPr/>
-        </p:nvSpPr>
-        <p:spPr>
-          <a:xfrm>
-            <a:off x="7665887" y="3569559"/>
-            <a:ext cx="1643348" cy="369332"/>
-          </a:xfrm>
-          <a:prstGeom prst="rect">
-            <a:avLst/>
-          </a:prstGeom>
-          <a:solidFill>
-            <a:schemeClr val="bg1"/>
-          </a:solidFill>
-        </p:spPr>
-        <p:txBody>
-          <a:bodyPr wrap="square" rtlCol="0">
-            <a:spAutoFit/>
-          </a:bodyPr>
-          <a:lstStyle>
-            <a:defPPr>
-              <a:defRPr lang="en-US"/>
-            </a:defPPr>
-            <a:lvl1pPr>
-              <a:defRPr b="1">
-                <a:solidFill>
-                  <a:schemeClr val="accent2">
-                    <a:lumMod val="75000"/>
-                  </a:schemeClr>
-                </a:solidFill>
-                <a:latin typeface="Courier New" panose="02070309020205020404" pitchFamily="49" charset="0"/>
-                <a:cs typeface="Courier New" panose="02070309020205020404" pitchFamily="49" charset="0"/>
-              </a:defRPr>
-            </a:lvl1pPr>
-          </a:lstStyle>
-          <a:p>
-            <a:r>
-              <a:rPr lang="en-US" dirty="0" err="1"/>
-              <a:t>subClassOf</a:t>
-            </a:r>
-            <a:endParaRPr lang="en-US" dirty="0"/>
-          </a:p>
-        </p:txBody>
-      </p:sp>
-      <p:sp>
-        <p:nvSpPr>
-          <p:cNvPr id="45" name="TextBox 44">
-            <a:extLst>
-              <a:ext uri="{FF2B5EF4-FFF2-40B4-BE49-F238E27FC236}">
-                <a16:creationId xmlns:a16="http://schemas.microsoft.com/office/drawing/2014/main" id="{DCEB2144-B3F4-48FC-863E-2B0381C57201}"/>
-              </a:ext>
-            </a:extLst>
-          </p:cNvPr>
-          <p:cNvSpPr txBox="1"/>
-          <p:nvPr/>
-        </p:nvSpPr>
-        <p:spPr>
-          <a:xfrm>
-            <a:off x="603175" y="837054"/>
-            <a:ext cx="4975721" cy="3139321"/>
-          </a:xfrm>
-          <a:prstGeom prst="rect">
-            <a:avLst/>
-          </a:prstGeom>
-          <a:noFill/>
-        </p:spPr>
-        <p:txBody>
-          <a:bodyPr wrap="none" rtlCol="0">
-            <a:spAutoFit/>
-          </a:bodyPr>
-          <a:lstStyle/>
-          <a:p>
-            <a:r>
-              <a:rPr lang="en-US" dirty="0"/>
-              <a:t>study:Subject_CJ16050_00M01</a:t>
-            </a:r>
-          </a:p>
-          <a:p>
-            <a:r>
-              <a:rPr lang="en-US" dirty="0"/>
-              <a:t>    a                           </a:t>
-            </a:r>
-            <a:r>
-              <a:rPr lang="en-US" dirty="0" err="1"/>
-              <a:t>study:StudySubject</a:t>
-            </a:r>
-            <a:r>
-              <a:rPr lang="en-US" dirty="0"/>
-              <a:t> ;</a:t>
-            </a:r>
-          </a:p>
-          <a:p>
-            <a:r>
-              <a:rPr lang="en-US" dirty="0"/>
-              <a:t>    </a:t>
-            </a:r>
-            <a:r>
-              <a:rPr lang="en-US" dirty="0" err="1"/>
-              <a:t>study:rfendtc</a:t>
-            </a:r>
-            <a:r>
-              <a:rPr lang="en-US" dirty="0"/>
-              <a:t>      "2016-12-07"^^</a:t>
-            </a:r>
-            <a:r>
-              <a:rPr lang="en-US" dirty="0" err="1"/>
-              <a:t>xsd:date</a:t>
-            </a:r>
-            <a:r>
-              <a:rPr lang="en-US" dirty="0"/>
-              <a:t> ;</a:t>
-            </a:r>
-          </a:p>
-          <a:p>
-            <a:r>
-              <a:rPr lang="en-US" dirty="0"/>
-              <a:t>    </a:t>
-            </a:r>
-            <a:r>
-              <a:rPr lang="en-US" dirty="0" err="1"/>
-              <a:t>study:rfstdtc</a:t>
-            </a:r>
-            <a:r>
-              <a:rPr lang="en-US" dirty="0"/>
-              <a:t>       "2016-12-07"^^</a:t>
-            </a:r>
-            <a:r>
-              <a:rPr lang="en-US" dirty="0" err="1"/>
-              <a:t>xsd:date</a:t>
-            </a:r>
-            <a:r>
-              <a:rPr lang="en-US" dirty="0"/>
-              <a:t>  ;</a:t>
-            </a:r>
-          </a:p>
-          <a:p>
-            <a:r>
-              <a:rPr lang="en-US" dirty="0"/>
-              <a:t>    </a:t>
-            </a:r>
-            <a:r>
-              <a:rPr lang="en-US" dirty="0" err="1"/>
-              <a:t>study:subjid</a:t>
-            </a:r>
-            <a:r>
-              <a:rPr lang="en-US" dirty="0"/>
-              <a:t>        “CJ16050_00M01"^^</a:t>
-            </a:r>
-            <a:r>
-              <a:rPr lang="en-US" dirty="0" err="1"/>
-              <a:t>xsd:string</a:t>
-            </a:r>
-            <a:r>
-              <a:rPr lang="en-US" dirty="0"/>
-              <a:t> ;</a:t>
-            </a:r>
-          </a:p>
-          <a:p>
-            <a:r>
-              <a:rPr lang="en-US" dirty="0"/>
-              <a:t>    </a:t>
-            </a:r>
-            <a:r>
-              <a:rPr lang="en-US" dirty="0" err="1"/>
-              <a:t>study:usubjid</a:t>
-            </a:r>
-            <a:r>
-              <a:rPr lang="en-US" dirty="0"/>
-              <a:t>     “CJ16050_00M01” ^^</a:t>
-            </a:r>
-            <a:r>
-              <a:rPr lang="en-US" dirty="0" err="1"/>
-              <a:t>xsd:string</a:t>
-            </a:r>
-            <a:r>
-              <a:rPr lang="en-US" dirty="0"/>
-              <a:t> ;</a:t>
-            </a:r>
-          </a:p>
-          <a:p>
-            <a:r>
-              <a:rPr lang="en-US" dirty="0"/>
-              <a:t>.</a:t>
-            </a:r>
-          </a:p>
-          <a:p>
-            <a:endParaRPr lang="en-US" dirty="0"/>
-          </a:p>
-          <a:p>
-            <a:endParaRPr lang="en-US" dirty="0"/>
-          </a:p>
-          <a:p>
-            <a:endParaRPr lang="en-US" dirty="0"/>
-          </a:p>
-          <a:p>
-            <a:endParaRPr lang="en-US" dirty="0"/>
-          </a:p>
-        </p:txBody>
-      </p:sp>
-    </p:spTree>
-    <p:extLst>
-      <p:ext uri="{BB962C8B-B14F-4D97-AF65-F5344CB8AC3E}">
-        <p14:creationId xmlns:p14="http://schemas.microsoft.com/office/powerpoint/2010/main" val="2932786974"/>
       </p:ext>
     </p:extLst>
   </p:cSld>

</xml_diff>